<commit_message>
icebreakers for each lesson
</commit_message>
<xml_diff>
--- a/CssIntro/HelloCss.pptx
+++ b/CssIntro/HelloCss.pptx
@@ -218,7 +218,7 @@
           <a:p>
             <a:fld id="{19104133-B5B0-4351-8158-4F0E5EB1E2BF}" type="datetimeFigureOut">
               <a:rPr lang="en-US" smtClean="0"/>
-              <a:t>7/16/2021</a:t>
+              <a:t>8/25/2022</a:t>
             </a:fld>
             <a:endParaRPr lang="en-US"/>
           </a:p>
@@ -1672,7 +1672,7 @@
             <a:fld id="{1C2D31DE-C454-491C-B5C3-F097855E3DF7}" type="datetime4">
               <a:rPr lang="en-US" smtClean="0"/>
               <a:pPr/>
-              <a:t>July 16, 2021</a:t>
+              <a:t>August 25, 2022</a:t>
             </a:fld>
             <a:endParaRPr lang="en-US" dirty="0"/>
           </a:p>
@@ -5064,7 +5064,7 @@
           <a:p>
             <a:fld id="{5958763E-B898-436D-883D-03711491D54A}" type="datetimeFigureOut">
               <a:rPr lang="en-US" smtClean="0"/>
-              <a:t>7/16/2021</a:t>
+              <a:t>8/25/2022</a:t>
             </a:fld>
             <a:endParaRPr lang="en-US"/>
           </a:p>
@@ -5257,7 +5257,7 @@
           <a:p>
             <a:fld id="{5958763E-B898-436D-883D-03711491D54A}" type="datetimeFigureOut">
               <a:rPr lang="en-US" smtClean="0"/>
-              <a:t>7/16/2021</a:t>
+              <a:t>8/25/2022</a:t>
             </a:fld>
             <a:endParaRPr lang="en-US"/>
           </a:p>
@@ -5507,7 +5507,7 @@
           <a:p>
             <a:fld id="{5958763E-B898-436D-883D-03711491D54A}" type="datetimeFigureOut">
               <a:rPr lang="en-US" smtClean="0"/>
-              <a:t>7/16/2021</a:t>
+              <a:t>8/25/2022</a:t>
             </a:fld>
             <a:endParaRPr lang="en-US"/>
           </a:p>
@@ -5855,7 +5855,7 @@
           <a:p>
             <a:fld id="{5958763E-B898-436D-883D-03711491D54A}" type="datetimeFigureOut">
               <a:rPr lang="en-US" smtClean="0"/>
-              <a:t>7/16/2021</a:t>
+              <a:t>8/25/2022</a:t>
             </a:fld>
             <a:endParaRPr lang="en-US"/>
           </a:p>
@@ -6271,7 +6271,7 @@
           <a:p>
             <a:fld id="{5958763E-B898-436D-883D-03711491D54A}" type="datetimeFigureOut">
               <a:rPr lang="en-US" smtClean="0"/>
-              <a:t>7/16/2021</a:t>
+              <a:t>8/25/2022</a:t>
             </a:fld>
             <a:endParaRPr lang="en-US"/>
           </a:p>
@@ -6772,7 +6772,7 @@
           <a:p>
             <a:fld id="{5958763E-B898-436D-883D-03711491D54A}" type="datetimeFigureOut">
               <a:rPr lang="en-US" smtClean="0"/>
-              <a:t>7/16/2021</a:t>
+              <a:t>8/25/2022</a:t>
             </a:fld>
             <a:endParaRPr lang="en-US"/>
           </a:p>
@@ -7223,7 +7223,7 @@
           <a:p>
             <a:fld id="{5958763E-B898-436D-883D-03711491D54A}" type="datetimeFigureOut">
               <a:rPr lang="en-US" smtClean="0"/>
-              <a:t>7/16/2021</a:t>
+              <a:t>8/25/2022</a:t>
             </a:fld>
             <a:endParaRPr lang="en-US"/>
           </a:p>
@@ -7834,7 +7834,7 @@
           <a:p>
             <a:fld id="{5958763E-B898-436D-883D-03711491D54A}" type="datetimeFigureOut">
               <a:rPr lang="en-US" smtClean="0"/>
-              <a:t>7/16/2021</a:t>
+              <a:t>8/25/2022</a:t>
             </a:fld>
             <a:endParaRPr lang="en-US"/>
           </a:p>
@@ -8605,7 +8605,7 @@
           <a:p>
             <a:fld id="{5958763E-B898-436D-883D-03711491D54A}" type="datetimeFigureOut">
               <a:rPr lang="en-US" smtClean="0"/>
-              <a:t>7/16/2021</a:t>
+              <a:t>8/25/2022</a:t>
             </a:fld>
             <a:endParaRPr lang="en-US"/>
           </a:p>
@@ -8709,7 +8709,7 @@
           <a:p>
             <a:fld id="{5958763E-B898-436D-883D-03711491D54A}" type="datetimeFigureOut">
               <a:rPr lang="en-US" smtClean="0"/>
-              <a:t>7/16/2021</a:t>
+              <a:t>8/25/2022</a:t>
             </a:fld>
             <a:endParaRPr lang="en-US"/>
           </a:p>
@@ -9036,7 +9036,7 @@
             <a:fld id="{1C2D31DE-C454-491C-B5C3-F097855E3DF7}" type="datetime4">
               <a:rPr lang="en-US" smtClean="0"/>
               <a:pPr/>
-              <a:t>July 16, 2021</a:t>
+              <a:t>August 25, 2022</a:t>
             </a:fld>
             <a:endParaRPr lang="en-US" dirty="0"/>
           </a:p>
@@ -12188,7 +12188,7 @@
           <a:p>
             <a:fld id="{5958763E-B898-436D-883D-03711491D54A}" type="datetimeFigureOut">
               <a:rPr lang="en-US" smtClean="0"/>
-              <a:t>7/16/2021</a:t>
+              <a:t>8/25/2022</a:t>
             </a:fld>
             <a:endParaRPr lang="en-US"/>
           </a:p>
@@ -12312,7 +12312,7 @@
           <a:p>
             <a:fld id="{5958763E-B898-436D-883D-03711491D54A}" type="datetimeFigureOut">
               <a:rPr lang="en-US" smtClean="0"/>
-              <a:t>7/16/2021</a:t>
+              <a:t>8/25/2022</a:t>
             </a:fld>
             <a:endParaRPr lang="en-US"/>
           </a:p>
@@ -12436,7 +12436,7 @@
           <a:p>
             <a:fld id="{5958763E-B898-436D-883D-03711491D54A}" type="datetimeFigureOut">
               <a:rPr lang="en-US" smtClean="0"/>
-              <a:t>7/16/2021</a:t>
+              <a:t>8/25/2022</a:t>
             </a:fld>
             <a:endParaRPr lang="en-US"/>
           </a:p>
@@ -12560,7 +12560,7 @@
           <a:p>
             <a:fld id="{5958763E-B898-436D-883D-03711491D54A}" type="datetimeFigureOut">
               <a:rPr lang="en-US" smtClean="0"/>
-              <a:t>7/16/2021</a:t>
+              <a:t>8/25/2022</a:t>
             </a:fld>
             <a:endParaRPr lang="en-US"/>
           </a:p>
@@ -12684,7 +12684,7 @@
           <a:p>
             <a:fld id="{5958763E-B898-436D-883D-03711491D54A}" type="datetimeFigureOut">
               <a:rPr lang="en-US" smtClean="0"/>
-              <a:t>7/16/2021</a:t>
+              <a:t>8/25/2022</a:t>
             </a:fld>
             <a:endParaRPr lang="en-US"/>
           </a:p>
@@ -12808,7 +12808,7 @@
           <a:p>
             <a:fld id="{5958763E-B898-436D-883D-03711491D54A}" type="datetimeFigureOut">
               <a:rPr lang="en-US" smtClean="0"/>
-              <a:t>7/16/2021</a:t>
+              <a:t>8/25/2022</a:t>
             </a:fld>
             <a:endParaRPr lang="en-US"/>
           </a:p>
@@ -12932,7 +12932,7 @@
           <a:p>
             <a:fld id="{5958763E-B898-436D-883D-03711491D54A}" type="datetimeFigureOut">
               <a:rPr lang="en-US" smtClean="0"/>
-              <a:t>7/16/2021</a:t>
+              <a:t>8/25/2022</a:t>
             </a:fld>
             <a:endParaRPr lang="en-US"/>
           </a:p>
@@ -13056,7 +13056,7 @@
           <a:p>
             <a:fld id="{5958763E-B898-436D-883D-03711491D54A}" type="datetimeFigureOut">
               <a:rPr lang="en-US" smtClean="0"/>
-              <a:t>7/16/2021</a:t>
+              <a:t>8/25/2022</a:t>
             </a:fld>
             <a:endParaRPr lang="en-US"/>
           </a:p>
@@ -13189,7 +13189,7 @@
           <a:p>
             <a:fld id="{5958763E-B898-436D-883D-03711491D54A}" type="datetimeFigureOut">
               <a:rPr lang="en-US" smtClean="0"/>
-              <a:t>7/16/2021</a:t>
+              <a:t>8/25/2022</a:t>
             </a:fld>
             <a:endParaRPr lang="en-US"/>
           </a:p>
@@ -16528,7 +16528,7 @@
             <a:fld id="{1C2D31DE-C454-491C-B5C3-F097855E3DF7}" type="datetime4">
               <a:rPr lang="en-US" smtClean="0"/>
               <a:pPr/>
-              <a:t>July 16, 2021</a:t>
+              <a:t>August 25, 2022</a:t>
             </a:fld>
             <a:endParaRPr lang="en-US" dirty="0"/>
           </a:p>
@@ -28764,7 +28764,7 @@
           <a:p>
             <a:fld id="{5958763E-B898-436D-883D-03711491D54A}" type="datetimeFigureOut">
               <a:rPr lang="en-US" smtClean="0"/>
-              <a:t>7/16/2021</a:t>
+              <a:t>8/25/2022</a:t>
             </a:fld>
             <a:endParaRPr lang="en-US"/>
           </a:p>
@@ -29166,7 +29166,7 @@
           <a:p>
             <a:fld id="{5958763E-B898-436D-883D-03711491D54A}" type="datetimeFigureOut">
               <a:rPr lang="en-US" smtClean="0"/>
-              <a:t>7/16/2021</a:t>
+              <a:t>8/25/2022</a:t>
             </a:fld>
             <a:endParaRPr lang="en-US"/>
           </a:p>
@@ -29460,7 +29460,7 @@
           <a:p>
             <a:fld id="{5958763E-B898-436D-883D-03711491D54A}" type="datetimeFigureOut">
               <a:rPr lang="en-US" smtClean="0"/>
-              <a:t>7/16/2021</a:t>
+              <a:t>8/25/2022</a:t>
             </a:fld>
             <a:endParaRPr lang="en-US"/>
           </a:p>
@@ -29661,7 +29661,7 @@
           <a:p>
             <a:fld id="{5958763E-B898-436D-883D-03711491D54A}" type="datetimeFigureOut">
               <a:rPr lang="en-US" smtClean="0"/>
-              <a:t>7/16/2021</a:t>
+              <a:t>8/25/2022</a:t>
             </a:fld>
             <a:endParaRPr lang="en-US"/>
           </a:p>
@@ -29922,7 +29922,7 @@
           <a:p>
             <a:fld id="{5958763E-B898-436D-883D-03711491D54A}" type="datetimeFigureOut">
               <a:rPr lang="en-US" smtClean="0"/>
-              <a:t>7/16/2021</a:t>
+              <a:t>8/25/2022</a:t>
             </a:fld>
             <a:endParaRPr lang="en-US"/>
           </a:p>
@@ -30183,7 +30183,7 @@
           <a:p>
             <a:fld id="{61FD5E12-641C-4696-BA65-B86205845F69}" type="datetimeFigureOut">
               <a:rPr lang="en-US" smtClean="0"/>
-              <a:t>7/16/2021</a:t>
+              <a:t>8/25/2022</a:t>
             </a:fld>
             <a:endParaRPr lang="en-US"/>
           </a:p>
@@ -30353,7 +30353,7 @@
           <a:p>
             <a:fld id="{61FD5E12-641C-4696-BA65-B86205845F69}" type="datetimeFigureOut">
               <a:rPr lang="en-US" smtClean="0"/>
-              <a:t>7/16/2021</a:t>
+              <a:t>8/25/2022</a:t>
             </a:fld>
             <a:endParaRPr lang="en-US"/>
           </a:p>
@@ -30792,7 +30792,7 @@
           <a:p>
             <a:fld id="{5958763E-B898-436D-883D-03711491D54A}" type="datetimeFigureOut">
               <a:rPr lang="en-US" smtClean="0"/>
-              <a:t>7/16/2021</a:t>
+              <a:t>8/25/2022</a:t>
             </a:fld>
             <a:endParaRPr lang="en-US"/>
           </a:p>
@@ -31087,7 +31087,7 @@
           <a:p>
             <a:fld id="{61FD5E12-641C-4696-BA65-B86205845F69}" type="datetimeFigureOut">
               <a:rPr lang="en-US" smtClean="0"/>
-              <a:t>7/16/2021</a:t>
+              <a:t>8/25/2022</a:t>
             </a:fld>
             <a:endParaRPr lang="en-US"/>
           </a:p>
@@ -31319,7 +31319,7 @@
           <a:p>
             <a:fld id="{61FD5E12-641C-4696-BA65-B86205845F69}" type="datetimeFigureOut">
               <a:rPr lang="en-US" smtClean="0"/>
-              <a:t>7/16/2021</a:t>
+              <a:t>8/25/2022</a:t>
             </a:fld>
             <a:endParaRPr lang="en-US"/>
           </a:p>
@@ -31686,7 +31686,7 @@
           <a:p>
             <a:fld id="{61FD5E12-641C-4696-BA65-B86205845F69}" type="datetimeFigureOut">
               <a:rPr lang="en-US" smtClean="0"/>
-              <a:t>7/16/2021</a:t>
+              <a:t>8/25/2022</a:t>
             </a:fld>
             <a:endParaRPr lang="en-US"/>
           </a:p>
@@ -31804,7 +31804,7 @@
           <a:p>
             <a:fld id="{61FD5E12-641C-4696-BA65-B86205845F69}" type="datetimeFigureOut">
               <a:rPr lang="en-US" smtClean="0"/>
-              <a:t>7/16/2021</a:t>
+              <a:t>8/25/2022</a:t>
             </a:fld>
             <a:endParaRPr lang="en-US"/>
           </a:p>
@@ -31899,7 +31899,7 @@
           <a:p>
             <a:fld id="{61FD5E12-641C-4696-BA65-B86205845F69}" type="datetimeFigureOut">
               <a:rPr lang="en-US" smtClean="0"/>
-              <a:t>7/16/2021</a:t>
+              <a:t>8/25/2022</a:t>
             </a:fld>
             <a:endParaRPr lang="en-US"/>
           </a:p>
@@ -32176,7 +32176,7 @@
           <a:p>
             <a:fld id="{61FD5E12-641C-4696-BA65-B86205845F69}" type="datetimeFigureOut">
               <a:rPr lang="en-US" smtClean="0"/>
-              <a:t>7/16/2021</a:t>
+              <a:t>8/25/2022</a:t>
             </a:fld>
             <a:endParaRPr lang="en-US"/>
           </a:p>
@@ -32433,7 +32433,7 @@
           <a:p>
             <a:fld id="{61FD5E12-641C-4696-BA65-B86205845F69}" type="datetimeFigureOut">
               <a:rPr lang="en-US" smtClean="0"/>
-              <a:t>7/16/2021</a:t>
+              <a:t>8/25/2022</a:t>
             </a:fld>
             <a:endParaRPr lang="en-US"/>
           </a:p>
@@ -32603,7 +32603,7 @@
           <a:p>
             <a:fld id="{61FD5E12-641C-4696-BA65-B86205845F69}" type="datetimeFigureOut">
               <a:rPr lang="en-US" smtClean="0"/>
-              <a:t>7/16/2021</a:t>
+              <a:t>8/25/2022</a:t>
             </a:fld>
             <a:endParaRPr lang="en-US"/>
           </a:p>
@@ -32783,7 +32783,7 @@
           <a:p>
             <a:fld id="{61FD5E12-641C-4696-BA65-B86205845F69}" type="datetimeFigureOut">
               <a:rPr lang="en-US" smtClean="0"/>
-              <a:t>7/16/2021</a:t>
+              <a:t>8/25/2022</a:t>
             </a:fld>
             <a:endParaRPr lang="en-US"/>
           </a:p>
@@ -33429,7 +33429,7 @@
           <a:p>
             <a:fld id="{5958763E-B898-436D-883D-03711491D54A}" type="datetimeFigureOut">
               <a:rPr lang="en-US" smtClean="0"/>
-              <a:t>7/16/2021</a:t>
+              <a:t>8/25/2022</a:t>
             </a:fld>
             <a:endParaRPr lang="en-US"/>
           </a:p>
@@ -34818,7 +34818,7 @@
           <a:p>
             <a:fld id="{5958763E-B898-436D-883D-03711491D54A}" type="datetimeFigureOut">
               <a:rPr lang="en-US" smtClean="0"/>
-              <a:t>7/16/2021</a:t>
+              <a:t>8/25/2022</a:t>
             </a:fld>
             <a:endParaRPr lang="en-US"/>
           </a:p>
@@ -35019,7 +35019,7 @@
           <a:p>
             <a:fld id="{5958763E-B898-436D-883D-03711491D54A}" type="datetimeFigureOut">
               <a:rPr lang="en-US" smtClean="0"/>
-              <a:t>7/16/2021</a:t>
+              <a:t>8/25/2022</a:t>
             </a:fld>
             <a:endParaRPr lang="en-US"/>
           </a:p>
@@ -35354,7 +35354,7 @@
           <a:p>
             <a:fld id="{5958763E-B898-436D-883D-03711491D54A}" type="datetimeFigureOut">
               <a:rPr lang="en-US" smtClean="0"/>
-              <a:t>7/16/2021</a:t>
+              <a:t>8/25/2022</a:t>
             </a:fld>
             <a:endParaRPr lang="en-US"/>
           </a:p>
@@ -35584,7 +35584,7 @@
           <a:p>
             <a:fld id="{5958763E-B898-436D-883D-03711491D54A}" type="datetimeFigureOut">
               <a:rPr lang="en-US" smtClean="0"/>
-              <a:t>7/16/2021</a:t>
+              <a:t>8/25/2022</a:t>
             </a:fld>
             <a:endParaRPr lang="en-US"/>
           </a:p>
@@ -35828,7 +35828,7 @@
           <a:p>
             <a:fld id="{5958763E-B898-436D-883D-03711491D54A}" type="datetimeFigureOut">
               <a:rPr lang="en-US" smtClean="0"/>
-              <a:t>7/16/2021</a:t>
+              <a:t>8/25/2022</a:t>
             </a:fld>
             <a:endParaRPr lang="en-US"/>
           </a:p>
@@ -36469,7 +36469,7 @@
           <a:p>
             <a:fld id="{61FD5E12-641C-4696-BA65-B86205845F69}" type="datetimeFigureOut">
               <a:rPr lang="en-US" smtClean="0"/>
-              <a:t>7/16/2021</a:t>
+              <a:t>8/25/2022</a:t>
             </a:fld>
             <a:endParaRPr lang="en-US"/>
           </a:p>
@@ -40737,7 +40737,7 @@
 </file>
 
 <file path=ppt/slides/slide4.xml><?xml version="1.0" encoding="utf-8"?>
-<p:sld xmlns:a="http://schemas.openxmlformats.org/drawingml/2006/main" xmlns:r="http://schemas.openxmlformats.org/officeDocument/2006/relationships" xmlns:p="http://schemas.openxmlformats.org/presentationml/2006/main" show="0">
+<p:sld xmlns:a="http://schemas.openxmlformats.org/drawingml/2006/main" xmlns:r="http://schemas.openxmlformats.org/officeDocument/2006/relationships" xmlns:p="http://schemas.openxmlformats.org/presentationml/2006/main">
   <p:cSld>
     <p:spTree>
       <p:nvGrpSpPr>

</xml_diff>

<commit_message>
Update gitbook 2022-08-25 15:36:41
</commit_message>
<xml_diff>
--- a/CssIntro/HelloCss.pptx
+++ b/CssIntro/HelloCss.pptx
@@ -218,7 +218,7 @@
           <a:p>
             <a:fld id="{19104133-B5B0-4351-8158-4F0E5EB1E2BF}" type="datetimeFigureOut">
               <a:rPr lang="en-US" smtClean="0"/>
-              <a:t>7/16/2021</a:t>
+              <a:t>8/25/2022</a:t>
             </a:fld>
             <a:endParaRPr lang="en-US"/>
           </a:p>
@@ -1672,7 +1672,7 @@
             <a:fld id="{1C2D31DE-C454-491C-B5C3-F097855E3DF7}" type="datetime4">
               <a:rPr lang="en-US" smtClean="0"/>
               <a:pPr/>
-              <a:t>July 16, 2021</a:t>
+              <a:t>August 25, 2022</a:t>
             </a:fld>
             <a:endParaRPr lang="en-US" dirty="0"/>
           </a:p>
@@ -5064,7 +5064,7 @@
           <a:p>
             <a:fld id="{5958763E-B898-436D-883D-03711491D54A}" type="datetimeFigureOut">
               <a:rPr lang="en-US" smtClean="0"/>
-              <a:t>7/16/2021</a:t>
+              <a:t>8/25/2022</a:t>
             </a:fld>
             <a:endParaRPr lang="en-US"/>
           </a:p>
@@ -5257,7 +5257,7 @@
           <a:p>
             <a:fld id="{5958763E-B898-436D-883D-03711491D54A}" type="datetimeFigureOut">
               <a:rPr lang="en-US" smtClean="0"/>
-              <a:t>7/16/2021</a:t>
+              <a:t>8/25/2022</a:t>
             </a:fld>
             <a:endParaRPr lang="en-US"/>
           </a:p>
@@ -5507,7 +5507,7 @@
           <a:p>
             <a:fld id="{5958763E-B898-436D-883D-03711491D54A}" type="datetimeFigureOut">
               <a:rPr lang="en-US" smtClean="0"/>
-              <a:t>7/16/2021</a:t>
+              <a:t>8/25/2022</a:t>
             </a:fld>
             <a:endParaRPr lang="en-US"/>
           </a:p>
@@ -5855,7 +5855,7 @@
           <a:p>
             <a:fld id="{5958763E-B898-436D-883D-03711491D54A}" type="datetimeFigureOut">
               <a:rPr lang="en-US" smtClean="0"/>
-              <a:t>7/16/2021</a:t>
+              <a:t>8/25/2022</a:t>
             </a:fld>
             <a:endParaRPr lang="en-US"/>
           </a:p>
@@ -6271,7 +6271,7 @@
           <a:p>
             <a:fld id="{5958763E-B898-436D-883D-03711491D54A}" type="datetimeFigureOut">
               <a:rPr lang="en-US" smtClean="0"/>
-              <a:t>7/16/2021</a:t>
+              <a:t>8/25/2022</a:t>
             </a:fld>
             <a:endParaRPr lang="en-US"/>
           </a:p>
@@ -6772,7 +6772,7 @@
           <a:p>
             <a:fld id="{5958763E-B898-436D-883D-03711491D54A}" type="datetimeFigureOut">
               <a:rPr lang="en-US" smtClean="0"/>
-              <a:t>7/16/2021</a:t>
+              <a:t>8/25/2022</a:t>
             </a:fld>
             <a:endParaRPr lang="en-US"/>
           </a:p>
@@ -7223,7 +7223,7 @@
           <a:p>
             <a:fld id="{5958763E-B898-436D-883D-03711491D54A}" type="datetimeFigureOut">
               <a:rPr lang="en-US" smtClean="0"/>
-              <a:t>7/16/2021</a:t>
+              <a:t>8/25/2022</a:t>
             </a:fld>
             <a:endParaRPr lang="en-US"/>
           </a:p>
@@ -7834,7 +7834,7 @@
           <a:p>
             <a:fld id="{5958763E-B898-436D-883D-03711491D54A}" type="datetimeFigureOut">
               <a:rPr lang="en-US" smtClean="0"/>
-              <a:t>7/16/2021</a:t>
+              <a:t>8/25/2022</a:t>
             </a:fld>
             <a:endParaRPr lang="en-US"/>
           </a:p>
@@ -8605,7 +8605,7 @@
           <a:p>
             <a:fld id="{5958763E-B898-436D-883D-03711491D54A}" type="datetimeFigureOut">
               <a:rPr lang="en-US" smtClean="0"/>
-              <a:t>7/16/2021</a:t>
+              <a:t>8/25/2022</a:t>
             </a:fld>
             <a:endParaRPr lang="en-US"/>
           </a:p>
@@ -8709,7 +8709,7 @@
           <a:p>
             <a:fld id="{5958763E-B898-436D-883D-03711491D54A}" type="datetimeFigureOut">
               <a:rPr lang="en-US" smtClean="0"/>
-              <a:t>7/16/2021</a:t>
+              <a:t>8/25/2022</a:t>
             </a:fld>
             <a:endParaRPr lang="en-US"/>
           </a:p>
@@ -9036,7 +9036,7 @@
             <a:fld id="{1C2D31DE-C454-491C-B5C3-F097855E3DF7}" type="datetime4">
               <a:rPr lang="en-US" smtClean="0"/>
               <a:pPr/>
-              <a:t>July 16, 2021</a:t>
+              <a:t>August 25, 2022</a:t>
             </a:fld>
             <a:endParaRPr lang="en-US" dirty="0"/>
           </a:p>
@@ -12188,7 +12188,7 @@
           <a:p>
             <a:fld id="{5958763E-B898-436D-883D-03711491D54A}" type="datetimeFigureOut">
               <a:rPr lang="en-US" smtClean="0"/>
-              <a:t>7/16/2021</a:t>
+              <a:t>8/25/2022</a:t>
             </a:fld>
             <a:endParaRPr lang="en-US"/>
           </a:p>
@@ -12312,7 +12312,7 @@
           <a:p>
             <a:fld id="{5958763E-B898-436D-883D-03711491D54A}" type="datetimeFigureOut">
               <a:rPr lang="en-US" smtClean="0"/>
-              <a:t>7/16/2021</a:t>
+              <a:t>8/25/2022</a:t>
             </a:fld>
             <a:endParaRPr lang="en-US"/>
           </a:p>
@@ -12436,7 +12436,7 @@
           <a:p>
             <a:fld id="{5958763E-B898-436D-883D-03711491D54A}" type="datetimeFigureOut">
               <a:rPr lang="en-US" smtClean="0"/>
-              <a:t>7/16/2021</a:t>
+              <a:t>8/25/2022</a:t>
             </a:fld>
             <a:endParaRPr lang="en-US"/>
           </a:p>
@@ -12560,7 +12560,7 @@
           <a:p>
             <a:fld id="{5958763E-B898-436D-883D-03711491D54A}" type="datetimeFigureOut">
               <a:rPr lang="en-US" smtClean="0"/>
-              <a:t>7/16/2021</a:t>
+              <a:t>8/25/2022</a:t>
             </a:fld>
             <a:endParaRPr lang="en-US"/>
           </a:p>
@@ -12684,7 +12684,7 @@
           <a:p>
             <a:fld id="{5958763E-B898-436D-883D-03711491D54A}" type="datetimeFigureOut">
               <a:rPr lang="en-US" smtClean="0"/>
-              <a:t>7/16/2021</a:t>
+              <a:t>8/25/2022</a:t>
             </a:fld>
             <a:endParaRPr lang="en-US"/>
           </a:p>
@@ -12808,7 +12808,7 @@
           <a:p>
             <a:fld id="{5958763E-B898-436D-883D-03711491D54A}" type="datetimeFigureOut">
               <a:rPr lang="en-US" smtClean="0"/>
-              <a:t>7/16/2021</a:t>
+              <a:t>8/25/2022</a:t>
             </a:fld>
             <a:endParaRPr lang="en-US"/>
           </a:p>
@@ -12932,7 +12932,7 @@
           <a:p>
             <a:fld id="{5958763E-B898-436D-883D-03711491D54A}" type="datetimeFigureOut">
               <a:rPr lang="en-US" smtClean="0"/>
-              <a:t>7/16/2021</a:t>
+              <a:t>8/25/2022</a:t>
             </a:fld>
             <a:endParaRPr lang="en-US"/>
           </a:p>
@@ -13056,7 +13056,7 @@
           <a:p>
             <a:fld id="{5958763E-B898-436D-883D-03711491D54A}" type="datetimeFigureOut">
               <a:rPr lang="en-US" smtClean="0"/>
-              <a:t>7/16/2021</a:t>
+              <a:t>8/25/2022</a:t>
             </a:fld>
             <a:endParaRPr lang="en-US"/>
           </a:p>
@@ -13189,7 +13189,7 @@
           <a:p>
             <a:fld id="{5958763E-B898-436D-883D-03711491D54A}" type="datetimeFigureOut">
               <a:rPr lang="en-US" smtClean="0"/>
-              <a:t>7/16/2021</a:t>
+              <a:t>8/25/2022</a:t>
             </a:fld>
             <a:endParaRPr lang="en-US"/>
           </a:p>
@@ -16528,7 +16528,7 @@
             <a:fld id="{1C2D31DE-C454-491C-B5C3-F097855E3DF7}" type="datetime4">
               <a:rPr lang="en-US" smtClean="0"/>
               <a:pPr/>
-              <a:t>July 16, 2021</a:t>
+              <a:t>August 25, 2022</a:t>
             </a:fld>
             <a:endParaRPr lang="en-US" dirty="0"/>
           </a:p>
@@ -28764,7 +28764,7 @@
           <a:p>
             <a:fld id="{5958763E-B898-436D-883D-03711491D54A}" type="datetimeFigureOut">
               <a:rPr lang="en-US" smtClean="0"/>
-              <a:t>7/16/2021</a:t>
+              <a:t>8/25/2022</a:t>
             </a:fld>
             <a:endParaRPr lang="en-US"/>
           </a:p>
@@ -29166,7 +29166,7 @@
           <a:p>
             <a:fld id="{5958763E-B898-436D-883D-03711491D54A}" type="datetimeFigureOut">
               <a:rPr lang="en-US" smtClean="0"/>
-              <a:t>7/16/2021</a:t>
+              <a:t>8/25/2022</a:t>
             </a:fld>
             <a:endParaRPr lang="en-US"/>
           </a:p>
@@ -29460,7 +29460,7 @@
           <a:p>
             <a:fld id="{5958763E-B898-436D-883D-03711491D54A}" type="datetimeFigureOut">
               <a:rPr lang="en-US" smtClean="0"/>
-              <a:t>7/16/2021</a:t>
+              <a:t>8/25/2022</a:t>
             </a:fld>
             <a:endParaRPr lang="en-US"/>
           </a:p>
@@ -29661,7 +29661,7 @@
           <a:p>
             <a:fld id="{5958763E-B898-436D-883D-03711491D54A}" type="datetimeFigureOut">
               <a:rPr lang="en-US" smtClean="0"/>
-              <a:t>7/16/2021</a:t>
+              <a:t>8/25/2022</a:t>
             </a:fld>
             <a:endParaRPr lang="en-US"/>
           </a:p>
@@ -29922,7 +29922,7 @@
           <a:p>
             <a:fld id="{5958763E-B898-436D-883D-03711491D54A}" type="datetimeFigureOut">
               <a:rPr lang="en-US" smtClean="0"/>
-              <a:t>7/16/2021</a:t>
+              <a:t>8/25/2022</a:t>
             </a:fld>
             <a:endParaRPr lang="en-US"/>
           </a:p>
@@ -30183,7 +30183,7 @@
           <a:p>
             <a:fld id="{61FD5E12-641C-4696-BA65-B86205845F69}" type="datetimeFigureOut">
               <a:rPr lang="en-US" smtClean="0"/>
-              <a:t>7/16/2021</a:t>
+              <a:t>8/25/2022</a:t>
             </a:fld>
             <a:endParaRPr lang="en-US"/>
           </a:p>
@@ -30353,7 +30353,7 @@
           <a:p>
             <a:fld id="{61FD5E12-641C-4696-BA65-B86205845F69}" type="datetimeFigureOut">
               <a:rPr lang="en-US" smtClean="0"/>
-              <a:t>7/16/2021</a:t>
+              <a:t>8/25/2022</a:t>
             </a:fld>
             <a:endParaRPr lang="en-US"/>
           </a:p>
@@ -30792,7 +30792,7 @@
           <a:p>
             <a:fld id="{5958763E-B898-436D-883D-03711491D54A}" type="datetimeFigureOut">
               <a:rPr lang="en-US" smtClean="0"/>
-              <a:t>7/16/2021</a:t>
+              <a:t>8/25/2022</a:t>
             </a:fld>
             <a:endParaRPr lang="en-US"/>
           </a:p>
@@ -31087,7 +31087,7 @@
           <a:p>
             <a:fld id="{61FD5E12-641C-4696-BA65-B86205845F69}" type="datetimeFigureOut">
               <a:rPr lang="en-US" smtClean="0"/>
-              <a:t>7/16/2021</a:t>
+              <a:t>8/25/2022</a:t>
             </a:fld>
             <a:endParaRPr lang="en-US"/>
           </a:p>
@@ -31319,7 +31319,7 @@
           <a:p>
             <a:fld id="{61FD5E12-641C-4696-BA65-B86205845F69}" type="datetimeFigureOut">
               <a:rPr lang="en-US" smtClean="0"/>
-              <a:t>7/16/2021</a:t>
+              <a:t>8/25/2022</a:t>
             </a:fld>
             <a:endParaRPr lang="en-US"/>
           </a:p>
@@ -31686,7 +31686,7 @@
           <a:p>
             <a:fld id="{61FD5E12-641C-4696-BA65-B86205845F69}" type="datetimeFigureOut">
               <a:rPr lang="en-US" smtClean="0"/>
-              <a:t>7/16/2021</a:t>
+              <a:t>8/25/2022</a:t>
             </a:fld>
             <a:endParaRPr lang="en-US"/>
           </a:p>
@@ -31804,7 +31804,7 @@
           <a:p>
             <a:fld id="{61FD5E12-641C-4696-BA65-B86205845F69}" type="datetimeFigureOut">
               <a:rPr lang="en-US" smtClean="0"/>
-              <a:t>7/16/2021</a:t>
+              <a:t>8/25/2022</a:t>
             </a:fld>
             <a:endParaRPr lang="en-US"/>
           </a:p>
@@ -31899,7 +31899,7 @@
           <a:p>
             <a:fld id="{61FD5E12-641C-4696-BA65-B86205845F69}" type="datetimeFigureOut">
               <a:rPr lang="en-US" smtClean="0"/>
-              <a:t>7/16/2021</a:t>
+              <a:t>8/25/2022</a:t>
             </a:fld>
             <a:endParaRPr lang="en-US"/>
           </a:p>
@@ -32176,7 +32176,7 @@
           <a:p>
             <a:fld id="{61FD5E12-641C-4696-BA65-B86205845F69}" type="datetimeFigureOut">
               <a:rPr lang="en-US" smtClean="0"/>
-              <a:t>7/16/2021</a:t>
+              <a:t>8/25/2022</a:t>
             </a:fld>
             <a:endParaRPr lang="en-US"/>
           </a:p>
@@ -32433,7 +32433,7 @@
           <a:p>
             <a:fld id="{61FD5E12-641C-4696-BA65-B86205845F69}" type="datetimeFigureOut">
               <a:rPr lang="en-US" smtClean="0"/>
-              <a:t>7/16/2021</a:t>
+              <a:t>8/25/2022</a:t>
             </a:fld>
             <a:endParaRPr lang="en-US"/>
           </a:p>
@@ -32603,7 +32603,7 @@
           <a:p>
             <a:fld id="{61FD5E12-641C-4696-BA65-B86205845F69}" type="datetimeFigureOut">
               <a:rPr lang="en-US" smtClean="0"/>
-              <a:t>7/16/2021</a:t>
+              <a:t>8/25/2022</a:t>
             </a:fld>
             <a:endParaRPr lang="en-US"/>
           </a:p>
@@ -32783,7 +32783,7 @@
           <a:p>
             <a:fld id="{61FD5E12-641C-4696-BA65-B86205845F69}" type="datetimeFigureOut">
               <a:rPr lang="en-US" smtClean="0"/>
-              <a:t>7/16/2021</a:t>
+              <a:t>8/25/2022</a:t>
             </a:fld>
             <a:endParaRPr lang="en-US"/>
           </a:p>
@@ -33429,7 +33429,7 @@
           <a:p>
             <a:fld id="{5958763E-B898-436D-883D-03711491D54A}" type="datetimeFigureOut">
               <a:rPr lang="en-US" smtClean="0"/>
-              <a:t>7/16/2021</a:t>
+              <a:t>8/25/2022</a:t>
             </a:fld>
             <a:endParaRPr lang="en-US"/>
           </a:p>
@@ -34818,7 +34818,7 @@
           <a:p>
             <a:fld id="{5958763E-B898-436D-883D-03711491D54A}" type="datetimeFigureOut">
               <a:rPr lang="en-US" smtClean="0"/>
-              <a:t>7/16/2021</a:t>
+              <a:t>8/25/2022</a:t>
             </a:fld>
             <a:endParaRPr lang="en-US"/>
           </a:p>
@@ -35019,7 +35019,7 @@
           <a:p>
             <a:fld id="{5958763E-B898-436D-883D-03711491D54A}" type="datetimeFigureOut">
               <a:rPr lang="en-US" smtClean="0"/>
-              <a:t>7/16/2021</a:t>
+              <a:t>8/25/2022</a:t>
             </a:fld>
             <a:endParaRPr lang="en-US"/>
           </a:p>
@@ -35354,7 +35354,7 @@
           <a:p>
             <a:fld id="{5958763E-B898-436D-883D-03711491D54A}" type="datetimeFigureOut">
               <a:rPr lang="en-US" smtClean="0"/>
-              <a:t>7/16/2021</a:t>
+              <a:t>8/25/2022</a:t>
             </a:fld>
             <a:endParaRPr lang="en-US"/>
           </a:p>
@@ -35584,7 +35584,7 @@
           <a:p>
             <a:fld id="{5958763E-B898-436D-883D-03711491D54A}" type="datetimeFigureOut">
               <a:rPr lang="en-US" smtClean="0"/>
-              <a:t>7/16/2021</a:t>
+              <a:t>8/25/2022</a:t>
             </a:fld>
             <a:endParaRPr lang="en-US"/>
           </a:p>
@@ -35828,7 +35828,7 @@
           <a:p>
             <a:fld id="{5958763E-B898-436D-883D-03711491D54A}" type="datetimeFigureOut">
               <a:rPr lang="en-US" smtClean="0"/>
-              <a:t>7/16/2021</a:t>
+              <a:t>8/25/2022</a:t>
             </a:fld>
             <a:endParaRPr lang="en-US"/>
           </a:p>
@@ -36469,7 +36469,7 @@
           <a:p>
             <a:fld id="{61FD5E12-641C-4696-BA65-B86205845F69}" type="datetimeFigureOut">
               <a:rPr lang="en-US" smtClean="0"/>
-              <a:t>7/16/2021</a:t>
+              <a:t>8/25/2022</a:t>
             </a:fld>
             <a:endParaRPr lang="en-US"/>
           </a:p>
@@ -40737,7 +40737,7 @@
 </file>
 
 <file path=ppt/slides/slide4.xml><?xml version="1.0" encoding="utf-8"?>
-<p:sld xmlns:a="http://schemas.openxmlformats.org/drawingml/2006/main" xmlns:r="http://schemas.openxmlformats.org/officeDocument/2006/relationships" xmlns:p="http://schemas.openxmlformats.org/presentationml/2006/main" show="0">
+<p:sld xmlns:a="http://schemas.openxmlformats.org/drawingml/2006/main" xmlns:r="http://schemas.openxmlformats.org/officeDocument/2006/relationships" xmlns:p="http://schemas.openxmlformats.org/presentationml/2006/main">
   <p:cSld>
     <p:spTree>
       <p:nvGrpSpPr>

</xml_diff>

<commit_message>
css intro use style element
</commit_message>
<xml_diff>
--- a/CssIntro/HelloCss.pptx
+++ b/CssIntro/HelloCss.pptx
@@ -6,19 +6,18 @@
     <p:sldMasterId id="2147483686" r:id="rId2"/>
   </p:sldMasterIdLst>
   <p:notesMasterIdLst>
-    <p:notesMasterId r:id="rId13"/>
+    <p:notesMasterId r:id="rId12"/>
   </p:notesMasterIdLst>
   <p:sldIdLst>
     <p:sldId id="258" r:id="rId3"/>
     <p:sldId id="295" r:id="rId4"/>
     <p:sldId id="306" r:id="rId5"/>
-    <p:sldId id="311" r:id="rId6"/>
-    <p:sldId id="312" r:id="rId7"/>
-    <p:sldId id="310" r:id="rId8"/>
-    <p:sldId id="307" r:id="rId9"/>
-    <p:sldId id="315" r:id="rId10"/>
-    <p:sldId id="314" r:id="rId11"/>
-    <p:sldId id="316" r:id="rId12"/>
+    <p:sldId id="312" r:id="rId6"/>
+    <p:sldId id="310" r:id="rId7"/>
+    <p:sldId id="307" r:id="rId8"/>
+    <p:sldId id="315" r:id="rId9"/>
+    <p:sldId id="314" r:id="rId10"/>
+    <p:sldId id="316" r:id="rId11"/>
   </p:sldIdLst>
   <p:sldSz cx="12192000" cy="6858000"/>
   <p:notesSz cx="6858000" cy="9144000"/>
@@ -136,6 +135,18 @@
 </p:presentation>
 </file>
 
+<file path=ppt/commentAuthors.xml><?xml version="1.0" encoding="utf-8"?>
+<p:cmAuthorLst xmlns:a="http://schemas.openxmlformats.org/drawingml/2006/main" xmlns:r="http://schemas.openxmlformats.org/officeDocument/2006/relationships" xmlns:p="http://schemas.openxmlformats.org/presentationml/2006/main">
+  <p:cmAuthor id="1" name="Joseph Maxwell" initials="JM" lastIdx="1" clrIdx="0">
+    <p:extLst>
+      <p:ext uri="{19B8F6BF-5375-455C-9EA6-DF929625EA0E}">
+        <p15:presenceInfo xmlns:p15="http://schemas.microsoft.com/office/powerpoint/2012/main" userId="S::Joseph.Maxwell@hyland.com::81b9e37d-9426-4999-a489-1cb52182bfd4" providerId="AD"/>
+      </p:ext>
+    </p:extLst>
+  </p:cmAuthor>
+</p:cmAuthorLst>
+</file>
+
 <file path=ppt/notesMasters/notesMaster1.xml><?xml version="1.0" encoding="utf-8"?>
 <p:notesMaster xmlns:a="http://schemas.openxmlformats.org/drawingml/2006/main" xmlns:r="http://schemas.openxmlformats.org/officeDocument/2006/relationships" xmlns:p="http://schemas.openxmlformats.org/presentationml/2006/main">
   <p:cSld>
@@ -218,7 +229,7 @@
           <a:p>
             <a:fld id="{19104133-B5B0-4351-8158-4F0E5EB1E2BF}" type="datetimeFigureOut">
               <a:rPr lang="en-US" smtClean="0"/>
-              <a:t>8/25/2022</a:t>
+              <a:t>10/19/2022</a:t>
             </a:fld>
             <a:endParaRPr lang="en-US"/>
           </a:p>
@@ -640,12 +651,8 @@
           <a:p>
             <a:r>
               <a:rPr lang="en-US" dirty="0"/>
-              <a:t>Explain what CSS files are</a:t>
+              <a:t>Explain what the head and style elements are</a:t>
             </a:r>
-            <a:endParaRPr lang="en-US" baseline="0" dirty="0"/>
-          </a:p>
-          <a:p>
-            <a:endParaRPr lang="en-US" dirty="0"/>
           </a:p>
         </p:txBody>
       </p:sp>
@@ -731,17 +738,12 @@
           <a:p>
             <a:r>
               <a:rPr lang="en-US" dirty="0"/>
-              <a:t>Explain the link tag. Students should not have to worry about this for the most part – the starter code will usually start with a </a:t>
+              <a:t>Show the link tag in action.</a:t>
             </a:r>
             <a:r>
-              <a:rPr lang="en-US" b="1" dirty="0"/>
-              <a:t>link</a:t>
+              <a:rPr lang="en-US" baseline="0" dirty="0"/>
+              <a:t> Make sure to note the filename, attributes, and CSS.</a:t>
             </a:r>
-            <a:r>
-              <a:rPr lang="en-US" b="0" dirty="0"/>
-              <a:t> tag already built in. If not, they can always copy it from somewhere else. It is important for them to be aware of its existence, but they do not need to memorize how it works.</a:t>
-            </a:r>
-            <a:endParaRPr lang="en-US" dirty="0"/>
           </a:p>
         </p:txBody>
       </p:sp>
@@ -771,7 +773,7 @@
     </p:spTree>
     <p:extLst>
       <p:ext uri="{BB962C8B-B14F-4D97-AF65-F5344CB8AC3E}">
-        <p14:creationId xmlns:p14="http://schemas.microsoft.com/office/powerpoint/2010/main" val="2439832816"/>
+        <p14:creationId xmlns:p14="http://schemas.microsoft.com/office/powerpoint/2010/main" val="1081873275"/>
       </p:ext>
     </p:extLst>
   </p:cSld>
@@ -827,12 +829,13 @@
           <a:p>
             <a:r>
               <a:rPr lang="en-US" dirty="0"/>
-              <a:t>Show the link tag in action.</a:t>
+              <a:t>Go</a:t>
             </a:r>
             <a:r>
               <a:rPr lang="en-US" baseline="0" dirty="0"/>
-              <a:t> Make sure to note the filename, attributes, and CSS.</a:t>
+              <a:t> over the vocabulary around different parts of CSS. Make sure to note that each character is very important: every colon, every semi-colon, every curly bracket, dash, etc.</a:t>
             </a:r>
+            <a:endParaRPr lang="en-US" dirty="0"/>
           </a:p>
         </p:txBody>
       </p:sp>
@@ -851,18 +854,78 @@
           <a:bodyPr/>
           <a:lstStyle/>
           <a:p>
+            <a:pPr marL="0" marR="0" lvl="0" indent="0" algn="r" defTabSz="914400" rtl="0" eaLnBrk="1" fontAlgn="auto" latinLnBrk="0" hangingPunct="1">
+              <a:lnSpc>
+                <a:spcPct val="100000"/>
+              </a:lnSpc>
+              <a:spcBef>
+                <a:spcPts val="0"/>
+              </a:spcBef>
+              <a:spcAft>
+                <a:spcPts val="0"/>
+              </a:spcAft>
+              <a:buClrTx/>
+              <a:buSzTx/>
+              <a:buFontTx/>
+              <a:buNone/>
+              <a:tabLst/>
+              <a:defRPr/>
+            </a:pPr>
             <a:fld id="{DEC8F7F9-57EC-49CF-9FCD-2B781E4B449F}" type="slidenum">
-              <a:rPr lang="en-US" smtClean="0"/>
+              <a:rPr kumimoji="0" lang="en-US" sz="1200" b="0" i="0" u="none" strike="noStrike" kern="1200" cap="none" spc="0" normalizeH="0" baseline="0" noProof="0" smtClean="0">
+                <a:ln>
+                  <a:noFill/>
+                </a:ln>
+                <a:solidFill>
+                  <a:prstClr val="black"/>
+                </a:solidFill>
+                <a:effectLst/>
+                <a:uLnTx/>
+                <a:uFillTx/>
+                <a:latin typeface="Calibri" panose="020F0502020204030204"/>
+                <a:ea typeface="+mn-ea"/>
+                <a:cs typeface="+mn-cs"/>
+              </a:rPr>
+              <a:pPr marL="0" marR="0" lvl="0" indent="0" algn="r" defTabSz="914400" rtl="0" eaLnBrk="1" fontAlgn="auto" latinLnBrk="0" hangingPunct="1">
+                <a:lnSpc>
+                  <a:spcPct val="100000"/>
+                </a:lnSpc>
+                <a:spcBef>
+                  <a:spcPts val="0"/>
+                </a:spcBef>
+                <a:spcAft>
+                  <a:spcPts val="0"/>
+                </a:spcAft>
+                <a:buClrTx/>
+                <a:buSzTx/>
+                <a:buFontTx/>
+                <a:buNone/>
+                <a:tabLst/>
+                <a:defRPr/>
+              </a:pPr>
               <a:t>5</a:t>
             </a:fld>
-            <a:endParaRPr lang="en-US"/>
+            <a:endParaRPr kumimoji="0" lang="en-US" sz="1200" b="0" i="0" u="none" strike="noStrike" kern="1200" cap="none" spc="0" normalizeH="0" baseline="0" noProof="0">
+              <a:ln>
+                <a:noFill/>
+              </a:ln>
+              <a:solidFill>
+                <a:prstClr val="black"/>
+              </a:solidFill>
+              <a:effectLst/>
+              <a:uLnTx/>
+              <a:uFillTx/>
+              <a:latin typeface="Calibri" panose="020F0502020204030204"/>
+              <a:ea typeface="+mn-ea"/>
+              <a:cs typeface="+mn-cs"/>
+            </a:endParaRPr>
           </a:p>
         </p:txBody>
       </p:sp>
     </p:spTree>
     <p:extLst>
       <p:ext uri="{BB962C8B-B14F-4D97-AF65-F5344CB8AC3E}">
-        <p14:creationId xmlns:p14="http://schemas.microsoft.com/office/powerpoint/2010/main" val="1081873275"/>
+        <p14:creationId xmlns:p14="http://schemas.microsoft.com/office/powerpoint/2010/main" val="2440334685"/>
       </p:ext>
     </p:extLst>
   </p:cSld>
@@ -918,11 +981,11 @@
           <a:p>
             <a:r>
               <a:rPr lang="en-US" dirty="0"/>
-              <a:t>Go</a:t>
+              <a:t>Explain how</a:t>
             </a:r>
             <a:r>
               <a:rPr lang="en-US" baseline="0" dirty="0"/>
-              <a:t> over the vocabulary around different parts of CSS. Make sure to note that each character is very important: every colon, every semi-colon, every curly bracket, dash, etc.</a:t>
+              <a:t> CSS properties determine the actual styles that are controlled by CSS</a:t>
             </a:r>
             <a:endParaRPr lang="en-US" dirty="0"/>
           </a:p>
@@ -1014,7 +1077,7 @@
     </p:spTree>
     <p:extLst>
       <p:ext uri="{BB962C8B-B14F-4D97-AF65-F5344CB8AC3E}">
-        <p14:creationId xmlns:p14="http://schemas.microsoft.com/office/powerpoint/2010/main" val="2440334685"/>
+        <p14:creationId xmlns:p14="http://schemas.microsoft.com/office/powerpoint/2010/main" val="669666032"/>
       </p:ext>
     </p:extLst>
   </p:cSld>
@@ -1070,13 +1133,8 @@
           <a:p>
             <a:r>
               <a:rPr lang="en-US" dirty="0"/>
-              <a:t>Explain how</a:t>
+              <a:t>Go through a few of the selectors – actually just examples of the element selector. The main idea is that </a:t>
             </a:r>
-            <a:r>
-              <a:rPr lang="en-US" baseline="0" dirty="0"/>
-              <a:t> CSS properties determine the actual styles that are controlled by CSS</a:t>
-            </a:r>
-            <a:endParaRPr lang="en-US" dirty="0"/>
           </a:p>
         </p:txBody>
       </p:sp>
@@ -1166,7 +1224,7 @@
     </p:spTree>
     <p:extLst>
       <p:ext uri="{BB962C8B-B14F-4D97-AF65-F5344CB8AC3E}">
-        <p14:creationId xmlns:p14="http://schemas.microsoft.com/office/powerpoint/2010/main" val="669666032"/>
+        <p14:creationId xmlns:p14="http://schemas.microsoft.com/office/powerpoint/2010/main" val="736763130"/>
       </p:ext>
     </p:extLst>
   </p:cSld>
@@ -1222,7 +1280,19 @@
           <a:p>
             <a:r>
               <a:rPr lang="en-US" dirty="0"/>
-              <a:t>Go through a few of the selectors – actually just examples of the element selector. The main idea is that </a:t>
+              <a:t>For the Repl,</a:t>
+            </a:r>
+            <a:r>
+              <a:rPr lang="en-US" baseline="0" dirty="0"/>
+              <a:t> show the whole ruleset in action. Change around the selector, properties, values </a:t>
+            </a:r>
+            <a:r>
+              <a:rPr lang="en-US" baseline="0" dirty="0" err="1"/>
+              <a:t>etc</a:t>
+            </a:r>
+            <a:r>
+              <a:rPr lang="en-US" baseline="0" dirty="0"/>
+              <a:t> to show how it affects the page.</a:t>
             </a:r>
           </a:p>
         </p:txBody>
@@ -1292,173 +1362,6 @@
                 <a:defRPr/>
               </a:pPr>
               <a:t>8</a:t>
-            </a:fld>
-            <a:endParaRPr kumimoji="0" lang="en-US" sz="1200" b="0" i="0" u="none" strike="noStrike" kern="1200" cap="none" spc="0" normalizeH="0" baseline="0" noProof="0">
-              <a:ln>
-                <a:noFill/>
-              </a:ln>
-              <a:solidFill>
-                <a:prstClr val="black"/>
-              </a:solidFill>
-              <a:effectLst/>
-              <a:uLnTx/>
-              <a:uFillTx/>
-              <a:latin typeface="Calibri" panose="020F0502020204030204"/>
-              <a:ea typeface="+mn-ea"/>
-              <a:cs typeface="+mn-cs"/>
-            </a:endParaRPr>
-          </a:p>
-        </p:txBody>
-      </p:sp>
-    </p:spTree>
-    <p:extLst>
-      <p:ext uri="{BB962C8B-B14F-4D97-AF65-F5344CB8AC3E}">
-        <p14:creationId xmlns:p14="http://schemas.microsoft.com/office/powerpoint/2010/main" val="736763130"/>
-      </p:ext>
-    </p:extLst>
-  </p:cSld>
-  <p:clrMapOvr>
-    <a:masterClrMapping/>
-  </p:clrMapOvr>
-</p:notes>
-</file>
-
-<file path=ppt/notesSlides/notesSlide8.xml><?xml version="1.0" encoding="utf-8"?>
-<p:notes xmlns:a="http://schemas.openxmlformats.org/drawingml/2006/main" xmlns:r="http://schemas.openxmlformats.org/officeDocument/2006/relationships" xmlns:p="http://schemas.openxmlformats.org/presentationml/2006/main">
-  <p:cSld>
-    <p:spTree>
-      <p:nvGrpSpPr>
-        <p:cNvPr id="1" name=""/>
-        <p:cNvGrpSpPr/>
-        <p:nvPr/>
-      </p:nvGrpSpPr>
-      <p:grpSpPr>
-        <a:xfrm>
-          <a:off x="0" y="0"/>
-          <a:ext cx="0" cy="0"/>
-          <a:chOff x="0" y="0"/>
-          <a:chExt cx="0" cy="0"/>
-        </a:xfrm>
-      </p:grpSpPr>
-      <p:sp>
-        <p:nvSpPr>
-          <p:cNvPr id="2" name="Slide Image Placeholder 1"/>
-          <p:cNvSpPr>
-            <a:spLocks noGrp="1" noRot="1" noChangeAspect="1"/>
-          </p:cNvSpPr>
-          <p:nvPr>
-            <p:ph type="sldImg"/>
-          </p:nvPr>
-        </p:nvSpPr>
-        <p:spPr/>
-      </p:sp>
-      <p:sp>
-        <p:nvSpPr>
-          <p:cNvPr id="3" name="Notes Placeholder 2"/>
-          <p:cNvSpPr>
-            <a:spLocks noGrp="1"/>
-          </p:cNvSpPr>
-          <p:nvPr>
-            <p:ph type="body" idx="1"/>
-          </p:nvPr>
-        </p:nvSpPr>
-        <p:spPr/>
-        <p:txBody>
-          <a:bodyPr/>
-          <a:lstStyle/>
-          <a:p>
-            <a:r>
-              <a:rPr lang="en-US" dirty="0"/>
-              <a:t>For the </a:t>
-            </a:r>
-            <a:r>
-              <a:rPr lang="en-US" dirty="0" err="1"/>
-              <a:t>Repl</a:t>
-            </a:r>
-            <a:r>
-              <a:rPr lang="en-US" dirty="0"/>
-              <a:t>,</a:t>
-            </a:r>
-            <a:r>
-              <a:rPr lang="en-US" baseline="0" dirty="0"/>
-              <a:t> show the whole ruleset in action. Make sure to switch to the CSS file to see the CSS. Change around the selector, properties, values </a:t>
-            </a:r>
-            <a:r>
-              <a:rPr lang="en-US" baseline="0" dirty="0" err="1"/>
-              <a:t>etc</a:t>
-            </a:r>
-            <a:r>
-              <a:rPr lang="en-US" baseline="0" dirty="0"/>
-              <a:t> to show how it affects the page.</a:t>
-            </a:r>
-          </a:p>
-        </p:txBody>
-      </p:sp>
-      <p:sp>
-        <p:nvSpPr>
-          <p:cNvPr id="4" name="Slide Number Placeholder 3"/>
-          <p:cNvSpPr>
-            <a:spLocks noGrp="1"/>
-          </p:cNvSpPr>
-          <p:nvPr>
-            <p:ph type="sldNum" sz="quarter" idx="10"/>
-          </p:nvPr>
-        </p:nvSpPr>
-        <p:spPr/>
-        <p:txBody>
-          <a:bodyPr/>
-          <a:lstStyle/>
-          <a:p>
-            <a:pPr marL="0" marR="0" lvl="0" indent="0" algn="r" defTabSz="914400" rtl="0" eaLnBrk="1" fontAlgn="auto" latinLnBrk="0" hangingPunct="1">
-              <a:lnSpc>
-                <a:spcPct val="100000"/>
-              </a:lnSpc>
-              <a:spcBef>
-                <a:spcPts val="0"/>
-              </a:spcBef>
-              <a:spcAft>
-                <a:spcPts val="0"/>
-              </a:spcAft>
-              <a:buClrTx/>
-              <a:buSzTx/>
-              <a:buFontTx/>
-              <a:buNone/>
-              <a:tabLst/>
-              <a:defRPr/>
-            </a:pPr>
-            <a:fld id="{DEC8F7F9-57EC-49CF-9FCD-2B781E4B449F}" type="slidenum">
-              <a:rPr kumimoji="0" lang="en-US" sz="1200" b="0" i="0" u="none" strike="noStrike" kern="1200" cap="none" spc="0" normalizeH="0" baseline="0" noProof="0" smtClean="0">
-                <a:ln>
-                  <a:noFill/>
-                </a:ln>
-                <a:solidFill>
-                  <a:prstClr val="black"/>
-                </a:solidFill>
-                <a:effectLst/>
-                <a:uLnTx/>
-                <a:uFillTx/>
-                <a:latin typeface="Calibri" panose="020F0502020204030204"/>
-                <a:ea typeface="+mn-ea"/>
-                <a:cs typeface="+mn-cs"/>
-              </a:rPr>
-              <a:pPr marL="0" marR="0" lvl="0" indent="0" algn="r" defTabSz="914400" rtl="0" eaLnBrk="1" fontAlgn="auto" latinLnBrk="0" hangingPunct="1">
-                <a:lnSpc>
-                  <a:spcPct val="100000"/>
-                </a:lnSpc>
-                <a:spcBef>
-                  <a:spcPts val="0"/>
-                </a:spcBef>
-                <a:spcAft>
-                  <a:spcPts val="0"/>
-                </a:spcAft>
-                <a:buClrTx/>
-                <a:buSzTx/>
-                <a:buFontTx/>
-                <a:buNone/>
-                <a:tabLst/>
-                <a:defRPr/>
-              </a:pPr>
-              <a:t>9</a:t>
             </a:fld>
             <a:endParaRPr kumimoji="0" lang="en-US" sz="1200" b="0" i="0" u="none" strike="noStrike" kern="1200" cap="none" spc="0" normalizeH="0" baseline="0" noProof="0">
               <a:ln>
@@ -1672,7 +1575,7 @@
             <a:fld id="{1C2D31DE-C454-491C-B5C3-F097855E3DF7}" type="datetime4">
               <a:rPr lang="en-US" smtClean="0"/>
               <a:pPr/>
-              <a:t>August 25, 2022</a:t>
+              <a:t>October 19, 2022</a:t>
             </a:fld>
             <a:endParaRPr lang="en-US" dirty="0"/>
           </a:p>
@@ -5064,7 +4967,7 @@
           <a:p>
             <a:fld id="{5958763E-B898-436D-883D-03711491D54A}" type="datetimeFigureOut">
               <a:rPr lang="en-US" smtClean="0"/>
-              <a:t>8/25/2022</a:t>
+              <a:t>10/19/2022</a:t>
             </a:fld>
             <a:endParaRPr lang="en-US"/>
           </a:p>
@@ -5257,7 +5160,7 @@
           <a:p>
             <a:fld id="{5958763E-B898-436D-883D-03711491D54A}" type="datetimeFigureOut">
               <a:rPr lang="en-US" smtClean="0"/>
-              <a:t>8/25/2022</a:t>
+              <a:t>10/19/2022</a:t>
             </a:fld>
             <a:endParaRPr lang="en-US"/>
           </a:p>
@@ -5507,7 +5410,7 @@
           <a:p>
             <a:fld id="{5958763E-B898-436D-883D-03711491D54A}" type="datetimeFigureOut">
               <a:rPr lang="en-US" smtClean="0"/>
-              <a:t>8/25/2022</a:t>
+              <a:t>10/19/2022</a:t>
             </a:fld>
             <a:endParaRPr lang="en-US"/>
           </a:p>
@@ -5855,7 +5758,7 @@
           <a:p>
             <a:fld id="{5958763E-B898-436D-883D-03711491D54A}" type="datetimeFigureOut">
               <a:rPr lang="en-US" smtClean="0"/>
-              <a:t>8/25/2022</a:t>
+              <a:t>10/19/2022</a:t>
             </a:fld>
             <a:endParaRPr lang="en-US"/>
           </a:p>
@@ -6271,7 +6174,7 @@
           <a:p>
             <a:fld id="{5958763E-B898-436D-883D-03711491D54A}" type="datetimeFigureOut">
               <a:rPr lang="en-US" smtClean="0"/>
-              <a:t>8/25/2022</a:t>
+              <a:t>10/19/2022</a:t>
             </a:fld>
             <a:endParaRPr lang="en-US"/>
           </a:p>
@@ -6772,7 +6675,7 @@
           <a:p>
             <a:fld id="{5958763E-B898-436D-883D-03711491D54A}" type="datetimeFigureOut">
               <a:rPr lang="en-US" smtClean="0"/>
-              <a:t>8/25/2022</a:t>
+              <a:t>10/19/2022</a:t>
             </a:fld>
             <a:endParaRPr lang="en-US"/>
           </a:p>
@@ -7223,7 +7126,7 @@
           <a:p>
             <a:fld id="{5958763E-B898-436D-883D-03711491D54A}" type="datetimeFigureOut">
               <a:rPr lang="en-US" smtClean="0"/>
-              <a:t>8/25/2022</a:t>
+              <a:t>10/19/2022</a:t>
             </a:fld>
             <a:endParaRPr lang="en-US"/>
           </a:p>
@@ -7834,7 +7737,7 @@
           <a:p>
             <a:fld id="{5958763E-B898-436D-883D-03711491D54A}" type="datetimeFigureOut">
               <a:rPr lang="en-US" smtClean="0"/>
-              <a:t>8/25/2022</a:t>
+              <a:t>10/19/2022</a:t>
             </a:fld>
             <a:endParaRPr lang="en-US"/>
           </a:p>
@@ -8605,7 +8508,7 @@
           <a:p>
             <a:fld id="{5958763E-B898-436D-883D-03711491D54A}" type="datetimeFigureOut">
               <a:rPr lang="en-US" smtClean="0"/>
-              <a:t>8/25/2022</a:t>
+              <a:t>10/19/2022</a:t>
             </a:fld>
             <a:endParaRPr lang="en-US"/>
           </a:p>
@@ -8709,7 +8612,7 @@
           <a:p>
             <a:fld id="{5958763E-B898-436D-883D-03711491D54A}" type="datetimeFigureOut">
               <a:rPr lang="en-US" smtClean="0"/>
-              <a:t>8/25/2022</a:t>
+              <a:t>10/19/2022</a:t>
             </a:fld>
             <a:endParaRPr lang="en-US"/>
           </a:p>
@@ -9036,7 +8939,7 @@
             <a:fld id="{1C2D31DE-C454-491C-B5C3-F097855E3DF7}" type="datetime4">
               <a:rPr lang="en-US" smtClean="0"/>
               <a:pPr/>
-              <a:t>August 25, 2022</a:t>
+              <a:t>October 19, 2022</a:t>
             </a:fld>
             <a:endParaRPr lang="en-US" dirty="0"/>
           </a:p>
@@ -12188,7 +12091,7 @@
           <a:p>
             <a:fld id="{5958763E-B898-436D-883D-03711491D54A}" type="datetimeFigureOut">
               <a:rPr lang="en-US" smtClean="0"/>
-              <a:t>8/25/2022</a:t>
+              <a:t>10/19/2022</a:t>
             </a:fld>
             <a:endParaRPr lang="en-US"/>
           </a:p>
@@ -12312,7 +12215,7 @@
           <a:p>
             <a:fld id="{5958763E-B898-436D-883D-03711491D54A}" type="datetimeFigureOut">
               <a:rPr lang="en-US" smtClean="0"/>
-              <a:t>8/25/2022</a:t>
+              <a:t>10/19/2022</a:t>
             </a:fld>
             <a:endParaRPr lang="en-US"/>
           </a:p>
@@ -12436,7 +12339,7 @@
           <a:p>
             <a:fld id="{5958763E-B898-436D-883D-03711491D54A}" type="datetimeFigureOut">
               <a:rPr lang="en-US" smtClean="0"/>
-              <a:t>8/25/2022</a:t>
+              <a:t>10/19/2022</a:t>
             </a:fld>
             <a:endParaRPr lang="en-US"/>
           </a:p>
@@ -12560,7 +12463,7 @@
           <a:p>
             <a:fld id="{5958763E-B898-436D-883D-03711491D54A}" type="datetimeFigureOut">
               <a:rPr lang="en-US" smtClean="0"/>
-              <a:t>8/25/2022</a:t>
+              <a:t>10/19/2022</a:t>
             </a:fld>
             <a:endParaRPr lang="en-US"/>
           </a:p>
@@ -12684,7 +12587,7 @@
           <a:p>
             <a:fld id="{5958763E-B898-436D-883D-03711491D54A}" type="datetimeFigureOut">
               <a:rPr lang="en-US" smtClean="0"/>
-              <a:t>8/25/2022</a:t>
+              <a:t>10/19/2022</a:t>
             </a:fld>
             <a:endParaRPr lang="en-US"/>
           </a:p>
@@ -12808,7 +12711,7 @@
           <a:p>
             <a:fld id="{5958763E-B898-436D-883D-03711491D54A}" type="datetimeFigureOut">
               <a:rPr lang="en-US" smtClean="0"/>
-              <a:t>8/25/2022</a:t>
+              <a:t>10/19/2022</a:t>
             </a:fld>
             <a:endParaRPr lang="en-US"/>
           </a:p>
@@ -12932,7 +12835,7 @@
           <a:p>
             <a:fld id="{5958763E-B898-436D-883D-03711491D54A}" type="datetimeFigureOut">
               <a:rPr lang="en-US" smtClean="0"/>
-              <a:t>8/25/2022</a:t>
+              <a:t>10/19/2022</a:t>
             </a:fld>
             <a:endParaRPr lang="en-US"/>
           </a:p>
@@ -13056,7 +12959,7 @@
           <a:p>
             <a:fld id="{5958763E-B898-436D-883D-03711491D54A}" type="datetimeFigureOut">
               <a:rPr lang="en-US" smtClean="0"/>
-              <a:t>8/25/2022</a:t>
+              <a:t>10/19/2022</a:t>
             </a:fld>
             <a:endParaRPr lang="en-US"/>
           </a:p>
@@ -13189,7 +13092,7 @@
           <a:p>
             <a:fld id="{5958763E-B898-436D-883D-03711491D54A}" type="datetimeFigureOut">
               <a:rPr lang="en-US" smtClean="0"/>
-              <a:t>8/25/2022</a:t>
+              <a:t>10/19/2022</a:t>
             </a:fld>
             <a:endParaRPr lang="en-US"/>
           </a:p>
@@ -16528,7 +16431,7 @@
             <a:fld id="{1C2D31DE-C454-491C-B5C3-F097855E3DF7}" type="datetime4">
               <a:rPr lang="en-US" smtClean="0"/>
               <a:pPr/>
-              <a:t>August 25, 2022</a:t>
+              <a:t>October 19, 2022</a:t>
             </a:fld>
             <a:endParaRPr lang="en-US" dirty="0"/>
           </a:p>
@@ -28764,7 +28667,7 @@
           <a:p>
             <a:fld id="{5958763E-B898-436D-883D-03711491D54A}" type="datetimeFigureOut">
               <a:rPr lang="en-US" smtClean="0"/>
-              <a:t>8/25/2022</a:t>
+              <a:t>10/19/2022</a:t>
             </a:fld>
             <a:endParaRPr lang="en-US"/>
           </a:p>
@@ -29166,7 +29069,7 @@
           <a:p>
             <a:fld id="{5958763E-B898-436D-883D-03711491D54A}" type="datetimeFigureOut">
               <a:rPr lang="en-US" smtClean="0"/>
-              <a:t>8/25/2022</a:t>
+              <a:t>10/19/2022</a:t>
             </a:fld>
             <a:endParaRPr lang="en-US"/>
           </a:p>
@@ -29460,7 +29363,7 @@
           <a:p>
             <a:fld id="{5958763E-B898-436D-883D-03711491D54A}" type="datetimeFigureOut">
               <a:rPr lang="en-US" smtClean="0"/>
-              <a:t>8/25/2022</a:t>
+              <a:t>10/19/2022</a:t>
             </a:fld>
             <a:endParaRPr lang="en-US"/>
           </a:p>
@@ -29661,7 +29564,7 @@
           <a:p>
             <a:fld id="{5958763E-B898-436D-883D-03711491D54A}" type="datetimeFigureOut">
               <a:rPr lang="en-US" smtClean="0"/>
-              <a:t>8/25/2022</a:t>
+              <a:t>10/19/2022</a:t>
             </a:fld>
             <a:endParaRPr lang="en-US"/>
           </a:p>
@@ -29922,7 +29825,7 @@
           <a:p>
             <a:fld id="{5958763E-B898-436D-883D-03711491D54A}" type="datetimeFigureOut">
               <a:rPr lang="en-US" smtClean="0"/>
-              <a:t>8/25/2022</a:t>
+              <a:t>10/19/2022</a:t>
             </a:fld>
             <a:endParaRPr lang="en-US"/>
           </a:p>
@@ -30183,7 +30086,7 @@
           <a:p>
             <a:fld id="{61FD5E12-641C-4696-BA65-B86205845F69}" type="datetimeFigureOut">
               <a:rPr lang="en-US" smtClean="0"/>
-              <a:t>8/25/2022</a:t>
+              <a:t>10/19/2022</a:t>
             </a:fld>
             <a:endParaRPr lang="en-US"/>
           </a:p>
@@ -30353,7 +30256,7 @@
           <a:p>
             <a:fld id="{61FD5E12-641C-4696-BA65-B86205845F69}" type="datetimeFigureOut">
               <a:rPr lang="en-US" smtClean="0"/>
-              <a:t>8/25/2022</a:t>
+              <a:t>10/19/2022</a:t>
             </a:fld>
             <a:endParaRPr lang="en-US"/>
           </a:p>
@@ -30792,7 +30695,7 @@
           <a:p>
             <a:fld id="{5958763E-B898-436D-883D-03711491D54A}" type="datetimeFigureOut">
               <a:rPr lang="en-US" smtClean="0"/>
-              <a:t>8/25/2022</a:t>
+              <a:t>10/19/2022</a:t>
             </a:fld>
             <a:endParaRPr lang="en-US"/>
           </a:p>
@@ -31087,7 +30990,7 @@
           <a:p>
             <a:fld id="{61FD5E12-641C-4696-BA65-B86205845F69}" type="datetimeFigureOut">
               <a:rPr lang="en-US" smtClean="0"/>
-              <a:t>8/25/2022</a:t>
+              <a:t>10/19/2022</a:t>
             </a:fld>
             <a:endParaRPr lang="en-US"/>
           </a:p>
@@ -31319,7 +31222,7 @@
           <a:p>
             <a:fld id="{61FD5E12-641C-4696-BA65-B86205845F69}" type="datetimeFigureOut">
               <a:rPr lang="en-US" smtClean="0"/>
-              <a:t>8/25/2022</a:t>
+              <a:t>10/19/2022</a:t>
             </a:fld>
             <a:endParaRPr lang="en-US"/>
           </a:p>
@@ -31686,7 +31589,7 @@
           <a:p>
             <a:fld id="{61FD5E12-641C-4696-BA65-B86205845F69}" type="datetimeFigureOut">
               <a:rPr lang="en-US" smtClean="0"/>
-              <a:t>8/25/2022</a:t>
+              <a:t>10/19/2022</a:t>
             </a:fld>
             <a:endParaRPr lang="en-US"/>
           </a:p>
@@ -31804,7 +31707,7 @@
           <a:p>
             <a:fld id="{61FD5E12-641C-4696-BA65-B86205845F69}" type="datetimeFigureOut">
               <a:rPr lang="en-US" smtClean="0"/>
-              <a:t>8/25/2022</a:t>
+              <a:t>10/19/2022</a:t>
             </a:fld>
             <a:endParaRPr lang="en-US"/>
           </a:p>
@@ -31899,7 +31802,7 @@
           <a:p>
             <a:fld id="{61FD5E12-641C-4696-BA65-B86205845F69}" type="datetimeFigureOut">
               <a:rPr lang="en-US" smtClean="0"/>
-              <a:t>8/25/2022</a:t>
+              <a:t>10/19/2022</a:t>
             </a:fld>
             <a:endParaRPr lang="en-US"/>
           </a:p>
@@ -32176,7 +32079,7 @@
           <a:p>
             <a:fld id="{61FD5E12-641C-4696-BA65-B86205845F69}" type="datetimeFigureOut">
               <a:rPr lang="en-US" smtClean="0"/>
-              <a:t>8/25/2022</a:t>
+              <a:t>10/19/2022</a:t>
             </a:fld>
             <a:endParaRPr lang="en-US"/>
           </a:p>
@@ -32433,7 +32336,7 @@
           <a:p>
             <a:fld id="{61FD5E12-641C-4696-BA65-B86205845F69}" type="datetimeFigureOut">
               <a:rPr lang="en-US" smtClean="0"/>
-              <a:t>8/25/2022</a:t>
+              <a:t>10/19/2022</a:t>
             </a:fld>
             <a:endParaRPr lang="en-US"/>
           </a:p>
@@ -32603,7 +32506,7 @@
           <a:p>
             <a:fld id="{61FD5E12-641C-4696-BA65-B86205845F69}" type="datetimeFigureOut">
               <a:rPr lang="en-US" smtClean="0"/>
-              <a:t>8/25/2022</a:t>
+              <a:t>10/19/2022</a:t>
             </a:fld>
             <a:endParaRPr lang="en-US"/>
           </a:p>
@@ -32783,7 +32686,7 @@
           <a:p>
             <a:fld id="{61FD5E12-641C-4696-BA65-B86205845F69}" type="datetimeFigureOut">
               <a:rPr lang="en-US" smtClean="0"/>
-              <a:t>8/25/2022</a:t>
+              <a:t>10/19/2022</a:t>
             </a:fld>
             <a:endParaRPr lang="en-US"/>
           </a:p>
@@ -33429,7 +33332,7 @@
           <a:p>
             <a:fld id="{5958763E-B898-436D-883D-03711491D54A}" type="datetimeFigureOut">
               <a:rPr lang="en-US" smtClean="0"/>
-              <a:t>8/25/2022</a:t>
+              <a:t>10/19/2022</a:t>
             </a:fld>
             <a:endParaRPr lang="en-US"/>
           </a:p>
@@ -34818,7 +34721,7 @@
           <a:p>
             <a:fld id="{5958763E-B898-436D-883D-03711491D54A}" type="datetimeFigureOut">
               <a:rPr lang="en-US" smtClean="0"/>
-              <a:t>8/25/2022</a:t>
+              <a:t>10/19/2022</a:t>
             </a:fld>
             <a:endParaRPr lang="en-US"/>
           </a:p>
@@ -35019,7 +34922,7 @@
           <a:p>
             <a:fld id="{5958763E-B898-436D-883D-03711491D54A}" type="datetimeFigureOut">
               <a:rPr lang="en-US" smtClean="0"/>
-              <a:t>8/25/2022</a:t>
+              <a:t>10/19/2022</a:t>
             </a:fld>
             <a:endParaRPr lang="en-US"/>
           </a:p>
@@ -35354,7 +35257,7 @@
           <a:p>
             <a:fld id="{5958763E-B898-436D-883D-03711491D54A}" type="datetimeFigureOut">
               <a:rPr lang="en-US" smtClean="0"/>
-              <a:t>8/25/2022</a:t>
+              <a:t>10/19/2022</a:t>
             </a:fld>
             <a:endParaRPr lang="en-US"/>
           </a:p>
@@ -35584,7 +35487,7 @@
           <a:p>
             <a:fld id="{5958763E-B898-436D-883D-03711491D54A}" type="datetimeFigureOut">
               <a:rPr lang="en-US" smtClean="0"/>
-              <a:t>8/25/2022</a:t>
+              <a:t>10/19/2022</a:t>
             </a:fld>
             <a:endParaRPr lang="en-US"/>
           </a:p>
@@ -35828,7 +35731,7 @@
           <a:p>
             <a:fld id="{5958763E-B898-436D-883D-03711491D54A}" type="datetimeFigureOut">
               <a:rPr lang="en-US" smtClean="0"/>
-              <a:t>8/25/2022</a:t>
+              <a:t>10/19/2022</a:t>
             </a:fld>
             <a:endParaRPr lang="en-US"/>
           </a:p>
@@ -36469,7 +36372,7 @@
           <a:p>
             <a:fld id="{61FD5E12-641C-4696-BA65-B86205845F69}" type="datetimeFigureOut">
               <a:rPr lang="en-US" smtClean="0"/>
-              <a:t>8/25/2022</a:t>
+              <a:t>10/19/2022</a:t>
             </a:fld>
             <a:endParaRPr lang="en-US"/>
           </a:p>
@@ -39906,67 +39809,6 @@
     <p:extLst>
       <p:ext uri="{BB962C8B-B14F-4D97-AF65-F5344CB8AC3E}">
         <p14:creationId xmlns:p14="http://schemas.microsoft.com/office/powerpoint/2010/main" val="1399880830"/>
-      </p:ext>
-    </p:extLst>
-  </p:cSld>
-  <p:clrMapOvr>
-    <a:masterClrMapping/>
-  </p:clrMapOvr>
-  <p:transition>
-    <p:fade/>
-  </p:transition>
-</p:sld>
-</file>
-
-<file path=ppt/slides/slide10.xml><?xml version="1.0" encoding="utf-8"?>
-<p:sld xmlns:a="http://schemas.openxmlformats.org/drawingml/2006/main" xmlns:r="http://schemas.openxmlformats.org/officeDocument/2006/relationships" xmlns:p="http://schemas.openxmlformats.org/presentationml/2006/main">
-  <p:cSld>
-    <p:spTree>
-      <p:nvGrpSpPr>
-        <p:cNvPr id="1" name=""/>
-        <p:cNvGrpSpPr/>
-        <p:nvPr/>
-      </p:nvGrpSpPr>
-      <p:grpSpPr>
-        <a:xfrm>
-          <a:off x="0" y="0"/>
-          <a:ext cx="0" cy="0"/>
-          <a:chOff x="0" y="0"/>
-          <a:chExt cx="0" cy="0"/>
-        </a:xfrm>
-      </p:grpSpPr>
-      <p:sp>
-        <p:nvSpPr>
-          <p:cNvPr id="2" name="Text Placeholder 1">
-            <a:extLst>
-              <a:ext uri="{FF2B5EF4-FFF2-40B4-BE49-F238E27FC236}">
-                <a16:creationId xmlns:a16="http://schemas.microsoft.com/office/drawing/2014/main" id="{85615D18-8F75-4B52-89C9-F982DAFE9325}"/>
-              </a:ext>
-            </a:extLst>
-          </p:cNvPr>
-          <p:cNvSpPr>
-            <a:spLocks noGrp="1"/>
-          </p:cNvSpPr>
-          <p:nvPr>
-            <p:ph type="body" sz="quarter" idx="10"/>
-          </p:nvPr>
-        </p:nvSpPr>
-        <p:spPr/>
-        <p:txBody>
-          <a:bodyPr/>
-          <a:lstStyle/>
-          <a:p>
-            <a:r>
-              <a:rPr lang="en-US"/>
-              <a:t>Questions?</a:t>
-            </a:r>
-          </a:p>
-        </p:txBody>
-      </p:sp>
-    </p:spTree>
-    <p:extLst>
-      <p:ext uri="{BB962C8B-B14F-4D97-AF65-F5344CB8AC3E}">
-        <p14:creationId xmlns:p14="http://schemas.microsoft.com/office/powerpoint/2010/main" val="2552111147"/>
       </p:ext>
     </p:extLst>
   </p:cSld>
@@ -40596,7 +40438,39 @@
           <a:p>
             <a:r>
               <a:rPr lang="en-US" dirty="0"/>
-              <a:t>CSS Files</a:t>
+              <a:t>The </a:t>
+            </a:r>
+            <a:r>
+              <a:rPr lang="en-US" sz="4000" cap="none" dirty="0">
+                <a:solidFill>
+                  <a:schemeClr val="accent1">
+                    <a:lumMod val="40000"/>
+                    <a:lumOff val="60000"/>
+                  </a:schemeClr>
+                </a:solidFill>
+                <a:latin typeface="Consolas" panose="020B0609020204030204" pitchFamily="49" charset="0"/>
+              </a:rPr>
+              <a:t>&lt;head&gt;</a:t>
+            </a:r>
+            <a:r>
+              <a:rPr lang="en-US" sz="3600" dirty="0"/>
+              <a:t> and </a:t>
+            </a:r>
+            <a:r>
+              <a:rPr lang="en-US" sz="4000" cap="none" dirty="0">
+                <a:solidFill>
+                  <a:schemeClr val="accent1">
+                    <a:lumMod val="40000"/>
+                    <a:lumOff val="60000"/>
+                  </a:schemeClr>
+                </a:solidFill>
+                <a:latin typeface="Consolas" panose="020B0609020204030204" pitchFamily="49" charset="0"/>
+              </a:rPr>
+              <a:t>&lt;style&gt;</a:t>
+            </a:r>
+            <a:r>
+              <a:rPr lang="en-US" dirty="0"/>
+              <a:t> elements</a:t>
             </a:r>
           </a:p>
         </p:txBody>
@@ -40617,70 +40491,866 @@
             <p:ph idx="1"/>
           </p:nvPr>
         </p:nvSpPr>
-        <p:spPr/>
+        <p:spPr>
+          <a:xfrm>
+            <a:off x="381000" y="1270143"/>
+            <a:ext cx="4572000" cy="5257800"/>
+          </a:xfrm>
+          <a:solidFill>
+            <a:srgbClr val="322610"/>
+          </a:solidFill>
+        </p:spPr>
         <p:txBody>
           <a:bodyPr>
             <a:normAutofit/>
           </a:bodyPr>
           <a:lstStyle/>
           <a:p>
+            <a:pPr marL="57150" indent="0">
+              <a:buNone/>
+            </a:pPr>
             <a:r>
-              <a:rPr lang="en-US" sz="3600" dirty="0"/>
-              <a:t>CSS files are separate files that add style to HTML</a:t>
-            </a:r>
-          </a:p>
-          <a:p>
-            <a:endParaRPr lang="en-US" sz="3600" dirty="0"/>
-          </a:p>
-          <a:p>
-            <a:r>
-              <a:rPr lang="en-US" sz="3600" dirty="0"/>
-              <a:t>They have a different language</a:t>
-            </a:r>
-          </a:p>
-          <a:p>
-            <a:endParaRPr lang="en-US" sz="3600" dirty="0"/>
-          </a:p>
-          <a:p>
-            <a:r>
-              <a:rPr lang="en-US" sz="3600" dirty="0"/>
-              <a:t>They end with </a:t>
+              <a:rPr lang="en-US" sz="2400" b="0" dirty="0">
+                <a:solidFill>
+                  <a:srgbClr val="A9B665"/>
+                </a:solidFill>
+                <a:effectLst/>
+                <a:latin typeface="Consolas" panose="020B0609020204030204" pitchFamily="49" charset="0"/>
+              </a:rPr>
+              <a:t>&lt;</a:t>
             </a:r>
             <a:r>
-              <a:rPr lang="en-US" sz="3600" b="1" dirty="0"/>
-              <a:t>.</a:t>
+              <a:rPr lang="en-US" sz="2400" b="0" dirty="0">
+                <a:solidFill>
+                  <a:srgbClr val="E78A4E"/>
+                </a:solidFill>
+                <a:effectLst/>
+                <a:latin typeface="Consolas" panose="020B0609020204030204" pitchFamily="49" charset="0"/>
+              </a:rPr>
+              <a:t>html</a:t>
             </a:r>
             <a:r>
-              <a:rPr lang="en-US" sz="3600" b="1" dirty="0" err="1"/>
-              <a:t>css</a:t>
+              <a:rPr lang="en-US" sz="2400" b="0" dirty="0">
+                <a:solidFill>
+                  <a:srgbClr val="A9B665"/>
+                </a:solidFill>
+                <a:effectLst/>
+                <a:latin typeface="Consolas" panose="020B0609020204030204" pitchFamily="49" charset="0"/>
+              </a:rPr>
+              <a:t>&gt;</a:t>
             </a:r>
-            <a:endParaRPr lang="en-US" sz="3600" b="1" dirty="0"/>
-          </a:p>
-          <a:p>
-            <a:endParaRPr lang="en-US" sz="3600" dirty="0"/>
-          </a:p>
-          <a:p>
+            <a:endParaRPr lang="en-US" sz="2400" b="0" dirty="0">
+              <a:solidFill>
+                <a:srgbClr val="D4BE98"/>
+              </a:solidFill>
+              <a:effectLst/>
+              <a:latin typeface="Consolas" panose="020B0609020204030204" pitchFamily="49" charset="0"/>
+            </a:endParaRPr>
+          </a:p>
+          <a:p>
+            <a:pPr marL="57150" indent="0">
+              <a:buNone/>
+            </a:pPr>
             <a:r>
-              <a:rPr lang="en-US" sz="3600" dirty="0"/>
-              <a:t>They must be </a:t>
+              <a:rPr lang="en-US" sz="2400" b="0" dirty="0">
+                <a:solidFill>
+                  <a:srgbClr val="D4BE98"/>
+                </a:solidFill>
+                <a:effectLst/>
+                <a:latin typeface="Consolas" panose="020B0609020204030204" pitchFamily="49" charset="0"/>
+              </a:rPr>
+              <a:t>  </a:t>
             </a:r>
             <a:r>
-              <a:rPr lang="en-US" sz="3600" i="1" dirty="0"/>
-              <a:t>linked</a:t>
+              <a:rPr lang="en-US" sz="2400" b="0" dirty="0">
+                <a:solidFill>
+                  <a:srgbClr val="A9B665"/>
+                </a:solidFill>
+                <a:effectLst/>
+                <a:latin typeface="Consolas" panose="020B0609020204030204" pitchFamily="49" charset="0"/>
+              </a:rPr>
+              <a:t>&lt;</a:t>
             </a:r>
             <a:r>
-              <a:rPr lang="en-US" sz="3600" dirty="0"/>
-              <a:t> from the HTML element  </a:t>
+              <a:rPr lang="en-US" sz="2400" b="0" dirty="0">
+                <a:solidFill>
+                  <a:srgbClr val="E78A4E"/>
+                </a:solidFill>
+                <a:effectLst/>
+                <a:latin typeface="Consolas" panose="020B0609020204030204" pitchFamily="49" charset="0"/>
+              </a:rPr>
+              <a:t>head</a:t>
+            </a:r>
+            <a:r>
+              <a:rPr lang="en-US" sz="2400" b="0" dirty="0">
+                <a:solidFill>
+                  <a:srgbClr val="A9B665"/>
+                </a:solidFill>
+                <a:effectLst/>
+                <a:latin typeface="Consolas" panose="020B0609020204030204" pitchFamily="49" charset="0"/>
+              </a:rPr>
+              <a:t>&gt;</a:t>
+            </a:r>
+            <a:endParaRPr lang="en-US" sz="2400" b="0" dirty="0">
+              <a:solidFill>
+                <a:srgbClr val="D4BE98"/>
+              </a:solidFill>
+              <a:effectLst/>
+              <a:latin typeface="Consolas" panose="020B0609020204030204" pitchFamily="49" charset="0"/>
+            </a:endParaRPr>
+          </a:p>
+          <a:p>
+            <a:pPr marL="57150" indent="0">
+              <a:buNone/>
+            </a:pPr>
+            <a:r>
+              <a:rPr lang="en-US" sz="2400" b="0" dirty="0">
+                <a:solidFill>
+                  <a:srgbClr val="D4BE98"/>
+                </a:solidFill>
+                <a:effectLst/>
+                <a:latin typeface="Consolas" panose="020B0609020204030204" pitchFamily="49" charset="0"/>
+              </a:rPr>
+              <a:t>    </a:t>
+            </a:r>
+            <a:r>
+              <a:rPr lang="en-US" sz="2400" b="0" dirty="0">
+                <a:solidFill>
+                  <a:srgbClr val="A9B665"/>
+                </a:solidFill>
+                <a:effectLst/>
+                <a:latin typeface="Consolas" panose="020B0609020204030204" pitchFamily="49" charset="0"/>
+              </a:rPr>
+              <a:t>&lt;</a:t>
+            </a:r>
+            <a:r>
+              <a:rPr lang="en-US" sz="2400" b="0" dirty="0">
+                <a:solidFill>
+                  <a:srgbClr val="E78A4E"/>
+                </a:solidFill>
+                <a:effectLst/>
+                <a:latin typeface="Consolas" panose="020B0609020204030204" pitchFamily="49" charset="0"/>
+              </a:rPr>
+              <a:t>style</a:t>
+            </a:r>
+            <a:r>
+              <a:rPr lang="en-US" sz="2400" b="0" dirty="0">
+                <a:solidFill>
+                  <a:srgbClr val="A9B665"/>
+                </a:solidFill>
+                <a:effectLst/>
+                <a:latin typeface="Consolas" panose="020B0609020204030204" pitchFamily="49" charset="0"/>
+              </a:rPr>
+              <a:t>&gt;</a:t>
+            </a:r>
+            <a:endParaRPr lang="en-US" sz="2400" b="0" dirty="0">
+              <a:solidFill>
+                <a:srgbClr val="D4BE98"/>
+              </a:solidFill>
+              <a:effectLst/>
+              <a:latin typeface="Consolas" panose="020B0609020204030204" pitchFamily="49" charset="0"/>
+            </a:endParaRPr>
+          </a:p>
+          <a:p>
+            <a:pPr marL="57150" indent="0">
+              <a:buNone/>
+            </a:pPr>
+            <a:r>
+              <a:rPr lang="en-US" sz="2400" b="0" dirty="0">
+                <a:solidFill>
+                  <a:srgbClr val="D4BE98"/>
+                </a:solidFill>
+                <a:effectLst/>
+                <a:latin typeface="Consolas" panose="020B0609020204030204" pitchFamily="49" charset="0"/>
+              </a:rPr>
+              <a:t>      </a:t>
+            </a:r>
+            <a:r>
+              <a:rPr lang="en-US" sz="2400" b="0" i="1" dirty="0">
+                <a:solidFill>
+                  <a:srgbClr val="928374"/>
+                </a:solidFill>
+                <a:effectLst/>
+                <a:latin typeface="Consolas" panose="020B0609020204030204" pitchFamily="49" charset="0"/>
+              </a:rPr>
+              <a:t>/* CSS Goes Here */</a:t>
+            </a:r>
+            <a:endParaRPr lang="en-US" sz="2400" b="0" dirty="0">
+              <a:solidFill>
+                <a:srgbClr val="D4BE98"/>
+              </a:solidFill>
+              <a:effectLst/>
+              <a:latin typeface="Consolas" panose="020B0609020204030204" pitchFamily="49" charset="0"/>
+            </a:endParaRPr>
+          </a:p>
+          <a:p>
+            <a:pPr marL="57150" indent="0">
+              <a:buNone/>
+            </a:pPr>
+            <a:r>
+              <a:rPr lang="en-US" sz="2400" b="0" dirty="0">
+                <a:solidFill>
+                  <a:srgbClr val="D4BE98"/>
+                </a:solidFill>
+                <a:effectLst/>
+                <a:latin typeface="Consolas" panose="020B0609020204030204" pitchFamily="49" charset="0"/>
+              </a:rPr>
+              <a:t>    </a:t>
+            </a:r>
+            <a:r>
+              <a:rPr lang="en-US" sz="2400" b="0" dirty="0">
+                <a:solidFill>
+                  <a:srgbClr val="A9B665"/>
+                </a:solidFill>
+                <a:effectLst/>
+                <a:latin typeface="Consolas" panose="020B0609020204030204" pitchFamily="49" charset="0"/>
+              </a:rPr>
+              <a:t>&lt;/</a:t>
+            </a:r>
+            <a:r>
+              <a:rPr lang="en-US" sz="2400" b="0" dirty="0">
+                <a:solidFill>
+                  <a:srgbClr val="E78A4E"/>
+                </a:solidFill>
+                <a:effectLst/>
+                <a:latin typeface="Consolas" panose="020B0609020204030204" pitchFamily="49" charset="0"/>
+              </a:rPr>
+              <a:t>style</a:t>
+            </a:r>
+            <a:r>
+              <a:rPr lang="en-US" sz="2400" b="0" dirty="0">
+                <a:solidFill>
+                  <a:srgbClr val="A9B665"/>
+                </a:solidFill>
+                <a:effectLst/>
+                <a:latin typeface="Consolas" panose="020B0609020204030204" pitchFamily="49" charset="0"/>
+              </a:rPr>
+              <a:t>&gt;</a:t>
+            </a:r>
+            <a:endParaRPr lang="en-US" sz="2400" b="0" dirty="0">
+              <a:solidFill>
+                <a:srgbClr val="D4BE98"/>
+              </a:solidFill>
+              <a:effectLst/>
+              <a:latin typeface="Consolas" panose="020B0609020204030204" pitchFamily="49" charset="0"/>
+            </a:endParaRPr>
+          </a:p>
+          <a:p>
+            <a:pPr marL="57150" indent="0">
+              <a:buNone/>
+            </a:pPr>
+            <a:r>
+              <a:rPr lang="en-US" sz="2400" b="0" dirty="0">
+                <a:solidFill>
+                  <a:srgbClr val="D4BE98"/>
+                </a:solidFill>
+                <a:effectLst/>
+                <a:latin typeface="Consolas" panose="020B0609020204030204" pitchFamily="49" charset="0"/>
+              </a:rPr>
+              <a:t>  </a:t>
+            </a:r>
+            <a:r>
+              <a:rPr lang="en-US" sz="2400" b="0" dirty="0">
+                <a:solidFill>
+                  <a:srgbClr val="A9B665"/>
+                </a:solidFill>
+                <a:effectLst/>
+                <a:latin typeface="Consolas" panose="020B0609020204030204" pitchFamily="49" charset="0"/>
+              </a:rPr>
+              <a:t>&lt;/</a:t>
+            </a:r>
+            <a:r>
+              <a:rPr lang="en-US" sz="2400" b="0" dirty="0">
+                <a:solidFill>
+                  <a:srgbClr val="E78A4E"/>
+                </a:solidFill>
+                <a:effectLst/>
+                <a:latin typeface="Consolas" panose="020B0609020204030204" pitchFamily="49" charset="0"/>
+              </a:rPr>
+              <a:t>head</a:t>
+            </a:r>
+            <a:r>
+              <a:rPr lang="en-US" sz="2400" b="0" dirty="0">
+                <a:solidFill>
+                  <a:srgbClr val="A9B665"/>
+                </a:solidFill>
+                <a:effectLst/>
+                <a:latin typeface="Consolas" panose="020B0609020204030204" pitchFamily="49" charset="0"/>
+              </a:rPr>
+              <a:t>&gt;</a:t>
+            </a:r>
+            <a:endParaRPr lang="en-US" sz="2400" b="0" dirty="0">
+              <a:solidFill>
+                <a:srgbClr val="D4BE98"/>
+              </a:solidFill>
+              <a:effectLst/>
+              <a:latin typeface="Consolas" panose="020B0609020204030204" pitchFamily="49" charset="0"/>
+            </a:endParaRPr>
+          </a:p>
+          <a:p>
+            <a:pPr marL="57150" indent="0">
+              <a:buNone/>
+            </a:pPr>
+            <a:r>
+              <a:rPr lang="en-US" sz="2400" b="0" dirty="0">
+                <a:solidFill>
+                  <a:srgbClr val="D4BE98"/>
+                </a:solidFill>
+                <a:effectLst/>
+                <a:latin typeface="Consolas" panose="020B0609020204030204" pitchFamily="49" charset="0"/>
+              </a:rPr>
+              <a:t>  </a:t>
+            </a:r>
+            <a:r>
+              <a:rPr lang="en-US" sz="2400" b="0" dirty="0">
+                <a:solidFill>
+                  <a:srgbClr val="A9B665"/>
+                </a:solidFill>
+                <a:effectLst/>
+                <a:latin typeface="Consolas" panose="020B0609020204030204" pitchFamily="49" charset="0"/>
+              </a:rPr>
+              <a:t>&lt;</a:t>
+            </a:r>
+            <a:r>
+              <a:rPr lang="en-US" sz="2400" b="0" dirty="0">
+                <a:solidFill>
+                  <a:srgbClr val="E78A4E"/>
+                </a:solidFill>
+                <a:effectLst/>
+                <a:latin typeface="Consolas" panose="020B0609020204030204" pitchFamily="49" charset="0"/>
+              </a:rPr>
+              <a:t>body</a:t>
+            </a:r>
+            <a:r>
+              <a:rPr lang="en-US" sz="2400" b="0" dirty="0">
+                <a:solidFill>
+                  <a:srgbClr val="A9B665"/>
+                </a:solidFill>
+                <a:effectLst/>
+                <a:latin typeface="Consolas" panose="020B0609020204030204" pitchFamily="49" charset="0"/>
+              </a:rPr>
+              <a:t>&gt;</a:t>
+            </a:r>
+            <a:endParaRPr lang="en-US" sz="2400" b="0" dirty="0">
+              <a:solidFill>
+                <a:srgbClr val="D4BE98"/>
+              </a:solidFill>
+              <a:effectLst/>
+              <a:latin typeface="Consolas" panose="020B0609020204030204" pitchFamily="49" charset="0"/>
+            </a:endParaRPr>
+          </a:p>
+          <a:p>
+            <a:pPr marL="57150" indent="0">
+              <a:buNone/>
+            </a:pPr>
+            <a:r>
+              <a:rPr lang="en-US" sz="2400" b="0" dirty="0">
+                <a:solidFill>
+                  <a:srgbClr val="D4BE98"/>
+                </a:solidFill>
+                <a:effectLst/>
+                <a:latin typeface="Consolas" panose="020B0609020204030204" pitchFamily="49" charset="0"/>
+              </a:rPr>
+              <a:t>    </a:t>
+            </a:r>
+            <a:r>
+              <a:rPr lang="en-US" sz="2400" b="0" dirty="0">
+                <a:solidFill>
+                  <a:srgbClr val="A9B665"/>
+                </a:solidFill>
+                <a:effectLst/>
+                <a:latin typeface="Consolas" panose="020B0609020204030204" pitchFamily="49" charset="0"/>
+              </a:rPr>
+              <a:t>&lt;</a:t>
+            </a:r>
+            <a:r>
+              <a:rPr lang="en-US" sz="2400" b="0" dirty="0">
+                <a:solidFill>
+                  <a:srgbClr val="E78A4E"/>
+                </a:solidFill>
+                <a:effectLst/>
+                <a:latin typeface="Consolas" panose="020B0609020204030204" pitchFamily="49" charset="0"/>
+              </a:rPr>
+              <a:t>h1</a:t>
+            </a:r>
+            <a:r>
+              <a:rPr lang="en-US" sz="2400" b="0" dirty="0">
+                <a:solidFill>
+                  <a:srgbClr val="A9B665"/>
+                </a:solidFill>
+                <a:effectLst/>
+                <a:latin typeface="Consolas" panose="020B0609020204030204" pitchFamily="49" charset="0"/>
+              </a:rPr>
+              <a:t>&gt;</a:t>
+            </a:r>
+            <a:r>
+              <a:rPr lang="en-US" sz="2400" b="0" dirty="0">
+                <a:solidFill>
+                  <a:srgbClr val="D4BE98"/>
+                </a:solidFill>
+                <a:effectLst/>
+                <a:latin typeface="Consolas" panose="020B0609020204030204" pitchFamily="49" charset="0"/>
+              </a:rPr>
+              <a:t>My Site</a:t>
+            </a:r>
+            <a:r>
+              <a:rPr lang="en-US" sz="2400" b="0" dirty="0">
+                <a:solidFill>
+                  <a:srgbClr val="A9B665"/>
+                </a:solidFill>
+                <a:effectLst/>
+                <a:latin typeface="Consolas" panose="020B0609020204030204" pitchFamily="49" charset="0"/>
+              </a:rPr>
+              <a:t>&lt;/</a:t>
+            </a:r>
+            <a:r>
+              <a:rPr lang="en-US" sz="2400" b="0" dirty="0">
+                <a:solidFill>
+                  <a:srgbClr val="E78A4E"/>
+                </a:solidFill>
+                <a:effectLst/>
+                <a:latin typeface="Consolas" panose="020B0609020204030204" pitchFamily="49" charset="0"/>
+              </a:rPr>
+              <a:t>h1</a:t>
+            </a:r>
+            <a:r>
+              <a:rPr lang="en-US" sz="2400" b="0" dirty="0">
+                <a:solidFill>
+                  <a:srgbClr val="A9B665"/>
+                </a:solidFill>
+                <a:effectLst/>
+                <a:latin typeface="Consolas" panose="020B0609020204030204" pitchFamily="49" charset="0"/>
+              </a:rPr>
+              <a:t>&gt;</a:t>
+            </a:r>
+            <a:endParaRPr lang="en-US" sz="2400" b="0" dirty="0">
+              <a:solidFill>
+                <a:srgbClr val="D4BE98"/>
+              </a:solidFill>
+              <a:effectLst/>
+              <a:latin typeface="Consolas" panose="020B0609020204030204" pitchFamily="49" charset="0"/>
+            </a:endParaRPr>
+          </a:p>
+          <a:p>
+            <a:pPr marL="57150" indent="0">
+              <a:buNone/>
+            </a:pPr>
+            <a:r>
+              <a:rPr lang="en-US" sz="2400" b="0" dirty="0">
+                <a:solidFill>
+                  <a:srgbClr val="D4BE98"/>
+                </a:solidFill>
+                <a:effectLst/>
+                <a:latin typeface="Consolas" panose="020B0609020204030204" pitchFamily="49" charset="0"/>
+              </a:rPr>
+              <a:t>  </a:t>
+            </a:r>
+            <a:r>
+              <a:rPr lang="en-US" sz="2400" b="0" dirty="0">
+                <a:solidFill>
+                  <a:srgbClr val="A9B665"/>
+                </a:solidFill>
+                <a:effectLst/>
+                <a:latin typeface="Consolas" panose="020B0609020204030204" pitchFamily="49" charset="0"/>
+              </a:rPr>
+              <a:t>&lt;/</a:t>
+            </a:r>
+            <a:r>
+              <a:rPr lang="en-US" sz="2400" b="0" dirty="0">
+                <a:solidFill>
+                  <a:srgbClr val="E78A4E"/>
+                </a:solidFill>
+                <a:effectLst/>
+                <a:latin typeface="Consolas" panose="020B0609020204030204" pitchFamily="49" charset="0"/>
+              </a:rPr>
+              <a:t>body</a:t>
+            </a:r>
+            <a:r>
+              <a:rPr lang="en-US" sz="2400" b="0" dirty="0">
+                <a:solidFill>
+                  <a:srgbClr val="A9B665"/>
+                </a:solidFill>
+                <a:effectLst/>
+                <a:latin typeface="Consolas" panose="020B0609020204030204" pitchFamily="49" charset="0"/>
+              </a:rPr>
+              <a:t>&gt;</a:t>
+            </a:r>
+            <a:endParaRPr lang="en-US" sz="2400" b="0" dirty="0">
+              <a:solidFill>
+                <a:srgbClr val="D4BE98"/>
+              </a:solidFill>
+              <a:effectLst/>
+              <a:latin typeface="Consolas" panose="020B0609020204030204" pitchFamily="49" charset="0"/>
+            </a:endParaRPr>
+          </a:p>
+          <a:p>
+            <a:pPr marL="57150" indent="0">
+              <a:buNone/>
+            </a:pPr>
+            <a:r>
+              <a:rPr lang="en-US" sz="2400" b="0" dirty="0">
+                <a:solidFill>
+                  <a:srgbClr val="A9B665"/>
+                </a:solidFill>
+                <a:effectLst/>
+                <a:latin typeface="Consolas" panose="020B0609020204030204" pitchFamily="49" charset="0"/>
+              </a:rPr>
+              <a:t>&lt;/</a:t>
+            </a:r>
+            <a:r>
+              <a:rPr lang="en-US" sz="2400" b="0" dirty="0">
+                <a:solidFill>
+                  <a:srgbClr val="E78A4E"/>
+                </a:solidFill>
+                <a:effectLst/>
+                <a:latin typeface="Consolas" panose="020B0609020204030204" pitchFamily="49" charset="0"/>
+              </a:rPr>
+              <a:t>html</a:t>
+            </a:r>
+            <a:r>
+              <a:rPr lang="en-US" sz="2400" b="0" dirty="0">
+                <a:solidFill>
+                  <a:srgbClr val="A9B665"/>
+                </a:solidFill>
+                <a:effectLst/>
+                <a:latin typeface="Consolas" panose="020B0609020204030204" pitchFamily="49" charset="0"/>
+              </a:rPr>
+              <a:t>&gt;</a:t>
+            </a:r>
+            <a:endParaRPr lang="en-US" sz="2400" b="0" dirty="0">
+              <a:solidFill>
+                <a:srgbClr val="D4BE98"/>
+              </a:solidFill>
+              <a:effectLst/>
+              <a:latin typeface="Consolas" panose="020B0609020204030204" pitchFamily="49" charset="0"/>
+            </a:endParaRPr>
+          </a:p>
+        </p:txBody>
+      </p:sp>
+      <p:sp>
+        <p:nvSpPr>
+          <p:cNvPr id="5" name="Content Placeholder 2">
+            <a:extLst>
+              <a:ext uri="{FF2B5EF4-FFF2-40B4-BE49-F238E27FC236}">
+                <a16:creationId xmlns:a16="http://schemas.microsoft.com/office/drawing/2014/main" id="{0E28B48C-F781-40A9-8C61-6C54EECEAE54}"/>
+              </a:ext>
+            </a:extLst>
+          </p:cNvPr>
+          <p:cNvSpPr txBox="1">
+            <a:spLocks/>
+          </p:cNvSpPr>
+          <p:nvPr/>
+        </p:nvSpPr>
+        <p:spPr>
+          <a:xfrm>
+            <a:off x="5181599" y="4173364"/>
+            <a:ext cx="6508955" cy="2354580"/>
+          </a:xfrm>
+          <a:prstGeom prst="rect">
+            <a:avLst/>
+          </a:prstGeom>
+        </p:spPr>
+        <p:txBody>
+          <a:bodyPr vert="horz" lIns="0" tIns="0" rIns="0" bIns="0" rtlCol="0">
+            <a:normAutofit/>
+          </a:bodyPr>
+          <a:lstStyle>
+            <a:lvl1pPr marL="342900" indent="-285750" algn="l" defTabSz="914400" rtl="0" eaLnBrk="1" latinLnBrk="0" hangingPunct="1">
+              <a:lnSpc>
+                <a:spcPct val="100000"/>
+              </a:lnSpc>
+              <a:spcBef>
+                <a:spcPts val="0"/>
+              </a:spcBef>
+              <a:spcAft>
+                <a:spcPts val="1200"/>
+              </a:spcAft>
+              <a:buClr>
+                <a:schemeClr val="accent3"/>
+              </a:buClr>
+              <a:buFont typeface="Wingdings" panose="05000000000000000000" pitchFamily="2" charset="2"/>
+              <a:buChar char="§"/>
+              <a:defRPr sz="2800" kern="1200">
+                <a:solidFill>
+                  <a:schemeClr val="tx1"/>
+                </a:solidFill>
+                <a:latin typeface="+mn-lt"/>
+                <a:ea typeface="+mn-ea"/>
+                <a:cs typeface="+mn-cs"/>
+              </a:defRPr>
+            </a:lvl1pPr>
+            <a:lvl2pPr marL="685800" indent="-228600" algn="l" defTabSz="914400" rtl="0" eaLnBrk="1" latinLnBrk="0" hangingPunct="1">
+              <a:lnSpc>
+                <a:spcPct val="100000"/>
+              </a:lnSpc>
+              <a:spcBef>
+                <a:spcPts val="0"/>
+              </a:spcBef>
+              <a:spcAft>
+                <a:spcPts val="1200"/>
+              </a:spcAft>
+              <a:buClr>
+                <a:schemeClr val="accent2"/>
+              </a:buClr>
+              <a:buFont typeface="Arial" panose="020B0604020202020204" pitchFamily="34" charset="0"/>
+              <a:buChar char="•"/>
+              <a:defRPr sz="2400" kern="1200">
+                <a:solidFill>
+                  <a:schemeClr val="tx1"/>
+                </a:solidFill>
+                <a:latin typeface="+mn-lt"/>
+                <a:ea typeface="+mn-ea"/>
+                <a:cs typeface="+mn-cs"/>
+              </a:defRPr>
+            </a:lvl2pPr>
+            <a:lvl3pPr marL="1028700" indent="-228600" algn="l" defTabSz="914400" rtl="0" eaLnBrk="1" latinLnBrk="0" hangingPunct="1">
+              <a:lnSpc>
+                <a:spcPct val="100000"/>
+              </a:lnSpc>
+              <a:spcBef>
+                <a:spcPts val="0"/>
+              </a:spcBef>
+              <a:spcAft>
+                <a:spcPts val="1200"/>
+              </a:spcAft>
+              <a:buClr>
+                <a:schemeClr val="accent1"/>
+              </a:buClr>
+              <a:buFont typeface="Arial" panose="020B0604020202020204" pitchFamily="34" charset="0"/>
+              <a:buChar char="•"/>
+              <a:defRPr sz="2000" kern="1200">
+                <a:solidFill>
+                  <a:schemeClr val="tx1"/>
+                </a:solidFill>
+                <a:latin typeface="+mn-lt"/>
+                <a:ea typeface="+mn-ea"/>
+                <a:cs typeface="+mn-cs"/>
+              </a:defRPr>
+            </a:lvl3pPr>
+            <a:lvl4pPr marL="1484313" indent="-285750" algn="l" defTabSz="914400" rtl="0" eaLnBrk="1" latinLnBrk="0" hangingPunct="1">
+              <a:lnSpc>
+                <a:spcPct val="100000"/>
+              </a:lnSpc>
+              <a:spcBef>
+                <a:spcPts val="0"/>
+              </a:spcBef>
+              <a:spcAft>
+                <a:spcPts val="1200"/>
+              </a:spcAft>
+              <a:buFont typeface="Arial" panose="020B0604020202020204" pitchFamily="34" charset="0"/>
+              <a:buChar char="•"/>
+              <a:defRPr sz="1800" kern="1200">
+                <a:solidFill>
+                  <a:schemeClr val="tx1"/>
+                </a:solidFill>
+                <a:latin typeface="+mn-lt"/>
+                <a:ea typeface="+mn-ea"/>
+                <a:cs typeface="+mn-cs"/>
+              </a:defRPr>
+            </a:lvl4pPr>
+            <a:lvl5pPr marL="1889125" indent="-284163" algn="l" defTabSz="914400" rtl="0" eaLnBrk="1" latinLnBrk="0" hangingPunct="1">
+              <a:lnSpc>
+                <a:spcPct val="100000"/>
+              </a:lnSpc>
+              <a:spcBef>
+                <a:spcPts val="0"/>
+              </a:spcBef>
+              <a:spcAft>
+                <a:spcPts val="1200"/>
+              </a:spcAft>
+              <a:buFont typeface="Arial" panose="020B0604020202020204" pitchFamily="34" charset="0"/>
+              <a:buChar char="•"/>
+              <a:defRPr sz="1800" kern="1200">
+                <a:solidFill>
+                  <a:schemeClr val="tx1"/>
+                </a:solidFill>
+                <a:latin typeface="+mn-lt"/>
+                <a:ea typeface="+mn-ea"/>
+                <a:cs typeface="+mn-cs"/>
+              </a:defRPr>
+            </a:lvl5pPr>
+            <a:lvl6pPr marL="2514600" indent="-228600" algn="l" defTabSz="914400" rtl="0" eaLnBrk="1" latinLnBrk="0" hangingPunct="1">
+              <a:lnSpc>
+                <a:spcPct val="90000"/>
+              </a:lnSpc>
+              <a:spcBef>
+                <a:spcPts val="500"/>
+              </a:spcBef>
+              <a:buFont typeface="Arial" panose="020B0604020202020204" pitchFamily="34" charset="0"/>
+              <a:buChar char="•"/>
+              <a:defRPr sz="1800" kern="1200">
+                <a:solidFill>
+                  <a:schemeClr val="tx1"/>
+                </a:solidFill>
+                <a:latin typeface="+mn-lt"/>
+                <a:ea typeface="+mn-ea"/>
+                <a:cs typeface="+mn-cs"/>
+              </a:defRPr>
+            </a:lvl6pPr>
+            <a:lvl7pPr marL="2971800" indent="-228600" algn="l" defTabSz="914400" rtl="0" eaLnBrk="1" latinLnBrk="0" hangingPunct="1">
+              <a:lnSpc>
+                <a:spcPct val="90000"/>
+              </a:lnSpc>
+              <a:spcBef>
+                <a:spcPts val="500"/>
+              </a:spcBef>
+              <a:buFont typeface="Arial" panose="020B0604020202020204" pitchFamily="34" charset="0"/>
+              <a:buChar char="•"/>
+              <a:defRPr sz="1800" kern="1200">
+                <a:solidFill>
+                  <a:schemeClr val="tx1"/>
+                </a:solidFill>
+                <a:latin typeface="+mn-lt"/>
+                <a:ea typeface="+mn-ea"/>
+                <a:cs typeface="+mn-cs"/>
+              </a:defRPr>
+            </a:lvl7pPr>
+            <a:lvl8pPr marL="3429000" indent="-228600" algn="l" defTabSz="914400" rtl="0" eaLnBrk="1" latinLnBrk="0" hangingPunct="1">
+              <a:lnSpc>
+                <a:spcPct val="90000"/>
+              </a:lnSpc>
+              <a:spcBef>
+                <a:spcPts val="500"/>
+              </a:spcBef>
+              <a:buFont typeface="Arial" panose="020B0604020202020204" pitchFamily="34" charset="0"/>
+              <a:buChar char="•"/>
+              <a:defRPr sz="1800" kern="1200">
+                <a:solidFill>
+                  <a:schemeClr val="tx1"/>
+                </a:solidFill>
+                <a:latin typeface="+mn-lt"/>
+                <a:ea typeface="+mn-ea"/>
+                <a:cs typeface="+mn-cs"/>
+              </a:defRPr>
+            </a:lvl8pPr>
+            <a:lvl9pPr marL="3886200" indent="-228600" algn="l" defTabSz="914400" rtl="0" eaLnBrk="1" latinLnBrk="0" hangingPunct="1">
+              <a:lnSpc>
+                <a:spcPct val="90000"/>
+              </a:lnSpc>
+              <a:spcBef>
+                <a:spcPts val="500"/>
+              </a:spcBef>
+              <a:buFont typeface="Arial" panose="020B0604020202020204" pitchFamily="34" charset="0"/>
+              <a:buChar char="•"/>
+              <a:defRPr sz="1800" kern="1200">
+                <a:solidFill>
+                  <a:schemeClr val="tx1"/>
+                </a:solidFill>
+                <a:latin typeface="+mn-lt"/>
+                <a:ea typeface="+mn-ea"/>
+                <a:cs typeface="+mn-cs"/>
+              </a:defRPr>
+            </a:lvl9pPr>
+          </a:lstStyle>
+          <a:p>
+            <a:r>
+              <a:rPr lang="en-US" dirty="0"/>
+              <a:t>The </a:t>
+            </a:r>
+            <a:r>
+              <a:rPr lang="en-US" b="1" dirty="0">
+                <a:solidFill>
+                  <a:srgbClr val="FFB71B"/>
+                </a:solidFill>
+                <a:latin typeface="Consolas" panose="020B0609020204030204" pitchFamily="49" charset="0"/>
+              </a:rPr>
+              <a:t>&lt;head&gt;&lt;/head&gt;</a:t>
+            </a:r>
+            <a:r>
+              <a:rPr lang="en-US" dirty="0"/>
+              <a:t> element is a </a:t>
+            </a:r>
+            <a:r>
+              <a:rPr lang="en-US" i="1" dirty="0"/>
+              <a:t>child</a:t>
+            </a:r>
+            <a:r>
+              <a:rPr lang="en-US" dirty="0"/>
+              <a:t> of the </a:t>
+            </a:r>
+            <a:r>
+              <a:rPr lang="en-US" b="1" dirty="0">
+                <a:solidFill>
+                  <a:srgbClr val="FFB71B"/>
+                </a:solidFill>
+                <a:latin typeface="Consolas" panose="020B0609020204030204" pitchFamily="49" charset="0"/>
+              </a:rPr>
+              <a:t>&lt;html&gt;&lt;/html&gt;</a:t>
+            </a:r>
+            <a:r>
+              <a:rPr lang="en-US" dirty="0"/>
+              <a:t> element, and a </a:t>
+            </a:r>
+            <a:r>
+              <a:rPr lang="en-US" i="1" dirty="0"/>
+              <a:t>sibling</a:t>
+            </a:r>
+            <a:r>
+              <a:rPr lang="en-US" dirty="0"/>
+              <a:t> of the </a:t>
+            </a:r>
+            <a:r>
+              <a:rPr lang="en-US" b="1" dirty="0">
+                <a:solidFill>
+                  <a:srgbClr val="FFB71B"/>
+                </a:solidFill>
+                <a:latin typeface="Consolas" panose="020B0609020204030204" pitchFamily="49" charset="0"/>
+              </a:rPr>
+              <a:t>&lt;body&gt;&lt;/body&gt;</a:t>
+            </a:r>
+            <a:r>
+              <a:rPr lang="en-US" dirty="0"/>
+              <a:t> element</a:t>
+            </a:r>
+          </a:p>
+          <a:p>
+            <a:r>
+              <a:rPr lang="en-US" dirty="0"/>
+              <a:t>The </a:t>
+            </a:r>
+            <a:r>
+              <a:rPr lang="en-US" b="1" dirty="0">
+                <a:solidFill>
+                  <a:srgbClr val="FFB71B"/>
+                </a:solidFill>
+                <a:latin typeface="Consolas" panose="020B0609020204030204" pitchFamily="49" charset="0"/>
+              </a:rPr>
+              <a:t>&lt;style&gt;&lt;/style&gt;</a:t>
+            </a:r>
+            <a:r>
+              <a:rPr lang="en-US" dirty="0"/>
+              <a:t> element is a </a:t>
+            </a:r>
+            <a:r>
+              <a:rPr lang="en-US" i="1" dirty="0"/>
+              <a:t>child</a:t>
+            </a:r>
+            <a:r>
+              <a:rPr lang="en-US" dirty="0"/>
+              <a:t> of the </a:t>
+            </a:r>
+            <a:r>
+              <a:rPr lang="en-US" b="1" dirty="0">
+                <a:solidFill>
+                  <a:srgbClr val="FFB71B"/>
+                </a:solidFill>
+                <a:latin typeface="Consolas" panose="020B0609020204030204" pitchFamily="49" charset="0"/>
+              </a:rPr>
+              <a:t>&lt;head&gt;&lt;/head&gt;</a:t>
+            </a:r>
+            <a:r>
+              <a:rPr lang="en-US" dirty="0"/>
+              <a:t> element</a:t>
             </a:r>
           </a:p>
         </p:txBody>
       </p:sp>
       <p:pic>
         <p:nvPicPr>
-          <p:cNvPr id="1026" name="Picture 2" descr="File Manager: Download a Free Trial of WinZip">
+          <p:cNvPr id="3" name="Picture 2" descr="The saying 'Alas, poor Yorick! I knew him, Horatio' - meaning and origin.">
             <a:extLst>
               <a:ext uri="{FF2B5EF4-FFF2-40B4-BE49-F238E27FC236}">
-                <a16:creationId xmlns:a16="http://schemas.microsoft.com/office/drawing/2014/main" id="{8D89EA5D-538D-4544-BA34-92AC5BBC859E}"/>
+                <a16:creationId xmlns:a16="http://schemas.microsoft.com/office/drawing/2014/main" id="{748A4E57-B80E-4ACA-9AC7-66D578E3E66B}"/>
               </a:ext>
             </a:extLst>
           </p:cNvPr>
@@ -40697,13 +41367,60 @@
               </a:ext>
             </a:extLst>
           </a:blip>
-          <a:srcRect l="12296" r="8276"/>
+          <a:srcRect t="-1" b="33515"/>
           <a:stretch/>
         </p:blipFill>
         <p:spPr bwMode="auto">
           <a:xfrm>
-            <a:off x="7353300" y="2057400"/>
-            <a:ext cx="4229101" cy="2835983"/>
+            <a:off x="5511902" y="1374425"/>
+            <a:ext cx="2924175" cy="2387457"/>
+          </a:xfrm>
+          <a:prstGeom prst="rect">
+            <a:avLst/>
+          </a:prstGeom>
+          <a:noFill/>
+          <a:extLst>
+            <a:ext uri="{909E8E84-426E-40DD-AFC4-6F175D3DCCD1}">
+              <a14:hiddenFill xmlns:a14="http://schemas.microsoft.com/office/drawing/2010/main">
+                <a:solidFill>
+                  <a:srgbClr val="FFFFFF"/>
+                </a:solidFill>
+              </a14:hiddenFill>
+            </a:ext>
+          </a:extLst>
+        </p:spPr>
+      </p:pic>
+      <p:pic>
+        <p:nvPicPr>
+          <p:cNvPr id="1028" name="Picture 4" descr="Matryoshka - Montessori Services">
+            <a:extLst>
+              <a:ext uri="{FF2B5EF4-FFF2-40B4-BE49-F238E27FC236}">
+                <a16:creationId xmlns:a16="http://schemas.microsoft.com/office/drawing/2014/main" id="{324B8F4F-CA5A-41D3-8E74-DCFEFDB1A3CC}"/>
+              </a:ext>
+            </a:extLst>
+          </p:cNvPr>
+          <p:cNvPicPr>
+            <a:picLocks noChangeAspect="1" noChangeArrowheads="1"/>
+          </p:cNvPicPr>
+          <p:nvPr/>
+        </p:nvPicPr>
+        <p:blipFill>
+          <a:blip r:embed="rId4">
+            <a:extLst>
+              <a:ext uri="{28A0092B-C50C-407E-A947-70E740481C1C}">
+                <a14:useLocalDpi xmlns:a14="http://schemas.microsoft.com/office/drawing/2010/main" val="0"/>
+              </a:ext>
+            </a:extLst>
+          </a:blip>
+          <a:srcRect/>
+          <a:stretch>
+            <a:fillRect/>
+          </a:stretch>
+        </p:blipFill>
+        <p:spPr bwMode="auto">
+          <a:xfrm>
+            <a:off x="8724900" y="1207983"/>
+            <a:ext cx="2514600" cy="2514600"/>
           </a:xfrm>
           <a:prstGeom prst="rect">
             <a:avLst/>
@@ -40724,299 +41441,6 @@
     <p:extLst>
       <p:ext uri="{BB962C8B-B14F-4D97-AF65-F5344CB8AC3E}">
         <p14:creationId xmlns:p14="http://schemas.microsoft.com/office/powerpoint/2010/main" val="969036985"/>
-      </p:ext>
-    </p:extLst>
-  </p:cSld>
-  <p:clrMapOvr>
-    <a:masterClrMapping/>
-  </p:clrMapOvr>
-  <p:transition>
-    <p:fade/>
-  </p:transition>
-</p:sld>
-</file>
-
-<file path=ppt/slides/slide4.xml><?xml version="1.0" encoding="utf-8"?>
-<p:sld xmlns:a="http://schemas.openxmlformats.org/drawingml/2006/main" xmlns:r="http://schemas.openxmlformats.org/officeDocument/2006/relationships" xmlns:p="http://schemas.openxmlformats.org/presentationml/2006/main">
-  <p:cSld>
-    <p:spTree>
-      <p:nvGrpSpPr>
-        <p:cNvPr id="1" name=""/>
-        <p:cNvGrpSpPr/>
-        <p:nvPr/>
-      </p:nvGrpSpPr>
-      <p:grpSpPr>
-        <a:xfrm>
-          <a:off x="0" y="0"/>
-          <a:ext cx="0" cy="0"/>
-          <a:chOff x="0" y="0"/>
-          <a:chExt cx="0" cy="0"/>
-        </a:xfrm>
-      </p:grpSpPr>
-      <p:sp>
-        <p:nvSpPr>
-          <p:cNvPr id="2" name="Title 1"/>
-          <p:cNvSpPr>
-            <a:spLocks noGrp="1"/>
-          </p:cNvSpPr>
-          <p:nvPr>
-            <p:ph type="title"/>
-          </p:nvPr>
-        </p:nvSpPr>
-        <p:spPr/>
-        <p:txBody>
-          <a:bodyPr/>
-          <a:lstStyle/>
-          <a:p>
-            <a:r>
-              <a:rPr lang="en-US" dirty="0"/>
-              <a:t>the </a:t>
-            </a:r>
-            <a:r>
-              <a:rPr lang="en-US" cap="none" dirty="0">
-                <a:solidFill>
-                  <a:schemeClr val="accent1">
-                    <a:lumMod val="20000"/>
-                    <a:lumOff val="80000"/>
-                  </a:schemeClr>
-                </a:solidFill>
-                <a:latin typeface="Consolas" panose="020B0609020204030204" pitchFamily="49" charset="0"/>
-              </a:rPr>
-              <a:t>link</a:t>
-            </a:r>
-            <a:r>
-              <a:rPr lang="en-US" dirty="0"/>
-              <a:t> element</a:t>
-            </a:r>
-          </a:p>
-        </p:txBody>
-      </p:sp>
-      <p:sp>
-        <p:nvSpPr>
-          <p:cNvPr id="3" name="Content Placeholder 2"/>
-          <p:cNvSpPr>
-            <a:spLocks noGrp="1"/>
-          </p:cNvSpPr>
-          <p:nvPr>
-            <p:ph idx="1"/>
-          </p:nvPr>
-        </p:nvSpPr>
-        <p:spPr/>
-        <p:txBody>
-          <a:bodyPr>
-            <a:normAutofit/>
-          </a:bodyPr>
-          <a:lstStyle/>
-          <a:p>
-            <a:r>
-              <a:rPr lang="en-US" i="1" dirty="0"/>
-              <a:t>Different from the </a:t>
-            </a:r>
-            <a:r>
-              <a:rPr lang="en-US" b="1" i="1" dirty="0">
-                <a:solidFill>
-                  <a:schemeClr val="accent1">
-                    <a:lumMod val="50000"/>
-                  </a:schemeClr>
-                </a:solidFill>
-                <a:latin typeface="Consolas" panose="020B0609020204030204" pitchFamily="49" charset="0"/>
-              </a:rPr>
-              <a:t>&lt;a&gt;</a:t>
-            </a:r>
-            <a:r>
-              <a:rPr lang="en-US" i="1" dirty="0"/>
-              <a:t> hyperlink element</a:t>
-            </a:r>
-          </a:p>
-          <a:p>
-            <a:r>
-              <a:rPr lang="en-US" dirty="0"/>
-              <a:t>Links a variety of external files (CSS, fonts, icons)</a:t>
-            </a:r>
-          </a:p>
-          <a:p>
-            <a:r>
-              <a:rPr lang="en-US" dirty="0"/>
-              <a:t>It is a </a:t>
-            </a:r>
-            <a:r>
-              <a:rPr lang="en-US" i="1" dirty="0"/>
-              <a:t>self-closing</a:t>
-            </a:r>
-            <a:r>
-              <a:rPr lang="en-US" dirty="0"/>
-              <a:t> tag</a:t>
-            </a:r>
-          </a:p>
-          <a:p>
-            <a:r>
-              <a:rPr lang="en-US" dirty="0"/>
-              <a:t>It goes within the </a:t>
-            </a:r>
-            <a:r>
-              <a:rPr lang="en-US" sz="3200" dirty="0">
-                <a:solidFill>
-                  <a:schemeClr val="accent1">
-                    <a:lumMod val="50000"/>
-                  </a:schemeClr>
-                </a:solidFill>
-                <a:latin typeface="Consolas" panose="020B0609020204030204" pitchFamily="49" charset="0"/>
-              </a:rPr>
-              <a:t>&lt;head&gt;&lt;/head&gt;</a:t>
-            </a:r>
-            <a:r>
-              <a:rPr lang="en-US" dirty="0"/>
-              <a:t> element</a:t>
-            </a:r>
-          </a:p>
-          <a:p>
-            <a:endParaRPr lang="en-US" dirty="0"/>
-          </a:p>
-          <a:p>
-            <a:r>
-              <a:rPr lang="en-US" dirty="0"/>
-              <a:t>Important attributes:</a:t>
-            </a:r>
-          </a:p>
-          <a:p>
-            <a:pPr lvl="1"/>
-            <a:r>
-              <a:rPr lang="en-US" u="sng" dirty="0" err="1">
-                <a:solidFill>
-                  <a:schemeClr val="accent1">
-                    <a:lumMod val="50000"/>
-                  </a:schemeClr>
-                </a:solidFill>
-                <a:latin typeface="Consolas" panose="020B0609020204030204" pitchFamily="49" charset="0"/>
-              </a:rPr>
-              <a:t>href</a:t>
-            </a:r>
-            <a:r>
-              <a:rPr lang="en-US" dirty="0"/>
-              <a:t>: path to the file (either online or local)</a:t>
-            </a:r>
-          </a:p>
-          <a:p>
-            <a:pPr lvl="1"/>
-            <a:r>
-              <a:rPr lang="en-US" u="sng" dirty="0" err="1">
-                <a:solidFill>
-                  <a:schemeClr val="accent1">
-                    <a:lumMod val="50000"/>
-                  </a:schemeClr>
-                </a:solidFill>
-                <a:latin typeface="Consolas" panose="020B0609020204030204" pitchFamily="49" charset="0"/>
-              </a:rPr>
-              <a:t>rel</a:t>
-            </a:r>
-            <a:r>
-              <a:rPr lang="en-US" dirty="0"/>
-              <a:t>: determines the relationship type (e.g., “</a:t>
-            </a:r>
-            <a:r>
-              <a:rPr lang="en-US" dirty="0">
-                <a:solidFill>
-                  <a:schemeClr val="accent1">
-                    <a:lumMod val="50000"/>
-                  </a:schemeClr>
-                </a:solidFill>
-              </a:rPr>
-              <a:t>stylesheet</a:t>
-            </a:r>
-            <a:r>
-              <a:rPr lang="en-US" dirty="0"/>
-              <a:t>”)</a:t>
-            </a:r>
-          </a:p>
-          <a:p>
-            <a:pPr lvl="1"/>
-            <a:r>
-              <a:rPr lang="en-US" u="sng" dirty="0">
-                <a:solidFill>
-                  <a:schemeClr val="accent1">
-                    <a:lumMod val="50000"/>
-                  </a:schemeClr>
-                </a:solidFill>
-                <a:latin typeface="Consolas" panose="020B0609020204030204" pitchFamily="49" charset="0"/>
-              </a:rPr>
-              <a:t>type</a:t>
-            </a:r>
-            <a:r>
-              <a:rPr lang="en-US" dirty="0"/>
-              <a:t>: specifies the content type of the file (e.g., “</a:t>
-            </a:r>
-            <a:r>
-              <a:rPr lang="en-US" dirty="0">
-                <a:solidFill>
-                  <a:schemeClr val="accent1">
-                    <a:lumMod val="50000"/>
-                  </a:schemeClr>
-                </a:solidFill>
-              </a:rPr>
-              <a:t>text/</a:t>
-            </a:r>
-            <a:r>
-              <a:rPr lang="en-US" dirty="0" err="1">
-                <a:solidFill>
-                  <a:schemeClr val="accent1">
-                    <a:lumMod val="50000"/>
-                  </a:schemeClr>
-                </a:solidFill>
-              </a:rPr>
-              <a:t>css</a:t>
-            </a:r>
-            <a:r>
-              <a:rPr lang="en-US" dirty="0"/>
-              <a:t>”)</a:t>
-            </a:r>
-          </a:p>
-        </p:txBody>
-      </p:sp>
-      <p:pic>
-        <p:nvPicPr>
-          <p:cNvPr id="2050" name="Picture 2" descr="Image result for link"/>
-          <p:cNvPicPr>
-            <a:picLocks noChangeAspect="1" noChangeArrowheads="1"/>
-          </p:cNvPicPr>
-          <p:nvPr/>
-        </p:nvPicPr>
-        <p:blipFill>
-          <a:blip r:embed="rId3">
-            <a:extLst>
-              <a:ext uri="{28A0092B-C50C-407E-A947-70E740481C1C}">
-                <a14:useLocalDpi xmlns:a14="http://schemas.microsoft.com/office/drawing/2010/main" val="0"/>
-              </a:ext>
-            </a:extLst>
-          </a:blip>
-          <a:srcRect/>
-          <a:stretch>
-            <a:fillRect/>
-          </a:stretch>
-        </p:blipFill>
-        <p:spPr bwMode="auto">
-          <a:xfrm>
-            <a:off x="8603416" y="1828800"/>
-            <a:ext cx="3207584" cy="3200400"/>
-          </a:xfrm>
-          <a:prstGeom prst="rect">
-            <a:avLst/>
-          </a:prstGeom>
-          <a:noFill/>
-          <a:extLst>
-            <a:ext uri="{909E8E84-426E-40DD-AFC4-6F175D3DCCD1}">
-              <a14:hiddenFill xmlns:a14="http://schemas.microsoft.com/office/drawing/2010/main">
-                <a:solidFill>
-                  <a:srgbClr val="FFFFFF"/>
-                </a:solidFill>
-              </a14:hiddenFill>
-            </a:ext>
-          </a:extLst>
-        </p:spPr>
-      </p:pic>
-    </p:spTree>
-    <p:extLst>
-      <p:ext uri="{BB962C8B-B14F-4D97-AF65-F5344CB8AC3E}">
-        <p14:creationId xmlns:p14="http://schemas.microsoft.com/office/powerpoint/2010/main" val="2192436492"/>
       </p:ext>
     </p:extLst>
   </p:cSld>
@@ -41060,7 +41484,55 @@
                                           </p:stCondLst>
                                         </p:cTn>
                                         <p:tgtEl>
-                                          <p:spTgt spid="3">
+                                          <p:spTgt spid="6">
+                                            <p:bg/>
+                                          </p:spTgt>
+                                        </p:tgtEl>
+                                        <p:attrNameLst>
+                                          <p:attrName>style.visibility</p:attrName>
+                                        </p:attrNameLst>
+                                      </p:cBhvr>
+                                      <p:to>
+                                        <p:strVal val="visible"/>
+                                      </p:to>
+                                    </p:set>
+                                    <p:animEffect transition="in" filter="fade">
+                                      <p:cBhvr>
+                                        <p:cTn id="7" dur="500"/>
+                                        <p:tgtEl>
+                                          <p:spTgt spid="6">
+                                            <p:bg/>
+                                          </p:spTgt>
+                                        </p:tgtEl>
+                                      </p:cBhvr>
+                                    </p:animEffect>
+                                  </p:childTnLst>
+                                </p:cTn>
+                              </p:par>
+                            </p:childTnLst>
+                          </p:cTn>
+                        </p:par>
+                        <p:par>
+                          <p:cTn id="8" fill="hold">
+                            <p:stCondLst>
+                              <p:cond delay="500"/>
+                            </p:stCondLst>
+                            <p:childTnLst>
+                              <p:par>
+                                <p:cTn id="9" presetID="10" presetClass="entr" presetSubtype="0" fill="hold" grpId="0" nodeType="afterEffect">
+                                  <p:stCondLst>
+                                    <p:cond delay="0"/>
+                                  </p:stCondLst>
+                                  <p:childTnLst>
+                                    <p:set>
+                                      <p:cBhvr>
+                                        <p:cTn id="10" dur="1" fill="hold">
+                                          <p:stCondLst>
+                                            <p:cond delay="0"/>
+                                          </p:stCondLst>
+                                        </p:cTn>
+                                        <p:tgtEl>
+                                          <p:spTgt spid="6">
                                             <p:txEl>
                                               <p:pRg st="0" end="0"/>
                                             </p:txEl>
@@ -41076,9 +41548,346 @@
                                     </p:set>
                                     <p:animEffect transition="in" filter="fade">
                                       <p:cBhvr>
-                                        <p:cTn id="7" dur="500"/>
+                                        <p:cTn id="11" dur="500"/>
                                         <p:tgtEl>
-                                          <p:spTgt spid="3">
+                                          <p:spTgt spid="6">
+                                            <p:txEl>
+                                              <p:pRg st="0" end="0"/>
+                                            </p:txEl>
+                                          </p:spTgt>
+                                        </p:tgtEl>
+                                      </p:cBhvr>
+                                    </p:animEffect>
+                                  </p:childTnLst>
+                                </p:cTn>
+                              </p:par>
+                              <p:par>
+                                <p:cTn id="12" presetID="10" presetClass="entr" presetSubtype="0" fill="hold" grpId="0" nodeType="withEffect">
+                                  <p:stCondLst>
+                                    <p:cond delay="0"/>
+                                  </p:stCondLst>
+                                  <p:childTnLst>
+                                    <p:set>
+                                      <p:cBhvr>
+                                        <p:cTn id="13" dur="1" fill="hold">
+                                          <p:stCondLst>
+                                            <p:cond delay="0"/>
+                                          </p:stCondLst>
+                                        </p:cTn>
+                                        <p:tgtEl>
+                                          <p:spTgt spid="6">
+                                            <p:txEl>
+                                              <p:pRg st="9" end="9"/>
+                                            </p:txEl>
+                                          </p:spTgt>
+                                        </p:tgtEl>
+                                        <p:attrNameLst>
+                                          <p:attrName>style.visibility</p:attrName>
+                                        </p:attrNameLst>
+                                      </p:cBhvr>
+                                      <p:to>
+                                        <p:strVal val="visible"/>
+                                      </p:to>
+                                    </p:set>
+                                    <p:animEffect transition="in" filter="fade">
+                                      <p:cBhvr>
+                                        <p:cTn id="14" dur="500"/>
+                                        <p:tgtEl>
+                                          <p:spTgt spid="6">
+                                            <p:txEl>
+                                              <p:pRg st="9" end="9"/>
+                                            </p:txEl>
+                                          </p:spTgt>
+                                        </p:tgtEl>
+                                      </p:cBhvr>
+                                    </p:animEffect>
+                                  </p:childTnLst>
+                                </p:cTn>
+                              </p:par>
+                            </p:childTnLst>
+                          </p:cTn>
+                        </p:par>
+                        <p:par>
+                          <p:cTn id="15" fill="hold">
+                            <p:stCondLst>
+                              <p:cond delay="1000"/>
+                            </p:stCondLst>
+                            <p:childTnLst>
+                              <p:par>
+                                <p:cTn id="16" presetID="10" presetClass="entr" presetSubtype="0" fill="hold" grpId="0" nodeType="afterEffect">
+                                  <p:stCondLst>
+                                    <p:cond delay="0"/>
+                                  </p:stCondLst>
+                                  <p:childTnLst>
+                                    <p:set>
+                                      <p:cBhvr>
+                                        <p:cTn id="17" dur="1" fill="hold">
+                                          <p:stCondLst>
+                                            <p:cond delay="0"/>
+                                          </p:stCondLst>
+                                        </p:cTn>
+                                        <p:tgtEl>
+                                          <p:spTgt spid="6">
+                                            <p:txEl>
+                                              <p:pRg st="6" end="6"/>
+                                            </p:txEl>
+                                          </p:spTgt>
+                                        </p:tgtEl>
+                                        <p:attrNameLst>
+                                          <p:attrName>style.visibility</p:attrName>
+                                        </p:attrNameLst>
+                                      </p:cBhvr>
+                                      <p:to>
+                                        <p:strVal val="visible"/>
+                                      </p:to>
+                                    </p:set>
+                                    <p:animEffect transition="in" filter="fade">
+                                      <p:cBhvr>
+                                        <p:cTn id="18" dur="500"/>
+                                        <p:tgtEl>
+                                          <p:spTgt spid="6">
+                                            <p:txEl>
+                                              <p:pRg st="6" end="6"/>
+                                            </p:txEl>
+                                          </p:spTgt>
+                                        </p:tgtEl>
+                                      </p:cBhvr>
+                                    </p:animEffect>
+                                  </p:childTnLst>
+                                </p:cTn>
+                              </p:par>
+                              <p:par>
+                                <p:cTn id="19" presetID="10" presetClass="entr" presetSubtype="0" fill="hold" grpId="0" nodeType="withEffect">
+                                  <p:stCondLst>
+                                    <p:cond delay="0"/>
+                                  </p:stCondLst>
+                                  <p:childTnLst>
+                                    <p:set>
+                                      <p:cBhvr>
+                                        <p:cTn id="20" dur="1" fill="hold">
+                                          <p:stCondLst>
+                                            <p:cond delay="0"/>
+                                          </p:stCondLst>
+                                        </p:cTn>
+                                        <p:tgtEl>
+                                          <p:spTgt spid="6">
+                                            <p:txEl>
+                                              <p:pRg st="8" end="8"/>
+                                            </p:txEl>
+                                          </p:spTgt>
+                                        </p:tgtEl>
+                                        <p:attrNameLst>
+                                          <p:attrName>style.visibility</p:attrName>
+                                        </p:attrNameLst>
+                                      </p:cBhvr>
+                                      <p:to>
+                                        <p:strVal val="visible"/>
+                                      </p:to>
+                                    </p:set>
+                                    <p:animEffect transition="in" filter="fade">
+                                      <p:cBhvr>
+                                        <p:cTn id="21" dur="500"/>
+                                        <p:tgtEl>
+                                          <p:spTgt spid="6">
+                                            <p:txEl>
+                                              <p:pRg st="8" end="8"/>
+                                            </p:txEl>
+                                          </p:spTgt>
+                                        </p:tgtEl>
+                                      </p:cBhvr>
+                                    </p:animEffect>
+                                  </p:childTnLst>
+                                </p:cTn>
+                              </p:par>
+                            </p:childTnLst>
+                          </p:cTn>
+                        </p:par>
+                        <p:par>
+                          <p:cTn id="22" fill="hold">
+                            <p:stCondLst>
+                              <p:cond delay="1500"/>
+                            </p:stCondLst>
+                            <p:childTnLst>
+                              <p:par>
+                                <p:cTn id="23" presetID="10" presetClass="entr" presetSubtype="0" fill="hold" grpId="0" nodeType="afterEffect">
+                                  <p:stCondLst>
+                                    <p:cond delay="0"/>
+                                  </p:stCondLst>
+                                  <p:childTnLst>
+                                    <p:set>
+                                      <p:cBhvr>
+                                        <p:cTn id="24" dur="1" fill="hold">
+                                          <p:stCondLst>
+                                            <p:cond delay="0"/>
+                                          </p:stCondLst>
+                                        </p:cTn>
+                                        <p:tgtEl>
+                                          <p:spTgt spid="6">
+                                            <p:txEl>
+                                              <p:pRg st="7" end="7"/>
+                                            </p:txEl>
+                                          </p:spTgt>
+                                        </p:tgtEl>
+                                        <p:attrNameLst>
+                                          <p:attrName>style.visibility</p:attrName>
+                                        </p:attrNameLst>
+                                      </p:cBhvr>
+                                      <p:to>
+                                        <p:strVal val="visible"/>
+                                      </p:to>
+                                    </p:set>
+                                    <p:animEffect transition="in" filter="fade">
+                                      <p:cBhvr>
+                                        <p:cTn id="25" dur="500"/>
+                                        <p:tgtEl>
+                                          <p:spTgt spid="6">
+                                            <p:txEl>
+                                              <p:pRg st="7" end="7"/>
+                                            </p:txEl>
+                                          </p:spTgt>
+                                        </p:tgtEl>
+                                      </p:cBhvr>
+                                    </p:animEffect>
+                                  </p:childTnLst>
+                                </p:cTn>
+                              </p:par>
+                            </p:childTnLst>
+                          </p:cTn>
+                        </p:par>
+                      </p:childTnLst>
+                    </p:cTn>
+                  </p:par>
+                  <p:par>
+                    <p:cTn id="26" fill="hold">
+                      <p:stCondLst>
+                        <p:cond delay="indefinite"/>
+                      </p:stCondLst>
+                      <p:childTnLst>
+                        <p:par>
+                          <p:cTn id="27" fill="hold">
+                            <p:stCondLst>
+                              <p:cond delay="0"/>
+                            </p:stCondLst>
+                            <p:childTnLst>
+                              <p:par>
+                                <p:cTn id="28" presetID="10" presetClass="entr" presetSubtype="0" fill="hold" grpId="0" nodeType="clickEffect">
+                                  <p:stCondLst>
+                                    <p:cond delay="0"/>
+                                  </p:stCondLst>
+                                  <p:childTnLst>
+                                    <p:set>
+                                      <p:cBhvr>
+                                        <p:cTn id="29" dur="1" fill="hold">
+                                          <p:stCondLst>
+                                            <p:cond delay="0"/>
+                                          </p:stCondLst>
+                                        </p:cTn>
+                                        <p:tgtEl>
+                                          <p:spTgt spid="6">
+                                            <p:txEl>
+                                              <p:pRg st="1" end="1"/>
+                                            </p:txEl>
+                                          </p:spTgt>
+                                        </p:tgtEl>
+                                        <p:attrNameLst>
+                                          <p:attrName>style.visibility</p:attrName>
+                                        </p:attrNameLst>
+                                      </p:cBhvr>
+                                      <p:to>
+                                        <p:strVal val="visible"/>
+                                      </p:to>
+                                    </p:set>
+                                    <p:animEffect transition="in" filter="fade">
+                                      <p:cBhvr>
+                                        <p:cTn id="30" dur="500"/>
+                                        <p:tgtEl>
+                                          <p:spTgt spid="6">
+                                            <p:txEl>
+                                              <p:pRg st="1" end="1"/>
+                                            </p:txEl>
+                                          </p:spTgt>
+                                        </p:tgtEl>
+                                      </p:cBhvr>
+                                    </p:animEffect>
+                                  </p:childTnLst>
+                                </p:cTn>
+                              </p:par>
+                              <p:par>
+                                <p:cTn id="31" presetID="10" presetClass="entr" presetSubtype="0" fill="hold" grpId="0" nodeType="withEffect">
+                                  <p:stCondLst>
+                                    <p:cond delay="0"/>
+                                  </p:stCondLst>
+                                  <p:childTnLst>
+                                    <p:set>
+                                      <p:cBhvr>
+                                        <p:cTn id="32" dur="1" fill="hold">
+                                          <p:stCondLst>
+                                            <p:cond delay="0"/>
+                                          </p:stCondLst>
+                                        </p:cTn>
+                                        <p:tgtEl>
+                                          <p:spTgt spid="6">
+                                            <p:txEl>
+                                              <p:pRg st="5" end="5"/>
+                                            </p:txEl>
+                                          </p:spTgt>
+                                        </p:tgtEl>
+                                        <p:attrNameLst>
+                                          <p:attrName>style.visibility</p:attrName>
+                                        </p:attrNameLst>
+                                      </p:cBhvr>
+                                      <p:to>
+                                        <p:strVal val="visible"/>
+                                      </p:to>
+                                    </p:set>
+                                    <p:animEffect transition="in" filter="fade">
+                                      <p:cBhvr>
+                                        <p:cTn id="33" dur="500"/>
+                                        <p:tgtEl>
+                                          <p:spTgt spid="6">
+                                            <p:txEl>
+                                              <p:pRg st="5" end="5"/>
+                                            </p:txEl>
+                                          </p:spTgt>
+                                        </p:tgtEl>
+                                      </p:cBhvr>
+                                    </p:animEffect>
+                                  </p:childTnLst>
+                                </p:cTn>
+                              </p:par>
+                              <p:par>
+                                <p:cTn id="34" presetID="10" presetClass="entr" presetSubtype="0" fill="hold" grpId="0" nodeType="withEffect">
+                                  <p:stCondLst>
+                                    <p:cond delay="0"/>
+                                  </p:stCondLst>
+                                  <p:childTnLst>
+                                    <p:set>
+                                      <p:cBhvr>
+                                        <p:cTn id="35" dur="1" fill="hold">
+                                          <p:stCondLst>
+                                            <p:cond delay="0"/>
+                                          </p:stCondLst>
+                                        </p:cTn>
+                                        <p:tgtEl>
+                                          <p:spTgt spid="5">
+                                            <p:txEl>
+                                              <p:pRg st="0" end="0"/>
+                                            </p:txEl>
+                                          </p:spTgt>
+                                        </p:tgtEl>
+                                        <p:attrNameLst>
+                                          <p:attrName>style.visibility</p:attrName>
+                                        </p:attrNameLst>
+                                      </p:cBhvr>
+                                      <p:to>
+                                        <p:strVal val="visible"/>
+                                      </p:to>
+                                    </p:set>
+                                    <p:animEffect transition="in" filter="fade">
+                                      <p:cBhvr>
+                                        <p:cTn id="36" dur="500"/>
+                                        <p:tgtEl>
+                                          <p:spTgt spid="5">
                                             <p:txEl>
                                               <p:pRg st="0" end="0"/>
                                             </p:txEl>
@@ -41096,32 +41905,118 @@
                     </p:cTn>
                   </p:par>
                   <p:par>
-                    <p:cTn id="8" fill="hold">
+                    <p:cTn id="37" fill="hold">
                       <p:stCondLst>
                         <p:cond delay="indefinite"/>
                       </p:stCondLst>
                       <p:childTnLst>
                         <p:par>
-                          <p:cTn id="9" fill="hold">
+                          <p:cTn id="38" fill="hold">
                             <p:stCondLst>
                               <p:cond delay="0"/>
                             </p:stCondLst>
                             <p:childTnLst>
                               <p:par>
-                                <p:cTn id="10" presetID="10" presetClass="entr" presetSubtype="0" fill="hold" grpId="0" nodeType="clickEffect">
+                                <p:cTn id="39" presetID="10" presetClass="entr" presetSubtype="0" fill="hold" grpId="0" nodeType="clickEffect">
                                   <p:stCondLst>
                                     <p:cond delay="0"/>
                                   </p:stCondLst>
                                   <p:childTnLst>
                                     <p:set>
                                       <p:cBhvr>
-                                        <p:cTn id="11" dur="1" fill="hold">
+                                        <p:cTn id="40" dur="1" fill="hold">
                                           <p:stCondLst>
                                             <p:cond delay="0"/>
                                           </p:stCondLst>
                                         </p:cTn>
                                         <p:tgtEl>
-                                          <p:spTgt spid="3">
+                                          <p:spTgt spid="6">
+                                            <p:txEl>
+                                              <p:pRg st="2" end="2"/>
+                                            </p:txEl>
+                                          </p:spTgt>
+                                        </p:tgtEl>
+                                        <p:attrNameLst>
+                                          <p:attrName>style.visibility</p:attrName>
+                                        </p:attrNameLst>
+                                      </p:cBhvr>
+                                      <p:to>
+                                        <p:strVal val="visible"/>
+                                      </p:to>
+                                    </p:set>
+                                    <p:animEffect transition="in" filter="fade">
+                                      <p:cBhvr>
+                                        <p:cTn id="41" dur="500"/>
+                                        <p:tgtEl>
+                                          <p:spTgt spid="6">
+                                            <p:txEl>
+                                              <p:pRg st="2" end="2"/>
+                                            </p:txEl>
+                                          </p:spTgt>
+                                        </p:tgtEl>
+                                      </p:cBhvr>
+                                    </p:animEffect>
+                                  </p:childTnLst>
+                                </p:cTn>
+                              </p:par>
+                              <p:par>
+                                <p:cTn id="42" presetID="10" presetClass="entr" presetSubtype="0" fill="hold" grpId="0" nodeType="withEffect">
+                                  <p:stCondLst>
+                                    <p:cond delay="0"/>
+                                  </p:stCondLst>
+                                  <p:childTnLst>
+                                    <p:set>
+                                      <p:cBhvr>
+                                        <p:cTn id="43" dur="1" fill="hold">
+                                          <p:stCondLst>
+                                            <p:cond delay="0"/>
+                                          </p:stCondLst>
+                                        </p:cTn>
+                                        <p:tgtEl>
+                                          <p:spTgt spid="6">
+                                            <p:txEl>
+                                              <p:pRg st="4" end="4"/>
+                                            </p:txEl>
+                                          </p:spTgt>
+                                        </p:tgtEl>
+                                        <p:attrNameLst>
+                                          <p:attrName>style.visibility</p:attrName>
+                                        </p:attrNameLst>
+                                      </p:cBhvr>
+                                      <p:to>
+                                        <p:strVal val="visible"/>
+                                      </p:to>
+                                    </p:set>
+                                    <p:animEffect transition="in" filter="fade">
+                                      <p:cBhvr>
+                                        <p:cTn id="44" dur="500"/>
+                                        <p:tgtEl>
+                                          <p:spTgt spid="6">
+                                            <p:txEl>
+                                              <p:pRg st="4" end="4"/>
+                                            </p:txEl>
+                                          </p:spTgt>
+                                        </p:tgtEl>
+                                      </p:cBhvr>
+                                    </p:animEffect>
+                                  </p:childTnLst>
+                                </p:cTn>
+                              </p:par>
+                              <p:par>
+                                <p:cTn id="45" presetID="10" presetClass="entr" presetSubtype="0" fill="hold" grpId="0" nodeType="withEffect">
+                                  <p:stCondLst>
+                                    <p:cond delay="0"/>
+                                  </p:stCondLst>
+                                  <p:childTnLst>
+                                    <p:set>
+                                      <p:cBhvr>
+                                        <p:cTn id="46" dur="1" fill="hold">
+                                          <p:stCondLst>
+                                            <p:cond delay="0"/>
+                                          </p:stCondLst>
+                                        </p:cTn>
+                                        <p:tgtEl>
+                                          <p:spTgt spid="5">
                                             <p:txEl>
                                               <p:pRg st="1" end="1"/>
                                             </p:txEl>
@@ -41137,9 +42032,9 @@
                                     </p:set>
                                     <p:animEffect transition="in" filter="fade">
                                       <p:cBhvr>
-                                        <p:cTn id="12" dur="500"/>
+                                        <p:cTn id="47" dur="500"/>
                                         <p:tgtEl>
-                                          <p:spTgt spid="3">
+                                          <p:spTgt spid="5">
                                             <p:txEl>
                                               <p:pRg st="1" end="1"/>
                                             </p:txEl>
@@ -41157,93 +42052,32 @@
                     </p:cTn>
                   </p:par>
                   <p:par>
-                    <p:cTn id="13" fill="hold">
+                    <p:cTn id="48" fill="hold">
                       <p:stCondLst>
                         <p:cond delay="indefinite"/>
                       </p:stCondLst>
                       <p:childTnLst>
                         <p:par>
-                          <p:cTn id="14" fill="hold">
+                          <p:cTn id="49" fill="hold">
                             <p:stCondLst>
                               <p:cond delay="0"/>
                             </p:stCondLst>
                             <p:childTnLst>
                               <p:par>
-                                <p:cTn id="15" presetID="10" presetClass="entr" presetSubtype="0" fill="hold" grpId="0" nodeType="clickEffect">
+                                <p:cTn id="50" presetID="10" presetClass="entr" presetSubtype="0" fill="hold" grpId="0" nodeType="clickEffect">
                                   <p:stCondLst>
                                     <p:cond delay="0"/>
                                   </p:stCondLst>
                                   <p:childTnLst>
                                     <p:set>
                                       <p:cBhvr>
-                                        <p:cTn id="16" dur="1" fill="hold">
+                                        <p:cTn id="51" dur="1" fill="hold">
                                           <p:stCondLst>
                                             <p:cond delay="0"/>
                                           </p:stCondLst>
                                         </p:cTn>
                                         <p:tgtEl>
-                                          <p:spTgt spid="3">
-                                            <p:txEl>
-                                              <p:pRg st="2" end="2"/>
-                                            </p:txEl>
-                                          </p:spTgt>
-                                        </p:tgtEl>
-                                        <p:attrNameLst>
-                                          <p:attrName>style.visibility</p:attrName>
-                                        </p:attrNameLst>
-                                      </p:cBhvr>
-                                      <p:to>
-                                        <p:strVal val="visible"/>
-                                      </p:to>
-                                    </p:set>
-                                    <p:animEffect transition="in" filter="fade">
-                                      <p:cBhvr>
-                                        <p:cTn id="17" dur="500"/>
-                                        <p:tgtEl>
-                                          <p:spTgt spid="3">
-                                            <p:txEl>
-                                              <p:pRg st="2" end="2"/>
-                                            </p:txEl>
-                                          </p:spTgt>
-                                        </p:tgtEl>
-                                      </p:cBhvr>
-                                    </p:animEffect>
-                                  </p:childTnLst>
-                                </p:cTn>
-                              </p:par>
-                            </p:childTnLst>
-                          </p:cTn>
-                        </p:par>
-                      </p:childTnLst>
-                    </p:cTn>
-                  </p:par>
-                  <p:par>
-                    <p:cTn id="18" fill="hold">
-                      <p:stCondLst>
-                        <p:cond delay="indefinite"/>
-                      </p:stCondLst>
-                      <p:childTnLst>
-                        <p:par>
-                          <p:cTn id="19" fill="hold">
-                            <p:stCondLst>
-                              <p:cond delay="0"/>
-                            </p:stCondLst>
-                            <p:childTnLst>
-                              <p:par>
-                                <p:cTn id="20" presetID="10" presetClass="entr" presetSubtype="0" fill="hold" grpId="0" nodeType="clickEffect">
-                                  <p:stCondLst>
-                                    <p:cond delay="0"/>
-                                  </p:stCondLst>
-                                  <p:childTnLst>
-                                    <p:set>
-                                      <p:cBhvr>
-                                        <p:cTn id="21" dur="1" fill="hold">
-                                          <p:stCondLst>
-                                            <p:cond delay="0"/>
-                                          </p:stCondLst>
-                                        </p:cTn>
-                                        <p:tgtEl>
-                                          <p:spTgt spid="3">
+                                          <p:spTgt spid="6">
                                             <p:txEl>
                                               <p:pRg st="3" end="3"/>
                                             </p:txEl>
@@ -41259,255 +42093,11 @@
                                     </p:set>
                                     <p:animEffect transition="in" filter="fade">
                                       <p:cBhvr>
-                                        <p:cTn id="22" dur="500"/>
+                                        <p:cTn id="52" dur="500"/>
                                         <p:tgtEl>
-                                          <p:spTgt spid="3">
+                                          <p:spTgt spid="6">
                                             <p:txEl>
                                               <p:pRg st="3" end="3"/>
-                                            </p:txEl>
-                                          </p:spTgt>
-                                        </p:tgtEl>
-                                      </p:cBhvr>
-                                    </p:animEffect>
-                                  </p:childTnLst>
-                                </p:cTn>
-                              </p:par>
-                            </p:childTnLst>
-                          </p:cTn>
-                        </p:par>
-                      </p:childTnLst>
-                    </p:cTn>
-                  </p:par>
-                  <p:par>
-                    <p:cTn id="23" fill="hold">
-                      <p:stCondLst>
-                        <p:cond delay="indefinite"/>
-                      </p:stCondLst>
-                      <p:childTnLst>
-                        <p:par>
-                          <p:cTn id="24" fill="hold">
-                            <p:stCondLst>
-                              <p:cond delay="0"/>
-                            </p:stCondLst>
-                            <p:childTnLst>
-                              <p:par>
-                                <p:cTn id="25" presetID="10" presetClass="entr" presetSubtype="0" fill="hold" grpId="0" nodeType="clickEffect">
-                                  <p:stCondLst>
-                                    <p:cond delay="0"/>
-                                  </p:stCondLst>
-                                  <p:childTnLst>
-                                    <p:set>
-                                      <p:cBhvr>
-                                        <p:cTn id="26" dur="1" fill="hold">
-                                          <p:stCondLst>
-                                            <p:cond delay="0"/>
-                                          </p:stCondLst>
-                                        </p:cTn>
-                                        <p:tgtEl>
-                                          <p:spTgt spid="3">
-                                            <p:txEl>
-                                              <p:pRg st="5" end="5"/>
-                                            </p:txEl>
-                                          </p:spTgt>
-                                        </p:tgtEl>
-                                        <p:attrNameLst>
-                                          <p:attrName>style.visibility</p:attrName>
-                                        </p:attrNameLst>
-                                      </p:cBhvr>
-                                      <p:to>
-                                        <p:strVal val="visible"/>
-                                      </p:to>
-                                    </p:set>
-                                    <p:animEffect transition="in" filter="fade">
-                                      <p:cBhvr>
-                                        <p:cTn id="27" dur="500"/>
-                                        <p:tgtEl>
-                                          <p:spTgt spid="3">
-                                            <p:txEl>
-                                              <p:pRg st="5" end="5"/>
-                                            </p:txEl>
-                                          </p:spTgt>
-                                        </p:tgtEl>
-                                      </p:cBhvr>
-                                    </p:animEffect>
-                                  </p:childTnLst>
-                                </p:cTn>
-                              </p:par>
-                            </p:childTnLst>
-                          </p:cTn>
-                        </p:par>
-                      </p:childTnLst>
-                    </p:cTn>
-                  </p:par>
-                  <p:par>
-                    <p:cTn id="28" fill="hold">
-                      <p:stCondLst>
-                        <p:cond delay="indefinite"/>
-                      </p:stCondLst>
-                      <p:childTnLst>
-                        <p:par>
-                          <p:cTn id="29" fill="hold">
-                            <p:stCondLst>
-                              <p:cond delay="0"/>
-                            </p:stCondLst>
-                            <p:childTnLst>
-                              <p:par>
-                                <p:cTn id="30" presetID="10" presetClass="entr" presetSubtype="0" fill="hold" grpId="0" nodeType="clickEffect">
-                                  <p:stCondLst>
-                                    <p:cond delay="0"/>
-                                  </p:stCondLst>
-                                  <p:childTnLst>
-                                    <p:set>
-                                      <p:cBhvr>
-                                        <p:cTn id="31" dur="1" fill="hold">
-                                          <p:stCondLst>
-                                            <p:cond delay="0"/>
-                                          </p:stCondLst>
-                                        </p:cTn>
-                                        <p:tgtEl>
-                                          <p:spTgt spid="3">
-                                            <p:txEl>
-                                              <p:pRg st="6" end="6"/>
-                                            </p:txEl>
-                                          </p:spTgt>
-                                        </p:tgtEl>
-                                        <p:attrNameLst>
-                                          <p:attrName>style.visibility</p:attrName>
-                                        </p:attrNameLst>
-                                      </p:cBhvr>
-                                      <p:to>
-                                        <p:strVal val="visible"/>
-                                      </p:to>
-                                    </p:set>
-                                    <p:animEffect transition="in" filter="fade">
-                                      <p:cBhvr>
-                                        <p:cTn id="32" dur="500"/>
-                                        <p:tgtEl>
-                                          <p:spTgt spid="3">
-                                            <p:txEl>
-                                              <p:pRg st="6" end="6"/>
-                                            </p:txEl>
-                                          </p:spTgt>
-                                        </p:tgtEl>
-                                      </p:cBhvr>
-                                    </p:animEffect>
-                                  </p:childTnLst>
-                                </p:cTn>
-                              </p:par>
-                            </p:childTnLst>
-                          </p:cTn>
-                        </p:par>
-                      </p:childTnLst>
-                    </p:cTn>
-                  </p:par>
-                  <p:par>
-                    <p:cTn id="33" fill="hold">
-                      <p:stCondLst>
-                        <p:cond delay="indefinite"/>
-                      </p:stCondLst>
-                      <p:childTnLst>
-                        <p:par>
-                          <p:cTn id="34" fill="hold">
-                            <p:stCondLst>
-                              <p:cond delay="0"/>
-                            </p:stCondLst>
-                            <p:childTnLst>
-                              <p:par>
-                                <p:cTn id="35" presetID="10" presetClass="entr" presetSubtype="0" fill="hold" grpId="0" nodeType="clickEffect">
-                                  <p:stCondLst>
-                                    <p:cond delay="0"/>
-                                  </p:stCondLst>
-                                  <p:childTnLst>
-                                    <p:set>
-                                      <p:cBhvr>
-                                        <p:cTn id="36" dur="1" fill="hold">
-                                          <p:stCondLst>
-                                            <p:cond delay="0"/>
-                                          </p:stCondLst>
-                                        </p:cTn>
-                                        <p:tgtEl>
-                                          <p:spTgt spid="3">
-                                            <p:txEl>
-                                              <p:pRg st="7" end="7"/>
-                                            </p:txEl>
-                                          </p:spTgt>
-                                        </p:tgtEl>
-                                        <p:attrNameLst>
-                                          <p:attrName>style.visibility</p:attrName>
-                                        </p:attrNameLst>
-                                      </p:cBhvr>
-                                      <p:to>
-                                        <p:strVal val="visible"/>
-                                      </p:to>
-                                    </p:set>
-                                    <p:animEffect transition="in" filter="fade">
-                                      <p:cBhvr>
-                                        <p:cTn id="37" dur="500"/>
-                                        <p:tgtEl>
-                                          <p:spTgt spid="3">
-                                            <p:txEl>
-                                              <p:pRg st="7" end="7"/>
-                                            </p:txEl>
-                                          </p:spTgt>
-                                        </p:tgtEl>
-                                      </p:cBhvr>
-                                    </p:animEffect>
-                                  </p:childTnLst>
-                                </p:cTn>
-                              </p:par>
-                            </p:childTnLst>
-                          </p:cTn>
-                        </p:par>
-                      </p:childTnLst>
-                    </p:cTn>
-                  </p:par>
-                  <p:par>
-                    <p:cTn id="38" fill="hold">
-                      <p:stCondLst>
-                        <p:cond delay="indefinite"/>
-                      </p:stCondLst>
-                      <p:childTnLst>
-                        <p:par>
-                          <p:cTn id="39" fill="hold">
-                            <p:stCondLst>
-                              <p:cond delay="0"/>
-                            </p:stCondLst>
-                            <p:childTnLst>
-                              <p:par>
-                                <p:cTn id="40" presetID="10" presetClass="entr" presetSubtype="0" fill="hold" grpId="0" nodeType="clickEffect">
-                                  <p:stCondLst>
-                                    <p:cond delay="0"/>
-                                  </p:stCondLst>
-                                  <p:childTnLst>
-                                    <p:set>
-                                      <p:cBhvr>
-                                        <p:cTn id="41" dur="1" fill="hold">
-                                          <p:stCondLst>
-                                            <p:cond delay="0"/>
-                                          </p:stCondLst>
-                                        </p:cTn>
-                                        <p:tgtEl>
-                                          <p:spTgt spid="3">
-                                            <p:txEl>
-                                              <p:pRg st="8" end="8"/>
-                                            </p:txEl>
-                                          </p:spTgt>
-                                        </p:tgtEl>
-                                        <p:attrNameLst>
-                                          <p:attrName>style.visibility</p:attrName>
-                                        </p:attrNameLst>
-                                      </p:cBhvr>
-                                      <p:to>
-                                        <p:strVal val="visible"/>
-                                      </p:to>
-                                    </p:set>
-                                    <p:animEffect transition="in" filter="fade">
-                                      <p:cBhvr>
-                                        <p:cTn id="42" dur="500"/>
-                                        <p:tgtEl>
-                                          <p:spTgt spid="3">
-                                            <p:txEl>
-                                              <p:pRg st="8" end="8"/>
                                             </p:txEl>
                                           </p:spTgt>
                                         </p:tgtEl>
@@ -41544,13 +42134,14 @@
       </p:par>
     </p:tnLst>
     <p:bldLst>
-      <p:bldP spid="3" grpId="0" uiExpand="1" build="p"/>
+      <p:bldP spid="6" grpId="0" uiExpand="1" build="p" animBg="1"/>
+      <p:bldP spid="5" grpId="0" uiExpand="1" build="p"/>
     </p:bldLst>
   </p:timing>
 </p:sld>
 </file>
 
-<file path=ppt/slides/slide5.xml><?xml version="1.0" encoding="utf-8"?>
+<file path=ppt/slides/slide4.xml><?xml version="1.0" encoding="utf-8"?>
 <p:sld xmlns:a="http://schemas.openxmlformats.org/drawingml/2006/main" xmlns:r="http://schemas.openxmlformats.org/officeDocument/2006/relationships" xmlns:p="http://schemas.openxmlformats.org/presentationml/2006/main">
   <p:cSld>
     <p:bg>
@@ -41623,7 +42214,7 @@
               <a:rPr lang="en-US" sz="9600" dirty="0">
                 <a:hlinkClick r:id="rId3"/>
               </a:rPr>
-              <a:t>https://replit.com/@HylandOutreach/CssFileExample</a:t>
+              <a:t>https://replit.com/@HylandOutreach/StyleElementExample</a:t>
             </a:r>
             <a:endParaRPr lang="en-US" sz="13800" dirty="0"/>
           </a:p>
@@ -41645,7 +42236,7 @@
 </p:sld>
 </file>
 
-<file path=ppt/slides/slide6.xml><?xml version="1.0" encoding="utf-8"?>
+<file path=ppt/slides/slide5.xml><?xml version="1.0" encoding="utf-8"?>
 <p:sld xmlns:a="http://schemas.openxmlformats.org/drawingml/2006/main" xmlns:r="http://schemas.openxmlformats.org/officeDocument/2006/relationships" xmlns:p="http://schemas.openxmlformats.org/presentationml/2006/main">
   <p:cSld>
     <p:spTree>
@@ -43703,7 +44294,7 @@
 </p:sld>
 </file>
 
-<file path=ppt/slides/slide7.xml><?xml version="1.0" encoding="utf-8"?>
+<file path=ppt/slides/slide6.xml><?xml version="1.0" encoding="utf-8"?>
 <p:sld xmlns:a="http://schemas.openxmlformats.org/drawingml/2006/main" xmlns:r="http://schemas.openxmlformats.org/officeDocument/2006/relationships" xmlns:p="http://schemas.openxmlformats.org/presentationml/2006/main">
   <p:cSld>
     <p:spTree>
@@ -44152,7 +44743,7 @@
 </p:sld>
 </file>
 
-<file path=ppt/slides/slide8.xml><?xml version="1.0" encoding="utf-8"?>
+<file path=ppt/slides/slide7.xml><?xml version="1.0" encoding="utf-8"?>
 <p:sld xmlns:a="http://schemas.openxmlformats.org/drawingml/2006/main" xmlns:r="http://schemas.openxmlformats.org/officeDocument/2006/relationships" xmlns:p="http://schemas.openxmlformats.org/presentationml/2006/main">
   <p:cSld>
     <p:spTree>
@@ -44690,7 +45281,7 @@
 </p:sld>
 </file>
 
-<file path=ppt/slides/slide9.xml><?xml version="1.0" encoding="utf-8"?>
+<file path=ppt/slides/slide8.xml><?xml version="1.0" encoding="utf-8"?>
 <p:sld xmlns:a="http://schemas.openxmlformats.org/drawingml/2006/main" xmlns:r="http://schemas.openxmlformats.org/officeDocument/2006/relationships" xmlns:p="http://schemas.openxmlformats.org/presentationml/2006/main">
   <p:cSld>
     <p:bg>
@@ -44763,7 +45354,7 @@
               <a:rPr lang="en-US" sz="11500" dirty="0">
                 <a:hlinkClick r:id="rId3"/>
               </a:rPr>
-              <a:t>https://replit.com/@HylandOutreach/Ruleset</a:t>
+              <a:t>https://replit.com/@HylandOutreach/Ruleset2</a:t>
             </a:r>
             <a:endParaRPr lang="en-US" sz="11500" dirty="0"/>
           </a:p>
@@ -44773,6 +45364,67 @@
     <p:extLst>
       <p:ext uri="{BB962C8B-B14F-4D97-AF65-F5344CB8AC3E}">
         <p14:creationId xmlns:p14="http://schemas.microsoft.com/office/powerpoint/2010/main" val="396988711"/>
+      </p:ext>
+    </p:extLst>
+  </p:cSld>
+  <p:clrMapOvr>
+    <a:masterClrMapping/>
+  </p:clrMapOvr>
+  <p:transition>
+    <p:fade/>
+  </p:transition>
+</p:sld>
+</file>
+
+<file path=ppt/slides/slide9.xml><?xml version="1.0" encoding="utf-8"?>
+<p:sld xmlns:a="http://schemas.openxmlformats.org/drawingml/2006/main" xmlns:r="http://schemas.openxmlformats.org/officeDocument/2006/relationships" xmlns:p="http://schemas.openxmlformats.org/presentationml/2006/main">
+  <p:cSld>
+    <p:spTree>
+      <p:nvGrpSpPr>
+        <p:cNvPr id="1" name=""/>
+        <p:cNvGrpSpPr/>
+        <p:nvPr/>
+      </p:nvGrpSpPr>
+      <p:grpSpPr>
+        <a:xfrm>
+          <a:off x="0" y="0"/>
+          <a:ext cx="0" cy="0"/>
+          <a:chOff x="0" y="0"/>
+          <a:chExt cx="0" cy="0"/>
+        </a:xfrm>
+      </p:grpSpPr>
+      <p:sp>
+        <p:nvSpPr>
+          <p:cNvPr id="2" name="Text Placeholder 1">
+            <a:extLst>
+              <a:ext uri="{FF2B5EF4-FFF2-40B4-BE49-F238E27FC236}">
+                <a16:creationId xmlns:a16="http://schemas.microsoft.com/office/drawing/2014/main" id="{85615D18-8F75-4B52-89C9-F982DAFE9325}"/>
+              </a:ext>
+            </a:extLst>
+          </p:cNvPr>
+          <p:cNvSpPr>
+            <a:spLocks noGrp="1"/>
+          </p:cNvSpPr>
+          <p:nvPr>
+            <p:ph type="body" sz="quarter" idx="10"/>
+          </p:nvPr>
+        </p:nvSpPr>
+        <p:spPr/>
+        <p:txBody>
+          <a:bodyPr/>
+          <a:lstStyle/>
+          <a:p>
+            <a:r>
+              <a:rPr lang="en-US"/>
+              <a:t>Questions?</a:t>
+            </a:r>
+          </a:p>
+        </p:txBody>
+      </p:sp>
+    </p:spTree>
+    <p:extLst>
+      <p:ext uri="{BB962C8B-B14F-4D97-AF65-F5344CB8AC3E}">
+        <p14:creationId xmlns:p14="http://schemas.microsoft.com/office/powerpoint/2010/main" val="2552111147"/>
       </p:ext>
     </p:extLst>
   </p:cSld>

</xml_diff>

<commit_message>
Update gitbook 2022-10-19 19:32:01
</commit_message>
<xml_diff>
--- a/CssIntro/HelloCss.pptx
+++ b/CssIntro/HelloCss.pptx
@@ -6,19 +6,18 @@
     <p:sldMasterId id="2147483686" r:id="rId2"/>
   </p:sldMasterIdLst>
   <p:notesMasterIdLst>
-    <p:notesMasterId r:id="rId13"/>
+    <p:notesMasterId r:id="rId12"/>
   </p:notesMasterIdLst>
   <p:sldIdLst>
     <p:sldId id="258" r:id="rId3"/>
     <p:sldId id="295" r:id="rId4"/>
     <p:sldId id="306" r:id="rId5"/>
-    <p:sldId id="311" r:id="rId6"/>
-    <p:sldId id="312" r:id="rId7"/>
-    <p:sldId id="310" r:id="rId8"/>
-    <p:sldId id="307" r:id="rId9"/>
-    <p:sldId id="315" r:id="rId10"/>
-    <p:sldId id="314" r:id="rId11"/>
-    <p:sldId id="316" r:id="rId12"/>
+    <p:sldId id="312" r:id="rId6"/>
+    <p:sldId id="310" r:id="rId7"/>
+    <p:sldId id="307" r:id="rId8"/>
+    <p:sldId id="315" r:id="rId9"/>
+    <p:sldId id="314" r:id="rId10"/>
+    <p:sldId id="316" r:id="rId11"/>
   </p:sldIdLst>
   <p:sldSz cx="12192000" cy="6858000"/>
   <p:notesSz cx="6858000" cy="9144000"/>
@@ -136,6 +135,18 @@
 </p:presentation>
 </file>
 
+<file path=ppt/commentAuthors.xml><?xml version="1.0" encoding="utf-8"?>
+<p:cmAuthorLst xmlns:a="http://schemas.openxmlformats.org/drawingml/2006/main" xmlns:r="http://schemas.openxmlformats.org/officeDocument/2006/relationships" xmlns:p="http://schemas.openxmlformats.org/presentationml/2006/main">
+  <p:cmAuthor id="1" name="Joseph Maxwell" initials="JM" lastIdx="1" clrIdx="0">
+    <p:extLst>
+      <p:ext uri="{19B8F6BF-5375-455C-9EA6-DF929625EA0E}">
+        <p15:presenceInfo xmlns:p15="http://schemas.microsoft.com/office/powerpoint/2012/main" userId="S::Joseph.Maxwell@hyland.com::81b9e37d-9426-4999-a489-1cb52182bfd4" providerId="AD"/>
+      </p:ext>
+    </p:extLst>
+  </p:cmAuthor>
+</p:cmAuthorLst>
+</file>
+
 <file path=ppt/notesMasters/notesMaster1.xml><?xml version="1.0" encoding="utf-8"?>
 <p:notesMaster xmlns:a="http://schemas.openxmlformats.org/drawingml/2006/main" xmlns:r="http://schemas.openxmlformats.org/officeDocument/2006/relationships" xmlns:p="http://schemas.openxmlformats.org/presentationml/2006/main">
   <p:cSld>
@@ -218,7 +229,7 @@
           <a:p>
             <a:fld id="{19104133-B5B0-4351-8158-4F0E5EB1E2BF}" type="datetimeFigureOut">
               <a:rPr lang="en-US" smtClean="0"/>
-              <a:t>8/25/2022</a:t>
+              <a:t>10/19/2022</a:t>
             </a:fld>
             <a:endParaRPr lang="en-US"/>
           </a:p>
@@ -640,12 +651,8 @@
           <a:p>
             <a:r>
               <a:rPr lang="en-US" dirty="0"/>
-              <a:t>Explain what CSS files are</a:t>
+              <a:t>Explain what the head and style elements are</a:t>
             </a:r>
-            <a:endParaRPr lang="en-US" baseline="0" dirty="0"/>
-          </a:p>
-          <a:p>
-            <a:endParaRPr lang="en-US" dirty="0"/>
           </a:p>
         </p:txBody>
       </p:sp>
@@ -731,17 +738,12 @@
           <a:p>
             <a:r>
               <a:rPr lang="en-US" dirty="0"/>
-              <a:t>Explain the link tag. Students should not have to worry about this for the most part – the starter code will usually start with a </a:t>
+              <a:t>Show the link tag in action.</a:t>
             </a:r>
             <a:r>
-              <a:rPr lang="en-US" b="1" dirty="0"/>
-              <a:t>link</a:t>
+              <a:rPr lang="en-US" baseline="0" dirty="0"/>
+              <a:t> Make sure to note the filename, attributes, and CSS.</a:t>
             </a:r>
-            <a:r>
-              <a:rPr lang="en-US" b="0" dirty="0"/>
-              <a:t> tag already built in. If not, they can always copy it from somewhere else. It is important for them to be aware of its existence, but they do not need to memorize how it works.</a:t>
-            </a:r>
-            <a:endParaRPr lang="en-US" dirty="0"/>
           </a:p>
         </p:txBody>
       </p:sp>
@@ -771,7 +773,7 @@
     </p:spTree>
     <p:extLst>
       <p:ext uri="{BB962C8B-B14F-4D97-AF65-F5344CB8AC3E}">
-        <p14:creationId xmlns:p14="http://schemas.microsoft.com/office/powerpoint/2010/main" val="2439832816"/>
+        <p14:creationId xmlns:p14="http://schemas.microsoft.com/office/powerpoint/2010/main" val="1081873275"/>
       </p:ext>
     </p:extLst>
   </p:cSld>
@@ -827,12 +829,13 @@
           <a:p>
             <a:r>
               <a:rPr lang="en-US" dirty="0"/>
-              <a:t>Show the link tag in action.</a:t>
+              <a:t>Go</a:t>
             </a:r>
             <a:r>
               <a:rPr lang="en-US" baseline="0" dirty="0"/>
-              <a:t> Make sure to note the filename, attributes, and CSS.</a:t>
+              <a:t> over the vocabulary around different parts of CSS. Make sure to note that each character is very important: every colon, every semi-colon, every curly bracket, dash, etc.</a:t>
             </a:r>
+            <a:endParaRPr lang="en-US" dirty="0"/>
           </a:p>
         </p:txBody>
       </p:sp>
@@ -851,18 +854,78 @@
           <a:bodyPr/>
           <a:lstStyle/>
           <a:p>
+            <a:pPr marL="0" marR="0" lvl="0" indent="0" algn="r" defTabSz="914400" rtl="0" eaLnBrk="1" fontAlgn="auto" latinLnBrk="0" hangingPunct="1">
+              <a:lnSpc>
+                <a:spcPct val="100000"/>
+              </a:lnSpc>
+              <a:spcBef>
+                <a:spcPts val="0"/>
+              </a:spcBef>
+              <a:spcAft>
+                <a:spcPts val="0"/>
+              </a:spcAft>
+              <a:buClrTx/>
+              <a:buSzTx/>
+              <a:buFontTx/>
+              <a:buNone/>
+              <a:tabLst/>
+              <a:defRPr/>
+            </a:pPr>
             <a:fld id="{DEC8F7F9-57EC-49CF-9FCD-2B781E4B449F}" type="slidenum">
-              <a:rPr lang="en-US" smtClean="0"/>
+              <a:rPr kumimoji="0" lang="en-US" sz="1200" b="0" i="0" u="none" strike="noStrike" kern="1200" cap="none" spc="0" normalizeH="0" baseline="0" noProof="0" smtClean="0">
+                <a:ln>
+                  <a:noFill/>
+                </a:ln>
+                <a:solidFill>
+                  <a:prstClr val="black"/>
+                </a:solidFill>
+                <a:effectLst/>
+                <a:uLnTx/>
+                <a:uFillTx/>
+                <a:latin typeface="Calibri" panose="020F0502020204030204"/>
+                <a:ea typeface="+mn-ea"/>
+                <a:cs typeface="+mn-cs"/>
+              </a:rPr>
+              <a:pPr marL="0" marR="0" lvl="0" indent="0" algn="r" defTabSz="914400" rtl="0" eaLnBrk="1" fontAlgn="auto" latinLnBrk="0" hangingPunct="1">
+                <a:lnSpc>
+                  <a:spcPct val="100000"/>
+                </a:lnSpc>
+                <a:spcBef>
+                  <a:spcPts val="0"/>
+                </a:spcBef>
+                <a:spcAft>
+                  <a:spcPts val="0"/>
+                </a:spcAft>
+                <a:buClrTx/>
+                <a:buSzTx/>
+                <a:buFontTx/>
+                <a:buNone/>
+                <a:tabLst/>
+                <a:defRPr/>
+              </a:pPr>
               <a:t>5</a:t>
             </a:fld>
-            <a:endParaRPr lang="en-US"/>
+            <a:endParaRPr kumimoji="0" lang="en-US" sz="1200" b="0" i="0" u="none" strike="noStrike" kern="1200" cap="none" spc="0" normalizeH="0" baseline="0" noProof="0">
+              <a:ln>
+                <a:noFill/>
+              </a:ln>
+              <a:solidFill>
+                <a:prstClr val="black"/>
+              </a:solidFill>
+              <a:effectLst/>
+              <a:uLnTx/>
+              <a:uFillTx/>
+              <a:latin typeface="Calibri" panose="020F0502020204030204"/>
+              <a:ea typeface="+mn-ea"/>
+              <a:cs typeface="+mn-cs"/>
+            </a:endParaRPr>
           </a:p>
         </p:txBody>
       </p:sp>
     </p:spTree>
     <p:extLst>
       <p:ext uri="{BB962C8B-B14F-4D97-AF65-F5344CB8AC3E}">
-        <p14:creationId xmlns:p14="http://schemas.microsoft.com/office/powerpoint/2010/main" val="1081873275"/>
+        <p14:creationId xmlns:p14="http://schemas.microsoft.com/office/powerpoint/2010/main" val="2440334685"/>
       </p:ext>
     </p:extLst>
   </p:cSld>
@@ -918,11 +981,11 @@
           <a:p>
             <a:r>
               <a:rPr lang="en-US" dirty="0"/>
-              <a:t>Go</a:t>
+              <a:t>Explain how</a:t>
             </a:r>
             <a:r>
               <a:rPr lang="en-US" baseline="0" dirty="0"/>
-              <a:t> over the vocabulary around different parts of CSS. Make sure to note that each character is very important: every colon, every semi-colon, every curly bracket, dash, etc.</a:t>
+              <a:t> CSS properties determine the actual styles that are controlled by CSS</a:t>
             </a:r>
             <a:endParaRPr lang="en-US" dirty="0"/>
           </a:p>
@@ -1014,7 +1077,7 @@
     </p:spTree>
     <p:extLst>
       <p:ext uri="{BB962C8B-B14F-4D97-AF65-F5344CB8AC3E}">
-        <p14:creationId xmlns:p14="http://schemas.microsoft.com/office/powerpoint/2010/main" val="2440334685"/>
+        <p14:creationId xmlns:p14="http://schemas.microsoft.com/office/powerpoint/2010/main" val="669666032"/>
       </p:ext>
     </p:extLst>
   </p:cSld>
@@ -1070,13 +1133,8 @@
           <a:p>
             <a:r>
               <a:rPr lang="en-US" dirty="0"/>
-              <a:t>Explain how</a:t>
+              <a:t>Go through a few of the selectors – actually just examples of the element selector. The main idea is that </a:t>
             </a:r>
-            <a:r>
-              <a:rPr lang="en-US" baseline="0" dirty="0"/>
-              <a:t> CSS properties determine the actual styles that are controlled by CSS</a:t>
-            </a:r>
-            <a:endParaRPr lang="en-US" dirty="0"/>
           </a:p>
         </p:txBody>
       </p:sp>
@@ -1166,7 +1224,7 @@
     </p:spTree>
     <p:extLst>
       <p:ext uri="{BB962C8B-B14F-4D97-AF65-F5344CB8AC3E}">
-        <p14:creationId xmlns:p14="http://schemas.microsoft.com/office/powerpoint/2010/main" val="669666032"/>
+        <p14:creationId xmlns:p14="http://schemas.microsoft.com/office/powerpoint/2010/main" val="736763130"/>
       </p:ext>
     </p:extLst>
   </p:cSld>
@@ -1222,7 +1280,19 @@
           <a:p>
             <a:r>
               <a:rPr lang="en-US" dirty="0"/>
-              <a:t>Go through a few of the selectors – actually just examples of the element selector. The main idea is that </a:t>
+              <a:t>For the Repl,</a:t>
+            </a:r>
+            <a:r>
+              <a:rPr lang="en-US" baseline="0" dirty="0"/>
+              <a:t> show the whole ruleset in action. Change around the selector, properties, values </a:t>
+            </a:r>
+            <a:r>
+              <a:rPr lang="en-US" baseline="0" dirty="0" err="1"/>
+              <a:t>etc</a:t>
+            </a:r>
+            <a:r>
+              <a:rPr lang="en-US" baseline="0" dirty="0"/>
+              <a:t> to show how it affects the page.</a:t>
             </a:r>
           </a:p>
         </p:txBody>
@@ -1292,173 +1362,6 @@
                 <a:defRPr/>
               </a:pPr>
               <a:t>8</a:t>
-            </a:fld>
-            <a:endParaRPr kumimoji="0" lang="en-US" sz="1200" b="0" i="0" u="none" strike="noStrike" kern="1200" cap="none" spc="0" normalizeH="0" baseline="0" noProof="0">
-              <a:ln>
-                <a:noFill/>
-              </a:ln>
-              <a:solidFill>
-                <a:prstClr val="black"/>
-              </a:solidFill>
-              <a:effectLst/>
-              <a:uLnTx/>
-              <a:uFillTx/>
-              <a:latin typeface="Calibri" panose="020F0502020204030204"/>
-              <a:ea typeface="+mn-ea"/>
-              <a:cs typeface="+mn-cs"/>
-            </a:endParaRPr>
-          </a:p>
-        </p:txBody>
-      </p:sp>
-    </p:spTree>
-    <p:extLst>
-      <p:ext uri="{BB962C8B-B14F-4D97-AF65-F5344CB8AC3E}">
-        <p14:creationId xmlns:p14="http://schemas.microsoft.com/office/powerpoint/2010/main" val="736763130"/>
-      </p:ext>
-    </p:extLst>
-  </p:cSld>
-  <p:clrMapOvr>
-    <a:masterClrMapping/>
-  </p:clrMapOvr>
-</p:notes>
-</file>
-
-<file path=ppt/notesSlides/notesSlide8.xml><?xml version="1.0" encoding="utf-8"?>
-<p:notes xmlns:a="http://schemas.openxmlformats.org/drawingml/2006/main" xmlns:r="http://schemas.openxmlformats.org/officeDocument/2006/relationships" xmlns:p="http://schemas.openxmlformats.org/presentationml/2006/main">
-  <p:cSld>
-    <p:spTree>
-      <p:nvGrpSpPr>
-        <p:cNvPr id="1" name=""/>
-        <p:cNvGrpSpPr/>
-        <p:nvPr/>
-      </p:nvGrpSpPr>
-      <p:grpSpPr>
-        <a:xfrm>
-          <a:off x="0" y="0"/>
-          <a:ext cx="0" cy="0"/>
-          <a:chOff x="0" y="0"/>
-          <a:chExt cx="0" cy="0"/>
-        </a:xfrm>
-      </p:grpSpPr>
-      <p:sp>
-        <p:nvSpPr>
-          <p:cNvPr id="2" name="Slide Image Placeholder 1"/>
-          <p:cNvSpPr>
-            <a:spLocks noGrp="1" noRot="1" noChangeAspect="1"/>
-          </p:cNvSpPr>
-          <p:nvPr>
-            <p:ph type="sldImg"/>
-          </p:nvPr>
-        </p:nvSpPr>
-        <p:spPr/>
-      </p:sp>
-      <p:sp>
-        <p:nvSpPr>
-          <p:cNvPr id="3" name="Notes Placeholder 2"/>
-          <p:cNvSpPr>
-            <a:spLocks noGrp="1"/>
-          </p:cNvSpPr>
-          <p:nvPr>
-            <p:ph type="body" idx="1"/>
-          </p:nvPr>
-        </p:nvSpPr>
-        <p:spPr/>
-        <p:txBody>
-          <a:bodyPr/>
-          <a:lstStyle/>
-          <a:p>
-            <a:r>
-              <a:rPr lang="en-US" dirty="0"/>
-              <a:t>For the </a:t>
-            </a:r>
-            <a:r>
-              <a:rPr lang="en-US" dirty="0" err="1"/>
-              <a:t>Repl</a:t>
-            </a:r>
-            <a:r>
-              <a:rPr lang="en-US" dirty="0"/>
-              <a:t>,</a:t>
-            </a:r>
-            <a:r>
-              <a:rPr lang="en-US" baseline="0" dirty="0"/>
-              <a:t> show the whole ruleset in action. Make sure to switch to the CSS file to see the CSS. Change around the selector, properties, values </a:t>
-            </a:r>
-            <a:r>
-              <a:rPr lang="en-US" baseline="0" dirty="0" err="1"/>
-              <a:t>etc</a:t>
-            </a:r>
-            <a:r>
-              <a:rPr lang="en-US" baseline="0" dirty="0"/>
-              <a:t> to show how it affects the page.</a:t>
-            </a:r>
-          </a:p>
-        </p:txBody>
-      </p:sp>
-      <p:sp>
-        <p:nvSpPr>
-          <p:cNvPr id="4" name="Slide Number Placeholder 3"/>
-          <p:cNvSpPr>
-            <a:spLocks noGrp="1"/>
-          </p:cNvSpPr>
-          <p:nvPr>
-            <p:ph type="sldNum" sz="quarter" idx="10"/>
-          </p:nvPr>
-        </p:nvSpPr>
-        <p:spPr/>
-        <p:txBody>
-          <a:bodyPr/>
-          <a:lstStyle/>
-          <a:p>
-            <a:pPr marL="0" marR="0" lvl="0" indent="0" algn="r" defTabSz="914400" rtl="0" eaLnBrk="1" fontAlgn="auto" latinLnBrk="0" hangingPunct="1">
-              <a:lnSpc>
-                <a:spcPct val="100000"/>
-              </a:lnSpc>
-              <a:spcBef>
-                <a:spcPts val="0"/>
-              </a:spcBef>
-              <a:spcAft>
-                <a:spcPts val="0"/>
-              </a:spcAft>
-              <a:buClrTx/>
-              <a:buSzTx/>
-              <a:buFontTx/>
-              <a:buNone/>
-              <a:tabLst/>
-              <a:defRPr/>
-            </a:pPr>
-            <a:fld id="{DEC8F7F9-57EC-49CF-9FCD-2B781E4B449F}" type="slidenum">
-              <a:rPr kumimoji="0" lang="en-US" sz="1200" b="0" i="0" u="none" strike="noStrike" kern="1200" cap="none" spc="0" normalizeH="0" baseline="0" noProof="0" smtClean="0">
-                <a:ln>
-                  <a:noFill/>
-                </a:ln>
-                <a:solidFill>
-                  <a:prstClr val="black"/>
-                </a:solidFill>
-                <a:effectLst/>
-                <a:uLnTx/>
-                <a:uFillTx/>
-                <a:latin typeface="Calibri" panose="020F0502020204030204"/>
-                <a:ea typeface="+mn-ea"/>
-                <a:cs typeface="+mn-cs"/>
-              </a:rPr>
-              <a:pPr marL="0" marR="0" lvl="0" indent="0" algn="r" defTabSz="914400" rtl="0" eaLnBrk="1" fontAlgn="auto" latinLnBrk="0" hangingPunct="1">
-                <a:lnSpc>
-                  <a:spcPct val="100000"/>
-                </a:lnSpc>
-                <a:spcBef>
-                  <a:spcPts val="0"/>
-                </a:spcBef>
-                <a:spcAft>
-                  <a:spcPts val="0"/>
-                </a:spcAft>
-                <a:buClrTx/>
-                <a:buSzTx/>
-                <a:buFontTx/>
-                <a:buNone/>
-                <a:tabLst/>
-                <a:defRPr/>
-              </a:pPr>
-              <a:t>9</a:t>
             </a:fld>
             <a:endParaRPr kumimoji="0" lang="en-US" sz="1200" b="0" i="0" u="none" strike="noStrike" kern="1200" cap="none" spc="0" normalizeH="0" baseline="0" noProof="0">
               <a:ln>
@@ -1672,7 +1575,7 @@
             <a:fld id="{1C2D31DE-C454-491C-B5C3-F097855E3DF7}" type="datetime4">
               <a:rPr lang="en-US" smtClean="0"/>
               <a:pPr/>
-              <a:t>August 25, 2022</a:t>
+              <a:t>October 19, 2022</a:t>
             </a:fld>
             <a:endParaRPr lang="en-US" dirty="0"/>
           </a:p>
@@ -5064,7 +4967,7 @@
           <a:p>
             <a:fld id="{5958763E-B898-436D-883D-03711491D54A}" type="datetimeFigureOut">
               <a:rPr lang="en-US" smtClean="0"/>
-              <a:t>8/25/2022</a:t>
+              <a:t>10/19/2022</a:t>
             </a:fld>
             <a:endParaRPr lang="en-US"/>
           </a:p>
@@ -5257,7 +5160,7 @@
           <a:p>
             <a:fld id="{5958763E-B898-436D-883D-03711491D54A}" type="datetimeFigureOut">
               <a:rPr lang="en-US" smtClean="0"/>
-              <a:t>8/25/2022</a:t>
+              <a:t>10/19/2022</a:t>
             </a:fld>
             <a:endParaRPr lang="en-US"/>
           </a:p>
@@ -5507,7 +5410,7 @@
           <a:p>
             <a:fld id="{5958763E-B898-436D-883D-03711491D54A}" type="datetimeFigureOut">
               <a:rPr lang="en-US" smtClean="0"/>
-              <a:t>8/25/2022</a:t>
+              <a:t>10/19/2022</a:t>
             </a:fld>
             <a:endParaRPr lang="en-US"/>
           </a:p>
@@ -5855,7 +5758,7 @@
           <a:p>
             <a:fld id="{5958763E-B898-436D-883D-03711491D54A}" type="datetimeFigureOut">
               <a:rPr lang="en-US" smtClean="0"/>
-              <a:t>8/25/2022</a:t>
+              <a:t>10/19/2022</a:t>
             </a:fld>
             <a:endParaRPr lang="en-US"/>
           </a:p>
@@ -6271,7 +6174,7 @@
           <a:p>
             <a:fld id="{5958763E-B898-436D-883D-03711491D54A}" type="datetimeFigureOut">
               <a:rPr lang="en-US" smtClean="0"/>
-              <a:t>8/25/2022</a:t>
+              <a:t>10/19/2022</a:t>
             </a:fld>
             <a:endParaRPr lang="en-US"/>
           </a:p>
@@ -6772,7 +6675,7 @@
           <a:p>
             <a:fld id="{5958763E-B898-436D-883D-03711491D54A}" type="datetimeFigureOut">
               <a:rPr lang="en-US" smtClean="0"/>
-              <a:t>8/25/2022</a:t>
+              <a:t>10/19/2022</a:t>
             </a:fld>
             <a:endParaRPr lang="en-US"/>
           </a:p>
@@ -7223,7 +7126,7 @@
           <a:p>
             <a:fld id="{5958763E-B898-436D-883D-03711491D54A}" type="datetimeFigureOut">
               <a:rPr lang="en-US" smtClean="0"/>
-              <a:t>8/25/2022</a:t>
+              <a:t>10/19/2022</a:t>
             </a:fld>
             <a:endParaRPr lang="en-US"/>
           </a:p>
@@ -7834,7 +7737,7 @@
           <a:p>
             <a:fld id="{5958763E-B898-436D-883D-03711491D54A}" type="datetimeFigureOut">
               <a:rPr lang="en-US" smtClean="0"/>
-              <a:t>8/25/2022</a:t>
+              <a:t>10/19/2022</a:t>
             </a:fld>
             <a:endParaRPr lang="en-US"/>
           </a:p>
@@ -8605,7 +8508,7 @@
           <a:p>
             <a:fld id="{5958763E-B898-436D-883D-03711491D54A}" type="datetimeFigureOut">
               <a:rPr lang="en-US" smtClean="0"/>
-              <a:t>8/25/2022</a:t>
+              <a:t>10/19/2022</a:t>
             </a:fld>
             <a:endParaRPr lang="en-US"/>
           </a:p>
@@ -8709,7 +8612,7 @@
           <a:p>
             <a:fld id="{5958763E-B898-436D-883D-03711491D54A}" type="datetimeFigureOut">
               <a:rPr lang="en-US" smtClean="0"/>
-              <a:t>8/25/2022</a:t>
+              <a:t>10/19/2022</a:t>
             </a:fld>
             <a:endParaRPr lang="en-US"/>
           </a:p>
@@ -9036,7 +8939,7 @@
             <a:fld id="{1C2D31DE-C454-491C-B5C3-F097855E3DF7}" type="datetime4">
               <a:rPr lang="en-US" smtClean="0"/>
               <a:pPr/>
-              <a:t>August 25, 2022</a:t>
+              <a:t>October 19, 2022</a:t>
             </a:fld>
             <a:endParaRPr lang="en-US" dirty="0"/>
           </a:p>
@@ -12188,7 +12091,7 @@
           <a:p>
             <a:fld id="{5958763E-B898-436D-883D-03711491D54A}" type="datetimeFigureOut">
               <a:rPr lang="en-US" smtClean="0"/>
-              <a:t>8/25/2022</a:t>
+              <a:t>10/19/2022</a:t>
             </a:fld>
             <a:endParaRPr lang="en-US"/>
           </a:p>
@@ -12312,7 +12215,7 @@
           <a:p>
             <a:fld id="{5958763E-B898-436D-883D-03711491D54A}" type="datetimeFigureOut">
               <a:rPr lang="en-US" smtClean="0"/>
-              <a:t>8/25/2022</a:t>
+              <a:t>10/19/2022</a:t>
             </a:fld>
             <a:endParaRPr lang="en-US"/>
           </a:p>
@@ -12436,7 +12339,7 @@
           <a:p>
             <a:fld id="{5958763E-B898-436D-883D-03711491D54A}" type="datetimeFigureOut">
               <a:rPr lang="en-US" smtClean="0"/>
-              <a:t>8/25/2022</a:t>
+              <a:t>10/19/2022</a:t>
             </a:fld>
             <a:endParaRPr lang="en-US"/>
           </a:p>
@@ -12560,7 +12463,7 @@
           <a:p>
             <a:fld id="{5958763E-B898-436D-883D-03711491D54A}" type="datetimeFigureOut">
               <a:rPr lang="en-US" smtClean="0"/>
-              <a:t>8/25/2022</a:t>
+              <a:t>10/19/2022</a:t>
             </a:fld>
             <a:endParaRPr lang="en-US"/>
           </a:p>
@@ -12684,7 +12587,7 @@
           <a:p>
             <a:fld id="{5958763E-B898-436D-883D-03711491D54A}" type="datetimeFigureOut">
               <a:rPr lang="en-US" smtClean="0"/>
-              <a:t>8/25/2022</a:t>
+              <a:t>10/19/2022</a:t>
             </a:fld>
             <a:endParaRPr lang="en-US"/>
           </a:p>
@@ -12808,7 +12711,7 @@
           <a:p>
             <a:fld id="{5958763E-B898-436D-883D-03711491D54A}" type="datetimeFigureOut">
               <a:rPr lang="en-US" smtClean="0"/>
-              <a:t>8/25/2022</a:t>
+              <a:t>10/19/2022</a:t>
             </a:fld>
             <a:endParaRPr lang="en-US"/>
           </a:p>
@@ -12932,7 +12835,7 @@
           <a:p>
             <a:fld id="{5958763E-B898-436D-883D-03711491D54A}" type="datetimeFigureOut">
               <a:rPr lang="en-US" smtClean="0"/>
-              <a:t>8/25/2022</a:t>
+              <a:t>10/19/2022</a:t>
             </a:fld>
             <a:endParaRPr lang="en-US"/>
           </a:p>
@@ -13056,7 +12959,7 @@
           <a:p>
             <a:fld id="{5958763E-B898-436D-883D-03711491D54A}" type="datetimeFigureOut">
               <a:rPr lang="en-US" smtClean="0"/>
-              <a:t>8/25/2022</a:t>
+              <a:t>10/19/2022</a:t>
             </a:fld>
             <a:endParaRPr lang="en-US"/>
           </a:p>
@@ -13189,7 +13092,7 @@
           <a:p>
             <a:fld id="{5958763E-B898-436D-883D-03711491D54A}" type="datetimeFigureOut">
               <a:rPr lang="en-US" smtClean="0"/>
-              <a:t>8/25/2022</a:t>
+              <a:t>10/19/2022</a:t>
             </a:fld>
             <a:endParaRPr lang="en-US"/>
           </a:p>
@@ -16528,7 +16431,7 @@
             <a:fld id="{1C2D31DE-C454-491C-B5C3-F097855E3DF7}" type="datetime4">
               <a:rPr lang="en-US" smtClean="0"/>
               <a:pPr/>
-              <a:t>August 25, 2022</a:t>
+              <a:t>October 19, 2022</a:t>
             </a:fld>
             <a:endParaRPr lang="en-US" dirty="0"/>
           </a:p>
@@ -28764,7 +28667,7 @@
           <a:p>
             <a:fld id="{5958763E-B898-436D-883D-03711491D54A}" type="datetimeFigureOut">
               <a:rPr lang="en-US" smtClean="0"/>
-              <a:t>8/25/2022</a:t>
+              <a:t>10/19/2022</a:t>
             </a:fld>
             <a:endParaRPr lang="en-US"/>
           </a:p>
@@ -29166,7 +29069,7 @@
           <a:p>
             <a:fld id="{5958763E-B898-436D-883D-03711491D54A}" type="datetimeFigureOut">
               <a:rPr lang="en-US" smtClean="0"/>
-              <a:t>8/25/2022</a:t>
+              <a:t>10/19/2022</a:t>
             </a:fld>
             <a:endParaRPr lang="en-US"/>
           </a:p>
@@ -29460,7 +29363,7 @@
           <a:p>
             <a:fld id="{5958763E-B898-436D-883D-03711491D54A}" type="datetimeFigureOut">
               <a:rPr lang="en-US" smtClean="0"/>
-              <a:t>8/25/2022</a:t>
+              <a:t>10/19/2022</a:t>
             </a:fld>
             <a:endParaRPr lang="en-US"/>
           </a:p>
@@ -29661,7 +29564,7 @@
           <a:p>
             <a:fld id="{5958763E-B898-436D-883D-03711491D54A}" type="datetimeFigureOut">
               <a:rPr lang="en-US" smtClean="0"/>
-              <a:t>8/25/2022</a:t>
+              <a:t>10/19/2022</a:t>
             </a:fld>
             <a:endParaRPr lang="en-US"/>
           </a:p>
@@ -29922,7 +29825,7 @@
           <a:p>
             <a:fld id="{5958763E-B898-436D-883D-03711491D54A}" type="datetimeFigureOut">
               <a:rPr lang="en-US" smtClean="0"/>
-              <a:t>8/25/2022</a:t>
+              <a:t>10/19/2022</a:t>
             </a:fld>
             <a:endParaRPr lang="en-US"/>
           </a:p>
@@ -30183,7 +30086,7 @@
           <a:p>
             <a:fld id="{61FD5E12-641C-4696-BA65-B86205845F69}" type="datetimeFigureOut">
               <a:rPr lang="en-US" smtClean="0"/>
-              <a:t>8/25/2022</a:t>
+              <a:t>10/19/2022</a:t>
             </a:fld>
             <a:endParaRPr lang="en-US"/>
           </a:p>
@@ -30353,7 +30256,7 @@
           <a:p>
             <a:fld id="{61FD5E12-641C-4696-BA65-B86205845F69}" type="datetimeFigureOut">
               <a:rPr lang="en-US" smtClean="0"/>
-              <a:t>8/25/2022</a:t>
+              <a:t>10/19/2022</a:t>
             </a:fld>
             <a:endParaRPr lang="en-US"/>
           </a:p>
@@ -30792,7 +30695,7 @@
           <a:p>
             <a:fld id="{5958763E-B898-436D-883D-03711491D54A}" type="datetimeFigureOut">
               <a:rPr lang="en-US" smtClean="0"/>
-              <a:t>8/25/2022</a:t>
+              <a:t>10/19/2022</a:t>
             </a:fld>
             <a:endParaRPr lang="en-US"/>
           </a:p>
@@ -31087,7 +30990,7 @@
           <a:p>
             <a:fld id="{61FD5E12-641C-4696-BA65-B86205845F69}" type="datetimeFigureOut">
               <a:rPr lang="en-US" smtClean="0"/>
-              <a:t>8/25/2022</a:t>
+              <a:t>10/19/2022</a:t>
             </a:fld>
             <a:endParaRPr lang="en-US"/>
           </a:p>
@@ -31319,7 +31222,7 @@
           <a:p>
             <a:fld id="{61FD5E12-641C-4696-BA65-B86205845F69}" type="datetimeFigureOut">
               <a:rPr lang="en-US" smtClean="0"/>
-              <a:t>8/25/2022</a:t>
+              <a:t>10/19/2022</a:t>
             </a:fld>
             <a:endParaRPr lang="en-US"/>
           </a:p>
@@ -31686,7 +31589,7 @@
           <a:p>
             <a:fld id="{61FD5E12-641C-4696-BA65-B86205845F69}" type="datetimeFigureOut">
               <a:rPr lang="en-US" smtClean="0"/>
-              <a:t>8/25/2022</a:t>
+              <a:t>10/19/2022</a:t>
             </a:fld>
             <a:endParaRPr lang="en-US"/>
           </a:p>
@@ -31804,7 +31707,7 @@
           <a:p>
             <a:fld id="{61FD5E12-641C-4696-BA65-B86205845F69}" type="datetimeFigureOut">
               <a:rPr lang="en-US" smtClean="0"/>
-              <a:t>8/25/2022</a:t>
+              <a:t>10/19/2022</a:t>
             </a:fld>
             <a:endParaRPr lang="en-US"/>
           </a:p>
@@ -31899,7 +31802,7 @@
           <a:p>
             <a:fld id="{61FD5E12-641C-4696-BA65-B86205845F69}" type="datetimeFigureOut">
               <a:rPr lang="en-US" smtClean="0"/>
-              <a:t>8/25/2022</a:t>
+              <a:t>10/19/2022</a:t>
             </a:fld>
             <a:endParaRPr lang="en-US"/>
           </a:p>
@@ -32176,7 +32079,7 @@
           <a:p>
             <a:fld id="{61FD5E12-641C-4696-BA65-B86205845F69}" type="datetimeFigureOut">
               <a:rPr lang="en-US" smtClean="0"/>
-              <a:t>8/25/2022</a:t>
+              <a:t>10/19/2022</a:t>
             </a:fld>
             <a:endParaRPr lang="en-US"/>
           </a:p>
@@ -32433,7 +32336,7 @@
           <a:p>
             <a:fld id="{61FD5E12-641C-4696-BA65-B86205845F69}" type="datetimeFigureOut">
               <a:rPr lang="en-US" smtClean="0"/>
-              <a:t>8/25/2022</a:t>
+              <a:t>10/19/2022</a:t>
             </a:fld>
             <a:endParaRPr lang="en-US"/>
           </a:p>
@@ -32603,7 +32506,7 @@
           <a:p>
             <a:fld id="{61FD5E12-641C-4696-BA65-B86205845F69}" type="datetimeFigureOut">
               <a:rPr lang="en-US" smtClean="0"/>
-              <a:t>8/25/2022</a:t>
+              <a:t>10/19/2022</a:t>
             </a:fld>
             <a:endParaRPr lang="en-US"/>
           </a:p>
@@ -32783,7 +32686,7 @@
           <a:p>
             <a:fld id="{61FD5E12-641C-4696-BA65-B86205845F69}" type="datetimeFigureOut">
               <a:rPr lang="en-US" smtClean="0"/>
-              <a:t>8/25/2022</a:t>
+              <a:t>10/19/2022</a:t>
             </a:fld>
             <a:endParaRPr lang="en-US"/>
           </a:p>
@@ -33429,7 +33332,7 @@
           <a:p>
             <a:fld id="{5958763E-B898-436D-883D-03711491D54A}" type="datetimeFigureOut">
               <a:rPr lang="en-US" smtClean="0"/>
-              <a:t>8/25/2022</a:t>
+              <a:t>10/19/2022</a:t>
             </a:fld>
             <a:endParaRPr lang="en-US"/>
           </a:p>
@@ -34818,7 +34721,7 @@
           <a:p>
             <a:fld id="{5958763E-B898-436D-883D-03711491D54A}" type="datetimeFigureOut">
               <a:rPr lang="en-US" smtClean="0"/>
-              <a:t>8/25/2022</a:t>
+              <a:t>10/19/2022</a:t>
             </a:fld>
             <a:endParaRPr lang="en-US"/>
           </a:p>
@@ -35019,7 +34922,7 @@
           <a:p>
             <a:fld id="{5958763E-B898-436D-883D-03711491D54A}" type="datetimeFigureOut">
               <a:rPr lang="en-US" smtClean="0"/>
-              <a:t>8/25/2022</a:t>
+              <a:t>10/19/2022</a:t>
             </a:fld>
             <a:endParaRPr lang="en-US"/>
           </a:p>
@@ -35354,7 +35257,7 @@
           <a:p>
             <a:fld id="{5958763E-B898-436D-883D-03711491D54A}" type="datetimeFigureOut">
               <a:rPr lang="en-US" smtClean="0"/>
-              <a:t>8/25/2022</a:t>
+              <a:t>10/19/2022</a:t>
             </a:fld>
             <a:endParaRPr lang="en-US"/>
           </a:p>
@@ -35584,7 +35487,7 @@
           <a:p>
             <a:fld id="{5958763E-B898-436D-883D-03711491D54A}" type="datetimeFigureOut">
               <a:rPr lang="en-US" smtClean="0"/>
-              <a:t>8/25/2022</a:t>
+              <a:t>10/19/2022</a:t>
             </a:fld>
             <a:endParaRPr lang="en-US"/>
           </a:p>
@@ -35828,7 +35731,7 @@
           <a:p>
             <a:fld id="{5958763E-B898-436D-883D-03711491D54A}" type="datetimeFigureOut">
               <a:rPr lang="en-US" smtClean="0"/>
-              <a:t>8/25/2022</a:t>
+              <a:t>10/19/2022</a:t>
             </a:fld>
             <a:endParaRPr lang="en-US"/>
           </a:p>
@@ -36469,7 +36372,7 @@
           <a:p>
             <a:fld id="{61FD5E12-641C-4696-BA65-B86205845F69}" type="datetimeFigureOut">
               <a:rPr lang="en-US" smtClean="0"/>
-              <a:t>8/25/2022</a:t>
+              <a:t>10/19/2022</a:t>
             </a:fld>
             <a:endParaRPr lang="en-US"/>
           </a:p>
@@ -39906,67 +39809,6 @@
     <p:extLst>
       <p:ext uri="{BB962C8B-B14F-4D97-AF65-F5344CB8AC3E}">
         <p14:creationId xmlns:p14="http://schemas.microsoft.com/office/powerpoint/2010/main" val="1399880830"/>
-      </p:ext>
-    </p:extLst>
-  </p:cSld>
-  <p:clrMapOvr>
-    <a:masterClrMapping/>
-  </p:clrMapOvr>
-  <p:transition>
-    <p:fade/>
-  </p:transition>
-</p:sld>
-</file>
-
-<file path=ppt/slides/slide10.xml><?xml version="1.0" encoding="utf-8"?>
-<p:sld xmlns:a="http://schemas.openxmlformats.org/drawingml/2006/main" xmlns:r="http://schemas.openxmlformats.org/officeDocument/2006/relationships" xmlns:p="http://schemas.openxmlformats.org/presentationml/2006/main">
-  <p:cSld>
-    <p:spTree>
-      <p:nvGrpSpPr>
-        <p:cNvPr id="1" name=""/>
-        <p:cNvGrpSpPr/>
-        <p:nvPr/>
-      </p:nvGrpSpPr>
-      <p:grpSpPr>
-        <a:xfrm>
-          <a:off x="0" y="0"/>
-          <a:ext cx="0" cy="0"/>
-          <a:chOff x="0" y="0"/>
-          <a:chExt cx="0" cy="0"/>
-        </a:xfrm>
-      </p:grpSpPr>
-      <p:sp>
-        <p:nvSpPr>
-          <p:cNvPr id="2" name="Text Placeholder 1">
-            <a:extLst>
-              <a:ext uri="{FF2B5EF4-FFF2-40B4-BE49-F238E27FC236}">
-                <a16:creationId xmlns:a16="http://schemas.microsoft.com/office/drawing/2014/main" id="{85615D18-8F75-4B52-89C9-F982DAFE9325}"/>
-              </a:ext>
-            </a:extLst>
-          </p:cNvPr>
-          <p:cNvSpPr>
-            <a:spLocks noGrp="1"/>
-          </p:cNvSpPr>
-          <p:nvPr>
-            <p:ph type="body" sz="quarter" idx="10"/>
-          </p:nvPr>
-        </p:nvSpPr>
-        <p:spPr/>
-        <p:txBody>
-          <a:bodyPr/>
-          <a:lstStyle/>
-          <a:p>
-            <a:r>
-              <a:rPr lang="en-US"/>
-              <a:t>Questions?</a:t>
-            </a:r>
-          </a:p>
-        </p:txBody>
-      </p:sp>
-    </p:spTree>
-    <p:extLst>
-      <p:ext uri="{BB962C8B-B14F-4D97-AF65-F5344CB8AC3E}">
-        <p14:creationId xmlns:p14="http://schemas.microsoft.com/office/powerpoint/2010/main" val="2552111147"/>
       </p:ext>
     </p:extLst>
   </p:cSld>
@@ -40596,7 +40438,39 @@
           <a:p>
             <a:r>
               <a:rPr lang="en-US" dirty="0"/>
-              <a:t>CSS Files</a:t>
+              <a:t>The </a:t>
+            </a:r>
+            <a:r>
+              <a:rPr lang="en-US" sz="4000" cap="none" dirty="0">
+                <a:solidFill>
+                  <a:schemeClr val="accent1">
+                    <a:lumMod val="40000"/>
+                    <a:lumOff val="60000"/>
+                  </a:schemeClr>
+                </a:solidFill>
+                <a:latin typeface="Consolas" panose="020B0609020204030204" pitchFamily="49" charset="0"/>
+              </a:rPr>
+              <a:t>&lt;head&gt;</a:t>
+            </a:r>
+            <a:r>
+              <a:rPr lang="en-US" sz="3600" dirty="0"/>
+              <a:t> and </a:t>
+            </a:r>
+            <a:r>
+              <a:rPr lang="en-US" sz="4000" cap="none" dirty="0">
+                <a:solidFill>
+                  <a:schemeClr val="accent1">
+                    <a:lumMod val="40000"/>
+                    <a:lumOff val="60000"/>
+                  </a:schemeClr>
+                </a:solidFill>
+                <a:latin typeface="Consolas" panose="020B0609020204030204" pitchFamily="49" charset="0"/>
+              </a:rPr>
+              <a:t>&lt;style&gt;</a:t>
+            </a:r>
+            <a:r>
+              <a:rPr lang="en-US" dirty="0"/>
+              <a:t> elements</a:t>
             </a:r>
           </a:p>
         </p:txBody>
@@ -40617,70 +40491,866 @@
             <p:ph idx="1"/>
           </p:nvPr>
         </p:nvSpPr>
-        <p:spPr/>
+        <p:spPr>
+          <a:xfrm>
+            <a:off x="381000" y="1270143"/>
+            <a:ext cx="4572000" cy="5257800"/>
+          </a:xfrm>
+          <a:solidFill>
+            <a:srgbClr val="322610"/>
+          </a:solidFill>
+        </p:spPr>
         <p:txBody>
           <a:bodyPr>
             <a:normAutofit/>
           </a:bodyPr>
           <a:lstStyle/>
           <a:p>
+            <a:pPr marL="57150" indent="0">
+              <a:buNone/>
+            </a:pPr>
             <a:r>
-              <a:rPr lang="en-US" sz="3600" dirty="0"/>
-              <a:t>CSS files are separate files that add style to HTML</a:t>
-            </a:r>
-          </a:p>
-          <a:p>
-            <a:endParaRPr lang="en-US" sz="3600" dirty="0"/>
-          </a:p>
-          <a:p>
-            <a:r>
-              <a:rPr lang="en-US" sz="3600" dirty="0"/>
-              <a:t>They have a different language</a:t>
-            </a:r>
-          </a:p>
-          <a:p>
-            <a:endParaRPr lang="en-US" sz="3600" dirty="0"/>
-          </a:p>
-          <a:p>
-            <a:r>
-              <a:rPr lang="en-US" sz="3600" dirty="0"/>
-              <a:t>They end with </a:t>
+              <a:rPr lang="en-US" sz="2400" b="0" dirty="0">
+                <a:solidFill>
+                  <a:srgbClr val="A9B665"/>
+                </a:solidFill>
+                <a:effectLst/>
+                <a:latin typeface="Consolas" panose="020B0609020204030204" pitchFamily="49" charset="0"/>
+              </a:rPr>
+              <a:t>&lt;</a:t>
             </a:r>
             <a:r>
-              <a:rPr lang="en-US" sz="3600" b="1" dirty="0"/>
-              <a:t>.</a:t>
+              <a:rPr lang="en-US" sz="2400" b="0" dirty="0">
+                <a:solidFill>
+                  <a:srgbClr val="E78A4E"/>
+                </a:solidFill>
+                <a:effectLst/>
+                <a:latin typeface="Consolas" panose="020B0609020204030204" pitchFamily="49" charset="0"/>
+              </a:rPr>
+              <a:t>html</a:t>
             </a:r>
             <a:r>
-              <a:rPr lang="en-US" sz="3600" b="1" dirty="0" err="1"/>
-              <a:t>css</a:t>
+              <a:rPr lang="en-US" sz="2400" b="0" dirty="0">
+                <a:solidFill>
+                  <a:srgbClr val="A9B665"/>
+                </a:solidFill>
+                <a:effectLst/>
+                <a:latin typeface="Consolas" panose="020B0609020204030204" pitchFamily="49" charset="0"/>
+              </a:rPr>
+              <a:t>&gt;</a:t>
             </a:r>
-            <a:endParaRPr lang="en-US" sz="3600" b="1" dirty="0"/>
-          </a:p>
-          <a:p>
-            <a:endParaRPr lang="en-US" sz="3600" dirty="0"/>
-          </a:p>
-          <a:p>
+            <a:endParaRPr lang="en-US" sz="2400" b="0" dirty="0">
+              <a:solidFill>
+                <a:srgbClr val="D4BE98"/>
+              </a:solidFill>
+              <a:effectLst/>
+              <a:latin typeface="Consolas" panose="020B0609020204030204" pitchFamily="49" charset="0"/>
+            </a:endParaRPr>
+          </a:p>
+          <a:p>
+            <a:pPr marL="57150" indent="0">
+              <a:buNone/>
+            </a:pPr>
             <a:r>
-              <a:rPr lang="en-US" sz="3600" dirty="0"/>
-              <a:t>They must be </a:t>
+              <a:rPr lang="en-US" sz="2400" b="0" dirty="0">
+                <a:solidFill>
+                  <a:srgbClr val="D4BE98"/>
+                </a:solidFill>
+                <a:effectLst/>
+                <a:latin typeface="Consolas" panose="020B0609020204030204" pitchFamily="49" charset="0"/>
+              </a:rPr>
+              <a:t>  </a:t>
             </a:r>
             <a:r>
-              <a:rPr lang="en-US" sz="3600" i="1" dirty="0"/>
-              <a:t>linked</a:t>
+              <a:rPr lang="en-US" sz="2400" b="0" dirty="0">
+                <a:solidFill>
+                  <a:srgbClr val="A9B665"/>
+                </a:solidFill>
+                <a:effectLst/>
+                <a:latin typeface="Consolas" panose="020B0609020204030204" pitchFamily="49" charset="0"/>
+              </a:rPr>
+              <a:t>&lt;</a:t>
             </a:r>
             <a:r>
-              <a:rPr lang="en-US" sz="3600" dirty="0"/>
-              <a:t> from the HTML element  </a:t>
+              <a:rPr lang="en-US" sz="2400" b="0" dirty="0">
+                <a:solidFill>
+                  <a:srgbClr val="E78A4E"/>
+                </a:solidFill>
+                <a:effectLst/>
+                <a:latin typeface="Consolas" panose="020B0609020204030204" pitchFamily="49" charset="0"/>
+              </a:rPr>
+              <a:t>head</a:t>
+            </a:r>
+            <a:r>
+              <a:rPr lang="en-US" sz="2400" b="0" dirty="0">
+                <a:solidFill>
+                  <a:srgbClr val="A9B665"/>
+                </a:solidFill>
+                <a:effectLst/>
+                <a:latin typeface="Consolas" panose="020B0609020204030204" pitchFamily="49" charset="0"/>
+              </a:rPr>
+              <a:t>&gt;</a:t>
+            </a:r>
+            <a:endParaRPr lang="en-US" sz="2400" b="0" dirty="0">
+              <a:solidFill>
+                <a:srgbClr val="D4BE98"/>
+              </a:solidFill>
+              <a:effectLst/>
+              <a:latin typeface="Consolas" panose="020B0609020204030204" pitchFamily="49" charset="0"/>
+            </a:endParaRPr>
+          </a:p>
+          <a:p>
+            <a:pPr marL="57150" indent="0">
+              <a:buNone/>
+            </a:pPr>
+            <a:r>
+              <a:rPr lang="en-US" sz="2400" b="0" dirty="0">
+                <a:solidFill>
+                  <a:srgbClr val="D4BE98"/>
+                </a:solidFill>
+                <a:effectLst/>
+                <a:latin typeface="Consolas" panose="020B0609020204030204" pitchFamily="49" charset="0"/>
+              </a:rPr>
+              <a:t>    </a:t>
+            </a:r>
+            <a:r>
+              <a:rPr lang="en-US" sz="2400" b="0" dirty="0">
+                <a:solidFill>
+                  <a:srgbClr val="A9B665"/>
+                </a:solidFill>
+                <a:effectLst/>
+                <a:latin typeface="Consolas" panose="020B0609020204030204" pitchFamily="49" charset="0"/>
+              </a:rPr>
+              <a:t>&lt;</a:t>
+            </a:r>
+            <a:r>
+              <a:rPr lang="en-US" sz="2400" b="0" dirty="0">
+                <a:solidFill>
+                  <a:srgbClr val="E78A4E"/>
+                </a:solidFill>
+                <a:effectLst/>
+                <a:latin typeface="Consolas" panose="020B0609020204030204" pitchFamily="49" charset="0"/>
+              </a:rPr>
+              <a:t>style</a:t>
+            </a:r>
+            <a:r>
+              <a:rPr lang="en-US" sz="2400" b="0" dirty="0">
+                <a:solidFill>
+                  <a:srgbClr val="A9B665"/>
+                </a:solidFill>
+                <a:effectLst/>
+                <a:latin typeface="Consolas" panose="020B0609020204030204" pitchFamily="49" charset="0"/>
+              </a:rPr>
+              <a:t>&gt;</a:t>
+            </a:r>
+            <a:endParaRPr lang="en-US" sz="2400" b="0" dirty="0">
+              <a:solidFill>
+                <a:srgbClr val="D4BE98"/>
+              </a:solidFill>
+              <a:effectLst/>
+              <a:latin typeface="Consolas" panose="020B0609020204030204" pitchFamily="49" charset="0"/>
+            </a:endParaRPr>
+          </a:p>
+          <a:p>
+            <a:pPr marL="57150" indent="0">
+              <a:buNone/>
+            </a:pPr>
+            <a:r>
+              <a:rPr lang="en-US" sz="2400" b="0" dirty="0">
+                <a:solidFill>
+                  <a:srgbClr val="D4BE98"/>
+                </a:solidFill>
+                <a:effectLst/>
+                <a:latin typeface="Consolas" panose="020B0609020204030204" pitchFamily="49" charset="0"/>
+              </a:rPr>
+              <a:t>      </a:t>
+            </a:r>
+            <a:r>
+              <a:rPr lang="en-US" sz="2400" b="0" i="1" dirty="0">
+                <a:solidFill>
+                  <a:srgbClr val="928374"/>
+                </a:solidFill>
+                <a:effectLst/>
+                <a:latin typeface="Consolas" panose="020B0609020204030204" pitchFamily="49" charset="0"/>
+              </a:rPr>
+              <a:t>/* CSS Goes Here */</a:t>
+            </a:r>
+            <a:endParaRPr lang="en-US" sz="2400" b="0" dirty="0">
+              <a:solidFill>
+                <a:srgbClr val="D4BE98"/>
+              </a:solidFill>
+              <a:effectLst/>
+              <a:latin typeface="Consolas" panose="020B0609020204030204" pitchFamily="49" charset="0"/>
+            </a:endParaRPr>
+          </a:p>
+          <a:p>
+            <a:pPr marL="57150" indent="0">
+              <a:buNone/>
+            </a:pPr>
+            <a:r>
+              <a:rPr lang="en-US" sz="2400" b="0" dirty="0">
+                <a:solidFill>
+                  <a:srgbClr val="D4BE98"/>
+                </a:solidFill>
+                <a:effectLst/>
+                <a:latin typeface="Consolas" panose="020B0609020204030204" pitchFamily="49" charset="0"/>
+              </a:rPr>
+              <a:t>    </a:t>
+            </a:r>
+            <a:r>
+              <a:rPr lang="en-US" sz="2400" b="0" dirty="0">
+                <a:solidFill>
+                  <a:srgbClr val="A9B665"/>
+                </a:solidFill>
+                <a:effectLst/>
+                <a:latin typeface="Consolas" panose="020B0609020204030204" pitchFamily="49" charset="0"/>
+              </a:rPr>
+              <a:t>&lt;/</a:t>
+            </a:r>
+            <a:r>
+              <a:rPr lang="en-US" sz="2400" b="0" dirty="0">
+                <a:solidFill>
+                  <a:srgbClr val="E78A4E"/>
+                </a:solidFill>
+                <a:effectLst/>
+                <a:latin typeface="Consolas" panose="020B0609020204030204" pitchFamily="49" charset="0"/>
+              </a:rPr>
+              <a:t>style</a:t>
+            </a:r>
+            <a:r>
+              <a:rPr lang="en-US" sz="2400" b="0" dirty="0">
+                <a:solidFill>
+                  <a:srgbClr val="A9B665"/>
+                </a:solidFill>
+                <a:effectLst/>
+                <a:latin typeface="Consolas" panose="020B0609020204030204" pitchFamily="49" charset="0"/>
+              </a:rPr>
+              <a:t>&gt;</a:t>
+            </a:r>
+            <a:endParaRPr lang="en-US" sz="2400" b="0" dirty="0">
+              <a:solidFill>
+                <a:srgbClr val="D4BE98"/>
+              </a:solidFill>
+              <a:effectLst/>
+              <a:latin typeface="Consolas" panose="020B0609020204030204" pitchFamily="49" charset="0"/>
+            </a:endParaRPr>
+          </a:p>
+          <a:p>
+            <a:pPr marL="57150" indent="0">
+              <a:buNone/>
+            </a:pPr>
+            <a:r>
+              <a:rPr lang="en-US" sz="2400" b="0" dirty="0">
+                <a:solidFill>
+                  <a:srgbClr val="D4BE98"/>
+                </a:solidFill>
+                <a:effectLst/>
+                <a:latin typeface="Consolas" panose="020B0609020204030204" pitchFamily="49" charset="0"/>
+              </a:rPr>
+              <a:t>  </a:t>
+            </a:r>
+            <a:r>
+              <a:rPr lang="en-US" sz="2400" b="0" dirty="0">
+                <a:solidFill>
+                  <a:srgbClr val="A9B665"/>
+                </a:solidFill>
+                <a:effectLst/>
+                <a:latin typeface="Consolas" panose="020B0609020204030204" pitchFamily="49" charset="0"/>
+              </a:rPr>
+              <a:t>&lt;/</a:t>
+            </a:r>
+            <a:r>
+              <a:rPr lang="en-US" sz="2400" b="0" dirty="0">
+                <a:solidFill>
+                  <a:srgbClr val="E78A4E"/>
+                </a:solidFill>
+                <a:effectLst/>
+                <a:latin typeface="Consolas" panose="020B0609020204030204" pitchFamily="49" charset="0"/>
+              </a:rPr>
+              <a:t>head</a:t>
+            </a:r>
+            <a:r>
+              <a:rPr lang="en-US" sz="2400" b="0" dirty="0">
+                <a:solidFill>
+                  <a:srgbClr val="A9B665"/>
+                </a:solidFill>
+                <a:effectLst/>
+                <a:latin typeface="Consolas" panose="020B0609020204030204" pitchFamily="49" charset="0"/>
+              </a:rPr>
+              <a:t>&gt;</a:t>
+            </a:r>
+            <a:endParaRPr lang="en-US" sz="2400" b="0" dirty="0">
+              <a:solidFill>
+                <a:srgbClr val="D4BE98"/>
+              </a:solidFill>
+              <a:effectLst/>
+              <a:latin typeface="Consolas" panose="020B0609020204030204" pitchFamily="49" charset="0"/>
+            </a:endParaRPr>
+          </a:p>
+          <a:p>
+            <a:pPr marL="57150" indent="0">
+              <a:buNone/>
+            </a:pPr>
+            <a:r>
+              <a:rPr lang="en-US" sz="2400" b="0" dirty="0">
+                <a:solidFill>
+                  <a:srgbClr val="D4BE98"/>
+                </a:solidFill>
+                <a:effectLst/>
+                <a:latin typeface="Consolas" panose="020B0609020204030204" pitchFamily="49" charset="0"/>
+              </a:rPr>
+              <a:t>  </a:t>
+            </a:r>
+            <a:r>
+              <a:rPr lang="en-US" sz="2400" b="0" dirty="0">
+                <a:solidFill>
+                  <a:srgbClr val="A9B665"/>
+                </a:solidFill>
+                <a:effectLst/>
+                <a:latin typeface="Consolas" panose="020B0609020204030204" pitchFamily="49" charset="0"/>
+              </a:rPr>
+              <a:t>&lt;</a:t>
+            </a:r>
+            <a:r>
+              <a:rPr lang="en-US" sz="2400" b="0" dirty="0">
+                <a:solidFill>
+                  <a:srgbClr val="E78A4E"/>
+                </a:solidFill>
+                <a:effectLst/>
+                <a:latin typeface="Consolas" panose="020B0609020204030204" pitchFamily="49" charset="0"/>
+              </a:rPr>
+              <a:t>body</a:t>
+            </a:r>
+            <a:r>
+              <a:rPr lang="en-US" sz="2400" b="0" dirty="0">
+                <a:solidFill>
+                  <a:srgbClr val="A9B665"/>
+                </a:solidFill>
+                <a:effectLst/>
+                <a:latin typeface="Consolas" panose="020B0609020204030204" pitchFamily="49" charset="0"/>
+              </a:rPr>
+              <a:t>&gt;</a:t>
+            </a:r>
+            <a:endParaRPr lang="en-US" sz="2400" b="0" dirty="0">
+              <a:solidFill>
+                <a:srgbClr val="D4BE98"/>
+              </a:solidFill>
+              <a:effectLst/>
+              <a:latin typeface="Consolas" panose="020B0609020204030204" pitchFamily="49" charset="0"/>
+            </a:endParaRPr>
+          </a:p>
+          <a:p>
+            <a:pPr marL="57150" indent="0">
+              <a:buNone/>
+            </a:pPr>
+            <a:r>
+              <a:rPr lang="en-US" sz="2400" b="0" dirty="0">
+                <a:solidFill>
+                  <a:srgbClr val="D4BE98"/>
+                </a:solidFill>
+                <a:effectLst/>
+                <a:latin typeface="Consolas" panose="020B0609020204030204" pitchFamily="49" charset="0"/>
+              </a:rPr>
+              <a:t>    </a:t>
+            </a:r>
+            <a:r>
+              <a:rPr lang="en-US" sz="2400" b="0" dirty="0">
+                <a:solidFill>
+                  <a:srgbClr val="A9B665"/>
+                </a:solidFill>
+                <a:effectLst/>
+                <a:latin typeface="Consolas" panose="020B0609020204030204" pitchFamily="49" charset="0"/>
+              </a:rPr>
+              <a:t>&lt;</a:t>
+            </a:r>
+            <a:r>
+              <a:rPr lang="en-US" sz="2400" b="0" dirty="0">
+                <a:solidFill>
+                  <a:srgbClr val="E78A4E"/>
+                </a:solidFill>
+                <a:effectLst/>
+                <a:latin typeface="Consolas" panose="020B0609020204030204" pitchFamily="49" charset="0"/>
+              </a:rPr>
+              <a:t>h1</a:t>
+            </a:r>
+            <a:r>
+              <a:rPr lang="en-US" sz="2400" b="0" dirty="0">
+                <a:solidFill>
+                  <a:srgbClr val="A9B665"/>
+                </a:solidFill>
+                <a:effectLst/>
+                <a:latin typeface="Consolas" panose="020B0609020204030204" pitchFamily="49" charset="0"/>
+              </a:rPr>
+              <a:t>&gt;</a:t>
+            </a:r>
+            <a:r>
+              <a:rPr lang="en-US" sz="2400" b="0" dirty="0">
+                <a:solidFill>
+                  <a:srgbClr val="D4BE98"/>
+                </a:solidFill>
+                <a:effectLst/>
+                <a:latin typeface="Consolas" panose="020B0609020204030204" pitchFamily="49" charset="0"/>
+              </a:rPr>
+              <a:t>My Site</a:t>
+            </a:r>
+            <a:r>
+              <a:rPr lang="en-US" sz="2400" b="0" dirty="0">
+                <a:solidFill>
+                  <a:srgbClr val="A9B665"/>
+                </a:solidFill>
+                <a:effectLst/>
+                <a:latin typeface="Consolas" panose="020B0609020204030204" pitchFamily="49" charset="0"/>
+              </a:rPr>
+              <a:t>&lt;/</a:t>
+            </a:r>
+            <a:r>
+              <a:rPr lang="en-US" sz="2400" b="0" dirty="0">
+                <a:solidFill>
+                  <a:srgbClr val="E78A4E"/>
+                </a:solidFill>
+                <a:effectLst/>
+                <a:latin typeface="Consolas" panose="020B0609020204030204" pitchFamily="49" charset="0"/>
+              </a:rPr>
+              <a:t>h1</a:t>
+            </a:r>
+            <a:r>
+              <a:rPr lang="en-US" sz="2400" b="0" dirty="0">
+                <a:solidFill>
+                  <a:srgbClr val="A9B665"/>
+                </a:solidFill>
+                <a:effectLst/>
+                <a:latin typeface="Consolas" panose="020B0609020204030204" pitchFamily="49" charset="0"/>
+              </a:rPr>
+              <a:t>&gt;</a:t>
+            </a:r>
+            <a:endParaRPr lang="en-US" sz="2400" b="0" dirty="0">
+              <a:solidFill>
+                <a:srgbClr val="D4BE98"/>
+              </a:solidFill>
+              <a:effectLst/>
+              <a:latin typeface="Consolas" panose="020B0609020204030204" pitchFamily="49" charset="0"/>
+            </a:endParaRPr>
+          </a:p>
+          <a:p>
+            <a:pPr marL="57150" indent="0">
+              <a:buNone/>
+            </a:pPr>
+            <a:r>
+              <a:rPr lang="en-US" sz="2400" b="0" dirty="0">
+                <a:solidFill>
+                  <a:srgbClr val="D4BE98"/>
+                </a:solidFill>
+                <a:effectLst/>
+                <a:latin typeface="Consolas" panose="020B0609020204030204" pitchFamily="49" charset="0"/>
+              </a:rPr>
+              <a:t>  </a:t>
+            </a:r>
+            <a:r>
+              <a:rPr lang="en-US" sz="2400" b="0" dirty="0">
+                <a:solidFill>
+                  <a:srgbClr val="A9B665"/>
+                </a:solidFill>
+                <a:effectLst/>
+                <a:latin typeface="Consolas" panose="020B0609020204030204" pitchFamily="49" charset="0"/>
+              </a:rPr>
+              <a:t>&lt;/</a:t>
+            </a:r>
+            <a:r>
+              <a:rPr lang="en-US" sz="2400" b="0" dirty="0">
+                <a:solidFill>
+                  <a:srgbClr val="E78A4E"/>
+                </a:solidFill>
+                <a:effectLst/>
+                <a:latin typeface="Consolas" panose="020B0609020204030204" pitchFamily="49" charset="0"/>
+              </a:rPr>
+              <a:t>body</a:t>
+            </a:r>
+            <a:r>
+              <a:rPr lang="en-US" sz="2400" b="0" dirty="0">
+                <a:solidFill>
+                  <a:srgbClr val="A9B665"/>
+                </a:solidFill>
+                <a:effectLst/>
+                <a:latin typeface="Consolas" panose="020B0609020204030204" pitchFamily="49" charset="0"/>
+              </a:rPr>
+              <a:t>&gt;</a:t>
+            </a:r>
+            <a:endParaRPr lang="en-US" sz="2400" b="0" dirty="0">
+              <a:solidFill>
+                <a:srgbClr val="D4BE98"/>
+              </a:solidFill>
+              <a:effectLst/>
+              <a:latin typeface="Consolas" panose="020B0609020204030204" pitchFamily="49" charset="0"/>
+            </a:endParaRPr>
+          </a:p>
+          <a:p>
+            <a:pPr marL="57150" indent="0">
+              <a:buNone/>
+            </a:pPr>
+            <a:r>
+              <a:rPr lang="en-US" sz="2400" b="0" dirty="0">
+                <a:solidFill>
+                  <a:srgbClr val="A9B665"/>
+                </a:solidFill>
+                <a:effectLst/>
+                <a:latin typeface="Consolas" panose="020B0609020204030204" pitchFamily="49" charset="0"/>
+              </a:rPr>
+              <a:t>&lt;/</a:t>
+            </a:r>
+            <a:r>
+              <a:rPr lang="en-US" sz="2400" b="0" dirty="0">
+                <a:solidFill>
+                  <a:srgbClr val="E78A4E"/>
+                </a:solidFill>
+                <a:effectLst/>
+                <a:latin typeface="Consolas" panose="020B0609020204030204" pitchFamily="49" charset="0"/>
+              </a:rPr>
+              <a:t>html</a:t>
+            </a:r>
+            <a:r>
+              <a:rPr lang="en-US" sz="2400" b="0" dirty="0">
+                <a:solidFill>
+                  <a:srgbClr val="A9B665"/>
+                </a:solidFill>
+                <a:effectLst/>
+                <a:latin typeface="Consolas" panose="020B0609020204030204" pitchFamily="49" charset="0"/>
+              </a:rPr>
+              <a:t>&gt;</a:t>
+            </a:r>
+            <a:endParaRPr lang="en-US" sz="2400" b="0" dirty="0">
+              <a:solidFill>
+                <a:srgbClr val="D4BE98"/>
+              </a:solidFill>
+              <a:effectLst/>
+              <a:latin typeface="Consolas" panose="020B0609020204030204" pitchFamily="49" charset="0"/>
+            </a:endParaRPr>
+          </a:p>
+        </p:txBody>
+      </p:sp>
+      <p:sp>
+        <p:nvSpPr>
+          <p:cNvPr id="5" name="Content Placeholder 2">
+            <a:extLst>
+              <a:ext uri="{FF2B5EF4-FFF2-40B4-BE49-F238E27FC236}">
+                <a16:creationId xmlns:a16="http://schemas.microsoft.com/office/drawing/2014/main" id="{0E28B48C-F781-40A9-8C61-6C54EECEAE54}"/>
+              </a:ext>
+            </a:extLst>
+          </p:cNvPr>
+          <p:cNvSpPr txBox="1">
+            <a:spLocks/>
+          </p:cNvSpPr>
+          <p:nvPr/>
+        </p:nvSpPr>
+        <p:spPr>
+          <a:xfrm>
+            <a:off x="5181599" y="4173364"/>
+            <a:ext cx="6508955" cy="2354580"/>
+          </a:xfrm>
+          <a:prstGeom prst="rect">
+            <a:avLst/>
+          </a:prstGeom>
+        </p:spPr>
+        <p:txBody>
+          <a:bodyPr vert="horz" lIns="0" tIns="0" rIns="0" bIns="0" rtlCol="0">
+            <a:normAutofit/>
+          </a:bodyPr>
+          <a:lstStyle>
+            <a:lvl1pPr marL="342900" indent="-285750" algn="l" defTabSz="914400" rtl="0" eaLnBrk="1" latinLnBrk="0" hangingPunct="1">
+              <a:lnSpc>
+                <a:spcPct val="100000"/>
+              </a:lnSpc>
+              <a:spcBef>
+                <a:spcPts val="0"/>
+              </a:spcBef>
+              <a:spcAft>
+                <a:spcPts val="1200"/>
+              </a:spcAft>
+              <a:buClr>
+                <a:schemeClr val="accent3"/>
+              </a:buClr>
+              <a:buFont typeface="Wingdings" panose="05000000000000000000" pitchFamily="2" charset="2"/>
+              <a:buChar char="§"/>
+              <a:defRPr sz="2800" kern="1200">
+                <a:solidFill>
+                  <a:schemeClr val="tx1"/>
+                </a:solidFill>
+                <a:latin typeface="+mn-lt"/>
+                <a:ea typeface="+mn-ea"/>
+                <a:cs typeface="+mn-cs"/>
+              </a:defRPr>
+            </a:lvl1pPr>
+            <a:lvl2pPr marL="685800" indent="-228600" algn="l" defTabSz="914400" rtl="0" eaLnBrk="1" latinLnBrk="0" hangingPunct="1">
+              <a:lnSpc>
+                <a:spcPct val="100000"/>
+              </a:lnSpc>
+              <a:spcBef>
+                <a:spcPts val="0"/>
+              </a:spcBef>
+              <a:spcAft>
+                <a:spcPts val="1200"/>
+              </a:spcAft>
+              <a:buClr>
+                <a:schemeClr val="accent2"/>
+              </a:buClr>
+              <a:buFont typeface="Arial" panose="020B0604020202020204" pitchFamily="34" charset="0"/>
+              <a:buChar char="•"/>
+              <a:defRPr sz="2400" kern="1200">
+                <a:solidFill>
+                  <a:schemeClr val="tx1"/>
+                </a:solidFill>
+                <a:latin typeface="+mn-lt"/>
+                <a:ea typeface="+mn-ea"/>
+                <a:cs typeface="+mn-cs"/>
+              </a:defRPr>
+            </a:lvl2pPr>
+            <a:lvl3pPr marL="1028700" indent="-228600" algn="l" defTabSz="914400" rtl="0" eaLnBrk="1" latinLnBrk="0" hangingPunct="1">
+              <a:lnSpc>
+                <a:spcPct val="100000"/>
+              </a:lnSpc>
+              <a:spcBef>
+                <a:spcPts val="0"/>
+              </a:spcBef>
+              <a:spcAft>
+                <a:spcPts val="1200"/>
+              </a:spcAft>
+              <a:buClr>
+                <a:schemeClr val="accent1"/>
+              </a:buClr>
+              <a:buFont typeface="Arial" panose="020B0604020202020204" pitchFamily="34" charset="0"/>
+              <a:buChar char="•"/>
+              <a:defRPr sz="2000" kern="1200">
+                <a:solidFill>
+                  <a:schemeClr val="tx1"/>
+                </a:solidFill>
+                <a:latin typeface="+mn-lt"/>
+                <a:ea typeface="+mn-ea"/>
+                <a:cs typeface="+mn-cs"/>
+              </a:defRPr>
+            </a:lvl3pPr>
+            <a:lvl4pPr marL="1484313" indent="-285750" algn="l" defTabSz="914400" rtl="0" eaLnBrk="1" latinLnBrk="0" hangingPunct="1">
+              <a:lnSpc>
+                <a:spcPct val="100000"/>
+              </a:lnSpc>
+              <a:spcBef>
+                <a:spcPts val="0"/>
+              </a:spcBef>
+              <a:spcAft>
+                <a:spcPts val="1200"/>
+              </a:spcAft>
+              <a:buFont typeface="Arial" panose="020B0604020202020204" pitchFamily="34" charset="0"/>
+              <a:buChar char="•"/>
+              <a:defRPr sz="1800" kern="1200">
+                <a:solidFill>
+                  <a:schemeClr val="tx1"/>
+                </a:solidFill>
+                <a:latin typeface="+mn-lt"/>
+                <a:ea typeface="+mn-ea"/>
+                <a:cs typeface="+mn-cs"/>
+              </a:defRPr>
+            </a:lvl4pPr>
+            <a:lvl5pPr marL="1889125" indent="-284163" algn="l" defTabSz="914400" rtl="0" eaLnBrk="1" latinLnBrk="0" hangingPunct="1">
+              <a:lnSpc>
+                <a:spcPct val="100000"/>
+              </a:lnSpc>
+              <a:spcBef>
+                <a:spcPts val="0"/>
+              </a:spcBef>
+              <a:spcAft>
+                <a:spcPts val="1200"/>
+              </a:spcAft>
+              <a:buFont typeface="Arial" panose="020B0604020202020204" pitchFamily="34" charset="0"/>
+              <a:buChar char="•"/>
+              <a:defRPr sz="1800" kern="1200">
+                <a:solidFill>
+                  <a:schemeClr val="tx1"/>
+                </a:solidFill>
+                <a:latin typeface="+mn-lt"/>
+                <a:ea typeface="+mn-ea"/>
+                <a:cs typeface="+mn-cs"/>
+              </a:defRPr>
+            </a:lvl5pPr>
+            <a:lvl6pPr marL="2514600" indent="-228600" algn="l" defTabSz="914400" rtl="0" eaLnBrk="1" latinLnBrk="0" hangingPunct="1">
+              <a:lnSpc>
+                <a:spcPct val="90000"/>
+              </a:lnSpc>
+              <a:spcBef>
+                <a:spcPts val="500"/>
+              </a:spcBef>
+              <a:buFont typeface="Arial" panose="020B0604020202020204" pitchFamily="34" charset="0"/>
+              <a:buChar char="•"/>
+              <a:defRPr sz="1800" kern="1200">
+                <a:solidFill>
+                  <a:schemeClr val="tx1"/>
+                </a:solidFill>
+                <a:latin typeface="+mn-lt"/>
+                <a:ea typeface="+mn-ea"/>
+                <a:cs typeface="+mn-cs"/>
+              </a:defRPr>
+            </a:lvl6pPr>
+            <a:lvl7pPr marL="2971800" indent="-228600" algn="l" defTabSz="914400" rtl="0" eaLnBrk="1" latinLnBrk="0" hangingPunct="1">
+              <a:lnSpc>
+                <a:spcPct val="90000"/>
+              </a:lnSpc>
+              <a:spcBef>
+                <a:spcPts val="500"/>
+              </a:spcBef>
+              <a:buFont typeface="Arial" panose="020B0604020202020204" pitchFamily="34" charset="0"/>
+              <a:buChar char="•"/>
+              <a:defRPr sz="1800" kern="1200">
+                <a:solidFill>
+                  <a:schemeClr val="tx1"/>
+                </a:solidFill>
+                <a:latin typeface="+mn-lt"/>
+                <a:ea typeface="+mn-ea"/>
+                <a:cs typeface="+mn-cs"/>
+              </a:defRPr>
+            </a:lvl7pPr>
+            <a:lvl8pPr marL="3429000" indent="-228600" algn="l" defTabSz="914400" rtl="0" eaLnBrk="1" latinLnBrk="0" hangingPunct="1">
+              <a:lnSpc>
+                <a:spcPct val="90000"/>
+              </a:lnSpc>
+              <a:spcBef>
+                <a:spcPts val="500"/>
+              </a:spcBef>
+              <a:buFont typeface="Arial" panose="020B0604020202020204" pitchFamily="34" charset="0"/>
+              <a:buChar char="•"/>
+              <a:defRPr sz="1800" kern="1200">
+                <a:solidFill>
+                  <a:schemeClr val="tx1"/>
+                </a:solidFill>
+                <a:latin typeface="+mn-lt"/>
+                <a:ea typeface="+mn-ea"/>
+                <a:cs typeface="+mn-cs"/>
+              </a:defRPr>
+            </a:lvl8pPr>
+            <a:lvl9pPr marL="3886200" indent="-228600" algn="l" defTabSz="914400" rtl="0" eaLnBrk="1" latinLnBrk="0" hangingPunct="1">
+              <a:lnSpc>
+                <a:spcPct val="90000"/>
+              </a:lnSpc>
+              <a:spcBef>
+                <a:spcPts val="500"/>
+              </a:spcBef>
+              <a:buFont typeface="Arial" panose="020B0604020202020204" pitchFamily="34" charset="0"/>
+              <a:buChar char="•"/>
+              <a:defRPr sz="1800" kern="1200">
+                <a:solidFill>
+                  <a:schemeClr val="tx1"/>
+                </a:solidFill>
+                <a:latin typeface="+mn-lt"/>
+                <a:ea typeface="+mn-ea"/>
+                <a:cs typeface="+mn-cs"/>
+              </a:defRPr>
+            </a:lvl9pPr>
+          </a:lstStyle>
+          <a:p>
+            <a:r>
+              <a:rPr lang="en-US" dirty="0"/>
+              <a:t>The </a:t>
+            </a:r>
+            <a:r>
+              <a:rPr lang="en-US" b="1" dirty="0">
+                <a:solidFill>
+                  <a:srgbClr val="FFB71B"/>
+                </a:solidFill>
+                <a:latin typeface="Consolas" panose="020B0609020204030204" pitchFamily="49" charset="0"/>
+              </a:rPr>
+              <a:t>&lt;head&gt;&lt;/head&gt;</a:t>
+            </a:r>
+            <a:r>
+              <a:rPr lang="en-US" dirty="0"/>
+              <a:t> element is a </a:t>
+            </a:r>
+            <a:r>
+              <a:rPr lang="en-US" i="1" dirty="0"/>
+              <a:t>child</a:t>
+            </a:r>
+            <a:r>
+              <a:rPr lang="en-US" dirty="0"/>
+              <a:t> of the </a:t>
+            </a:r>
+            <a:r>
+              <a:rPr lang="en-US" b="1" dirty="0">
+                <a:solidFill>
+                  <a:srgbClr val="FFB71B"/>
+                </a:solidFill>
+                <a:latin typeface="Consolas" panose="020B0609020204030204" pitchFamily="49" charset="0"/>
+              </a:rPr>
+              <a:t>&lt;html&gt;&lt;/html&gt;</a:t>
+            </a:r>
+            <a:r>
+              <a:rPr lang="en-US" dirty="0"/>
+              <a:t> element, and a </a:t>
+            </a:r>
+            <a:r>
+              <a:rPr lang="en-US" i="1" dirty="0"/>
+              <a:t>sibling</a:t>
+            </a:r>
+            <a:r>
+              <a:rPr lang="en-US" dirty="0"/>
+              <a:t> of the </a:t>
+            </a:r>
+            <a:r>
+              <a:rPr lang="en-US" b="1" dirty="0">
+                <a:solidFill>
+                  <a:srgbClr val="FFB71B"/>
+                </a:solidFill>
+                <a:latin typeface="Consolas" panose="020B0609020204030204" pitchFamily="49" charset="0"/>
+              </a:rPr>
+              <a:t>&lt;body&gt;&lt;/body&gt;</a:t>
+            </a:r>
+            <a:r>
+              <a:rPr lang="en-US" dirty="0"/>
+              <a:t> element</a:t>
+            </a:r>
+          </a:p>
+          <a:p>
+            <a:r>
+              <a:rPr lang="en-US" dirty="0"/>
+              <a:t>The </a:t>
+            </a:r>
+            <a:r>
+              <a:rPr lang="en-US" b="1" dirty="0">
+                <a:solidFill>
+                  <a:srgbClr val="FFB71B"/>
+                </a:solidFill>
+                <a:latin typeface="Consolas" panose="020B0609020204030204" pitchFamily="49" charset="0"/>
+              </a:rPr>
+              <a:t>&lt;style&gt;&lt;/style&gt;</a:t>
+            </a:r>
+            <a:r>
+              <a:rPr lang="en-US" dirty="0"/>
+              <a:t> element is a </a:t>
+            </a:r>
+            <a:r>
+              <a:rPr lang="en-US" i="1" dirty="0"/>
+              <a:t>child</a:t>
+            </a:r>
+            <a:r>
+              <a:rPr lang="en-US" dirty="0"/>
+              <a:t> of the </a:t>
+            </a:r>
+            <a:r>
+              <a:rPr lang="en-US" b="1" dirty="0">
+                <a:solidFill>
+                  <a:srgbClr val="FFB71B"/>
+                </a:solidFill>
+                <a:latin typeface="Consolas" panose="020B0609020204030204" pitchFamily="49" charset="0"/>
+              </a:rPr>
+              <a:t>&lt;head&gt;&lt;/head&gt;</a:t>
+            </a:r>
+            <a:r>
+              <a:rPr lang="en-US" dirty="0"/>
+              <a:t> element</a:t>
             </a:r>
           </a:p>
         </p:txBody>
       </p:sp>
       <p:pic>
         <p:nvPicPr>
-          <p:cNvPr id="1026" name="Picture 2" descr="File Manager: Download a Free Trial of WinZip">
+          <p:cNvPr id="3" name="Picture 2" descr="The saying 'Alas, poor Yorick! I knew him, Horatio' - meaning and origin.">
             <a:extLst>
               <a:ext uri="{FF2B5EF4-FFF2-40B4-BE49-F238E27FC236}">
-                <a16:creationId xmlns:a16="http://schemas.microsoft.com/office/drawing/2014/main" id="{8D89EA5D-538D-4544-BA34-92AC5BBC859E}"/>
+                <a16:creationId xmlns:a16="http://schemas.microsoft.com/office/drawing/2014/main" id="{748A4E57-B80E-4ACA-9AC7-66D578E3E66B}"/>
               </a:ext>
             </a:extLst>
           </p:cNvPr>
@@ -40697,13 +41367,60 @@
               </a:ext>
             </a:extLst>
           </a:blip>
-          <a:srcRect l="12296" r="8276"/>
+          <a:srcRect t="-1" b="33515"/>
           <a:stretch/>
         </p:blipFill>
         <p:spPr bwMode="auto">
           <a:xfrm>
-            <a:off x="7353300" y="2057400"/>
-            <a:ext cx="4229101" cy="2835983"/>
+            <a:off x="5511902" y="1374425"/>
+            <a:ext cx="2924175" cy="2387457"/>
+          </a:xfrm>
+          <a:prstGeom prst="rect">
+            <a:avLst/>
+          </a:prstGeom>
+          <a:noFill/>
+          <a:extLst>
+            <a:ext uri="{909E8E84-426E-40DD-AFC4-6F175D3DCCD1}">
+              <a14:hiddenFill xmlns:a14="http://schemas.microsoft.com/office/drawing/2010/main">
+                <a:solidFill>
+                  <a:srgbClr val="FFFFFF"/>
+                </a:solidFill>
+              </a14:hiddenFill>
+            </a:ext>
+          </a:extLst>
+        </p:spPr>
+      </p:pic>
+      <p:pic>
+        <p:nvPicPr>
+          <p:cNvPr id="1028" name="Picture 4" descr="Matryoshka - Montessori Services">
+            <a:extLst>
+              <a:ext uri="{FF2B5EF4-FFF2-40B4-BE49-F238E27FC236}">
+                <a16:creationId xmlns:a16="http://schemas.microsoft.com/office/drawing/2014/main" id="{324B8F4F-CA5A-41D3-8E74-DCFEFDB1A3CC}"/>
+              </a:ext>
+            </a:extLst>
+          </p:cNvPr>
+          <p:cNvPicPr>
+            <a:picLocks noChangeAspect="1" noChangeArrowheads="1"/>
+          </p:cNvPicPr>
+          <p:nvPr/>
+        </p:nvPicPr>
+        <p:blipFill>
+          <a:blip r:embed="rId4">
+            <a:extLst>
+              <a:ext uri="{28A0092B-C50C-407E-A947-70E740481C1C}">
+                <a14:useLocalDpi xmlns:a14="http://schemas.microsoft.com/office/drawing/2010/main" val="0"/>
+              </a:ext>
+            </a:extLst>
+          </a:blip>
+          <a:srcRect/>
+          <a:stretch>
+            <a:fillRect/>
+          </a:stretch>
+        </p:blipFill>
+        <p:spPr bwMode="auto">
+          <a:xfrm>
+            <a:off x="8724900" y="1207983"/>
+            <a:ext cx="2514600" cy="2514600"/>
           </a:xfrm>
           <a:prstGeom prst="rect">
             <a:avLst/>
@@ -40724,299 +41441,6 @@
     <p:extLst>
       <p:ext uri="{BB962C8B-B14F-4D97-AF65-F5344CB8AC3E}">
         <p14:creationId xmlns:p14="http://schemas.microsoft.com/office/powerpoint/2010/main" val="969036985"/>
-      </p:ext>
-    </p:extLst>
-  </p:cSld>
-  <p:clrMapOvr>
-    <a:masterClrMapping/>
-  </p:clrMapOvr>
-  <p:transition>
-    <p:fade/>
-  </p:transition>
-</p:sld>
-</file>
-
-<file path=ppt/slides/slide4.xml><?xml version="1.0" encoding="utf-8"?>
-<p:sld xmlns:a="http://schemas.openxmlformats.org/drawingml/2006/main" xmlns:r="http://schemas.openxmlformats.org/officeDocument/2006/relationships" xmlns:p="http://schemas.openxmlformats.org/presentationml/2006/main">
-  <p:cSld>
-    <p:spTree>
-      <p:nvGrpSpPr>
-        <p:cNvPr id="1" name=""/>
-        <p:cNvGrpSpPr/>
-        <p:nvPr/>
-      </p:nvGrpSpPr>
-      <p:grpSpPr>
-        <a:xfrm>
-          <a:off x="0" y="0"/>
-          <a:ext cx="0" cy="0"/>
-          <a:chOff x="0" y="0"/>
-          <a:chExt cx="0" cy="0"/>
-        </a:xfrm>
-      </p:grpSpPr>
-      <p:sp>
-        <p:nvSpPr>
-          <p:cNvPr id="2" name="Title 1"/>
-          <p:cNvSpPr>
-            <a:spLocks noGrp="1"/>
-          </p:cNvSpPr>
-          <p:nvPr>
-            <p:ph type="title"/>
-          </p:nvPr>
-        </p:nvSpPr>
-        <p:spPr/>
-        <p:txBody>
-          <a:bodyPr/>
-          <a:lstStyle/>
-          <a:p>
-            <a:r>
-              <a:rPr lang="en-US" dirty="0"/>
-              <a:t>the </a:t>
-            </a:r>
-            <a:r>
-              <a:rPr lang="en-US" cap="none" dirty="0">
-                <a:solidFill>
-                  <a:schemeClr val="accent1">
-                    <a:lumMod val="20000"/>
-                    <a:lumOff val="80000"/>
-                  </a:schemeClr>
-                </a:solidFill>
-                <a:latin typeface="Consolas" panose="020B0609020204030204" pitchFamily="49" charset="0"/>
-              </a:rPr>
-              <a:t>link</a:t>
-            </a:r>
-            <a:r>
-              <a:rPr lang="en-US" dirty="0"/>
-              <a:t> element</a:t>
-            </a:r>
-          </a:p>
-        </p:txBody>
-      </p:sp>
-      <p:sp>
-        <p:nvSpPr>
-          <p:cNvPr id="3" name="Content Placeholder 2"/>
-          <p:cNvSpPr>
-            <a:spLocks noGrp="1"/>
-          </p:cNvSpPr>
-          <p:nvPr>
-            <p:ph idx="1"/>
-          </p:nvPr>
-        </p:nvSpPr>
-        <p:spPr/>
-        <p:txBody>
-          <a:bodyPr>
-            <a:normAutofit/>
-          </a:bodyPr>
-          <a:lstStyle/>
-          <a:p>
-            <a:r>
-              <a:rPr lang="en-US" i="1" dirty="0"/>
-              <a:t>Different from the </a:t>
-            </a:r>
-            <a:r>
-              <a:rPr lang="en-US" b="1" i="1" dirty="0">
-                <a:solidFill>
-                  <a:schemeClr val="accent1">
-                    <a:lumMod val="50000"/>
-                  </a:schemeClr>
-                </a:solidFill>
-                <a:latin typeface="Consolas" panose="020B0609020204030204" pitchFamily="49" charset="0"/>
-              </a:rPr>
-              <a:t>&lt;a&gt;</a:t>
-            </a:r>
-            <a:r>
-              <a:rPr lang="en-US" i="1" dirty="0"/>
-              <a:t> hyperlink element</a:t>
-            </a:r>
-          </a:p>
-          <a:p>
-            <a:r>
-              <a:rPr lang="en-US" dirty="0"/>
-              <a:t>Links a variety of external files (CSS, fonts, icons)</a:t>
-            </a:r>
-          </a:p>
-          <a:p>
-            <a:r>
-              <a:rPr lang="en-US" dirty="0"/>
-              <a:t>It is a </a:t>
-            </a:r>
-            <a:r>
-              <a:rPr lang="en-US" i="1" dirty="0"/>
-              <a:t>self-closing</a:t>
-            </a:r>
-            <a:r>
-              <a:rPr lang="en-US" dirty="0"/>
-              <a:t> tag</a:t>
-            </a:r>
-          </a:p>
-          <a:p>
-            <a:r>
-              <a:rPr lang="en-US" dirty="0"/>
-              <a:t>It goes within the </a:t>
-            </a:r>
-            <a:r>
-              <a:rPr lang="en-US" sz="3200" dirty="0">
-                <a:solidFill>
-                  <a:schemeClr val="accent1">
-                    <a:lumMod val="50000"/>
-                  </a:schemeClr>
-                </a:solidFill>
-                <a:latin typeface="Consolas" panose="020B0609020204030204" pitchFamily="49" charset="0"/>
-              </a:rPr>
-              <a:t>&lt;head&gt;&lt;/head&gt;</a:t>
-            </a:r>
-            <a:r>
-              <a:rPr lang="en-US" dirty="0"/>
-              <a:t> element</a:t>
-            </a:r>
-          </a:p>
-          <a:p>
-            <a:endParaRPr lang="en-US" dirty="0"/>
-          </a:p>
-          <a:p>
-            <a:r>
-              <a:rPr lang="en-US" dirty="0"/>
-              <a:t>Important attributes:</a:t>
-            </a:r>
-          </a:p>
-          <a:p>
-            <a:pPr lvl="1"/>
-            <a:r>
-              <a:rPr lang="en-US" u="sng" dirty="0" err="1">
-                <a:solidFill>
-                  <a:schemeClr val="accent1">
-                    <a:lumMod val="50000"/>
-                  </a:schemeClr>
-                </a:solidFill>
-                <a:latin typeface="Consolas" panose="020B0609020204030204" pitchFamily="49" charset="0"/>
-              </a:rPr>
-              <a:t>href</a:t>
-            </a:r>
-            <a:r>
-              <a:rPr lang="en-US" dirty="0"/>
-              <a:t>: path to the file (either online or local)</a:t>
-            </a:r>
-          </a:p>
-          <a:p>
-            <a:pPr lvl="1"/>
-            <a:r>
-              <a:rPr lang="en-US" u="sng" dirty="0" err="1">
-                <a:solidFill>
-                  <a:schemeClr val="accent1">
-                    <a:lumMod val="50000"/>
-                  </a:schemeClr>
-                </a:solidFill>
-                <a:latin typeface="Consolas" panose="020B0609020204030204" pitchFamily="49" charset="0"/>
-              </a:rPr>
-              <a:t>rel</a:t>
-            </a:r>
-            <a:r>
-              <a:rPr lang="en-US" dirty="0"/>
-              <a:t>: determines the relationship type (e.g., “</a:t>
-            </a:r>
-            <a:r>
-              <a:rPr lang="en-US" dirty="0">
-                <a:solidFill>
-                  <a:schemeClr val="accent1">
-                    <a:lumMod val="50000"/>
-                  </a:schemeClr>
-                </a:solidFill>
-              </a:rPr>
-              <a:t>stylesheet</a:t>
-            </a:r>
-            <a:r>
-              <a:rPr lang="en-US" dirty="0"/>
-              <a:t>”)</a:t>
-            </a:r>
-          </a:p>
-          <a:p>
-            <a:pPr lvl="1"/>
-            <a:r>
-              <a:rPr lang="en-US" u="sng" dirty="0">
-                <a:solidFill>
-                  <a:schemeClr val="accent1">
-                    <a:lumMod val="50000"/>
-                  </a:schemeClr>
-                </a:solidFill>
-                <a:latin typeface="Consolas" panose="020B0609020204030204" pitchFamily="49" charset="0"/>
-              </a:rPr>
-              <a:t>type</a:t>
-            </a:r>
-            <a:r>
-              <a:rPr lang="en-US" dirty="0"/>
-              <a:t>: specifies the content type of the file (e.g., “</a:t>
-            </a:r>
-            <a:r>
-              <a:rPr lang="en-US" dirty="0">
-                <a:solidFill>
-                  <a:schemeClr val="accent1">
-                    <a:lumMod val="50000"/>
-                  </a:schemeClr>
-                </a:solidFill>
-              </a:rPr>
-              <a:t>text/</a:t>
-            </a:r>
-            <a:r>
-              <a:rPr lang="en-US" dirty="0" err="1">
-                <a:solidFill>
-                  <a:schemeClr val="accent1">
-                    <a:lumMod val="50000"/>
-                  </a:schemeClr>
-                </a:solidFill>
-              </a:rPr>
-              <a:t>css</a:t>
-            </a:r>
-            <a:r>
-              <a:rPr lang="en-US" dirty="0"/>
-              <a:t>”)</a:t>
-            </a:r>
-          </a:p>
-        </p:txBody>
-      </p:sp>
-      <p:pic>
-        <p:nvPicPr>
-          <p:cNvPr id="2050" name="Picture 2" descr="Image result for link"/>
-          <p:cNvPicPr>
-            <a:picLocks noChangeAspect="1" noChangeArrowheads="1"/>
-          </p:cNvPicPr>
-          <p:nvPr/>
-        </p:nvPicPr>
-        <p:blipFill>
-          <a:blip r:embed="rId3">
-            <a:extLst>
-              <a:ext uri="{28A0092B-C50C-407E-A947-70E740481C1C}">
-                <a14:useLocalDpi xmlns:a14="http://schemas.microsoft.com/office/drawing/2010/main" val="0"/>
-              </a:ext>
-            </a:extLst>
-          </a:blip>
-          <a:srcRect/>
-          <a:stretch>
-            <a:fillRect/>
-          </a:stretch>
-        </p:blipFill>
-        <p:spPr bwMode="auto">
-          <a:xfrm>
-            <a:off x="8603416" y="1828800"/>
-            <a:ext cx="3207584" cy="3200400"/>
-          </a:xfrm>
-          <a:prstGeom prst="rect">
-            <a:avLst/>
-          </a:prstGeom>
-          <a:noFill/>
-          <a:extLst>
-            <a:ext uri="{909E8E84-426E-40DD-AFC4-6F175D3DCCD1}">
-              <a14:hiddenFill xmlns:a14="http://schemas.microsoft.com/office/drawing/2010/main">
-                <a:solidFill>
-                  <a:srgbClr val="FFFFFF"/>
-                </a:solidFill>
-              </a14:hiddenFill>
-            </a:ext>
-          </a:extLst>
-        </p:spPr>
-      </p:pic>
-    </p:spTree>
-    <p:extLst>
-      <p:ext uri="{BB962C8B-B14F-4D97-AF65-F5344CB8AC3E}">
-        <p14:creationId xmlns:p14="http://schemas.microsoft.com/office/powerpoint/2010/main" val="2192436492"/>
       </p:ext>
     </p:extLst>
   </p:cSld>
@@ -41060,7 +41484,55 @@
                                           </p:stCondLst>
                                         </p:cTn>
                                         <p:tgtEl>
-                                          <p:spTgt spid="3">
+                                          <p:spTgt spid="6">
+                                            <p:bg/>
+                                          </p:spTgt>
+                                        </p:tgtEl>
+                                        <p:attrNameLst>
+                                          <p:attrName>style.visibility</p:attrName>
+                                        </p:attrNameLst>
+                                      </p:cBhvr>
+                                      <p:to>
+                                        <p:strVal val="visible"/>
+                                      </p:to>
+                                    </p:set>
+                                    <p:animEffect transition="in" filter="fade">
+                                      <p:cBhvr>
+                                        <p:cTn id="7" dur="500"/>
+                                        <p:tgtEl>
+                                          <p:spTgt spid="6">
+                                            <p:bg/>
+                                          </p:spTgt>
+                                        </p:tgtEl>
+                                      </p:cBhvr>
+                                    </p:animEffect>
+                                  </p:childTnLst>
+                                </p:cTn>
+                              </p:par>
+                            </p:childTnLst>
+                          </p:cTn>
+                        </p:par>
+                        <p:par>
+                          <p:cTn id="8" fill="hold">
+                            <p:stCondLst>
+                              <p:cond delay="500"/>
+                            </p:stCondLst>
+                            <p:childTnLst>
+                              <p:par>
+                                <p:cTn id="9" presetID="10" presetClass="entr" presetSubtype="0" fill="hold" grpId="0" nodeType="afterEffect">
+                                  <p:stCondLst>
+                                    <p:cond delay="0"/>
+                                  </p:stCondLst>
+                                  <p:childTnLst>
+                                    <p:set>
+                                      <p:cBhvr>
+                                        <p:cTn id="10" dur="1" fill="hold">
+                                          <p:stCondLst>
+                                            <p:cond delay="0"/>
+                                          </p:stCondLst>
+                                        </p:cTn>
+                                        <p:tgtEl>
+                                          <p:spTgt spid="6">
                                             <p:txEl>
                                               <p:pRg st="0" end="0"/>
                                             </p:txEl>
@@ -41076,9 +41548,346 @@
                                     </p:set>
                                     <p:animEffect transition="in" filter="fade">
                                       <p:cBhvr>
-                                        <p:cTn id="7" dur="500"/>
+                                        <p:cTn id="11" dur="500"/>
                                         <p:tgtEl>
-                                          <p:spTgt spid="3">
+                                          <p:spTgt spid="6">
+                                            <p:txEl>
+                                              <p:pRg st="0" end="0"/>
+                                            </p:txEl>
+                                          </p:spTgt>
+                                        </p:tgtEl>
+                                      </p:cBhvr>
+                                    </p:animEffect>
+                                  </p:childTnLst>
+                                </p:cTn>
+                              </p:par>
+                              <p:par>
+                                <p:cTn id="12" presetID="10" presetClass="entr" presetSubtype="0" fill="hold" grpId="0" nodeType="withEffect">
+                                  <p:stCondLst>
+                                    <p:cond delay="0"/>
+                                  </p:stCondLst>
+                                  <p:childTnLst>
+                                    <p:set>
+                                      <p:cBhvr>
+                                        <p:cTn id="13" dur="1" fill="hold">
+                                          <p:stCondLst>
+                                            <p:cond delay="0"/>
+                                          </p:stCondLst>
+                                        </p:cTn>
+                                        <p:tgtEl>
+                                          <p:spTgt spid="6">
+                                            <p:txEl>
+                                              <p:pRg st="9" end="9"/>
+                                            </p:txEl>
+                                          </p:spTgt>
+                                        </p:tgtEl>
+                                        <p:attrNameLst>
+                                          <p:attrName>style.visibility</p:attrName>
+                                        </p:attrNameLst>
+                                      </p:cBhvr>
+                                      <p:to>
+                                        <p:strVal val="visible"/>
+                                      </p:to>
+                                    </p:set>
+                                    <p:animEffect transition="in" filter="fade">
+                                      <p:cBhvr>
+                                        <p:cTn id="14" dur="500"/>
+                                        <p:tgtEl>
+                                          <p:spTgt spid="6">
+                                            <p:txEl>
+                                              <p:pRg st="9" end="9"/>
+                                            </p:txEl>
+                                          </p:spTgt>
+                                        </p:tgtEl>
+                                      </p:cBhvr>
+                                    </p:animEffect>
+                                  </p:childTnLst>
+                                </p:cTn>
+                              </p:par>
+                            </p:childTnLst>
+                          </p:cTn>
+                        </p:par>
+                        <p:par>
+                          <p:cTn id="15" fill="hold">
+                            <p:stCondLst>
+                              <p:cond delay="1000"/>
+                            </p:stCondLst>
+                            <p:childTnLst>
+                              <p:par>
+                                <p:cTn id="16" presetID="10" presetClass="entr" presetSubtype="0" fill="hold" grpId="0" nodeType="afterEffect">
+                                  <p:stCondLst>
+                                    <p:cond delay="0"/>
+                                  </p:stCondLst>
+                                  <p:childTnLst>
+                                    <p:set>
+                                      <p:cBhvr>
+                                        <p:cTn id="17" dur="1" fill="hold">
+                                          <p:stCondLst>
+                                            <p:cond delay="0"/>
+                                          </p:stCondLst>
+                                        </p:cTn>
+                                        <p:tgtEl>
+                                          <p:spTgt spid="6">
+                                            <p:txEl>
+                                              <p:pRg st="6" end="6"/>
+                                            </p:txEl>
+                                          </p:spTgt>
+                                        </p:tgtEl>
+                                        <p:attrNameLst>
+                                          <p:attrName>style.visibility</p:attrName>
+                                        </p:attrNameLst>
+                                      </p:cBhvr>
+                                      <p:to>
+                                        <p:strVal val="visible"/>
+                                      </p:to>
+                                    </p:set>
+                                    <p:animEffect transition="in" filter="fade">
+                                      <p:cBhvr>
+                                        <p:cTn id="18" dur="500"/>
+                                        <p:tgtEl>
+                                          <p:spTgt spid="6">
+                                            <p:txEl>
+                                              <p:pRg st="6" end="6"/>
+                                            </p:txEl>
+                                          </p:spTgt>
+                                        </p:tgtEl>
+                                      </p:cBhvr>
+                                    </p:animEffect>
+                                  </p:childTnLst>
+                                </p:cTn>
+                              </p:par>
+                              <p:par>
+                                <p:cTn id="19" presetID="10" presetClass="entr" presetSubtype="0" fill="hold" grpId="0" nodeType="withEffect">
+                                  <p:stCondLst>
+                                    <p:cond delay="0"/>
+                                  </p:stCondLst>
+                                  <p:childTnLst>
+                                    <p:set>
+                                      <p:cBhvr>
+                                        <p:cTn id="20" dur="1" fill="hold">
+                                          <p:stCondLst>
+                                            <p:cond delay="0"/>
+                                          </p:stCondLst>
+                                        </p:cTn>
+                                        <p:tgtEl>
+                                          <p:spTgt spid="6">
+                                            <p:txEl>
+                                              <p:pRg st="8" end="8"/>
+                                            </p:txEl>
+                                          </p:spTgt>
+                                        </p:tgtEl>
+                                        <p:attrNameLst>
+                                          <p:attrName>style.visibility</p:attrName>
+                                        </p:attrNameLst>
+                                      </p:cBhvr>
+                                      <p:to>
+                                        <p:strVal val="visible"/>
+                                      </p:to>
+                                    </p:set>
+                                    <p:animEffect transition="in" filter="fade">
+                                      <p:cBhvr>
+                                        <p:cTn id="21" dur="500"/>
+                                        <p:tgtEl>
+                                          <p:spTgt spid="6">
+                                            <p:txEl>
+                                              <p:pRg st="8" end="8"/>
+                                            </p:txEl>
+                                          </p:spTgt>
+                                        </p:tgtEl>
+                                      </p:cBhvr>
+                                    </p:animEffect>
+                                  </p:childTnLst>
+                                </p:cTn>
+                              </p:par>
+                            </p:childTnLst>
+                          </p:cTn>
+                        </p:par>
+                        <p:par>
+                          <p:cTn id="22" fill="hold">
+                            <p:stCondLst>
+                              <p:cond delay="1500"/>
+                            </p:stCondLst>
+                            <p:childTnLst>
+                              <p:par>
+                                <p:cTn id="23" presetID="10" presetClass="entr" presetSubtype="0" fill="hold" grpId="0" nodeType="afterEffect">
+                                  <p:stCondLst>
+                                    <p:cond delay="0"/>
+                                  </p:stCondLst>
+                                  <p:childTnLst>
+                                    <p:set>
+                                      <p:cBhvr>
+                                        <p:cTn id="24" dur="1" fill="hold">
+                                          <p:stCondLst>
+                                            <p:cond delay="0"/>
+                                          </p:stCondLst>
+                                        </p:cTn>
+                                        <p:tgtEl>
+                                          <p:spTgt spid="6">
+                                            <p:txEl>
+                                              <p:pRg st="7" end="7"/>
+                                            </p:txEl>
+                                          </p:spTgt>
+                                        </p:tgtEl>
+                                        <p:attrNameLst>
+                                          <p:attrName>style.visibility</p:attrName>
+                                        </p:attrNameLst>
+                                      </p:cBhvr>
+                                      <p:to>
+                                        <p:strVal val="visible"/>
+                                      </p:to>
+                                    </p:set>
+                                    <p:animEffect transition="in" filter="fade">
+                                      <p:cBhvr>
+                                        <p:cTn id="25" dur="500"/>
+                                        <p:tgtEl>
+                                          <p:spTgt spid="6">
+                                            <p:txEl>
+                                              <p:pRg st="7" end="7"/>
+                                            </p:txEl>
+                                          </p:spTgt>
+                                        </p:tgtEl>
+                                      </p:cBhvr>
+                                    </p:animEffect>
+                                  </p:childTnLst>
+                                </p:cTn>
+                              </p:par>
+                            </p:childTnLst>
+                          </p:cTn>
+                        </p:par>
+                      </p:childTnLst>
+                    </p:cTn>
+                  </p:par>
+                  <p:par>
+                    <p:cTn id="26" fill="hold">
+                      <p:stCondLst>
+                        <p:cond delay="indefinite"/>
+                      </p:stCondLst>
+                      <p:childTnLst>
+                        <p:par>
+                          <p:cTn id="27" fill="hold">
+                            <p:stCondLst>
+                              <p:cond delay="0"/>
+                            </p:stCondLst>
+                            <p:childTnLst>
+                              <p:par>
+                                <p:cTn id="28" presetID="10" presetClass="entr" presetSubtype="0" fill="hold" grpId="0" nodeType="clickEffect">
+                                  <p:stCondLst>
+                                    <p:cond delay="0"/>
+                                  </p:stCondLst>
+                                  <p:childTnLst>
+                                    <p:set>
+                                      <p:cBhvr>
+                                        <p:cTn id="29" dur="1" fill="hold">
+                                          <p:stCondLst>
+                                            <p:cond delay="0"/>
+                                          </p:stCondLst>
+                                        </p:cTn>
+                                        <p:tgtEl>
+                                          <p:spTgt spid="6">
+                                            <p:txEl>
+                                              <p:pRg st="1" end="1"/>
+                                            </p:txEl>
+                                          </p:spTgt>
+                                        </p:tgtEl>
+                                        <p:attrNameLst>
+                                          <p:attrName>style.visibility</p:attrName>
+                                        </p:attrNameLst>
+                                      </p:cBhvr>
+                                      <p:to>
+                                        <p:strVal val="visible"/>
+                                      </p:to>
+                                    </p:set>
+                                    <p:animEffect transition="in" filter="fade">
+                                      <p:cBhvr>
+                                        <p:cTn id="30" dur="500"/>
+                                        <p:tgtEl>
+                                          <p:spTgt spid="6">
+                                            <p:txEl>
+                                              <p:pRg st="1" end="1"/>
+                                            </p:txEl>
+                                          </p:spTgt>
+                                        </p:tgtEl>
+                                      </p:cBhvr>
+                                    </p:animEffect>
+                                  </p:childTnLst>
+                                </p:cTn>
+                              </p:par>
+                              <p:par>
+                                <p:cTn id="31" presetID="10" presetClass="entr" presetSubtype="0" fill="hold" grpId="0" nodeType="withEffect">
+                                  <p:stCondLst>
+                                    <p:cond delay="0"/>
+                                  </p:stCondLst>
+                                  <p:childTnLst>
+                                    <p:set>
+                                      <p:cBhvr>
+                                        <p:cTn id="32" dur="1" fill="hold">
+                                          <p:stCondLst>
+                                            <p:cond delay="0"/>
+                                          </p:stCondLst>
+                                        </p:cTn>
+                                        <p:tgtEl>
+                                          <p:spTgt spid="6">
+                                            <p:txEl>
+                                              <p:pRg st="5" end="5"/>
+                                            </p:txEl>
+                                          </p:spTgt>
+                                        </p:tgtEl>
+                                        <p:attrNameLst>
+                                          <p:attrName>style.visibility</p:attrName>
+                                        </p:attrNameLst>
+                                      </p:cBhvr>
+                                      <p:to>
+                                        <p:strVal val="visible"/>
+                                      </p:to>
+                                    </p:set>
+                                    <p:animEffect transition="in" filter="fade">
+                                      <p:cBhvr>
+                                        <p:cTn id="33" dur="500"/>
+                                        <p:tgtEl>
+                                          <p:spTgt spid="6">
+                                            <p:txEl>
+                                              <p:pRg st="5" end="5"/>
+                                            </p:txEl>
+                                          </p:spTgt>
+                                        </p:tgtEl>
+                                      </p:cBhvr>
+                                    </p:animEffect>
+                                  </p:childTnLst>
+                                </p:cTn>
+                              </p:par>
+                              <p:par>
+                                <p:cTn id="34" presetID="10" presetClass="entr" presetSubtype="0" fill="hold" grpId="0" nodeType="withEffect">
+                                  <p:stCondLst>
+                                    <p:cond delay="0"/>
+                                  </p:stCondLst>
+                                  <p:childTnLst>
+                                    <p:set>
+                                      <p:cBhvr>
+                                        <p:cTn id="35" dur="1" fill="hold">
+                                          <p:stCondLst>
+                                            <p:cond delay="0"/>
+                                          </p:stCondLst>
+                                        </p:cTn>
+                                        <p:tgtEl>
+                                          <p:spTgt spid="5">
+                                            <p:txEl>
+                                              <p:pRg st="0" end="0"/>
+                                            </p:txEl>
+                                          </p:spTgt>
+                                        </p:tgtEl>
+                                        <p:attrNameLst>
+                                          <p:attrName>style.visibility</p:attrName>
+                                        </p:attrNameLst>
+                                      </p:cBhvr>
+                                      <p:to>
+                                        <p:strVal val="visible"/>
+                                      </p:to>
+                                    </p:set>
+                                    <p:animEffect transition="in" filter="fade">
+                                      <p:cBhvr>
+                                        <p:cTn id="36" dur="500"/>
+                                        <p:tgtEl>
+                                          <p:spTgt spid="5">
                                             <p:txEl>
                                               <p:pRg st="0" end="0"/>
                                             </p:txEl>
@@ -41096,32 +41905,118 @@
                     </p:cTn>
                   </p:par>
                   <p:par>
-                    <p:cTn id="8" fill="hold">
+                    <p:cTn id="37" fill="hold">
                       <p:stCondLst>
                         <p:cond delay="indefinite"/>
                       </p:stCondLst>
                       <p:childTnLst>
                         <p:par>
-                          <p:cTn id="9" fill="hold">
+                          <p:cTn id="38" fill="hold">
                             <p:stCondLst>
                               <p:cond delay="0"/>
                             </p:stCondLst>
                             <p:childTnLst>
                               <p:par>
-                                <p:cTn id="10" presetID="10" presetClass="entr" presetSubtype="0" fill="hold" grpId="0" nodeType="clickEffect">
+                                <p:cTn id="39" presetID="10" presetClass="entr" presetSubtype="0" fill="hold" grpId="0" nodeType="clickEffect">
                                   <p:stCondLst>
                                     <p:cond delay="0"/>
                                   </p:stCondLst>
                                   <p:childTnLst>
                                     <p:set>
                                       <p:cBhvr>
-                                        <p:cTn id="11" dur="1" fill="hold">
+                                        <p:cTn id="40" dur="1" fill="hold">
                                           <p:stCondLst>
                                             <p:cond delay="0"/>
                                           </p:stCondLst>
                                         </p:cTn>
                                         <p:tgtEl>
-                                          <p:spTgt spid="3">
+                                          <p:spTgt spid="6">
+                                            <p:txEl>
+                                              <p:pRg st="2" end="2"/>
+                                            </p:txEl>
+                                          </p:spTgt>
+                                        </p:tgtEl>
+                                        <p:attrNameLst>
+                                          <p:attrName>style.visibility</p:attrName>
+                                        </p:attrNameLst>
+                                      </p:cBhvr>
+                                      <p:to>
+                                        <p:strVal val="visible"/>
+                                      </p:to>
+                                    </p:set>
+                                    <p:animEffect transition="in" filter="fade">
+                                      <p:cBhvr>
+                                        <p:cTn id="41" dur="500"/>
+                                        <p:tgtEl>
+                                          <p:spTgt spid="6">
+                                            <p:txEl>
+                                              <p:pRg st="2" end="2"/>
+                                            </p:txEl>
+                                          </p:spTgt>
+                                        </p:tgtEl>
+                                      </p:cBhvr>
+                                    </p:animEffect>
+                                  </p:childTnLst>
+                                </p:cTn>
+                              </p:par>
+                              <p:par>
+                                <p:cTn id="42" presetID="10" presetClass="entr" presetSubtype="0" fill="hold" grpId="0" nodeType="withEffect">
+                                  <p:stCondLst>
+                                    <p:cond delay="0"/>
+                                  </p:stCondLst>
+                                  <p:childTnLst>
+                                    <p:set>
+                                      <p:cBhvr>
+                                        <p:cTn id="43" dur="1" fill="hold">
+                                          <p:stCondLst>
+                                            <p:cond delay="0"/>
+                                          </p:stCondLst>
+                                        </p:cTn>
+                                        <p:tgtEl>
+                                          <p:spTgt spid="6">
+                                            <p:txEl>
+                                              <p:pRg st="4" end="4"/>
+                                            </p:txEl>
+                                          </p:spTgt>
+                                        </p:tgtEl>
+                                        <p:attrNameLst>
+                                          <p:attrName>style.visibility</p:attrName>
+                                        </p:attrNameLst>
+                                      </p:cBhvr>
+                                      <p:to>
+                                        <p:strVal val="visible"/>
+                                      </p:to>
+                                    </p:set>
+                                    <p:animEffect transition="in" filter="fade">
+                                      <p:cBhvr>
+                                        <p:cTn id="44" dur="500"/>
+                                        <p:tgtEl>
+                                          <p:spTgt spid="6">
+                                            <p:txEl>
+                                              <p:pRg st="4" end="4"/>
+                                            </p:txEl>
+                                          </p:spTgt>
+                                        </p:tgtEl>
+                                      </p:cBhvr>
+                                    </p:animEffect>
+                                  </p:childTnLst>
+                                </p:cTn>
+                              </p:par>
+                              <p:par>
+                                <p:cTn id="45" presetID="10" presetClass="entr" presetSubtype="0" fill="hold" grpId="0" nodeType="withEffect">
+                                  <p:stCondLst>
+                                    <p:cond delay="0"/>
+                                  </p:stCondLst>
+                                  <p:childTnLst>
+                                    <p:set>
+                                      <p:cBhvr>
+                                        <p:cTn id="46" dur="1" fill="hold">
+                                          <p:stCondLst>
+                                            <p:cond delay="0"/>
+                                          </p:stCondLst>
+                                        </p:cTn>
+                                        <p:tgtEl>
+                                          <p:spTgt spid="5">
                                             <p:txEl>
                                               <p:pRg st="1" end="1"/>
                                             </p:txEl>
@@ -41137,9 +42032,9 @@
                                     </p:set>
                                     <p:animEffect transition="in" filter="fade">
                                       <p:cBhvr>
-                                        <p:cTn id="12" dur="500"/>
+                                        <p:cTn id="47" dur="500"/>
                                         <p:tgtEl>
-                                          <p:spTgt spid="3">
+                                          <p:spTgt spid="5">
                                             <p:txEl>
                                               <p:pRg st="1" end="1"/>
                                             </p:txEl>
@@ -41157,93 +42052,32 @@
                     </p:cTn>
                   </p:par>
                   <p:par>
-                    <p:cTn id="13" fill="hold">
+                    <p:cTn id="48" fill="hold">
                       <p:stCondLst>
                         <p:cond delay="indefinite"/>
                       </p:stCondLst>
                       <p:childTnLst>
                         <p:par>
-                          <p:cTn id="14" fill="hold">
+                          <p:cTn id="49" fill="hold">
                             <p:stCondLst>
                               <p:cond delay="0"/>
                             </p:stCondLst>
                             <p:childTnLst>
                               <p:par>
-                                <p:cTn id="15" presetID="10" presetClass="entr" presetSubtype="0" fill="hold" grpId="0" nodeType="clickEffect">
+                                <p:cTn id="50" presetID="10" presetClass="entr" presetSubtype="0" fill="hold" grpId="0" nodeType="clickEffect">
                                   <p:stCondLst>
                                     <p:cond delay="0"/>
                                   </p:stCondLst>
                                   <p:childTnLst>
                                     <p:set>
                                       <p:cBhvr>
-                                        <p:cTn id="16" dur="1" fill="hold">
+                                        <p:cTn id="51" dur="1" fill="hold">
                                           <p:stCondLst>
                                             <p:cond delay="0"/>
                                           </p:stCondLst>
                                         </p:cTn>
                                         <p:tgtEl>
-                                          <p:spTgt spid="3">
-                                            <p:txEl>
-                                              <p:pRg st="2" end="2"/>
-                                            </p:txEl>
-                                          </p:spTgt>
-                                        </p:tgtEl>
-                                        <p:attrNameLst>
-                                          <p:attrName>style.visibility</p:attrName>
-                                        </p:attrNameLst>
-                                      </p:cBhvr>
-                                      <p:to>
-                                        <p:strVal val="visible"/>
-                                      </p:to>
-                                    </p:set>
-                                    <p:animEffect transition="in" filter="fade">
-                                      <p:cBhvr>
-                                        <p:cTn id="17" dur="500"/>
-                                        <p:tgtEl>
-                                          <p:spTgt spid="3">
-                                            <p:txEl>
-                                              <p:pRg st="2" end="2"/>
-                                            </p:txEl>
-                                          </p:spTgt>
-                                        </p:tgtEl>
-                                      </p:cBhvr>
-                                    </p:animEffect>
-                                  </p:childTnLst>
-                                </p:cTn>
-                              </p:par>
-                            </p:childTnLst>
-                          </p:cTn>
-                        </p:par>
-                      </p:childTnLst>
-                    </p:cTn>
-                  </p:par>
-                  <p:par>
-                    <p:cTn id="18" fill="hold">
-                      <p:stCondLst>
-                        <p:cond delay="indefinite"/>
-                      </p:stCondLst>
-                      <p:childTnLst>
-                        <p:par>
-                          <p:cTn id="19" fill="hold">
-                            <p:stCondLst>
-                              <p:cond delay="0"/>
-                            </p:stCondLst>
-                            <p:childTnLst>
-                              <p:par>
-                                <p:cTn id="20" presetID="10" presetClass="entr" presetSubtype="0" fill="hold" grpId="0" nodeType="clickEffect">
-                                  <p:stCondLst>
-                                    <p:cond delay="0"/>
-                                  </p:stCondLst>
-                                  <p:childTnLst>
-                                    <p:set>
-                                      <p:cBhvr>
-                                        <p:cTn id="21" dur="1" fill="hold">
-                                          <p:stCondLst>
-                                            <p:cond delay="0"/>
-                                          </p:stCondLst>
-                                        </p:cTn>
-                                        <p:tgtEl>
-                                          <p:spTgt spid="3">
+                                          <p:spTgt spid="6">
                                             <p:txEl>
                                               <p:pRg st="3" end="3"/>
                                             </p:txEl>
@@ -41259,255 +42093,11 @@
                                     </p:set>
                                     <p:animEffect transition="in" filter="fade">
                                       <p:cBhvr>
-                                        <p:cTn id="22" dur="500"/>
+                                        <p:cTn id="52" dur="500"/>
                                         <p:tgtEl>
-                                          <p:spTgt spid="3">
+                                          <p:spTgt spid="6">
                                             <p:txEl>
                                               <p:pRg st="3" end="3"/>
-                                            </p:txEl>
-                                          </p:spTgt>
-                                        </p:tgtEl>
-                                      </p:cBhvr>
-                                    </p:animEffect>
-                                  </p:childTnLst>
-                                </p:cTn>
-                              </p:par>
-                            </p:childTnLst>
-                          </p:cTn>
-                        </p:par>
-                      </p:childTnLst>
-                    </p:cTn>
-                  </p:par>
-                  <p:par>
-                    <p:cTn id="23" fill="hold">
-                      <p:stCondLst>
-                        <p:cond delay="indefinite"/>
-                      </p:stCondLst>
-                      <p:childTnLst>
-                        <p:par>
-                          <p:cTn id="24" fill="hold">
-                            <p:stCondLst>
-                              <p:cond delay="0"/>
-                            </p:stCondLst>
-                            <p:childTnLst>
-                              <p:par>
-                                <p:cTn id="25" presetID="10" presetClass="entr" presetSubtype="0" fill="hold" grpId="0" nodeType="clickEffect">
-                                  <p:stCondLst>
-                                    <p:cond delay="0"/>
-                                  </p:stCondLst>
-                                  <p:childTnLst>
-                                    <p:set>
-                                      <p:cBhvr>
-                                        <p:cTn id="26" dur="1" fill="hold">
-                                          <p:stCondLst>
-                                            <p:cond delay="0"/>
-                                          </p:stCondLst>
-                                        </p:cTn>
-                                        <p:tgtEl>
-                                          <p:spTgt spid="3">
-                                            <p:txEl>
-                                              <p:pRg st="5" end="5"/>
-                                            </p:txEl>
-                                          </p:spTgt>
-                                        </p:tgtEl>
-                                        <p:attrNameLst>
-                                          <p:attrName>style.visibility</p:attrName>
-                                        </p:attrNameLst>
-                                      </p:cBhvr>
-                                      <p:to>
-                                        <p:strVal val="visible"/>
-                                      </p:to>
-                                    </p:set>
-                                    <p:animEffect transition="in" filter="fade">
-                                      <p:cBhvr>
-                                        <p:cTn id="27" dur="500"/>
-                                        <p:tgtEl>
-                                          <p:spTgt spid="3">
-                                            <p:txEl>
-                                              <p:pRg st="5" end="5"/>
-                                            </p:txEl>
-                                          </p:spTgt>
-                                        </p:tgtEl>
-                                      </p:cBhvr>
-                                    </p:animEffect>
-                                  </p:childTnLst>
-                                </p:cTn>
-                              </p:par>
-                            </p:childTnLst>
-                          </p:cTn>
-                        </p:par>
-                      </p:childTnLst>
-                    </p:cTn>
-                  </p:par>
-                  <p:par>
-                    <p:cTn id="28" fill="hold">
-                      <p:stCondLst>
-                        <p:cond delay="indefinite"/>
-                      </p:stCondLst>
-                      <p:childTnLst>
-                        <p:par>
-                          <p:cTn id="29" fill="hold">
-                            <p:stCondLst>
-                              <p:cond delay="0"/>
-                            </p:stCondLst>
-                            <p:childTnLst>
-                              <p:par>
-                                <p:cTn id="30" presetID="10" presetClass="entr" presetSubtype="0" fill="hold" grpId="0" nodeType="clickEffect">
-                                  <p:stCondLst>
-                                    <p:cond delay="0"/>
-                                  </p:stCondLst>
-                                  <p:childTnLst>
-                                    <p:set>
-                                      <p:cBhvr>
-                                        <p:cTn id="31" dur="1" fill="hold">
-                                          <p:stCondLst>
-                                            <p:cond delay="0"/>
-                                          </p:stCondLst>
-                                        </p:cTn>
-                                        <p:tgtEl>
-                                          <p:spTgt spid="3">
-                                            <p:txEl>
-                                              <p:pRg st="6" end="6"/>
-                                            </p:txEl>
-                                          </p:spTgt>
-                                        </p:tgtEl>
-                                        <p:attrNameLst>
-                                          <p:attrName>style.visibility</p:attrName>
-                                        </p:attrNameLst>
-                                      </p:cBhvr>
-                                      <p:to>
-                                        <p:strVal val="visible"/>
-                                      </p:to>
-                                    </p:set>
-                                    <p:animEffect transition="in" filter="fade">
-                                      <p:cBhvr>
-                                        <p:cTn id="32" dur="500"/>
-                                        <p:tgtEl>
-                                          <p:spTgt spid="3">
-                                            <p:txEl>
-                                              <p:pRg st="6" end="6"/>
-                                            </p:txEl>
-                                          </p:spTgt>
-                                        </p:tgtEl>
-                                      </p:cBhvr>
-                                    </p:animEffect>
-                                  </p:childTnLst>
-                                </p:cTn>
-                              </p:par>
-                            </p:childTnLst>
-                          </p:cTn>
-                        </p:par>
-                      </p:childTnLst>
-                    </p:cTn>
-                  </p:par>
-                  <p:par>
-                    <p:cTn id="33" fill="hold">
-                      <p:stCondLst>
-                        <p:cond delay="indefinite"/>
-                      </p:stCondLst>
-                      <p:childTnLst>
-                        <p:par>
-                          <p:cTn id="34" fill="hold">
-                            <p:stCondLst>
-                              <p:cond delay="0"/>
-                            </p:stCondLst>
-                            <p:childTnLst>
-                              <p:par>
-                                <p:cTn id="35" presetID="10" presetClass="entr" presetSubtype="0" fill="hold" grpId="0" nodeType="clickEffect">
-                                  <p:stCondLst>
-                                    <p:cond delay="0"/>
-                                  </p:stCondLst>
-                                  <p:childTnLst>
-                                    <p:set>
-                                      <p:cBhvr>
-                                        <p:cTn id="36" dur="1" fill="hold">
-                                          <p:stCondLst>
-                                            <p:cond delay="0"/>
-                                          </p:stCondLst>
-                                        </p:cTn>
-                                        <p:tgtEl>
-                                          <p:spTgt spid="3">
-                                            <p:txEl>
-                                              <p:pRg st="7" end="7"/>
-                                            </p:txEl>
-                                          </p:spTgt>
-                                        </p:tgtEl>
-                                        <p:attrNameLst>
-                                          <p:attrName>style.visibility</p:attrName>
-                                        </p:attrNameLst>
-                                      </p:cBhvr>
-                                      <p:to>
-                                        <p:strVal val="visible"/>
-                                      </p:to>
-                                    </p:set>
-                                    <p:animEffect transition="in" filter="fade">
-                                      <p:cBhvr>
-                                        <p:cTn id="37" dur="500"/>
-                                        <p:tgtEl>
-                                          <p:spTgt spid="3">
-                                            <p:txEl>
-                                              <p:pRg st="7" end="7"/>
-                                            </p:txEl>
-                                          </p:spTgt>
-                                        </p:tgtEl>
-                                      </p:cBhvr>
-                                    </p:animEffect>
-                                  </p:childTnLst>
-                                </p:cTn>
-                              </p:par>
-                            </p:childTnLst>
-                          </p:cTn>
-                        </p:par>
-                      </p:childTnLst>
-                    </p:cTn>
-                  </p:par>
-                  <p:par>
-                    <p:cTn id="38" fill="hold">
-                      <p:stCondLst>
-                        <p:cond delay="indefinite"/>
-                      </p:stCondLst>
-                      <p:childTnLst>
-                        <p:par>
-                          <p:cTn id="39" fill="hold">
-                            <p:stCondLst>
-                              <p:cond delay="0"/>
-                            </p:stCondLst>
-                            <p:childTnLst>
-                              <p:par>
-                                <p:cTn id="40" presetID="10" presetClass="entr" presetSubtype="0" fill="hold" grpId="0" nodeType="clickEffect">
-                                  <p:stCondLst>
-                                    <p:cond delay="0"/>
-                                  </p:stCondLst>
-                                  <p:childTnLst>
-                                    <p:set>
-                                      <p:cBhvr>
-                                        <p:cTn id="41" dur="1" fill="hold">
-                                          <p:stCondLst>
-                                            <p:cond delay="0"/>
-                                          </p:stCondLst>
-                                        </p:cTn>
-                                        <p:tgtEl>
-                                          <p:spTgt spid="3">
-                                            <p:txEl>
-                                              <p:pRg st="8" end="8"/>
-                                            </p:txEl>
-                                          </p:spTgt>
-                                        </p:tgtEl>
-                                        <p:attrNameLst>
-                                          <p:attrName>style.visibility</p:attrName>
-                                        </p:attrNameLst>
-                                      </p:cBhvr>
-                                      <p:to>
-                                        <p:strVal val="visible"/>
-                                      </p:to>
-                                    </p:set>
-                                    <p:animEffect transition="in" filter="fade">
-                                      <p:cBhvr>
-                                        <p:cTn id="42" dur="500"/>
-                                        <p:tgtEl>
-                                          <p:spTgt spid="3">
-                                            <p:txEl>
-                                              <p:pRg st="8" end="8"/>
                                             </p:txEl>
                                           </p:spTgt>
                                         </p:tgtEl>
@@ -41544,13 +42134,14 @@
       </p:par>
     </p:tnLst>
     <p:bldLst>
-      <p:bldP spid="3" grpId="0" uiExpand="1" build="p"/>
+      <p:bldP spid="6" grpId="0" uiExpand="1" build="p" animBg="1"/>
+      <p:bldP spid="5" grpId="0" uiExpand="1" build="p"/>
     </p:bldLst>
   </p:timing>
 </p:sld>
 </file>
 
-<file path=ppt/slides/slide5.xml><?xml version="1.0" encoding="utf-8"?>
+<file path=ppt/slides/slide4.xml><?xml version="1.0" encoding="utf-8"?>
 <p:sld xmlns:a="http://schemas.openxmlformats.org/drawingml/2006/main" xmlns:r="http://schemas.openxmlformats.org/officeDocument/2006/relationships" xmlns:p="http://schemas.openxmlformats.org/presentationml/2006/main">
   <p:cSld>
     <p:bg>
@@ -41623,7 +42214,7 @@
               <a:rPr lang="en-US" sz="9600" dirty="0">
                 <a:hlinkClick r:id="rId3"/>
               </a:rPr>
-              <a:t>https://replit.com/@HylandOutreach/CssFileExample</a:t>
+              <a:t>https://replit.com/@HylandOutreach/StyleElementExample</a:t>
             </a:r>
             <a:endParaRPr lang="en-US" sz="13800" dirty="0"/>
           </a:p>
@@ -41645,7 +42236,7 @@
 </p:sld>
 </file>
 
-<file path=ppt/slides/slide6.xml><?xml version="1.0" encoding="utf-8"?>
+<file path=ppt/slides/slide5.xml><?xml version="1.0" encoding="utf-8"?>
 <p:sld xmlns:a="http://schemas.openxmlformats.org/drawingml/2006/main" xmlns:r="http://schemas.openxmlformats.org/officeDocument/2006/relationships" xmlns:p="http://schemas.openxmlformats.org/presentationml/2006/main">
   <p:cSld>
     <p:spTree>
@@ -43703,7 +44294,7 @@
 </p:sld>
 </file>
 
-<file path=ppt/slides/slide7.xml><?xml version="1.0" encoding="utf-8"?>
+<file path=ppt/slides/slide6.xml><?xml version="1.0" encoding="utf-8"?>
 <p:sld xmlns:a="http://schemas.openxmlformats.org/drawingml/2006/main" xmlns:r="http://schemas.openxmlformats.org/officeDocument/2006/relationships" xmlns:p="http://schemas.openxmlformats.org/presentationml/2006/main">
   <p:cSld>
     <p:spTree>
@@ -44152,7 +44743,7 @@
 </p:sld>
 </file>
 
-<file path=ppt/slides/slide8.xml><?xml version="1.0" encoding="utf-8"?>
+<file path=ppt/slides/slide7.xml><?xml version="1.0" encoding="utf-8"?>
 <p:sld xmlns:a="http://schemas.openxmlformats.org/drawingml/2006/main" xmlns:r="http://schemas.openxmlformats.org/officeDocument/2006/relationships" xmlns:p="http://schemas.openxmlformats.org/presentationml/2006/main">
   <p:cSld>
     <p:spTree>
@@ -44690,7 +45281,7 @@
 </p:sld>
 </file>
 
-<file path=ppt/slides/slide9.xml><?xml version="1.0" encoding="utf-8"?>
+<file path=ppt/slides/slide8.xml><?xml version="1.0" encoding="utf-8"?>
 <p:sld xmlns:a="http://schemas.openxmlformats.org/drawingml/2006/main" xmlns:r="http://schemas.openxmlformats.org/officeDocument/2006/relationships" xmlns:p="http://schemas.openxmlformats.org/presentationml/2006/main">
   <p:cSld>
     <p:bg>
@@ -44763,7 +45354,7 @@
               <a:rPr lang="en-US" sz="11500" dirty="0">
                 <a:hlinkClick r:id="rId3"/>
               </a:rPr>
-              <a:t>https://replit.com/@HylandOutreach/Ruleset</a:t>
+              <a:t>https://replit.com/@HylandOutreach/Ruleset2</a:t>
             </a:r>
             <a:endParaRPr lang="en-US" sz="11500" dirty="0"/>
           </a:p>
@@ -44773,6 +45364,67 @@
     <p:extLst>
       <p:ext uri="{BB962C8B-B14F-4D97-AF65-F5344CB8AC3E}">
         <p14:creationId xmlns:p14="http://schemas.microsoft.com/office/powerpoint/2010/main" val="396988711"/>
+      </p:ext>
+    </p:extLst>
+  </p:cSld>
+  <p:clrMapOvr>
+    <a:masterClrMapping/>
+  </p:clrMapOvr>
+  <p:transition>
+    <p:fade/>
+  </p:transition>
+</p:sld>
+</file>
+
+<file path=ppt/slides/slide9.xml><?xml version="1.0" encoding="utf-8"?>
+<p:sld xmlns:a="http://schemas.openxmlformats.org/drawingml/2006/main" xmlns:r="http://schemas.openxmlformats.org/officeDocument/2006/relationships" xmlns:p="http://schemas.openxmlformats.org/presentationml/2006/main">
+  <p:cSld>
+    <p:spTree>
+      <p:nvGrpSpPr>
+        <p:cNvPr id="1" name=""/>
+        <p:cNvGrpSpPr/>
+        <p:nvPr/>
+      </p:nvGrpSpPr>
+      <p:grpSpPr>
+        <a:xfrm>
+          <a:off x="0" y="0"/>
+          <a:ext cx="0" cy="0"/>
+          <a:chOff x="0" y="0"/>
+          <a:chExt cx="0" cy="0"/>
+        </a:xfrm>
+      </p:grpSpPr>
+      <p:sp>
+        <p:nvSpPr>
+          <p:cNvPr id="2" name="Text Placeholder 1">
+            <a:extLst>
+              <a:ext uri="{FF2B5EF4-FFF2-40B4-BE49-F238E27FC236}">
+                <a16:creationId xmlns:a16="http://schemas.microsoft.com/office/drawing/2014/main" id="{85615D18-8F75-4B52-89C9-F982DAFE9325}"/>
+              </a:ext>
+            </a:extLst>
+          </p:cNvPr>
+          <p:cNvSpPr>
+            <a:spLocks noGrp="1"/>
+          </p:cNvSpPr>
+          <p:nvPr>
+            <p:ph type="body" sz="quarter" idx="10"/>
+          </p:nvPr>
+        </p:nvSpPr>
+        <p:spPr/>
+        <p:txBody>
+          <a:bodyPr/>
+          <a:lstStyle/>
+          <a:p>
+            <a:r>
+              <a:rPr lang="en-US"/>
+              <a:t>Questions?</a:t>
+            </a:r>
+          </a:p>
+        </p:txBody>
+      </p:sp>
+    </p:spTree>
+    <p:extLst>
+      <p:ext uri="{BB962C8B-B14F-4D97-AF65-F5344CB8AC3E}">
+        <p14:creationId xmlns:p14="http://schemas.microsoft.com/office/powerpoint/2010/main" val="2552111147"/>
       </p:ext>
     </p:extLst>
   </p:cSld>

</xml_diff>

<commit_message>
Update gitbook 2022-10-19 20:01:02
</commit_message>
<xml_diff>
--- a/CssIntro/HelloCss.pptx
+++ b/CssIntro/HelloCss.pptx
@@ -6,18 +6,19 @@
     <p:sldMasterId id="2147483686" r:id="rId2"/>
   </p:sldMasterIdLst>
   <p:notesMasterIdLst>
-    <p:notesMasterId r:id="rId12"/>
+    <p:notesMasterId r:id="rId13"/>
   </p:notesMasterIdLst>
   <p:sldIdLst>
     <p:sldId id="258" r:id="rId3"/>
     <p:sldId id="295" r:id="rId4"/>
     <p:sldId id="306" r:id="rId5"/>
-    <p:sldId id="312" r:id="rId6"/>
-    <p:sldId id="310" r:id="rId7"/>
-    <p:sldId id="307" r:id="rId8"/>
-    <p:sldId id="315" r:id="rId9"/>
-    <p:sldId id="314" r:id="rId10"/>
-    <p:sldId id="316" r:id="rId11"/>
+    <p:sldId id="311" r:id="rId6"/>
+    <p:sldId id="312" r:id="rId7"/>
+    <p:sldId id="310" r:id="rId8"/>
+    <p:sldId id="307" r:id="rId9"/>
+    <p:sldId id="315" r:id="rId10"/>
+    <p:sldId id="314" r:id="rId11"/>
+    <p:sldId id="316" r:id="rId12"/>
   </p:sldIdLst>
   <p:sldSz cx="12192000" cy="6858000"/>
   <p:notesSz cx="6858000" cy="9144000"/>
@@ -135,18 +136,6 @@
 </p:presentation>
 </file>
 
-<file path=ppt/commentAuthors.xml><?xml version="1.0" encoding="utf-8"?>
-<p:cmAuthorLst xmlns:a="http://schemas.openxmlformats.org/drawingml/2006/main" xmlns:r="http://schemas.openxmlformats.org/officeDocument/2006/relationships" xmlns:p="http://schemas.openxmlformats.org/presentationml/2006/main">
-  <p:cmAuthor id="1" name="Joseph Maxwell" initials="JM" lastIdx="1" clrIdx="0">
-    <p:extLst>
-      <p:ext uri="{19B8F6BF-5375-455C-9EA6-DF929625EA0E}">
-        <p15:presenceInfo xmlns:p15="http://schemas.microsoft.com/office/powerpoint/2012/main" userId="S::Joseph.Maxwell@hyland.com::81b9e37d-9426-4999-a489-1cb52182bfd4" providerId="AD"/>
-      </p:ext>
-    </p:extLst>
-  </p:cmAuthor>
-</p:cmAuthorLst>
-</file>
-
 <file path=ppt/notesMasters/notesMaster1.xml><?xml version="1.0" encoding="utf-8"?>
 <p:notesMaster xmlns:a="http://schemas.openxmlformats.org/drawingml/2006/main" xmlns:r="http://schemas.openxmlformats.org/officeDocument/2006/relationships" xmlns:p="http://schemas.openxmlformats.org/presentationml/2006/main">
   <p:cSld>
@@ -229,7 +218,7 @@
           <a:p>
             <a:fld id="{19104133-B5B0-4351-8158-4F0E5EB1E2BF}" type="datetimeFigureOut">
               <a:rPr lang="en-US" smtClean="0"/>
-              <a:t>10/19/2022</a:t>
+              <a:t>8/25/2022</a:t>
             </a:fld>
             <a:endParaRPr lang="en-US"/>
           </a:p>
@@ -651,8 +640,12 @@
           <a:p>
             <a:r>
               <a:rPr lang="en-US" dirty="0"/>
-              <a:t>Explain what the head and style elements are</a:t>
+              <a:t>Explain what CSS files are</a:t>
             </a:r>
+            <a:endParaRPr lang="en-US" baseline="0" dirty="0"/>
+          </a:p>
+          <a:p>
+            <a:endParaRPr lang="en-US" dirty="0"/>
           </a:p>
         </p:txBody>
       </p:sp>
@@ -738,12 +731,17 @@
           <a:p>
             <a:r>
               <a:rPr lang="en-US" dirty="0"/>
-              <a:t>Show the link tag in action.</a:t>
+              <a:t>Explain the link tag. Students should not have to worry about this for the most part – the starter code will usually start with a </a:t>
             </a:r>
             <a:r>
-              <a:rPr lang="en-US" baseline="0" dirty="0"/>
-              <a:t> Make sure to note the filename, attributes, and CSS.</a:t>
+              <a:rPr lang="en-US" b="1" dirty="0"/>
+              <a:t>link</a:t>
             </a:r>
+            <a:r>
+              <a:rPr lang="en-US" b="0" dirty="0"/>
+              <a:t> tag already built in. If not, they can always copy it from somewhere else. It is important for them to be aware of its existence, but they do not need to memorize how it works.</a:t>
+            </a:r>
+            <a:endParaRPr lang="en-US" dirty="0"/>
           </a:p>
         </p:txBody>
       </p:sp>
@@ -773,7 +771,7 @@
     </p:spTree>
     <p:extLst>
       <p:ext uri="{BB962C8B-B14F-4D97-AF65-F5344CB8AC3E}">
-        <p14:creationId xmlns:p14="http://schemas.microsoft.com/office/powerpoint/2010/main" val="1081873275"/>
+        <p14:creationId xmlns:p14="http://schemas.microsoft.com/office/powerpoint/2010/main" val="2439832816"/>
       </p:ext>
     </p:extLst>
   </p:cSld>
@@ -829,13 +827,12 @@
           <a:p>
             <a:r>
               <a:rPr lang="en-US" dirty="0"/>
-              <a:t>Go</a:t>
+              <a:t>Show the link tag in action.</a:t>
             </a:r>
             <a:r>
               <a:rPr lang="en-US" baseline="0" dirty="0"/>
-              <a:t> over the vocabulary around different parts of CSS. Make sure to note that each character is very important: every colon, every semi-colon, every curly bracket, dash, etc.</a:t>
+              <a:t> Make sure to note the filename, attributes, and CSS.</a:t>
             </a:r>
-            <a:endParaRPr lang="en-US" dirty="0"/>
           </a:p>
         </p:txBody>
       </p:sp>
@@ -854,78 +851,18 @@
           <a:bodyPr/>
           <a:lstStyle/>
           <a:p>
-            <a:pPr marL="0" marR="0" lvl="0" indent="0" algn="r" defTabSz="914400" rtl="0" eaLnBrk="1" fontAlgn="auto" latinLnBrk="0" hangingPunct="1">
-              <a:lnSpc>
-                <a:spcPct val="100000"/>
-              </a:lnSpc>
-              <a:spcBef>
-                <a:spcPts val="0"/>
-              </a:spcBef>
-              <a:spcAft>
-                <a:spcPts val="0"/>
-              </a:spcAft>
-              <a:buClrTx/>
-              <a:buSzTx/>
-              <a:buFontTx/>
-              <a:buNone/>
-              <a:tabLst/>
-              <a:defRPr/>
-            </a:pPr>
             <a:fld id="{DEC8F7F9-57EC-49CF-9FCD-2B781E4B449F}" type="slidenum">
-              <a:rPr kumimoji="0" lang="en-US" sz="1200" b="0" i="0" u="none" strike="noStrike" kern="1200" cap="none" spc="0" normalizeH="0" baseline="0" noProof="0" smtClean="0">
-                <a:ln>
-                  <a:noFill/>
-                </a:ln>
-                <a:solidFill>
-                  <a:prstClr val="black"/>
-                </a:solidFill>
-                <a:effectLst/>
-                <a:uLnTx/>
-                <a:uFillTx/>
-                <a:latin typeface="Calibri" panose="020F0502020204030204"/>
-                <a:ea typeface="+mn-ea"/>
-                <a:cs typeface="+mn-cs"/>
-              </a:rPr>
-              <a:pPr marL="0" marR="0" lvl="0" indent="0" algn="r" defTabSz="914400" rtl="0" eaLnBrk="1" fontAlgn="auto" latinLnBrk="0" hangingPunct="1">
-                <a:lnSpc>
-                  <a:spcPct val="100000"/>
-                </a:lnSpc>
-                <a:spcBef>
-                  <a:spcPts val="0"/>
-                </a:spcBef>
-                <a:spcAft>
-                  <a:spcPts val="0"/>
-                </a:spcAft>
-                <a:buClrTx/>
-                <a:buSzTx/>
-                <a:buFontTx/>
-                <a:buNone/>
-                <a:tabLst/>
-                <a:defRPr/>
-              </a:pPr>
+              <a:rPr lang="en-US" smtClean="0"/>
               <a:t>5</a:t>
             </a:fld>
-            <a:endParaRPr kumimoji="0" lang="en-US" sz="1200" b="0" i="0" u="none" strike="noStrike" kern="1200" cap="none" spc="0" normalizeH="0" baseline="0" noProof="0">
-              <a:ln>
-                <a:noFill/>
-              </a:ln>
-              <a:solidFill>
-                <a:prstClr val="black"/>
-              </a:solidFill>
-              <a:effectLst/>
-              <a:uLnTx/>
-              <a:uFillTx/>
-              <a:latin typeface="Calibri" panose="020F0502020204030204"/>
-              <a:ea typeface="+mn-ea"/>
-              <a:cs typeface="+mn-cs"/>
-            </a:endParaRPr>
+            <a:endParaRPr lang="en-US"/>
           </a:p>
         </p:txBody>
       </p:sp>
     </p:spTree>
     <p:extLst>
       <p:ext uri="{BB962C8B-B14F-4D97-AF65-F5344CB8AC3E}">
-        <p14:creationId xmlns:p14="http://schemas.microsoft.com/office/powerpoint/2010/main" val="2440334685"/>
+        <p14:creationId xmlns:p14="http://schemas.microsoft.com/office/powerpoint/2010/main" val="1081873275"/>
       </p:ext>
     </p:extLst>
   </p:cSld>
@@ -981,11 +918,11 @@
           <a:p>
             <a:r>
               <a:rPr lang="en-US" dirty="0"/>
-              <a:t>Explain how</a:t>
+              <a:t>Go</a:t>
             </a:r>
             <a:r>
               <a:rPr lang="en-US" baseline="0" dirty="0"/>
-              <a:t> CSS properties determine the actual styles that are controlled by CSS</a:t>
+              <a:t> over the vocabulary around different parts of CSS. Make sure to note that each character is very important: every colon, every semi-colon, every curly bracket, dash, etc.</a:t>
             </a:r>
             <a:endParaRPr lang="en-US" dirty="0"/>
           </a:p>
@@ -1077,7 +1014,7 @@
     </p:spTree>
     <p:extLst>
       <p:ext uri="{BB962C8B-B14F-4D97-AF65-F5344CB8AC3E}">
-        <p14:creationId xmlns:p14="http://schemas.microsoft.com/office/powerpoint/2010/main" val="669666032"/>
+        <p14:creationId xmlns:p14="http://schemas.microsoft.com/office/powerpoint/2010/main" val="2440334685"/>
       </p:ext>
     </p:extLst>
   </p:cSld>
@@ -1133,8 +1070,13 @@
           <a:p>
             <a:r>
               <a:rPr lang="en-US" dirty="0"/>
-              <a:t>Go through a few of the selectors – actually just examples of the element selector. The main idea is that </a:t>
+              <a:t>Explain how</a:t>
             </a:r>
+            <a:r>
+              <a:rPr lang="en-US" baseline="0" dirty="0"/>
+              <a:t> CSS properties determine the actual styles that are controlled by CSS</a:t>
+            </a:r>
+            <a:endParaRPr lang="en-US" dirty="0"/>
           </a:p>
         </p:txBody>
       </p:sp>
@@ -1224,7 +1166,7 @@
     </p:spTree>
     <p:extLst>
       <p:ext uri="{BB962C8B-B14F-4D97-AF65-F5344CB8AC3E}">
-        <p14:creationId xmlns:p14="http://schemas.microsoft.com/office/powerpoint/2010/main" val="736763130"/>
+        <p14:creationId xmlns:p14="http://schemas.microsoft.com/office/powerpoint/2010/main" val="669666032"/>
       </p:ext>
     </p:extLst>
   </p:cSld>
@@ -1280,19 +1222,7 @@
           <a:p>
             <a:r>
               <a:rPr lang="en-US" dirty="0"/>
-              <a:t>For the Repl,</a:t>
-            </a:r>
-            <a:r>
-              <a:rPr lang="en-US" baseline="0" dirty="0"/>
-              <a:t> show the whole ruleset in action. Change around the selector, properties, values </a:t>
-            </a:r>
-            <a:r>
-              <a:rPr lang="en-US" baseline="0" dirty="0" err="1"/>
-              <a:t>etc</a:t>
-            </a:r>
-            <a:r>
-              <a:rPr lang="en-US" baseline="0" dirty="0"/>
-              <a:t> to show how it affects the page.</a:t>
+              <a:t>Go through a few of the selectors – actually just examples of the element selector. The main idea is that </a:t>
             </a:r>
           </a:p>
         </p:txBody>
@@ -1362,6 +1292,173 @@
                 <a:defRPr/>
               </a:pPr>
               <a:t>8</a:t>
+            </a:fld>
+            <a:endParaRPr kumimoji="0" lang="en-US" sz="1200" b="0" i="0" u="none" strike="noStrike" kern="1200" cap="none" spc="0" normalizeH="0" baseline="0" noProof="0">
+              <a:ln>
+                <a:noFill/>
+              </a:ln>
+              <a:solidFill>
+                <a:prstClr val="black"/>
+              </a:solidFill>
+              <a:effectLst/>
+              <a:uLnTx/>
+              <a:uFillTx/>
+              <a:latin typeface="Calibri" panose="020F0502020204030204"/>
+              <a:ea typeface="+mn-ea"/>
+              <a:cs typeface="+mn-cs"/>
+            </a:endParaRPr>
+          </a:p>
+        </p:txBody>
+      </p:sp>
+    </p:spTree>
+    <p:extLst>
+      <p:ext uri="{BB962C8B-B14F-4D97-AF65-F5344CB8AC3E}">
+        <p14:creationId xmlns:p14="http://schemas.microsoft.com/office/powerpoint/2010/main" val="736763130"/>
+      </p:ext>
+    </p:extLst>
+  </p:cSld>
+  <p:clrMapOvr>
+    <a:masterClrMapping/>
+  </p:clrMapOvr>
+</p:notes>
+</file>
+
+<file path=ppt/notesSlides/notesSlide8.xml><?xml version="1.0" encoding="utf-8"?>
+<p:notes xmlns:a="http://schemas.openxmlformats.org/drawingml/2006/main" xmlns:r="http://schemas.openxmlformats.org/officeDocument/2006/relationships" xmlns:p="http://schemas.openxmlformats.org/presentationml/2006/main">
+  <p:cSld>
+    <p:spTree>
+      <p:nvGrpSpPr>
+        <p:cNvPr id="1" name=""/>
+        <p:cNvGrpSpPr/>
+        <p:nvPr/>
+      </p:nvGrpSpPr>
+      <p:grpSpPr>
+        <a:xfrm>
+          <a:off x="0" y="0"/>
+          <a:ext cx="0" cy="0"/>
+          <a:chOff x="0" y="0"/>
+          <a:chExt cx="0" cy="0"/>
+        </a:xfrm>
+      </p:grpSpPr>
+      <p:sp>
+        <p:nvSpPr>
+          <p:cNvPr id="2" name="Slide Image Placeholder 1"/>
+          <p:cNvSpPr>
+            <a:spLocks noGrp="1" noRot="1" noChangeAspect="1"/>
+          </p:cNvSpPr>
+          <p:nvPr>
+            <p:ph type="sldImg"/>
+          </p:nvPr>
+        </p:nvSpPr>
+        <p:spPr/>
+      </p:sp>
+      <p:sp>
+        <p:nvSpPr>
+          <p:cNvPr id="3" name="Notes Placeholder 2"/>
+          <p:cNvSpPr>
+            <a:spLocks noGrp="1"/>
+          </p:cNvSpPr>
+          <p:nvPr>
+            <p:ph type="body" idx="1"/>
+          </p:nvPr>
+        </p:nvSpPr>
+        <p:spPr/>
+        <p:txBody>
+          <a:bodyPr/>
+          <a:lstStyle/>
+          <a:p>
+            <a:r>
+              <a:rPr lang="en-US" dirty="0"/>
+              <a:t>For the </a:t>
+            </a:r>
+            <a:r>
+              <a:rPr lang="en-US" dirty="0" err="1"/>
+              <a:t>Repl</a:t>
+            </a:r>
+            <a:r>
+              <a:rPr lang="en-US" dirty="0"/>
+              <a:t>,</a:t>
+            </a:r>
+            <a:r>
+              <a:rPr lang="en-US" baseline="0" dirty="0"/>
+              <a:t> show the whole ruleset in action. Make sure to switch to the CSS file to see the CSS. Change around the selector, properties, values </a:t>
+            </a:r>
+            <a:r>
+              <a:rPr lang="en-US" baseline="0" dirty="0" err="1"/>
+              <a:t>etc</a:t>
+            </a:r>
+            <a:r>
+              <a:rPr lang="en-US" baseline="0" dirty="0"/>
+              <a:t> to show how it affects the page.</a:t>
+            </a:r>
+          </a:p>
+        </p:txBody>
+      </p:sp>
+      <p:sp>
+        <p:nvSpPr>
+          <p:cNvPr id="4" name="Slide Number Placeholder 3"/>
+          <p:cNvSpPr>
+            <a:spLocks noGrp="1"/>
+          </p:cNvSpPr>
+          <p:nvPr>
+            <p:ph type="sldNum" sz="quarter" idx="10"/>
+          </p:nvPr>
+        </p:nvSpPr>
+        <p:spPr/>
+        <p:txBody>
+          <a:bodyPr/>
+          <a:lstStyle/>
+          <a:p>
+            <a:pPr marL="0" marR="0" lvl="0" indent="0" algn="r" defTabSz="914400" rtl="0" eaLnBrk="1" fontAlgn="auto" latinLnBrk="0" hangingPunct="1">
+              <a:lnSpc>
+                <a:spcPct val="100000"/>
+              </a:lnSpc>
+              <a:spcBef>
+                <a:spcPts val="0"/>
+              </a:spcBef>
+              <a:spcAft>
+                <a:spcPts val="0"/>
+              </a:spcAft>
+              <a:buClrTx/>
+              <a:buSzTx/>
+              <a:buFontTx/>
+              <a:buNone/>
+              <a:tabLst/>
+              <a:defRPr/>
+            </a:pPr>
+            <a:fld id="{DEC8F7F9-57EC-49CF-9FCD-2B781E4B449F}" type="slidenum">
+              <a:rPr kumimoji="0" lang="en-US" sz="1200" b="0" i="0" u="none" strike="noStrike" kern="1200" cap="none" spc="0" normalizeH="0" baseline="0" noProof="0" smtClean="0">
+                <a:ln>
+                  <a:noFill/>
+                </a:ln>
+                <a:solidFill>
+                  <a:prstClr val="black"/>
+                </a:solidFill>
+                <a:effectLst/>
+                <a:uLnTx/>
+                <a:uFillTx/>
+                <a:latin typeface="Calibri" panose="020F0502020204030204"/>
+                <a:ea typeface="+mn-ea"/>
+                <a:cs typeface="+mn-cs"/>
+              </a:rPr>
+              <a:pPr marL="0" marR="0" lvl="0" indent="0" algn="r" defTabSz="914400" rtl="0" eaLnBrk="1" fontAlgn="auto" latinLnBrk="0" hangingPunct="1">
+                <a:lnSpc>
+                  <a:spcPct val="100000"/>
+                </a:lnSpc>
+                <a:spcBef>
+                  <a:spcPts val="0"/>
+                </a:spcBef>
+                <a:spcAft>
+                  <a:spcPts val="0"/>
+                </a:spcAft>
+                <a:buClrTx/>
+                <a:buSzTx/>
+                <a:buFontTx/>
+                <a:buNone/>
+                <a:tabLst/>
+                <a:defRPr/>
+              </a:pPr>
+              <a:t>9</a:t>
             </a:fld>
             <a:endParaRPr kumimoji="0" lang="en-US" sz="1200" b="0" i="0" u="none" strike="noStrike" kern="1200" cap="none" spc="0" normalizeH="0" baseline="0" noProof="0">
               <a:ln>
@@ -1575,7 +1672,7 @@
             <a:fld id="{1C2D31DE-C454-491C-B5C3-F097855E3DF7}" type="datetime4">
               <a:rPr lang="en-US" smtClean="0"/>
               <a:pPr/>
-              <a:t>October 19, 2022</a:t>
+              <a:t>August 25, 2022</a:t>
             </a:fld>
             <a:endParaRPr lang="en-US" dirty="0"/>
           </a:p>
@@ -4967,7 +5064,7 @@
           <a:p>
             <a:fld id="{5958763E-B898-436D-883D-03711491D54A}" type="datetimeFigureOut">
               <a:rPr lang="en-US" smtClean="0"/>
-              <a:t>10/19/2022</a:t>
+              <a:t>8/25/2022</a:t>
             </a:fld>
             <a:endParaRPr lang="en-US"/>
           </a:p>
@@ -5160,7 +5257,7 @@
           <a:p>
             <a:fld id="{5958763E-B898-436D-883D-03711491D54A}" type="datetimeFigureOut">
               <a:rPr lang="en-US" smtClean="0"/>
-              <a:t>10/19/2022</a:t>
+              <a:t>8/25/2022</a:t>
             </a:fld>
             <a:endParaRPr lang="en-US"/>
           </a:p>
@@ -5410,7 +5507,7 @@
           <a:p>
             <a:fld id="{5958763E-B898-436D-883D-03711491D54A}" type="datetimeFigureOut">
               <a:rPr lang="en-US" smtClean="0"/>
-              <a:t>10/19/2022</a:t>
+              <a:t>8/25/2022</a:t>
             </a:fld>
             <a:endParaRPr lang="en-US"/>
           </a:p>
@@ -5758,7 +5855,7 @@
           <a:p>
             <a:fld id="{5958763E-B898-436D-883D-03711491D54A}" type="datetimeFigureOut">
               <a:rPr lang="en-US" smtClean="0"/>
-              <a:t>10/19/2022</a:t>
+              <a:t>8/25/2022</a:t>
             </a:fld>
             <a:endParaRPr lang="en-US"/>
           </a:p>
@@ -6174,7 +6271,7 @@
           <a:p>
             <a:fld id="{5958763E-B898-436D-883D-03711491D54A}" type="datetimeFigureOut">
               <a:rPr lang="en-US" smtClean="0"/>
-              <a:t>10/19/2022</a:t>
+              <a:t>8/25/2022</a:t>
             </a:fld>
             <a:endParaRPr lang="en-US"/>
           </a:p>
@@ -6675,7 +6772,7 @@
           <a:p>
             <a:fld id="{5958763E-B898-436D-883D-03711491D54A}" type="datetimeFigureOut">
               <a:rPr lang="en-US" smtClean="0"/>
-              <a:t>10/19/2022</a:t>
+              <a:t>8/25/2022</a:t>
             </a:fld>
             <a:endParaRPr lang="en-US"/>
           </a:p>
@@ -7126,7 +7223,7 @@
           <a:p>
             <a:fld id="{5958763E-B898-436D-883D-03711491D54A}" type="datetimeFigureOut">
               <a:rPr lang="en-US" smtClean="0"/>
-              <a:t>10/19/2022</a:t>
+              <a:t>8/25/2022</a:t>
             </a:fld>
             <a:endParaRPr lang="en-US"/>
           </a:p>
@@ -7737,7 +7834,7 @@
           <a:p>
             <a:fld id="{5958763E-B898-436D-883D-03711491D54A}" type="datetimeFigureOut">
               <a:rPr lang="en-US" smtClean="0"/>
-              <a:t>10/19/2022</a:t>
+              <a:t>8/25/2022</a:t>
             </a:fld>
             <a:endParaRPr lang="en-US"/>
           </a:p>
@@ -8508,7 +8605,7 @@
           <a:p>
             <a:fld id="{5958763E-B898-436D-883D-03711491D54A}" type="datetimeFigureOut">
               <a:rPr lang="en-US" smtClean="0"/>
-              <a:t>10/19/2022</a:t>
+              <a:t>8/25/2022</a:t>
             </a:fld>
             <a:endParaRPr lang="en-US"/>
           </a:p>
@@ -8612,7 +8709,7 @@
           <a:p>
             <a:fld id="{5958763E-B898-436D-883D-03711491D54A}" type="datetimeFigureOut">
               <a:rPr lang="en-US" smtClean="0"/>
-              <a:t>10/19/2022</a:t>
+              <a:t>8/25/2022</a:t>
             </a:fld>
             <a:endParaRPr lang="en-US"/>
           </a:p>
@@ -8939,7 +9036,7 @@
             <a:fld id="{1C2D31DE-C454-491C-B5C3-F097855E3DF7}" type="datetime4">
               <a:rPr lang="en-US" smtClean="0"/>
               <a:pPr/>
-              <a:t>October 19, 2022</a:t>
+              <a:t>August 25, 2022</a:t>
             </a:fld>
             <a:endParaRPr lang="en-US" dirty="0"/>
           </a:p>
@@ -12091,7 +12188,7 @@
           <a:p>
             <a:fld id="{5958763E-B898-436D-883D-03711491D54A}" type="datetimeFigureOut">
               <a:rPr lang="en-US" smtClean="0"/>
-              <a:t>10/19/2022</a:t>
+              <a:t>8/25/2022</a:t>
             </a:fld>
             <a:endParaRPr lang="en-US"/>
           </a:p>
@@ -12215,7 +12312,7 @@
           <a:p>
             <a:fld id="{5958763E-B898-436D-883D-03711491D54A}" type="datetimeFigureOut">
               <a:rPr lang="en-US" smtClean="0"/>
-              <a:t>10/19/2022</a:t>
+              <a:t>8/25/2022</a:t>
             </a:fld>
             <a:endParaRPr lang="en-US"/>
           </a:p>
@@ -12339,7 +12436,7 @@
           <a:p>
             <a:fld id="{5958763E-B898-436D-883D-03711491D54A}" type="datetimeFigureOut">
               <a:rPr lang="en-US" smtClean="0"/>
-              <a:t>10/19/2022</a:t>
+              <a:t>8/25/2022</a:t>
             </a:fld>
             <a:endParaRPr lang="en-US"/>
           </a:p>
@@ -12463,7 +12560,7 @@
           <a:p>
             <a:fld id="{5958763E-B898-436D-883D-03711491D54A}" type="datetimeFigureOut">
               <a:rPr lang="en-US" smtClean="0"/>
-              <a:t>10/19/2022</a:t>
+              <a:t>8/25/2022</a:t>
             </a:fld>
             <a:endParaRPr lang="en-US"/>
           </a:p>
@@ -12587,7 +12684,7 @@
           <a:p>
             <a:fld id="{5958763E-B898-436D-883D-03711491D54A}" type="datetimeFigureOut">
               <a:rPr lang="en-US" smtClean="0"/>
-              <a:t>10/19/2022</a:t>
+              <a:t>8/25/2022</a:t>
             </a:fld>
             <a:endParaRPr lang="en-US"/>
           </a:p>
@@ -12711,7 +12808,7 @@
           <a:p>
             <a:fld id="{5958763E-B898-436D-883D-03711491D54A}" type="datetimeFigureOut">
               <a:rPr lang="en-US" smtClean="0"/>
-              <a:t>10/19/2022</a:t>
+              <a:t>8/25/2022</a:t>
             </a:fld>
             <a:endParaRPr lang="en-US"/>
           </a:p>
@@ -12835,7 +12932,7 @@
           <a:p>
             <a:fld id="{5958763E-B898-436D-883D-03711491D54A}" type="datetimeFigureOut">
               <a:rPr lang="en-US" smtClean="0"/>
-              <a:t>10/19/2022</a:t>
+              <a:t>8/25/2022</a:t>
             </a:fld>
             <a:endParaRPr lang="en-US"/>
           </a:p>
@@ -12959,7 +13056,7 @@
           <a:p>
             <a:fld id="{5958763E-B898-436D-883D-03711491D54A}" type="datetimeFigureOut">
               <a:rPr lang="en-US" smtClean="0"/>
-              <a:t>10/19/2022</a:t>
+              <a:t>8/25/2022</a:t>
             </a:fld>
             <a:endParaRPr lang="en-US"/>
           </a:p>
@@ -13092,7 +13189,7 @@
           <a:p>
             <a:fld id="{5958763E-B898-436D-883D-03711491D54A}" type="datetimeFigureOut">
               <a:rPr lang="en-US" smtClean="0"/>
-              <a:t>10/19/2022</a:t>
+              <a:t>8/25/2022</a:t>
             </a:fld>
             <a:endParaRPr lang="en-US"/>
           </a:p>
@@ -16431,7 +16528,7 @@
             <a:fld id="{1C2D31DE-C454-491C-B5C3-F097855E3DF7}" type="datetime4">
               <a:rPr lang="en-US" smtClean="0"/>
               <a:pPr/>
-              <a:t>October 19, 2022</a:t>
+              <a:t>August 25, 2022</a:t>
             </a:fld>
             <a:endParaRPr lang="en-US" dirty="0"/>
           </a:p>
@@ -28667,7 +28764,7 @@
           <a:p>
             <a:fld id="{5958763E-B898-436D-883D-03711491D54A}" type="datetimeFigureOut">
               <a:rPr lang="en-US" smtClean="0"/>
-              <a:t>10/19/2022</a:t>
+              <a:t>8/25/2022</a:t>
             </a:fld>
             <a:endParaRPr lang="en-US"/>
           </a:p>
@@ -29069,7 +29166,7 @@
           <a:p>
             <a:fld id="{5958763E-B898-436D-883D-03711491D54A}" type="datetimeFigureOut">
               <a:rPr lang="en-US" smtClean="0"/>
-              <a:t>10/19/2022</a:t>
+              <a:t>8/25/2022</a:t>
             </a:fld>
             <a:endParaRPr lang="en-US"/>
           </a:p>
@@ -29363,7 +29460,7 @@
           <a:p>
             <a:fld id="{5958763E-B898-436D-883D-03711491D54A}" type="datetimeFigureOut">
               <a:rPr lang="en-US" smtClean="0"/>
-              <a:t>10/19/2022</a:t>
+              <a:t>8/25/2022</a:t>
             </a:fld>
             <a:endParaRPr lang="en-US"/>
           </a:p>
@@ -29564,7 +29661,7 @@
           <a:p>
             <a:fld id="{5958763E-B898-436D-883D-03711491D54A}" type="datetimeFigureOut">
               <a:rPr lang="en-US" smtClean="0"/>
-              <a:t>10/19/2022</a:t>
+              <a:t>8/25/2022</a:t>
             </a:fld>
             <a:endParaRPr lang="en-US"/>
           </a:p>
@@ -29825,7 +29922,7 @@
           <a:p>
             <a:fld id="{5958763E-B898-436D-883D-03711491D54A}" type="datetimeFigureOut">
               <a:rPr lang="en-US" smtClean="0"/>
-              <a:t>10/19/2022</a:t>
+              <a:t>8/25/2022</a:t>
             </a:fld>
             <a:endParaRPr lang="en-US"/>
           </a:p>
@@ -30086,7 +30183,7 @@
           <a:p>
             <a:fld id="{61FD5E12-641C-4696-BA65-B86205845F69}" type="datetimeFigureOut">
               <a:rPr lang="en-US" smtClean="0"/>
-              <a:t>10/19/2022</a:t>
+              <a:t>8/25/2022</a:t>
             </a:fld>
             <a:endParaRPr lang="en-US"/>
           </a:p>
@@ -30256,7 +30353,7 @@
           <a:p>
             <a:fld id="{61FD5E12-641C-4696-BA65-B86205845F69}" type="datetimeFigureOut">
               <a:rPr lang="en-US" smtClean="0"/>
-              <a:t>10/19/2022</a:t>
+              <a:t>8/25/2022</a:t>
             </a:fld>
             <a:endParaRPr lang="en-US"/>
           </a:p>
@@ -30695,7 +30792,7 @@
           <a:p>
             <a:fld id="{5958763E-B898-436D-883D-03711491D54A}" type="datetimeFigureOut">
               <a:rPr lang="en-US" smtClean="0"/>
-              <a:t>10/19/2022</a:t>
+              <a:t>8/25/2022</a:t>
             </a:fld>
             <a:endParaRPr lang="en-US"/>
           </a:p>
@@ -30990,7 +31087,7 @@
           <a:p>
             <a:fld id="{61FD5E12-641C-4696-BA65-B86205845F69}" type="datetimeFigureOut">
               <a:rPr lang="en-US" smtClean="0"/>
-              <a:t>10/19/2022</a:t>
+              <a:t>8/25/2022</a:t>
             </a:fld>
             <a:endParaRPr lang="en-US"/>
           </a:p>
@@ -31222,7 +31319,7 @@
           <a:p>
             <a:fld id="{61FD5E12-641C-4696-BA65-B86205845F69}" type="datetimeFigureOut">
               <a:rPr lang="en-US" smtClean="0"/>
-              <a:t>10/19/2022</a:t>
+              <a:t>8/25/2022</a:t>
             </a:fld>
             <a:endParaRPr lang="en-US"/>
           </a:p>
@@ -31589,7 +31686,7 @@
           <a:p>
             <a:fld id="{61FD5E12-641C-4696-BA65-B86205845F69}" type="datetimeFigureOut">
               <a:rPr lang="en-US" smtClean="0"/>
-              <a:t>10/19/2022</a:t>
+              <a:t>8/25/2022</a:t>
             </a:fld>
             <a:endParaRPr lang="en-US"/>
           </a:p>
@@ -31707,7 +31804,7 @@
           <a:p>
             <a:fld id="{61FD5E12-641C-4696-BA65-B86205845F69}" type="datetimeFigureOut">
               <a:rPr lang="en-US" smtClean="0"/>
-              <a:t>10/19/2022</a:t>
+              <a:t>8/25/2022</a:t>
             </a:fld>
             <a:endParaRPr lang="en-US"/>
           </a:p>
@@ -31802,7 +31899,7 @@
           <a:p>
             <a:fld id="{61FD5E12-641C-4696-BA65-B86205845F69}" type="datetimeFigureOut">
               <a:rPr lang="en-US" smtClean="0"/>
-              <a:t>10/19/2022</a:t>
+              <a:t>8/25/2022</a:t>
             </a:fld>
             <a:endParaRPr lang="en-US"/>
           </a:p>
@@ -32079,7 +32176,7 @@
           <a:p>
             <a:fld id="{61FD5E12-641C-4696-BA65-B86205845F69}" type="datetimeFigureOut">
               <a:rPr lang="en-US" smtClean="0"/>
-              <a:t>10/19/2022</a:t>
+              <a:t>8/25/2022</a:t>
             </a:fld>
             <a:endParaRPr lang="en-US"/>
           </a:p>
@@ -32336,7 +32433,7 @@
           <a:p>
             <a:fld id="{61FD5E12-641C-4696-BA65-B86205845F69}" type="datetimeFigureOut">
               <a:rPr lang="en-US" smtClean="0"/>
-              <a:t>10/19/2022</a:t>
+              <a:t>8/25/2022</a:t>
             </a:fld>
             <a:endParaRPr lang="en-US"/>
           </a:p>
@@ -32506,7 +32603,7 @@
           <a:p>
             <a:fld id="{61FD5E12-641C-4696-BA65-B86205845F69}" type="datetimeFigureOut">
               <a:rPr lang="en-US" smtClean="0"/>
-              <a:t>10/19/2022</a:t>
+              <a:t>8/25/2022</a:t>
             </a:fld>
             <a:endParaRPr lang="en-US"/>
           </a:p>
@@ -32686,7 +32783,7 @@
           <a:p>
             <a:fld id="{61FD5E12-641C-4696-BA65-B86205845F69}" type="datetimeFigureOut">
               <a:rPr lang="en-US" smtClean="0"/>
-              <a:t>10/19/2022</a:t>
+              <a:t>8/25/2022</a:t>
             </a:fld>
             <a:endParaRPr lang="en-US"/>
           </a:p>
@@ -33332,7 +33429,7 @@
           <a:p>
             <a:fld id="{5958763E-B898-436D-883D-03711491D54A}" type="datetimeFigureOut">
               <a:rPr lang="en-US" smtClean="0"/>
-              <a:t>10/19/2022</a:t>
+              <a:t>8/25/2022</a:t>
             </a:fld>
             <a:endParaRPr lang="en-US"/>
           </a:p>
@@ -34721,7 +34818,7 @@
           <a:p>
             <a:fld id="{5958763E-B898-436D-883D-03711491D54A}" type="datetimeFigureOut">
               <a:rPr lang="en-US" smtClean="0"/>
-              <a:t>10/19/2022</a:t>
+              <a:t>8/25/2022</a:t>
             </a:fld>
             <a:endParaRPr lang="en-US"/>
           </a:p>
@@ -34922,7 +35019,7 @@
           <a:p>
             <a:fld id="{5958763E-B898-436D-883D-03711491D54A}" type="datetimeFigureOut">
               <a:rPr lang="en-US" smtClean="0"/>
-              <a:t>10/19/2022</a:t>
+              <a:t>8/25/2022</a:t>
             </a:fld>
             <a:endParaRPr lang="en-US"/>
           </a:p>
@@ -35257,7 +35354,7 @@
           <a:p>
             <a:fld id="{5958763E-B898-436D-883D-03711491D54A}" type="datetimeFigureOut">
               <a:rPr lang="en-US" smtClean="0"/>
-              <a:t>10/19/2022</a:t>
+              <a:t>8/25/2022</a:t>
             </a:fld>
             <a:endParaRPr lang="en-US"/>
           </a:p>
@@ -35487,7 +35584,7 @@
           <a:p>
             <a:fld id="{5958763E-B898-436D-883D-03711491D54A}" type="datetimeFigureOut">
               <a:rPr lang="en-US" smtClean="0"/>
-              <a:t>10/19/2022</a:t>
+              <a:t>8/25/2022</a:t>
             </a:fld>
             <a:endParaRPr lang="en-US"/>
           </a:p>
@@ -35731,7 +35828,7 @@
           <a:p>
             <a:fld id="{5958763E-B898-436D-883D-03711491D54A}" type="datetimeFigureOut">
               <a:rPr lang="en-US" smtClean="0"/>
-              <a:t>10/19/2022</a:t>
+              <a:t>8/25/2022</a:t>
             </a:fld>
             <a:endParaRPr lang="en-US"/>
           </a:p>
@@ -36372,7 +36469,7 @@
           <a:p>
             <a:fld id="{61FD5E12-641C-4696-BA65-B86205845F69}" type="datetimeFigureOut">
               <a:rPr lang="en-US" smtClean="0"/>
-              <a:t>10/19/2022</a:t>
+              <a:t>8/25/2022</a:t>
             </a:fld>
             <a:endParaRPr lang="en-US"/>
           </a:p>
@@ -39809,6 +39906,67 @@
     <p:extLst>
       <p:ext uri="{BB962C8B-B14F-4D97-AF65-F5344CB8AC3E}">
         <p14:creationId xmlns:p14="http://schemas.microsoft.com/office/powerpoint/2010/main" val="1399880830"/>
+      </p:ext>
+    </p:extLst>
+  </p:cSld>
+  <p:clrMapOvr>
+    <a:masterClrMapping/>
+  </p:clrMapOvr>
+  <p:transition>
+    <p:fade/>
+  </p:transition>
+</p:sld>
+</file>
+
+<file path=ppt/slides/slide10.xml><?xml version="1.0" encoding="utf-8"?>
+<p:sld xmlns:a="http://schemas.openxmlformats.org/drawingml/2006/main" xmlns:r="http://schemas.openxmlformats.org/officeDocument/2006/relationships" xmlns:p="http://schemas.openxmlformats.org/presentationml/2006/main">
+  <p:cSld>
+    <p:spTree>
+      <p:nvGrpSpPr>
+        <p:cNvPr id="1" name=""/>
+        <p:cNvGrpSpPr/>
+        <p:nvPr/>
+      </p:nvGrpSpPr>
+      <p:grpSpPr>
+        <a:xfrm>
+          <a:off x="0" y="0"/>
+          <a:ext cx="0" cy="0"/>
+          <a:chOff x="0" y="0"/>
+          <a:chExt cx="0" cy="0"/>
+        </a:xfrm>
+      </p:grpSpPr>
+      <p:sp>
+        <p:nvSpPr>
+          <p:cNvPr id="2" name="Text Placeholder 1">
+            <a:extLst>
+              <a:ext uri="{FF2B5EF4-FFF2-40B4-BE49-F238E27FC236}">
+                <a16:creationId xmlns:a16="http://schemas.microsoft.com/office/drawing/2014/main" id="{85615D18-8F75-4B52-89C9-F982DAFE9325}"/>
+              </a:ext>
+            </a:extLst>
+          </p:cNvPr>
+          <p:cNvSpPr>
+            <a:spLocks noGrp="1"/>
+          </p:cNvSpPr>
+          <p:nvPr>
+            <p:ph type="body" sz="quarter" idx="10"/>
+          </p:nvPr>
+        </p:nvSpPr>
+        <p:spPr/>
+        <p:txBody>
+          <a:bodyPr/>
+          <a:lstStyle/>
+          <a:p>
+            <a:r>
+              <a:rPr lang="en-US"/>
+              <a:t>Questions?</a:t>
+            </a:r>
+          </a:p>
+        </p:txBody>
+      </p:sp>
+    </p:spTree>
+    <p:extLst>
+      <p:ext uri="{BB962C8B-B14F-4D97-AF65-F5344CB8AC3E}">
+        <p14:creationId xmlns:p14="http://schemas.microsoft.com/office/powerpoint/2010/main" val="2552111147"/>
       </p:ext>
     </p:extLst>
   </p:cSld>
@@ -40438,39 +40596,7 @@
           <a:p>
             <a:r>
               <a:rPr lang="en-US" dirty="0"/>
-              <a:t>The </a:t>
-            </a:r>
-            <a:r>
-              <a:rPr lang="en-US" sz="4000" cap="none" dirty="0">
-                <a:solidFill>
-                  <a:schemeClr val="accent1">
-                    <a:lumMod val="40000"/>
-                    <a:lumOff val="60000"/>
-                  </a:schemeClr>
-                </a:solidFill>
-                <a:latin typeface="Consolas" panose="020B0609020204030204" pitchFamily="49" charset="0"/>
-              </a:rPr>
-              <a:t>&lt;head&gt;</a:t>
-            </a:r>
-            <a:r>
-              <a:rPr lang="en-US" sz="3600" dirty="0"/>
-              <a:t> and </a:t>
-            </a:r>
-            <a:r>
-              <a:rPr lang="en-US" sz="4000" cap="none" dirty="0">
-                <a:solidFill>
-                  <a:schemeClr val="accent1">
-                    <a:lumMod val="40000"/>
-                    <a:lumOff val="60000"/>
-                  </a:schemeClr>
-                </a:solidFill>
-                <a:latin typeface="Consolas" panose="020B0609020204030204" pitchFamily="49" charset="0"/>
-              </a:rPr>
-              <a:t>&lt;style&gt;</a:t>
-            </a:r>
-            <a:r>
-              <a:rPr lang="en-US" dirty="0"/>
-              <a:t> elements</a:t>
+              <a:t>CSS Files</a:t>
             </a:r>
           </a:p>
         </p:txBody>
@@ -40491,866 +40617,70 @@
             <p:ph idx="1"/>
           </p:nvPr>
         </p:nvSpPr>
-        <p:spPr>
-          <a:xfrm>
-            <a:off x="381000" y="1270143"/>
-            <a:ext cx="4572000" cy="5257800"/>
-          </a:xfrm>
-          <a:solidFill>
-            <a:srgbClr val="322610"/>
-          </a:solidFill>
-        </p:spPr>
+        <p:spPr/>
         <p:txBody>
           <a:bodyPr>
             <a:normAutofit/>
           </a:bodyPr>
           <a:lstStyle/>
           <a:p>
-            <a:pPr marL="57150" indent="0">
-              <a:buNone/>
-            </a:pPr>
             <a:r>
-              <a:rPr lang="en-US" sz="2400" b="0" dirty="0">
-                <a:solidFill>
-                  <a:srgbClr val="A9B665"/>
-                </a:solidFill>
-                <a:effectLst/>
-                <a:latin typeface="Consolas" panose="020B0609020204030204" pitchFamily="49" charset="0"/>
-              </a:rPr>
-              <a:t>&lt;</a:t>
+              <a:rPr lang="en-US" sz="3600" dirty="0"/>
+              <a:t>CSS files are separate files that add style to HTML</a:t>
+            </a:r>
+          </a:p>
+          <a:p>
+            <a:endParaRPr lang="en-US" sz="3600" dirty="0"/>
+          </a:p>
+          <a:p>
+            <a:r>
+              <a:rPr lang="en-US" sz="3600" dirty="0"/>
+              <a:t>They have a different language</a:t>
+            </a:r>
+          </a:p>
+          <a:p>
+            <a:endParaRPr lang="en-US" sz="3600" dirty="0"/>
+          </a:p>
+          <a:p>
+            <a:r>
+              <a:rPr lang="en-US" sz="3600" dirty="0"/>
+              <a:t>They end with </a:t>
             </a:r>
             <a:r>
-              <a:rPr lang="en-US" sz="2400" b="0" dirty="0">
-                <a:solidFill>
-                  <a:srgbClr val="E78A4E"/>
-                </a:solidFill>
-                <a:effectLst/>
-                <a:latin typeface="Consolas" panose="020B0609020204030204" pitchFamily="49" charset="0"/>
-              </a:rPr>
-              <a:t>html</a:t>
+              <a:rPr lang="en-US" sz="3600" b="1" dirty="0"/>
+              <a:t>.</a:t>
             </a:r>
             <a:r>
-              <a:rPr lang="en-US" sz="2400" b="0" dirty="0">
-                <a:solidFill>
-                  <a:srgbClr val="A9B665"/>
-                </a:solidFill>
-                <a:effectLst/>
-                <a:latin typeface="Consolas" panose="020B0609020204030204" pitchFamily="49" charset="0"/>
-              </a:rPr>
-              <a:t>&gt;</a:t>
+              <a:rPr lang="en-US" sz="3600" b="1" dirty="0" err="1"/>
+              <a:t>css</a:t>
             </a:r>
-            <a:endParaRPr lang="en-US" sz="2400" b="0" dirty="0">
-              <a:solidFill>
-                <a:srgbClr val="D4BE98"/>
-              </a:solidFill>
-              <a:effectLst/>
-              <a:latin typeface="Consolas" panose="020B0609020204030204" pitchFamily="49" charset="0"/>
-            </a:endParaRPr>
-          </a:p>
-          <a:p>
-            <a:pPr marL="57150" indent="0">
-              <a:buNone/>
-            </a:pPr>
+            <a:endParaRPr lang="en-US" sz="3600" b="1" dirty="0"/>
+          </a:p>
+          <a:p>
+            <a:endParaRPr lang="en-US" sz="3600" dirty="0"/>
+          </a:p>
+          <a:p>
             <a:r>
-              <a:rPr lang="en-US" sz="2400" b="0" dirty="0">
-                <a:solidFill>
-                  <a:srgbClr val="D4BE98"/>
-                </a:solidFill>
-                <a:effectLst/>
-                <a:latin typeface="Consolas" panose="020B0609020204030204" pitchFamily="49" charset="0"/>
-              </a:rPr>
-              <a:t>  </a:t>
+              <a:rPr lang="en-US" sz="3600" dirty="0"/>
+              <a:t>They must be </a:t>
             </a:r>
             <a:r>
-              <a:rPr lang="en-US" sz="2400" b="0" dirty="0">
-                <a:solidFill>
-                  <a:srgbClr val="A9B665"/>
-                </a:solidFill>
-                <a:effectLst/>
-                <a:latin typeface="Consolas" panose="020B0609020204030204" pitchFamily="49" charset="0"/>
-              </a:rPr>
-              <a:t>&lt;</a:t>
+              <a:rPr lang="en-US" sz="3600" i="1" dirty="0"/>
+              <a:t>linked</a:t>
             </a:r>
             <a:r>
-              <a:rPr lang="en-US" sz="2400" b="0" dirty="0">
-                <a:solidFill>
-                  <a:srgbClr val="E78A4E"/>
-                </a:solidFill>
-                <a:effectLst/>
-                <a:latin typeface="Consolas" panose="020B0609020204030204" pitchFamily="49" charset="0"/>
-              </a:rPr>
-              <a:t>head</a:t>
-            </a:r>
-            <a:r>
-              <a:rPr lang="en-US" sz="2400" b="0" dirty="0">
-                <a:solidFill>
-                  <a:srgbClr val="A9B665"/>
-                </a:solidFill>
-                <a:effectLst/>
-                <a:latin typeface="Consolas" panose="020B0609020204030204" pitchFamily="49" charset="0"/>
-              </a:rPr>
-              <a:t>&gt;</a:t>
-            </a:r>
-            <a:endParaRPr lang="en-US" sz="2400" b="0" dirty="0">
-              <a:solidFill>
-                <a:srgbClr val="D4BE98"/>
-              </a:solidFill>
-              <a:effectLst/>
-              <a:latin typeface="Consolas" panose="020B0609020204030204" pitchFamily="49" charset="0"/>
-            </a:endParaRPr>
-          </a:p>
-          <a:p>
-            <a:pPr marL="57150" indent="0">
-              <a:buNone/>
-            </a:pPr>
-            <a:r>
-              <a:rPr lang="en-US" sz="2400" b="0" dirty="0">
-                <a:solidFill>
-                  <a:srgbClr val="D4BE98"/>
-                </a:solidFill>
-                <a:effectLst/>
-                <a:latin typeface="Consolas" panose="020B0609020204030204" pitchFamily="49" charset="0"/>
-              </a:rPr>
-              <a:t>    </a:t>
-            </a:r>
-            <a:r>
-              <a:rPr lang="en-US" sz="2400" b="0" dirty="0">
-                <a:solidFill>
-                  <a:srgbClr val="A9B665"/>
-                </a:solidFill>
-                <a:effectLst/>
-                <a:latin typeface="Consolas" panose="020B0609020204030204" pitchFamily="49" charset="0"/>
-              </a:rPr>
-              <a:t>&lt;</a:t>
-            </a:r>
-            <a:r>
-              <a:rPr lang="en-US" sz="2400" b="0" dirty="0">
-                <a:solidFill>
-                  <a:srgbClr val="E78A4E"/>
-                </a:solidFill>
-                <a:effectLst/>
-                <a:latin typeface="Consolas" panose="020B0609020204030204" pitchFamily="49" charset="0"/>
-              </a:rPr>
-              <a:t>style</a:t>
-            </a:r>
-            <a:r>
-              <a:rPr lang="en-US" sz="2400" b="0" dirty="0">
-                <a:solidFill>
-                  <a:srgbClr val="A9B665"/>
-                </a:solidFill>
-                <a:effectLst/>
-                <a:latin typeface="Consolas" panose="020B0609020204030204" pitchFamily="49" charset="0"/>
-              </a:rPr>
-              <a:t>&gt;</a:t>
-            </a:r>
-            <a:endParaRPr lang="en-US" sz="2400" b="0" dirty="0">
-              <a:solidFill>
-                <a:srgbClr val="D4BE98"/>
-              </a:solidFill>
-              <a:effectLst/>
-              <a:latin typeface="Consolas" panose="020B0609020204030204" pitchFamily="49" charset="0"/>
-            </a:endParaRPr>
-          </a:p>
-          <a:p>
-            <a:pPr marL="57150" indent="0">
-              <a:buNone/>
-            </a:pPr>
-            <a:r>
-              <a:rPr lang="en-US" sz="2400" b="0" dirty="0">
-                <a:solidFill>
-                  <a:srgbClr val="D4BE98"/>
-                </a:solidFill>
-                <a:effectLst/>
-                <a:latin typeface="Consolas" panose="020B0609020204030204" pitchFamily="49" charset="0"/>
-              </a:rPr>
-              <a:t>      </a:t>
-            </a:r>
-            <a:r>
-              <a:rPr lang="en-US" sz="2400" b="0" i="1" dirty="0">
-                <a:solidFill>
-                  <a:srgbClr val="928374"/>
-                </a:solidFill>
-                <a:effectLst/>
-                <a:latin typeface="Consolas" panose="020B0609020204030204" pitchFamily="49" charset="0"/>
-              </a:rPr>
-              <a:t>/* CSS Goes Here */</a:t>
-            </a:r>
-            <a:endParaRPr lang="en-US" sz="2400" b="0" dirty="0">
-              <a:solidFill>
-                <a:srgbClr val="D4BE98"/>
-              </a:solidFill>
-              <a:effectLst/>
-              <a:latin typeface="Consolas" panose="020B0609020204030204" pitchFamily="49" charset="0"/>
-            </a:endParaRPr>
-          </a:p>
-          <a:p>
-            <a:pPr marL="57150" indent="0">
-              <a:buNone/>
-            </a:pPr>
-            <a:r>
-              <a:rPr lang="en-US" sz="2400" b="0" dirty="0">
-                <a:solidFill>
-                  <a:srgbClr val="D4BE98"/>
-                </a:solidFill>
-                <a:effectLst/>
-                <a:latin typeface="Consolas" panose="020B0609020204030204" pitchFamily="49" charset="0"/>
-              </a:rPr>
-              <a:t>    </a:t>
-            </a:r>
-            <a:r>
-              <a:rPr lang="en-US" sz="2400" b="0" dirty="0">
-                <a:solidFill>
-                  <a:srgbClr val="A9B665"/>
-                </a:solidFill>
-                <a:effectLst/>
-                <a:latin typeface="Consolas" panose="020B0609020204030204" pitchFamily="49" charset="0"/>
-              </a:rPr>
-              <a:t>&lt;/</a:t>
-            </a:r>
-            <a:r>
-              <a:rPr lang="en-US" sz="2400" b="0" dirty="0">
-                <a:solidFill>
-                  <a:srgbClr val="E78A4E"/>
-                </a:solidFill>
-                <a:effectLst/>
-                <a:latin typeface="Consolas" panose="020B0609020204030204" pitchFamily="49" charset="0"/>
-              </a:rPr>
-              <a:t>style</a:t>
-            </a:r>
-            <a:r>
-              <a:rPr lang="en-US" sz="2400" b="0" dirty="0">
-                <a:solidFill>
-                  <a:srgbClr val="A9B665"/>
-                </a:solidFill>
-                <a:effectLst/>
-                <a:latin typeface="Consolas" panose="020B0609020204030204" pitchFamily="49" charset="0"/>
-              </a:rPr>
-              <a:t>&gt;</a:t>
-            </a:r>
-            <a:endParaRPr lang="en-US" sz="2400" b="0" dirty="0">
-              <a:solidFill>
-                <a:srgbClr val="D4BE98"/>
-              </a:solidFill>
-              <a:effectLst/>
-              <a:latin typeface="Consolas" panose="020B0609020204030204" pitchFamily="49" charset="0"/>
-            </a:endParaRPr>
-          </a:p>
-          <a:p>
-            <a:pPr marL="57150" indent="0">
-              <a:buNone/>
-            </a:pPr>
-            <a:r>
-              <a:rPr lang="en-US" sz="2400" b="0" dirty="0">
-                <a:solidFill>
-                  <a:srgbClr val="D4BE98"/>
-                </a:solidFill>
-                <a:effectLst/>
-                <a:latin typeface="Consolas" panose="020B0609020204030204" pitchFamily="49" charset="0"/>
-              </a:rPr>
-              <a:t>  </a:t>
-            </a:r>
-            <a:r>
-              <a:rPr lang="en-US" sz="2400" b="0" dirty="0">
-                <a:solidFill>
-                  <a:srgbClr val="A9B665"/>
-                </a:solidFill>
-                <a:effectLst/>
-                <a:latin typeface="Consolas" panose="020B0609020204030204" pitchFamily="49" charset="0"/>
-              </a:rPr>
-              <a:t>&lt;/</a:t>
-            </a:r>
-            <a:r>
-              <a:rPr lang="en-US" sz="2400" b="0" dirty="0">
-                <a:solidFill>
-                  <a:srgbClr val="E78A4E"/>
-                </a:solidFill>
-                <a:effectLst/>
-                <a:latin typeface="Consolas" panose="020B0609020204030204" pitchFamily="49" charset="0"/>
-              </a:rPr>
-              <a:t>head</a:t>
-            </a:r>
-            <a:r>
-              <a:rPr lang="en-US" sz="2400" b="0" dirty="0">
-                <a:solidFill>
-                  <a:srgbClr val="A9B665"/>
-                </a:solidFill>
-                <a:effectLst/>
-                <a:latin typeface="Consolas" panose="020B0609020204030204" pitchFamily="49" charset="0"/>
-              </a:rPr>
-              <a:t>&gt;</a:t>
-            </a:r>
-            <a:endParaRPr lang="en-US" sz="2400" b="0" dirty="0">
-              <a:solidFill>
-                <a:srgbClr val="D4BE98"/>
-              </a:solidFill>
-              <a:effectLst/>
-              <a:latin typeface="Consolas" panose="020B0609020204030204" pitchFamily="49" charset="0"/>
-            </a:endParaRPr>
-          </a:p>
-          <a:p>
-            <a:pPr marL="57150" indent="0">
-              <a:buNone/>
-            </a:pPr>
-            <a:r>
-              <a:rPr lang="en-US" sz="2400" b="0" dirty="0">
-                <a:solidFill>
-                  <a:srgbClr val="D4BE98"/>
-                </a:solidFill>
-                <a:effectLst/>
-                <a:latin typeface="Consolas" panose="020B0609020204030204" pitchFamily="49" charset="0"/>
-              </a:rPr>
-              <a:t>  </a:t>
-            </a:r>
-            <a:r>
-              <a:rPr lang="en-US" sz="2400" b="0" dirty="0">
-                <a:solidFill>
-                  <a:srgbClr val="A9B665"/>
-                </a:solidFill>
-                <a:effectLst/>
-                <a:latin typeface="Consolas" panose="020B0609020204030204" pitchFamily="49" charset="0"/>
-              </a:rPr>
-              <a:t>&lt;</a:t>
-            </a:r>
-            <a:r>
-              <a:rPr lang="en-US" sz="2400" b="0" dirty="0">
-                <a:solidFill>
-                  <a:srgbClr val="E78A4E"/>
-                </a:solidFill>
-                <a:effectLst/>
-                <a:latin typeface="Consolas" panose="020B0609020204030204" pitchFamily="49" charset="0"/>
-              </a:rPr>
-              <a:t>body</a:t>
-            </a:r>
-            <a:r>
-              <a:rPr lang="en-US" sz="2400" b="0" dirty="0">
-                <a:solidFill>
-                  <a:srgbClr val="A9B665"/>
-                </a:solidFill>
-                <a:effectLst/>
-                <a:latin typeface="Consolas" panose="020B0609020204030204" pitchFamily="49" charset="0"/>
-              </a:rPr>
-              <a:t>&gt;</a:t>
-            </a:r>
-            <a:endParaRPr lang="en-US" sz="2400" b="0" dirty="0">
-              <a:solidFill>
-                <a:srgbClr val="D4BE98"/>
-              </a:solidFill>
-              <a:effectLst/>
-              <a:latin typeface="Consolas" panose="020B0609020204030204" pitchFamily="49" charset="0"/>
-            </a:endParaRPr>
-          </a:p>
-          <a:p>
-            <a:pPr marL="57150" indent="0">
-              <a:buNone/>
-            </a:pPr>
-            <a:r>
-              <a:rPr lang="en-US" sz="2400" b="0" dirty="0">
-                <a:solidFill>
-                  <a:srgbClr val="D4BE98"/>
-                </a:solidFill>
-                <a:effectLst/>
-                <a:latin typeface="Consolas" panose="020B0609020204030204" pitchFamily="49" charset="0"/>
-              </a:rPr>
-              <a:t>    </a:t>
-            </a:r>
-            <a:r>
-              <a:rPr lang="en-US" sz="2400" b="0" dirty="0">
-                <a:solidFill>
-                  <a:srgbClr val="A9B665"/>
-                </a:solidFill>
-                <a:effectLst/>
-                <a:latin typeface="Consolas" panose="020B0609020204030204" pitchFamily="49" charset="0"/>
-              </a:rPr>
-              <a:t>&lt;</a:t>
-            </a:r>
-            <a:r>
-              <a:rPr lang="en-US" sz="2400" b="0" dirty="0">
-                <a:solidFill>
-                  <a:srgbClr val="E78A4E"/>
-                </a:solidFill>
-                <a:effectLst/>
-                <a:latin typeface="Consolas" panose="020B0609020204030204" pitchFamily="49" charset="0"/>
-              </a:rPr>
-              <a:t>h1</a:t>
-            </a:r>
-            <a:r>
-              <a:rPr lang="en-US" sz="2400" b="0" dirty="0">
-                <a:solidFill>
-                  <a:srgbClr val="A9B665"/>
-                </a:solidFill>
-                <a:effectLst/>
-                <a:latin typeface="Consolas" panose="020B0609020204030204" pitchFamily="49" charset="0"/>
-              </a:rPr>
-              <a:t>&gt;</a:t>
-            </a:r>
-            <a:r>
-              <a:rPr lang="en-US" sz="2400" b="0" dirty="0">
-                <a:solidFill>
-                  <a:srgbClr val="D4BE98"/>
-                </a:solidFill>
-                <a:effectLst/>
-                <a:latin typeface="Consolas" panose="020B0609020204030204" pitchFamily="49" charset="0"/>
-              </a:rPr>
-              <a:t>My Site</a:t>
-            </a:r>
-            <a:r>
-              <a:rPr lang="en-US" sz="2400" b="0" dirty="0">
-                <a:solidFill>
-                  <a:srgbClr val="A9B665"/>
-                </a:solidFill>
-                <a:effectLst/>
-                <a:latin typeface="Consolas" panose="020B0609020204030204" pitchFamily="49" charset="0"/>
-              </a:rPr>
-              <a:t>&lt;/</a:t>
-            </a:r>
-            <a:r>
-              <a:rPr lang="en-US" sz="2400" b="0" dirty="0">
-                <a:solidFill>
-                  <a:srgbClr val="E78A4E"/>
-                </a:solidFill>
-                <a:effectLst/>
-                <a:latin typeface="Consolas" panose="020B0609020204030204" pitchFamily="49" charset="0"/>
-              </a:rPr>
-              <a:t>h1</a:t>
-            </a:r>
-            <a:r>
-              <a:rPr lang="en-US" sz="2400" b="0" dirty="0">
-                <a:solidFill>
-                  <a:srgbClr val="A9B665"/>
-                </a:solidFill>
-                <a:effectLst/>
-                <a:latin typeface="Consolas" panose="020B0609020204030204" pitchFamily="49" charset="0"/>
-              </a:rPr>
-              <a:t>&gt;</a:t>
-            </a:r>
-            <a:endParaRPr lang="en-US" sz="2400" b="0" dirty="0">
-              <a:solidFill>
-                <a:srgbClr val="D4BE98"/>
-              </a:solidFill>
-              <a:effectLst/>
-              <a:latin typeface="Consolas" panose="020B0609020204030204" pitchFamily="49" charset="0"/>
-            </a:endParaRPr>
-          </a:p>
-          <a:p>
-            <a:pPr marL="57150" indent="0">
-              <a:buNone/>
-            </a:pPr>
-            <a:r>
-              <a:rPr lang="en-US" sz="2400" b="0" dirty="0">
-                <a:solidFill>
-                  <a:srgbClr val="D4BE98"/>
-                </a:solidFill>
-                <a:effectLst/>
-                <a:latin typeface="Consolas" panose="020B0609020204030204" pitchFamily="49" charset="0"/>
-              </a:rPr>
-              <a:t>  </a:t>
-            </a:r>
-            <a:r>
-              <a:rPr lang="en-US" sz="2400" b="0" dirty="0">
-                <a:solidFill>
-                  <a:srgbClr val="A9B665"/>
-                </a:solidFill>
-                <a:effectLst/>
-                <a:latin typeface="Consolas" panose="020B0609020204030204" pitchFamily="49" charset="0"/>
-              </a:rPr>
-              <a:t>&lt;/</a:t>
-            </a:r>
-            <a:r>
-              <a:rPr lang="en-US" sz="2400" b="0" dirty="0">
-                <a:solidFill>
-                  <a:srgbClr val="E78A4E"/>
-                </a:solidFill>
-                <a:effectLst/>
-                <a:latin typeface="Consolas" panose="020B0609020204030204" pitchFamily="49" charset="0"/>
-              </a:rPr>
-              <a:t>body</a:t>
-            </a:r>
-            <a:r>
-              <a:rPr lang="en-US" sz="2400" b="0" dirty="0">
-                <a:solidFill>
-                  <a:srgbClr val="A9B665"/>
-                </a:solidFill>
-                <a:effectLst/>
-                <a:latin typeface="Consolas" panose="020B0609020204030204" pitchFamily="49" charset="0"/>
-              </a:rPr>
-              <a:t>&gt;</a:t>
-            </a:r>
-            <a:endParaRPr lang="en-US" sz="2400" b="0" dirty="0">
-              <a:solidFill>
-                <a:srgbClr val="D4BE98"/>
-              </a:solidFill>
-              <a:effectLst/>
-              <a:latin typeface="Consolas" panose="020B0609020204030204" pitchFamily="49" charset="0"/>
-            </a:endParaRPr>
-          </a:p>
-          <a:p>
-            <a:pPr marL="57150" indent="0">
-              <a:buNone/>
-            </a:pPr>
-            <a:r>
-              <a:rPr lang="en-US" sz="2400" b="0" dirty="0">
-                <a:solidFill>
-                  <a:srgbClr val="A9B665"/>
-                </a:solidFill>
-                <a:effectLst/>
-                <a:latin typeface="Consolas" panose="020B0609020204030204" pitchFamily="49" charset="0"/>
-              </a:rPr>
-              <a:t>&lt;/</a:t>
-            </a:r>
-            <a:r>
-              <a:rPr lang="en-US" sz="2400" b="0" dirty="0">
-                <a:solidFill>
-                  <a:srgbClr val="E78A4E"/>
-                </a:solidFill>
-                <a:effectLst/>
-                <a:latin typeface="Consolas" panose="020B0609020204030204" pitchFamily="49" charset="0"/>
-              </a:rPr>
-              <a:t>html</a:t>
-            </a:r>
-            <a:r>
-              <a:rPr lang="en-US" sz="2400" b="0" dirty="0">
-                <a:solidFill>
-                  <a:srgbClr val="A9B665"/>
-                </a:solidFill>
-                <a:effectLst/>
-                <a:latin typeface="Consolas" panose="020B0609020204030204" pitchFamily="49" charset="0"/>
-              </a:rPr>
-              <a:t>&gt;</a:t>
-            </a:r>
-            <a:endParaRPr lang="en-US" sz="2400" b="0" dirty="0">
-              <a:solidFill>
-                <a:srgbClr val="D4BE98"/>
-              </a:solidFill>
-              <a:effectLst/>
-              <a:latin typeface="Consolas" panose="020B0609020204030204" pitchFamily="49" charset="0"/>
-            </a:endParaRPr>
-          </a:p>
-        </p:txBody>
-      </p:sp>
-      <p:sp>
-        <p:nvSpPr>
-          <p:cNvPr id="5" name="Content Placeholder 2">
-            <a:extLst>
-              <a:ext uri="{FF2B5EF4-FFF2-40B4-BE49-F238E27FC236}">
-                <a16:creationId xmlns:a16="http://schemas.microsoft.com/office/drawing/2014/main" id="{0E28B48C-F781-40A9-8C61-6C54EECEAE54}"/>
-              </a:ext>
-            </a:extLst>
-          </p:cNvPr>
-          <p:cNvSpPr txBox="1">
-            <a:spLocks/>
-          </p:cNvSpPr>
-          <p:nvPr/>
-        </p:nvSpPr>
-        <p:spPr>
-          <a:xfrm>
-            <a:off x="5181599" y="4173364"/>
-            <a:ext cx="6508955" cy="2354580"/>
-          </a:xfrm>
-          <a:prstGeom prst="rect">
-            <a:avLst/>
-          </a:prstGeom>
-        </p:spPr>
-        <p:txBody>
-          <a:bodyPr vert="horz" lIns="0" tIns="0" rIns="0" bIns="0" rtlCol="0">
-            <a:normAutofit/>
-          </a:bodyPr>
-          <a:lstStyle>
-            <a:lvl1pPr marL="342900" indent="-285750" algn="l" defTabSz="914400" rtl="0" eaLnBrk="1" latinLnBrk="0" hangingPunct="1">
-              <a:lnSpc>
-                <a:spcPct val="100000"/>
-              </a:lnSpc>
-              <a:spcBef>
-                <a:spcPts val="0"/>
-              </a:spcBef>
-              <a:spcAft>
-                <a:spcPts val="1200"/>
-              </a:spcAft>
-              <a:buClr>
-                <a:schemeClr val="accent3"/>
-              </a:buClr>
-              <a:buFont typeface="Wingdings" panose="05000000000000000000" pitchFamily="2" charset="2"/>
-              <a:buChar char="§"/>
-              <a:defRPr sz="2800" kern="1200">
-                <a:solidFill>
-                  <a:schemeClr val="tx1"/>
-                </a:solidFill>
-                <a:latin typeface="+mn-lt"/>
-                <a:ea typeface="+mn-ea"/>
-                <a:cs typeface="+mn-cs"/>
-              </a:defRPr>
-            </a:lvl1pPr>
-            <a:lvl2pPr marL="685800" indent="-228600" algn="l" defTabSz="914400" rtl="0" eaLnBrk="1" latinLnBrk="0" hangingPunct="1">
-              <a:lnSpc>
-                <a:spcPct val="100000"/>
-              </a:lnSpc>
-              <a:spcBef>
-                <a:spcPts val="0"/>
-              </a:spcBef>
-              <a:spcAft>
-                <a:spcPts val="1200"/>
-              </a:spcAft>
-              <a:buClr>
-                <a:schemeClr val="accent2"/>
-              </a:buClr>
-              <a:buFont typeface="Arial" panose="020B0604020202020204" pitchFamily="34" charset="0"/>
-              <a:buChar char="•"/>
-              <a:defRPr sz="2400" kern="1200">
-                <a:solidFill>
-                  <a:schemeClr val="tx1"/>
-                </a:solidFill>
-                <a:latin typeface="+mn-lt"/>
-                <a:ea typeface="+mn-ea"/>
-                <a:cs typeface="+mn-cs"/>
-              </a:defRPr>
-            </a:lvl2pPr>
-            <a:lvl3pPr marL="1028700" indent="-228600" algn="l" defTabSz="914400" rtl="0" eaLnBrk="1" latinLnBrk="0" hangingPunct="1">
-              <a:lnSpc>
-                <a:spcPct val="100000"/>
-              </a:lnSpc>
-              <a:spcBef>
-                <a:spcPts val="0"/>
-              </a:spcBef>
-              <a:spcAft>
-                <a:spcPts val="1200"/>
-              </a:spcAft>
-              <a:buClr>
-                <a:schemeClr val="accent1"/>
-              </a:buClr>
-              <a:buFont typeface="Arial" panose="020B0604020202020204" pitchFamily="34" charset="0"/>
-              <a:buChar char="•"/>
-              <a:defRPr sz="2000" kern="1200">
-                <a:solidFill>
-                  <a:schemeClr val="tx1"/>
-                </a:solidFill>
-                <a:latin typeface="+mn-lt"/>
-                <a:ea typeface="+mn-ea"/>
-                <a:cs typeface="+mn-cs"/>
-              </a:defRPr>
-            </a:lvl3pPr>
-            <a:lvl4pPr marL="1484313" indent="-285750" algn="l" defTabSz="914400" rtl="0" eaLnBrk="1" latinLnBrk="0" hangingPunct="1">
-              <a:lnSpc>
-                <a:spcPct val="100000"/>
-              </a:lnSpc>
-              <a:spcBef>
-                <a:spcPts val="0"/>
-              </a:spcBef>
-              <a:spcAft>
-                <a:spcPts val="1200"/>
-              </a:spcAft>
-              <a:buFont typeface="Arial" panose="020B0604020202020204" pitchFamily="34" charset="0"/>
-              <a:buChar char="•"/>
-              <a:defRPr sz="1800" kern="1200">
-                <a:solidFill>
-                  <a:schemeClr val="tx1"/>
-                </a:solidFill>
-                <a:latin typeface="+mn-lt"/>
-                <a:ea typeface="+mn-ea"/>
-                <a:cs typeface="+mn-cs"/>
-              </a:defRPr>
-            </a:lvl4pPr>
-            <a:lvl5pPr marL="1889125" indent="-284163" algn="l" defTabSz="914400" rtl="0" eaLnBrk="1" latinLnBrk="0" hangingPunct="1">
-              <a:lnSpc>
-                <a:spcPct val="100000"/>
-              </a:lnSpc>
-              <a:spcBef>
-                <a:spcPts val="0"/>
-              </a:spcBef>
-              <a:spcAft>
-                <a:spcPts val="1200"/>
-              </a:spcAft>
-              <a:buFont typeface="Arial" panose="020B0604020202020204" pitchFamily="34" charset="0"/>
-              <a:buChar char="•"/>
-              <a:defRPr sz="1800" kern="1200">
-                <a:solidFill>
-                  <a:schemeClr val="tx1"/>
-                </a:solidFill>
-                <a:latin typeface="+mn-lt"/>
-                <a:ea typeface="+mn-ea"/>
-                <a:cs typeface="+mn-cs"/>
-              </a:defRPr>
-            </a:lvl5pPr>
-            <a:lvl6pPr marL="2514600" indent="-228600" algn="l" defTabSz="914400" rtl="0" eaLnBrk="1" latinLnBrk="0" hangingPunct="1">
-              <a:lnSpc>
-                <a:spcPct val="90000"/>
-              </a:lnSpc>
-              <a:spcBef>
-                <a:spcPts val="500"/>
-              </a:spcBef>
-              <a:buFont typeface="Arial" panose="020B0604020202020204" pitchFamily="34" charset="0"/>
-              <a:buChar char="•"/>
-              <a:defRPr sz="1800" kern="1200">
-                <a:solidFill>
-                  <a:schemeClr val="tx1"/>
-                </a:solidFill>
-                <a:latin typeface="+mn-lt"/>
-                <a:ea typeface="+mn-ea"/>
-                <a:cs typeface="+mn-cs"/>
-              </a:defRPr>
-            </a:lvl6pPr>
-            <a:lvl7pPr marL="2971800" indent="-228600" algn="l" defTabSz="914400" rtl="0" eaLnBrk="1" latinLnBrk="0" hangingPunct="1">
-              <a:lnSpc>
-                <a:spcPct val="90000"/>
-              </a:lnSpc>
-              <a:spcBef>
-                <a:spcPts val="500"/>
-              </a:spcBef>
-              <a:buFont typeface="Arial" panose="020B0604020202020204" pitchFamily="34" charset="0"/>
-              <a:buChar char="•"/>
-              <a:defRPr sz="1800" kern="1200">
-                <a:solidFill>
-                  <a:schemeClr val="tx1"/>
-                </a:solidFill>
-                <a:latin typeface="+mn-lt"/>
-                <a:ea typeface="+mn-ea"/>
-                <a:cs typeface="+mn-cs"/>
-              </a:defRPr>
-            </a:lvl7pPr>
-            <a:lvl8pPr marL="3429000" indent="-228600" algn="l" defTabSz="914400" rtl="0" eaLnBrk="1" latinLnBrk="0" hangingPunct="1">
-              <a:lnSpc>
-                <a:spcPct val="90000"/>
-              </a:lnSpc>
-              <a:spcBef>
-                <a:spcPts val="500"/>
-              </a:spcBef>
-              <a:buFont typeface="Arial" panose="020B0604020202020204" pitchFamily="34" charset="0"/>
-              <a:buChar char="•"/>
-              <a:defRPr sz="1800" kern="1200">
-                <a:solidFill>
-                  <a:schemeClr val="tx1"/>
-                </a:solidFill>
-                <a:latin typeface="+mn-lt"/>
-                <a:ea typeface="+mn-ea"/>
-                <a:cs typeface="+mn-cs"/>
-              </a:defRPr>
-            </a:lvl8pPr>
-            <a:lvl9pPr marL="3886200" indent="-228600" algn="l" defTabSz="914400" rtl="0" eaLnBrk="1" latinLnBrk="0" hangingPunct="1">
-              <a:lnSpc>
-                <a:spcPct val="90000"/>
-              </a:lnSpc>
-              <a:spcBef>
-                <a:spcPts val="500"/>
-              </a:spcBef>
-              <a:buFont typeface="Arial" panose="020B0604020202020204" pitchFamily="34" charset="0"/>
-              <a:buChar char="•"/>
-              <a:defRPr sz="1800" kern="1200">
-                <a:solidFill>
-                  <a:schemeClr val="tx1"/>
-                </a:solidFill>
-                <a:latin typeface="+mn-lt"/>
-                <a:ea typeface="+mn-ea"/>
-                <a:cs typeface="+mn-cs"/>
-              </a:defRPr>
-            </a:lvl9pPr>
-          </a:lstStyle>
-          <a:p>
-            <a:r>
-              <a:rPr lang="en-US" dirty="0"/>
-              <a:t>The </a:t>
-            </a:r>
-            <a:r>
-              <a:rPr lang="en-US" b="1" dirty="0">
-                <a:solidFill>
-                  <a:srgbClr val="FFB71B"/>
-                </a:solidFill>
-                <a:latin typeface="Consolas" panose="020B0609020204030204" pitchFamily="49" charset="0"/>
-              </a:rPr>
-              <a:t>&lt;head&gt;&lt;/head&gt;</a:t>
-            </a:r>
-            <a:r>
-              <a:rPr lang="en-US" dirty="0"/>
-              <a:t> element is a </a:t>
-            </a:r>
-            <a:r>
-              <a:rPr lang="en-US" i="1" dirty="0"/>
-              <a:t>child</a:t>
-            </a:r>
-            <a:r>
-              <a:rPr lang="en-US" dirty="0"/>
-              <a:t> of the </a:t>
-            </a:r>
-            <a:r>
-              <a:rPr lang="en-US" b="1" dirty="0">
-                <a:solidFill>
-                  <a:srgbClr val="FFB71B"/>
-                </a:solidFill>
-                <a:latin typeface="Consolas" panose="020B0609020204030204" pitchFamily="49" charset="0"/>
-              </a:rPr>
-              <a:t>&lt;html&gt;&lt;/html&gt;</a:t>
-            </a:r>
-            <a:r>
-              <a:rPr lang="en-US" dirty="0"/>
-              <a:t> element, and a </a:t>
-            </a:r>
-            <a:r>
-              <a:rPr lang="en-US" i="1" dirty="0"/>
-              <a:t>sibling</a:t>
-            </a:r>
-            <a:r>
-              <a:rPr lang="en-US" dirty="0"/>
-              <a:t> of the </a:t>
-            </a:r>
-            <a:r>
-              <a:rPr lang="en-US" b="1" dirty="0">
-                <a:solidFill>
-                  <a:srgbClr val="FFB71B"/>
-                </a:solidFill>
-                <a:latin typeface="Consolas" panose="020B0609020204030204" pitchFamily="49" charset="0"/>
-              </a:rPr>
-              <a:t>&lt;body&gt;&lt;/body&gt;</a:t>
-            </a:r>
-            <a:r>
-              <a:rPr lang="en-US" dirty="0"/>
-              <a:t> element</a:t>
-            </a:r>
-          </a:p>
-          <a:p>
-            <a:r>
-              <a:rPr lang="en-US" dirty="0"/>
-              <a:t>The </a:t>
-            </a:r>
-            <a:r>
-              <a:rPr lang="en-US" b="1" dirty="0">
-                <a:solidFill>
-                  <a:srgbClr val="FFB71B"/>
-                </a:solidFill>
-                <a:latin typeface="Consolas" panose="020B0609020204030204" pitchFamily="49" charset="0"/>
-              </a:rPr>
-              <a:t>&lt;style&gt;&lt;/style&gt;</a:t>
-            </a:r>
-            <a:r>
-              <a:rPr lang="en-US" dirty="0"/>
-              <a:t> element is a </a:t>
-            </a:r>
-            <a:r>
-              <a:rPr lang="en-US" i="1" dirty="0"/>
-              <a:t>child</a:t>
-            </a:r>
-            <a:r>
-              <a:rPr lang="en-US" dirty="0"/>
-              <a:t> of the </a:t>
-            </a:r>
-            <a:r>
-              <a:rPr lang="en-US" b="1" dirty="0">
-                <a:solidFill>
-                  <a:srgbClr val="FFB71B"/>
-                </a:solidFill>
-                <a:latin typeface="Consolas" panose="020B0609020204030204" pitchFamily="49" charset="0"/>
-              </a:rPr>
-              <a:t>&lt;head&gt;&lt;/head&gt;</a:t>
-            </a:r>
-            <a:r>
-              <a:rPr lang="en-US" dirty="0"/>
-              <a:t> element</a:t>
+              <a:rPr lang="en-US" sz="3600" dirty="0"/>
+              <a:t> from the HTML element  </a:t>
             </a:r>
           </a:p>
         </p:txBody>
       </p:sp>
       <p:pic>
         <p:nvPicPr>
-          <p:cNvPr id="3" name="Picture 2" descr="The saying 'Alas, poor Yorick! I knew him, Horatio' - meaning and origin.">
+          <p:cNvPr id="1026" name="Picture 2" descr="File Manager: Download a Free Trial of WinZip">
             <a:extLst>
               <a:ext uri="{FF2B5EF4-FFF2-40B4-BE49-F238E27FC236}">
-                <a16:creationId xmlns:a16="http://schemas.microsoft.com/office/drawing/2014/main" id="{748A4E57-B80E-4ACA-9AC7-66D578E3E66B}"/>
+                <a16:creationId xmlns:a16="http://schemas.microsoft.com/office/drawing/2014/main" id="{8D89EA5D-538D-4544-BA34-92AC5BBC859E}"/>
               </a:ext>
             </a:extLst>
           </p:cNvPr>
@@ -41367,60 +40697,13 @@
               </a:ext>
             </a:extLst>
           </a:blip>
-          <a:srcRect t="-1" b="33515"/>
+          <a:srcRect l="12296" r="8276"/>
           <a:stretch/>
         </p:blipFill>
         <p:spPr bwMode="auto">
           <a:xfrm>
-            <a:off x="5511902" y="1374425"/>
-            <a:ext cx="2924175" cy="2387457"/>
-          </a:xfrm>
-          <a:prstGeom prst="rect">
-            <a:avLst/>
-          </a:prstGeom>
-          <a:noFill/>
-          <a:extLst>
-            <a:ext uri="{909E8E84-426E-40DD-AFC4-6F175D3DCCD1}">
-              <a14:hiddenFill xmlns:a14="http://schemas.microsoft.com/office/drawing/2010/main">
-                <a:solidFill>
-                  <a:srgbClr val="FFFFFF"/>
-                </a:solidFill>
-              </a14:hiddenFill>
-            </a:ext>
-          </a:extLst>
-        </p:spPr>
-      </p:pic>
-      <p:pic>
-        <p:nvPicPr>
-          <p:cNvPr id="1028" name="Picture 4" descr="Matryoshka - Montessori Services">
-            <a:extLst>
-              <a:ext uri="{FF2B5EF4-FFF2-40B4-BE49-F238E27FC236}">
-                <a16:creationId xmlns:a16="http://schemas.microsoft.com/office/drawing/2014/main" id="{324B8F4F-CA5A-41D3-8E74-DCFEFDB1A3CC}"/>
-              </a:ext>
-            </a:extLst>
-          </p:cNvPr>
-          <p:cNvPicPr>
-            <a:picLocks noChangeAspect="1" noChangeArrowheads="1"/>
-          </p:cNvPicPr>
-          <p:nvPr/>
-        </p:nvPicPr>
-        <p:blipFill>
-          <a:blip r:embed="rId4">
-            <a:extLst>
-              <a:ext uri="{28A0092B-C50C-407E-A947-70E740481C1C}">
-                <a14:useLocalDpi xmlns:a14="http://schemas.microsoft.com/office/drawing/2010/main" val="0"/>
-              </a:ext>
-            </a:extLst>
-          </a:blip>
-          <a:srcRect/>
-          <a:stretch>
-            <a:fillRect/>
-          </a:stretch>
-        </p:blipFill>
-        <p:spPr bwMode="auto">
-          <a:xfrm>
-            <a:off x="8724900" y="1207983"/>
-            <a:ext cx="2514600" cy="2514600"/>
+            <a:off x="7353300" y="2057400"/>
+            <a:ext cx="4229101" cy="2835983"/>
           </a:xfrm>
           <a:prstGeom prst="rect">
             <a:avLst/>
@@ -41441,6 +40724,299 @@
     <p:extLst>
       <p:ext uri="{BB962C8B-B14F-4D97-AF65-F5344CB8AC3E}">
         <p14:creationId xmlns:p14="http://schemas.microsoft.com/office/powerpoint/2010/main" val="969036985"/>
+      </p:ext>
+    </p:extLst>
+  </p:cSld>
+  <p:clrMapOvr>
+    <a:masterClrMapping/>
+  </p:clrMapOvr>
+  <p:transition>
+    <p:fade/>
+  </p:transition>
+</p:sld>
+</file>
+
+<file path=ppt/slides/slide4.xml><?xml version="1.0" encoding="utf-8"?>
+<p:sld xmlns:a="http://schemas.openxmlformats.org/drawingml/2006/main" xmlns:r="http://schemas.openxmlformats.org/officeDocument/2006/relationships" xmlns:p="http://schemas.openxmlformats.org/presentationml/2006/main">
+  <p:cSld>
+    <p:spTree>
+      <p:nvGrpSpPr>
+        <p:cNvPr id="1" name=""/>
+        <p:cNvGrpSpPr/>
+        <p:nvPr/>
+      </p:nvGrpSpPr>
+      <p:grpSpPr>
+        <a:xfrm>
+          <a:off x="0" y="0"/>
+          <a:ext cx="0" cy="0"/>
+          <a:chOff x="0" y="0"/>
+          <a:chExt cx="0" cy="0"/>
+        </a:xfrm>
+      </p:grpSpPr>
+      <p:sp>
+        <p:nvSpPr>
+          <p:cNvPr id="2" name="Title 1"/>
+          <p:cNvSpPr>
+            <a:spLocks noGrp="1"/>
+          </p:cNvSpPr>
+          <p:nvPr>
+            <p:ph type="title"/>
+          </p:nvPr>
+        </p:nvSpPr>
+        <p:spPr/>
+        <p:txBody>
+          <a:bodyPr/>
+          <a:lstStyle/>
+          <a:p>
+            <a:r>
+              <a:rPr lang="en-US" dirty="0"/>
+              <a:t>the </a:t>
+            </a:r>
+            <a:r>
+              <a:rPr lang="en-US" cap="none" dirty="0">
+                <a:solidFill>
+                  <a:schemeClr val="accent1">
+                    <a:lumMod val="20000"/>
+                    <a:lumOff val="80000"/>
+                  </a:schemeClr>
+                </a:solidFill>
+                <a:latin typeface="Consolas" panose="020B0609020204030204" pitchFamily="49" charset="0"/>
+              </a:rPr>
+              <a:t>link</a:t>
+            </a:r>
+            <a:r>
+              <a:rPr lang="en-US" dirty="0"/>
+              <a:t> element</a:t>
+            </a:r>
+          </a:p>
+        </p:txBody>
+      </p:sp>
+      <p:sp>
+        <p:nvSpPr>
+          <p:cNvPr id="3" name="Content Placeholder 2"/>
+          <p:cNvSpPr>
+            <a:spLocks noGrp="1"/>
+          </p:cNvSpPr>
+          <p:nvPr>
+            <p:ph idx="1"/>
+          </p:nvPr>
+        </p:nvSpPr>
+        <p:spPr/>
+        <p:txBody>
+          <a:bodyPr>
+            <a:normAutofit/>
+          </a:bodyPr>
+          <a:lstStyle/>
+          <a:p>
+            <a:r>
+              <a:rPr lang="en-US" i="1" dirty="0"/>
+              <a:t>Different from the </a:t>
+            </a:r>
+            <a:r>
+              <a:rPr lang="en-US" b="1" i="1" dirty="0">
+                <a:solidFill>
+                  <a:schemeClr val="accent1">
+                    <a:lumMod val="50000"/>
+                  </a:schemeClr>
+                </a:solidFill>
+                <a:latin typeface="Consolas" panose="020B0609020204030204" pitchFamily="49" charset="0"/>
+              </a:rPr>
+              <a:t>&lt;a&gt;</a:t>
+            </a:r>
+            <a:r>
+              <a:rPr lang="en-US" i="1" dirty="0"/>
+              <a:t> hyperlink element</a:t>
+            </a:r>
+          </a:p>
+          <a:p>
+            <a:r>
+              <a:rPr lang="en-US" dirty="0"/>
+              <a:t>Links a variety of external files (CSS, fonts, icons)</a:t>
+            </a:r>
+          </a:p>
+          <a:p>
+            <a:r>
+              <a:rPr lang="en-US" dirty="0"/>
+              <a:t>It is a </a:t>
+            </a:r>
+            <a:r>
+              <a:rPr lang="en-US" i="1" dirty="0"/>
+              <a:t>self-closing</a:t>
+            </a:r>
+            <a:r>
+              <a:rPr lang="en-US" dirty="0"/>
+              <a:t> tag</a:t>
+            </a:r>
+          </a:p>
+          <a:p>
+            <a:r>
+              <a:rPr lang="en-US" dirty="0"/>
+              <a:t>It goes within the </a:t>
+            </a:r>
+            <a:r>
+              <a:rPr lang="en-US" sz="3200" dirty="0">
+                <a:solidFill>
+                  <a:schemeClr val="accent1">
+                    <a:lumMod val="50000"/>
+                  </a:schemeClr>
+                </a:solidFill>
+                <a:latin typeface="Consolas" panose="020B0609020204030204" pitchFamily="49" charset="0"/>
+              </a:rPr>
+              <a:t>&lt;head&gt;&lt;/head&gt;</a:t>
+            </a:r>
+            <a:r>
+              <a:rPr lang="en-US" dirty="0"/>
+              <a:t> element</a:t>
+            </a:r>
+          </a:p>
+          <a:p>
+            <a:endParaRPr lang="en-US" dirty="0"/>
+          </a:p>
+          <a:p>
+            <a:r>
+              <a:rPr lang="en-US" dirty="0"/>
+              <a:t>Important attributes:</a:t>
+            </a:r>
+          </a:p>
+          <a:p>
+            <a:pPr lvl="1"/>
+            <a:r>
+              <a:rPr lang="en-US" u="sng" dirty="0" err="1">
+                <a:solidFill>
+                  <a:schemeClr val="accent1">
+                    <a:lumMod val="50000"/>
+                  </a:schemeClr>
+                </a:solidFill>
+                <a:latin typeface="Consolas" panose="020B0609020204030204" pitchFamily="49" charset="0"/>
+              </a:rPr>
+              <a:t>href</a:t>
+            </a:r>
+            <a:r>
+              <a:rPr lang="en-US" dirty="0"/>
+              <a:t>: path to the file (either online or local)</a:t>
+            </a:r>
+          </a:p>
+          <a:p>
+            <a:pPr lvl="1"/>
+            <a:r>
+              <a:rPr lang="en-US" u="sng" dirty="0" err="1">
+                <a:solidFill>
+                  <a:schemeClr val="accent1">
+                    <a:lumMod val="50000"/>
+                  </a:schemeClr>
+                </a:solidFill>
+                <a:latin typeface="Consolas" panose="020B0609020204030204" pitchFamily="49" charset="0"/>
+              </a:rPr>
+              <a:t>rel</a:t>
+            </a:r>
+            <a:r>
+              <a:rPr lang="en-US" dirty="0"/>
+              <a:t>: determines the relationship type (e.g., “</a:t>
+            </a:r>
+            <a:r>
+              <a:rPr lang="en-US" dirty="0">
+                <a:solidFill>
+                  <a:schemeClr val="accent1">
+                    <a:lumMod val="50000"/>
+                  </a:schemeClr>
+                </a:solidFill>
+              </a:rPr>
+              <a:t>stylesheet</a:t>
+            </a:r>
+            <a:r>
+              <a:rPr lang="en-US" dirty="0"/>
+              <a:t>”)</a:t>
+            </a:r>
+          </a:p>
+          <a:p>
+            <a:pPr lvl="1"/>
+            <a:r>
+              <a:rPr lang="en-US" u="sng" dirty="0">
+                <a:solidFill>
+                  <a:schemeClr val="accent1">
+                    <a:lumMod val="50000"/>
+                  </a:schemeClr>
+                </a:solidFill>
+                <a:latin typeface="Consolas" panose="020B0609020204030204" pitchFamily="49" charset="0"/>
+              </a:rPr>
+              <a:t>type</a:t>
+            </a:r>
+            <a:r>
+              <a:rPr lang="en-US" dirty="0"/>
+              <a:t>: specifies the content type of the file (e.g., “</a:t>
+            </a:r>
+            <a:r>
+              <a:rPr lang="en-US" dirty="0">
+                <a:solidFill>
+                  <a:schemeClr val="accent1">
+                    <a:lumMod val="50000"/>
+                  </a:schemeClr>
+                </a:solidFill>
+              </a:rPr>
+              <a:t>text/</a:t>
+            </a:r>
+            <a:r>
+              <a:rPr lang="en-US" dirty="0" err="1">
+                <a:solidFill>
+                  <a:schemeClr val="accent1">
+                    <a:lumMod val="50000"/>
+                  </a:schemeClr>
+                </a:solidFill>
+              </a:rPr>
+              <a:t>css</a:t>
+            </a:r>
+            <a:r>
+              <a:rPr lang="en-US" dirty="0"/>
+              <a:t>”)</a:t>
+            </a:r>
+          </a:p>
+        </p:txBody>
+      </p:sp>
+      <p:pic>
+        <p:nvPicPr>
+          <p:cNvPr id="2050" name="Picture 2" descr="Image result for link"/>
+          <p:cNvPicPr>
+            <a:picLocks noChangeAspect="1" noChangeArrowheads="1"/>
+          </p:cNvPicPr>
+          <p:nvPr/>
+        </p:nvPicPr>
+        <p:blipFill>
+          <a:blip r:embed="rId3">
+            <a:extLst>
+              <a:ext uri="{28A0092B-C50C-407E-A947-70E740481C1C}">
+                <a14:useLocalDpi xmlns:a14="http://schemas.microsoft.com/office/drawing/2010/main" val="0"/>
+              </a:ext>
+            </a:extLst>
+          </a:blip>
+          <a:srcRect/>
+          <a:stretch>
+            <a:fillRect/>
+          </a:stretch>
+        </p:blipFill>
+        <p:spPr bwMode="auto">
+          <a:xfrm>
+            <a:off x="8603416" y="1828800"/>
+            <a:ext cx="3207584" cy="3200400"/>
+          </a:xfrm>
+          <a:prstGeom prst="rect">
+            <a:avLst/>
+          </a:prstGeom>
+          <a:noFill/>
+          <a:extLst>
+            <a:ext uri="{909E8E84-426E-40DD-AFC4-6F175D3DCCD1}">
+              <a14:hiddenFill xmlns:a14="http://schemas.microsoft.com/office/drawing/2010/main">
+                <a:solidFill>
+                  <a:srgbClr val="FFFFFF"/>
+                </a:solidFill>
+              </a14:hiddenFill>
+            </a:ext>
+          </a:extLst>
+        </p:spPr>
+      </p:pic>
+    </p:spTree>
+    <p:extLst>
+      <p:ext uri="{BB962C8B-B14F-4D97-AF65-F5344CB8AC3E}">
+        <p14:creationId xmlns:p14="http://schemas.microsoft.com/office/powerpoint/2010/main" val="2192436492"/>
       </p:ext>
     </p:extLst>
   </p:cSld>
@@ -41484,55 +41060,7 @@
                                           </p:stCondLst>
                                         </p:cTn>
                                         <p:tgtEl>
-                                          <p:spTgt spid="6">
-                                            <p:bg/>
-                                          </p:spTgt>
-                                        </p:tgtEl>
-                                        <p:attrNameLst>
-                                          <p:attrName>style.visibility</p:attrName>
-                                        </p:attrNameLst>
-                                      </p:cBhvr>
-                                      <p:to>
-                                        <p:strVal val="visible"/>
-                                      </p:to>
-                                    </p:set>
-                                    <p:animEffect transition="in" filter="fade">
-                                      <p:cBhvr>
-                                        <p:cTn id="7" dur="500"/>
-                                        <p:tgtEl>
-                                          <p:spTgt spid="6">
-                                            <p:bg/>
-                                          </p:spTgt>
-                                        </p:tgtEl>
-                                      </p:cBhvr>
-                                    </p:animEffect>
-                                  </p:childTnLst>
-                                </p:cTn>
-                              </p:par>
-                            </p:childTnLst>
-                          </p:cTn>
-                        </p:par>
-                        <p:par>
-                          <p:cTn id="8" fill="hold">
-                            <p:stCondLst>
-                              <p:cond delay="500"/>
-                            </p:stCondLst>
-                            <p:childTnLst>
-                              <p:par>
-                                <p:cTn id="9" presetID="10" presetClass="entr" presetSubtype="0" fill="hold" grpId="0" nodeType="afterEffect">
-                                  <p:stCondLst>
-                                    <p:cond delay="0"/>
-                                  </p:stCondLst>
-                                  <p:childTnLst>
-                                    <p:set>
-                                      <p:cBhvr>
-                                        <p:cTn id="10" dur="1" fill="hold">
-                                          <p:stCondLst>
-                                            <p:cond delay="0"/>
-                                          </p:stCondLst>
-                                        </p:cTn>
-                                        <p:tgtEl>
-                                          <p:spTgt spid="6">
+                                          <p:spTgt spid="3">
                                             <p:txEl>
                                               <p:pRg st="0" end="0"/>
                                             </p:txEl>
@@ -41548,9 +41076,9 @@
                                     </p:set>
                                     <p:animEffect transition="in" filter="fade">
                                       <p:cBhvr>
-                                        <p:cTn id="11" dur="500"/>
+                                        <p:cTn id="7" dur="500"/>
                                         <p:tgtEl>
-                                          <p:spTgt spid="6">
+                                          <p:spTgt spid="3">
                                             <p:txEl>
                                               <p:pRg st="0" end="0"/>
                                             </p:txEl>
@@ -41561,23 +41089,41 @@
                                   </p:childTnLst>
                                 </p:cTn>
                               </p:par>
+                            </p:childTnLst>
+                          </p:cTn>
+                        </p:par>
+                      </p:childTnLst>
+                    </p:cTn>
+                  </p:par>
+                  <p:par>
+                    <p:cTn id="8" fill="hold">
+                      <p:stCondLst>
+                        <p:cond delay="indefinite"/>
+                      </p:stCondLst>
+                      <p:childTnLst>
+                        <p:par>
+                          <p:cTn id="9" fill="hold">
+                            <p:stCondLst>
+                              <p:cond delay="0"/>
+                            </p:stCondLst>
+                            <p:childTnLst>
                               <p:par>
-                                <p:cTn id="12" presetID="10" presetClass="entr" presetSubtype="0" fill="hold" grpId="0" nodeType="withEffect">
+                                <p:cTn id="10" presetID="10" presetClass="entr" presetSubtype="0" fill="hold" grpId="0" nodeType="clickEffect">
                                   <p:stCondLst>
                                     <p:cond delay="0"/>
                                   </p:stCondLst>
                                   <p:childTnLst>
                                     <p:set>
                                       <p:cBhvr>
-                                        <p:cTn id="13" dur="1" fill="hold">
+                                        <p:cTn id="11" dur="1" fill="hold">
                                           <p:stCondLst>
                                             <p:cond delay="0"/>
                                           </p:stCondLst>
                                         </p:cTn>
                                         <p:tgtEl>
-                                          <p:spTgt spid="6">
+                                          <p:spTgt spid="3">
                                             <p:txEl>
-                                              <p:pRg st="9" end="9"/>
+                                              <p:pRg st="1" end="1"/>
                                             </p:txEl>
                                           </p:spTgt>
                                         </p:tgtEl>
@@ -41591,11 +41137,11 @@
                                     </p:set>
                                     <p:animEffect transition="in" filter="fade">
                                       <p:cBhvr>
-                                        <p:cTn id="14" dur="500"/>
+                                        <p:cTn id="12" dur="500"/>
                                         <p:tgtEl>
-                                          <p:spTgt spid="6">
+                                          <p:spTgt spid="3">
                                             <p:txEl>
-                                              <p:pRg st="9" end="9"/>
+                                              <p:pRg st="1" end="1"/>
                                             </p:txEl>
                                           </p:spTgt>
                                         </p:tgtEl>
@@ -41607,27 +41153,219 @@
                             </p:childTnLst>
                           </p:cTn>
                         </p:par>
+                      </p:childTnLst>
+                    </p:cTn>
+                  </p:par>
+                  <p:par>
+                    <p:cTn id="13" fill="hold">
+                      <p:stCondLst>
+                        <p:cond delay="indefinite"/>
+                      </p:stCondLst>
+                      <p:childTnLst>
                         <p:par>
-                          <p:cTn id="15" fill="hold">
+                          <p:cTn id="14" fill="hold">
                             <p:stCondLst>
-                              <p:cond delay="1000"/>
+                              <p:cond delay="0"/>
                             </p:stCondLst>
                             <p:childTnLst>
                               <p:par>
-                                <p:cTn id="16" presetID="10" presetClass="entr" presetSubtype="0" fill="hold" grpId="0" nodeType="afterEffect">
+                                <p:cTn id="15" presetID="10" presetClass="entr" presetSubtype="0" fill="hold" grpId="0" nodeType="clickEffect">
                                   <p:stCondLst>
                                     <p:cond delay="0"/>
                                   </p:stCondLst>
                                   <p:childTnLst>
                                     <p:set>
                                       <p:cBhvr>
-                                        <p:cTn id="17" dur="1" fill="hold">
+                                        <p:cTn id="16" dur="1" fill="hold">
                                           <p:stCondLst>
                                             <p:cond delay="0"/>
                                           </p:stCondLst>
                                         </p:cTn>
                                         <p:tgtEl>
-                                          <p:spTgt spid="6">
+                                          <p:spTgt spid="3">
+                                            <p:txEl>
+                                              <p:pRg st="2" end="2"/>
+                                            </p:txEl>
+                                          </p:spTgt>
+                                        </p:tgtEl>
+                                        <p:attrNameLst>
+                                          <p:attrName>style.visibility</p:attrName>
+                                        </p:attrNameLst>
+                                      </p:cBhvr>
+                                      <p:to>
+                                        <p:strVal val="visible"/>
+                                      </p:to>
+                                    </p:set>
+                                    <p:animEffect transition="in" filter="fade">
+                                      <p:cBhvr>
+                                        <p:cTn id="17" dur="500"/>
+                                        <p:tgtEl>
+                                          <p:spTgt spid="3">
+                                            <p:txEl>
+                                              <p:pRg st="2" end="2"/>
+                                            </p:txEl>
+                                          </p:spTgt>
+                                        </p:tgtEl>
+                                      </p:cBhvr>
+                                    </p:animEffect>
+                                  </p:childTnLst>
+                                </p:cTn>
+                              </p:par>
+                            </p:childTnLst>
+                          </p:cTn>
+                        </p:par>
+                      </p:childTnLst>
+                    </p:cTn>
+                  </p:par>
+                  <p:par>
+                    <p:cTn id="18" fill="hold">
+                      <p:stCondLst>
+                        <p:cond delay="indefinite"/>
+                      </p:stCondLst>
+                      <p:childTnLst>
+                        <p:par>
+                          <p:cTn id="19" fill="hold">
+                            <p:stCondLst>
+                              <p:cond delay="0"/>
+                            </p:stCondLst>
+                            <p:childTnLst>
+                              <p:par>
+                                <p:cTn id="20" presetID="10" presetClass="entr" presetSubtype="0" fill="hold" grpId="0" nodeType="clickEffect">
+                                  <p:stCondLst>
+                                    <p:cond delay="0"/>
+                                  </p:stCondLst>
+                                  <p:childTnLst>
+                                    <p:set>
+                                      <p:cBhvr>
+                                        <p:cTn id="21" dur="1" fill="hold">
+                                          <p:stCondLst>
+                                            <p:cond delay="0"/>
+                                          </p:stCondLst>
+                                        </p:cTn>
+                                        <p:tgtEl>
+                                          <p:spTgt spid="3">
+                                            <p:txEl>
+                                              <p:pRg st="3" end="3"/>
+                                            </p:txEl>
+                                          </p:spTgt>
+                                        </p:tgtEl>
+                                        <p:attrNameLst>
+                                          <p:attrName>style.visibility</p:attrName>
+                                        </p:attrNameLst>
+                                      </p:cBhvr>
+                                      <p:to>
+                                        <p:strVal val="visible"/>
+                                      </p:to>
+                                    </p:set>
+                                    <p:animEffect transition="in" filter="fade">
+                                      <p:cBhvr>
+                                        <p:cTn id="22" dur="500"/>
+                                        <p:tgtEl>
+                                          <p:spTgt spid="3">
+                                            <p:txEl>
+                                              <p:pRg st="3" end="3"/>
+                                            </p:txEl>
+                                          </p:spTgt>
+                                        </p:tgtEl>
+                                      </p:cBhvr>
+                                    </p:animEffect>
+                                  </p:childTnLst>
+                                </p:cTn>
+                              </p:par>
+                            </p:childTnLst>
+                          </p:cTn>
+                        </p:par>
+                      </p:childTnLst>
+                    </p:cTn>
+                  </p:par>
+                  <p:par>
+                    <p:cTn id="23" fill="hold">
+                      <p:stCondLst>
+                        <p:cond delay="indefinite"/>
+                      </p:stCondLst>
+                      <p:childTnLst>
+                        <p:par>
+                          <p:cTn id="24" fill="hold">
+                            <p:stCondLst>
+                              <p:cond delay="0"/>
+                            </p:stCondLst>
+                            <p:childTnLst>
+                              <p:par>
+                                <p:cTn id="25" presetID="10" presetClass="entr" presetSubtype="0" fill="hold" grpId="0" nodeType="clickEffect">
+                                  <p:stCondLst>
+                                    <p:cond delay="0"/>
+                                  </p:stCondLst>
+                                  <p:childTnLst>
+                                    <p:set>
+                                      <p:cBhvr>
+                                        <p:cTn id="26" dur="1" fill="hold">
+                                          <p:stCondLst>
+                                            <p:cond delay="0"/>
+                                          </p:stCondLst>
+                                        </p:cTn>
+                                        <p:tgtEl>
+                                          <p:spTgt spid="3">
+                                            <p:txEl>
+                                              <p:pRg st="5" end="5"/>
+                                            </p:txEl>
+                                          </p:spTgt>
+                                        </p:tgtEl>
+                                        <p:attrNameLst>
+                                          <p:attrName>style.visibility</p:attrName>
+                                        </p:attrNameLst>
+                                      </p:cBhvr>
+                                      <p:to>
+                                        <p:strVal val="visible"/>
+                                      </p:to>
+                                    </p:set>
+                                    <p:animEffect transition="in" filter="fade">
+                                      <p:cBhvr>
+                                        <p:cTn id="27" dur="500"/>
+                                        <p:tgtEl>
+                                          <p:spTgt spid="3">
+                                            <p:txEl>
+                                              <p:pRg st="5" end="5"/>
+                                            </p:txEl>
+                                          </p:spTgt>
+                                        </p:tgtEl>
+                                      </p:cBhvr>
+                                    </p:animEffect>
+                                  </p:childTnLst>
+                                </p:cTn>
+                              </p:par>
+                            </p:childTnLst>
+                          </p:cTn>
+                        </p:par>
+                      </p:childTnLst>
+                    </p:cTn>
+                  </p:par>
+                  <p:par>
+                    <p:cTn id="28" fill="hold">
+                      <p:stCondLst>
+                        <p:cond delay="indefinite"/>
+                      </p:stCondLst>
+                      <p:childTnLst>
+                        <p:par>
+                          <p:cTn id="29" fill="hold">
+                            <p:stCondLst>
+                              <p:cond delay="0"/>
+                            </p:stCondLst>
+                            <p:childTnLst>
+                              <p:par>
+                                <p:cTn id="30" presetID="10" presetClass="entr" presetSubtype="0" fill="hold" grpId="0" nodeType="clickEffect">
+                                  <p:stCondLst>
+                                    <p:cond delay="0"/>
+                                  </p:stCondLst>
+                                  <p:childTnLst>
+                                    <p:set>
+                                      <p:cBhvr>
+                                        <p:cTn id="31" dur="1" fill="hold">
+                                          <p:stCondLst>
+                                            <p:cond delay="0"/>
+                                          </p:stCondLst>
+                                        </p:cTn>
+                                        <p:tgtEl>
+                                          <p:spTgt spid="3">
                                             <p:txEl>
                                               <p:pRg st="6" end="6"/>
                                             </p:txEl>
@@ -41643,54 +41381,11 @@
                                     </p:set>
                                     <p:animEffect transition="in" filter="fade">
                                       <p:cBhvr>
-                                        <p:cTn id="18" dur="500"/>
+                                        <p:cTn id="32" dur="500"/>
                                         <p:tgtEl>
-                                          <p:spTgt spid="6">
+                                          <p:spTgt spid="3">
                                             <p:txEl>
                                               <p:pRg st="6" end="6"/>
-                                            </p:txEl>
-                                          </p:spTgt>
-                                        </p:tgtEl>
-                                      </p:cBhvr>
-                                    </p:animEffect>
-                                  </p:childTnLst>
-                                </p:cTn>
-                              </p:par>
-                              <p:par>
-                                <p:cTn id="19" presetID="10" presetClass="entr" presetSubtype="0" fill="hold" grpId="0" nodeType="withEffect">
-                                  <p:stCondLst>
-                                    <p:cond delay="0"/>
-                                  </p:stCondLst>
-                                  <p:childTnLst>
-                                    <p:set>
-                                      <p:cBhvr>
-                                        <p:cTn id="20" dur="1" fill="hold">
-                                          <p:stCondLst>
-                                            <p:cond delay="0"/>
-                                          </p:stCondLst>
-                                        </p:cTn>
-                                        <p:tgtEl>
-                                          <p:spTgt spid="6">
-                                            <p:txEl>
-                                              <p:pRg st="8" end="8"/>
-                                            </p:txEl>
-                                          </p:spTgt>
-                                        </p:tgtEl>
-                                        <p:attrNameLst>
-                                          <p:attrName>style.visibility</p:attrName>
-                                        </p:attrNameLst>
-                                      </p:cBhvr>
-                                      <p:to>
-                                        <p:strVal val="visible"/>
-                                      </p:to>
-                                    </p:set>
-                                    <p:animEffect transition="in" filter="fade">
-                                      <p:cBhvr>
-                                        <p:cTn id="21" dur="500"/>
-                                        <p:tgtEl>
-                                          <p:spTgt spid="6">
-                                            <p:txEl>
-                                              <p:pRg st="8" end="8"/>
                                             </p:txEl>
                                           </p:spTgt>
                                         </p:tgtEl>
@@ -41702,27 +41397,36 @@
                             </p:childTnLst>
                           </p:cTn>
                         </p:par>
+                      </p:childTnLst>
+                    </p:cTn>
+                  </p:par>
+                  <p:par>
+                    <p:cTn id="33" fill="hold">
+                      <p:stCondLst>
+                        <p:cond delay="indefinite"/>
+                      </p:stCondLst>
+                      <p:childTnLst>
                         <p:par>
-                          <p:cTn id="22" fill="hold">
+                          <p:cTn id="34" fill="hold">
                             <p:stCondLst>
-                              <p:cond delay="1500"/>
+                              <p:cond delay="0"/>
                             </p:stCondLst>
                             <p:childTnLst>
                               <p:par>
-                                <p:cTn id="23" presetID="10" presetClass="entr" presetSubtype="0" fill="hold" grpId="0" nodeType="afterEffect">
+                                <p:cTn id="35" presetID="10" presetClass="entr" presetSubtype="0" fill="hold" grpId="0" nodeType="clickEffect">
                                   <p:stCondLst>
                                     <p:cond delay="0"/>
                                   </p:stCondLst>
                                   <p:childTnLst>
                                     <p:set>
                                       <p:cBhvr>
-                                        <p:cTn id="24" dur="1" fill="hold">
+                                        <p:cTn id="36" dur="1" fill="hold">
                                           <p:stCondLst>
                                             <p:cond delay="0"/>
                                           </p:stCondLst>
                                         </p:cTn>
                                         <p:tgtEl>
-                                          <p:spTgt spid="6">
+                                          <p:spTgt spid="3">
                                             <p:txEl>
                                               <p:pRg st="7" end="7"/>
                                             </p:txEl>
@@ -41738,9 +41442,9 @@
                                     </p:set>
                                     <p:animEffect transition="in" filter="fade">
                                       <p:cBhvr>
-                                        <p:cTn id="25" dur="500"/>
+                                        <p:cTn id="37" dur="500"/>
                                         <p:tgtEl>
-                                          <p:spTgt spid="6">
+                                          <p:spTgt spid="3">
                                             <p:txEl>
                                               <p:pRg st="7" end="7"/>
                                             </p:txEl>
@@ -41758,34 +41462,34 @@
                     </p:cTn>
                   </p:par>
                   <p:par>
-                    <p:cTn id="26" fill="hold">
+                    <p:cTn id="38" fill="hold">
                       <p:stCondLst>
                         <p:cond delay="indefinite"/>
                       </p:stCondLst>
                       <p:childTnLst>
                         <p:par>
-                          <p:cTn id="27" fill="hold">
+                          <p:cTn id="39" fill="hold">
                             <p:stCondLst>
                               <p:cond delay="0"/>
                             </p:stCondLst>
                             <p:childTnLst>
                               <p:par>
-                                <p:cTn id="28" presetID="10" presetClass="entr" presetSubtype="0" fill="hold" grpId="0" nodeType="clickEffect">
+                                <p:cTn id="40" presetID="10" presetClass="entr" presetSubtype="0" fill="hold" grpId="0" nodeType="clickEffect">
                                   <p:stCondLst>
                                     <p:cond delay="0"/>
                                   </p:stCondLst>
                                   <p:childTnLst>
                                     <p:set>
                                       <p:cBhvr>
-                                        <p:cTn id="29" dur="1" fill="hold">
+                                        <p:cTn id="41" dur="1" fill="hold">
                                           <p:stCondLst>
                                             <p:cond delay="0"/>
                                           </p:stCondLst>
                                         </p:cTn>
                                         <p:tgtEl>
-                                          <p:spTgt spid="6">
+                                          <p:spTgt spid="3">
                                             <p:txEl>
-                                              <p:pRg st="1" end="1"/>
+                                              <p:pRg st="8" end="8"/>
                                             </p:txEl>
                                           </p:spTgt>
                                         </p:tgtEl>
@@ -41799,305 +41503,11 @@
                                     </p:set>
                                     <p:animEffect transition="in" filter="fade">
                                       <p:cBhvr>
-                                        <p:cTn id="30" dur="500"/>
+                                        <p:cTn id="42" dur="500"/>
                                         <p:tgtEl>
-                                          <p:spTgt spid="6">
+                                          <p:spTgt spid="3">
                                             <p:txEl>
-                                              <p:pRg st="1" end="1"/>
-                                            </p:txEl>
-                                          </p:spTgt>
-                                        </p:tgtEl>
-                                      </p:cBhvr>
-                                    </p:animEffect>
-                                  </p:childTnLst>
-                                </p:cTn>
-                              </p:par>
-                              <p:par>
-                                <p:cTn id="31" presetID="10" presetClass="entr" presetSubtype="0" fill="hold" grpId="0" nodeType="withEffect">
-                                  <p:stCondLst>
-                                    <p:cond delay="0"/>
-                                  </p:stCondLst>
-                                  <p:childTnLst>
-                                    <p:set>
-                                      <p:cBhvr>
-                                        <p:cTn id="32" dur="1" fill="hold">
-                                          <p:stCondLst>
-                                            <p:cond delay="0"/>
-                                          </p:stCondLst>
-                                        </p:cTn>
-                                        <p:tgtEl>
-                                          <p:spTgt spid="6">
-                                            <p:txEl>
-                                              <p:pRg st="5" end="5"/>
-                                            </p:txEl>
-                                          </p:spTgt>
-                                        </p:tgtEl>
-                                        <p:attrNameLst>
-                                          <p:attrName>style.visibility</p:attrName>
-                                        </p:attrNameLst>
-                                      </p:cBhvr>
-                                      <p:to>
-                                        <p:strVal val="visible"/>
-                                      </p:to>
-                                    </p:set>
-                                    <p:animEffect transition="in" filter="fade">
-                                      <p:cBhvr>
-                                        <p:cTn id="33" dur="500"/>
-                                        <p:tgtEl>
-                                          <p:spTgt spid="6">
-                                            <p:txEl>
-                                              <p:pRg st="5" end="5"/>
-                                            </p:txEl>
-                                          </p:spTgt>
-                                        </p:tgtEl>
-                                      </p:cBhvr>
-                                    </p:animEffect>
-                                  </p:childTnLst>
-                                </p:cTn>
-                              </p:par>
-                              <p:par>
-                                <p:cTn id="34" presetID="10" presetClass="entr" presetSubtype="0" fill="hold" grpId="0" nodeType="withEffect">
-                                  <p:stCondLst>
-                                    <p:cond delay="0"/>
-                                  </p:stCondLst>
-                                  <p:childTnLst>
-                                    <p:set>
-                                      <p:cBhvr>
-                                        <p:cTn id="35" dur="1" fill="hold">
-                                          <p:stCondLst>
-                                            <p:cond delay="0"/>
-                                          </p:stCondLst>
-                                        </p:cTn>
-                                        <p:tgtEl>
-                                          <p:spTgt spid="5">
-                                            <p:txEl>
-                                              <p:pRg st="0" end="0"/>
-                                            </p:txEl>
-                                          </p:spTgt>
-                                        </p:tgtEl>
-                                        <p:attrNameLst>
-                                          <p:attrName>style.visibility</p:attrName>
-                                        </p:attrNameLst>
-                                      </p:cBhvr>
-                                      <p:to>
-                                        <p:strVal val="visible"/>
-                                      </p:to>
-                                    </p:set>
-                                    <p:animEffect transition="in" filter="fade">
-                                      <p:cBhvr>
-                                        <p:cTn id="36" dur="500"/>
-                                        <p:tgtEl>
-                                          <p:spTgt spid="5">
-                                            <p:txEl>
-                                              <p:pRg st="0" end="0"/>
-                                            </p:txEl>
-                                          </p:spTgt>
-                                        </p:tgtEl>
-                                      </p:cBhvr>
-                                    </p:animEffect>
-                                  </p:childTnLst>
-                                </p:cTn>
-                              </p:par>
-                            </p:childTnLst>
-                          </p:cTn>
-                        </p:par>
-                      </p:childTnLst>
-                    </p:cTn>
-                  </p:par>
-                  <p:par>
-                    <p:cTn id="37" fill="hold">
-                      <p:stCondLst>
-                        <p:cond delay="indefinite"/>
-                      </p:stCondLst>
-                      <p:childTnLst>
-                        <p:par>
-                          <p:cTn id="38" fill="hold">
-                            <p:stCondLst>
-                              <p:cond delay="0"/>
-                            </p:stCondLst>
-                            <p:childTnLst>
-                              <p:par>
-                                <p:cTn id="39" presetID="10" presetClass="entr" presetSubtype="0" fill="hold" grpId="0" nodeType="clickEffect">
-                                  <p:stCondLst>
-                                    <p:cond delay="0"/>
-                                  </p:stCondLst>
-                                  <p:childTnLst>
-                                    <p:set>
-                                      <p:cBhvr>
-                                        <p:cTn id="40" dur="1" fill="hold">
-                                          <p:stCondLst>
-                                            <p:cond delay="0"/>
-                                          </p:stCondLst>
-                                        </p:cTn>
-                                        <p:tgtEl>
-                                          <p:spTgt spid="6">
-                                            <p:txEl>
-                                              <p:pRg st="2" end="2"/>
-                                            </p:txEl>
-                                          </p:spTgt>
-                                        </p:tgtEl>
-                                        <p:attrNameLst>
-                                          <p:attrName>style.visibility</p:attrName>
-                                        </p:attrNameLst>
-                                      </p:cBhvr>
-                                      <p:to>
-                                        <p:strVal val="visible"/>
-                                      </p:to>
-                                    </p:set>
-                                    <p:animEffect transition="in" filter="fade">
-                                      <p:cBhvr>
-                                        <p:cTn id="41" dur="500"/>
-                                        <p:tgtEl>
-                                          <p:spTgt spid="6">
-                                            <p:txEl>
-                                              <p:pRg st="2" end="2"/>
-                                            </p:txEl>
-                                          </p:spTgt>
-                                        </p:tgtEl>
-                                      </p:cBhvr>
-                                    </p:animEffect>
-                                  </p:childTnLst>
-                                </p:cTn>
-                              </p:par>
-                              <p:par>
-                                <p:cTn id="42" presetID="10" presetClass="entr" presetSubtype="0" fill="hold" grpId="0" nodeType="withEffect">
-                                  <p:stCondLst>
-                                    <p:cond delay="0"/>
-                                  </p:stCondLst>
-                                  <p:childTnLst>
-                                    <p:set>
-                                      <p:cBhvr>
-                                        <p:cTn id="43" dur="1" fill="hold">
-                                          <p:stCondLst>
-                                            <p:cond delay="0"/>
-                                          </p:stCondLst>
-                                        </p:cTn>
-                                        <p:tgtEl>
-                                          <p:spTgt spid="6">
-                                            <p:txEl>
-                                              <p:pRg st="4" end="4"/>
-                                            </p:txEl>
-                                          </p:spTgt>
-                                        </p:tgtEl>
-                                        <p:attrNameLst>
-                                          <p:attrName>style.visibility</p:attrName>
-                                        </p:attrNameLst>
-                                      </p:cBhvr>
-                                      <p:to>
-                                        <p:strVal val="visible"/>
-                                      </p:to>
-                                    </p:set>
-                                    <p:animEffect transition="in" filter="fade">
-                                      <p:cBhvr>
-                                        <p:cTn id="44" dur="500"/>
-                                        <p:tgtEl>
-                                          <p:spTgt spid="6">
-                                            <p:txEl>
-                                              <p:pRg st="4" end="4"/>
-                                            </p:txEl>
-                                          </p:spTgt>
-                                        </p:tgtEl>
-                                      </p:cBhvr>
-                                    </p:animEffect>
-                                  </p:childTnLst>
-                                </p:cTn>
-                              </p:par>
-                              <p:par>
-                                <p:cTn id="45" presetID="10" presetClass="entr" presetSubtype="0" fill="hold" grpId="0" nodeType="withEffect">
-                                  <p:stCondLst>
-                                    <p:cond delay="0"/>
-                                  </p:stCondLst>
-                                  <p:childTnLst>
-                                    <p:set>
-                                      <p:cBhvr>
-                                        <p:cTn id="46" dur="1" fill="hold">
-                                          <p:stCondLst>
-                                            <p:cond delay="0"/>
-                                          </p:stCondLst>
-                                        </p:cTn>
-                                        <p:tgtEl>
-                                          <p:spTgt spid="5">
-                                            <p:txEl>
-                                              <p:pRg st="1" end="1"/>
-                                            </p:txEl>
-                                          </p:spTgt>
-                                        </p:tgtEl>
-                                        <p:attrNameLst>
-                                          <p:attrName>style.visibility</p:attrName>
-                                        </p:attrNameLst>
-                                      </p:cBhvr>
-                                      <p:to>
-                                        <p:strVal val="visible"/>
-                                      </p:to>
-                                    </p:set>
-                                    <p:animEffect transition="in" filter="fade">
-                                      <p:cBhvr>
-                                        <p:cTn id="47" dur="500"/>
-                                        <p:tgtEl>
-                                          <p:spTgt spid="5">
-                                            <p:txEl>
-                                              <p:pRg st="1" end="1"/>
-                                            </p:txEl>
-                                          </p:spTgt>
-                                        </p:tgtEl>
-                                      </p:cBhvr>
-                                    </p:animEffect>
-                                  </p:childTnLst>
-                                </p:cTn>
-                              </p:par>
-                            </p:childTnLst>
-                          </p:cTn>
-                        </p:par>
-                      </p:childTnLst>
-                    </p:cTn>
-                  </p:par>
-                  <p:par>
-                    <p:cTn id="48" fill="hold">
-                      <p:stCondLst>
-                        <p:cond delay="indefinite"/>
-                      </p:stCondLst>
-                      <p:childTnLst>
-                        <p:par>
-                          <p:cTn id="49" fill="hold">
-                            <p:stCondLst>
-                              <p:cond delay="0"/>
-                            </p:stCondLst>
-                            <p:childTnLst>
-                              <p:par>
-                                <p:cTn id="50" presetID="10" presetClass="entr" presetSubtype="0" fill="hold" grpId="0" nodeType="clickEffect">
-                                  <p:stCondLst>
-                                    <p:cond delay="0"/>
-                                  </p:stCondLst>
-                                  <p:childTnLst>
-                                    <p:set>
-                                      <p:cBhvr>
-                                        <p:cTn id="51" dur="1" fill="hold">
-                                          <p:stCondLst>
-                                            <p:cond delay="0"/>
-                                          </p:stCondLst>
-                                        </p:cTn>
-                                        <p:tgtEl>
-                                          <p:spTgt spid="6">
-                                            <p:txEl>
-                                              <p:pRg st="3" end="3"/>
-                                            </p:txEl>
-                                          </p:spTgt>
-                                        </p:tgtEl>
-                                        <p:attrNameLst>
-                                          <p:attrName>style.visibility</p:attrName>
-                                        </p:attrNameLst>
-                                      </p:cBhvr>
-                                      <p:to>
-                                        <p:strVal val="visible"/>
-                                      </p:to>
-                                    </p:set>
-                                    <p:animEffect transition="in" filter="fade">
-                                      <p:cBhvr>
-                                        <p:cTn id="52" dur="500"/>
-                                        <p:tgtEl>
-                                          <p:spTgt spid="6">
-                                            <p:txEl>
-                                              <p:pRg st="3" end="3"/>
+                                              <p:pRg st="8" end="8"/>
                                             </p:txEl>
                                           </p:spTgt>
                                         </p:tgtEl>
@@ -42134,14 +41544,13 @@
       </p:par>
     </p:tnLst>
     <p:bldLst>
-      <p:bldP spid="6" grpId="0" uiExpand="1" build="p" animBg="1"/>
-      <p:bldP spid="5" grpId="0" uiExpand="1" build="p"/>
+      <p:bldP spid="3" grpId="0" uiExpand="1" build="p"/>
     </p:bldLst>
   </p:timing>
 </p:sld>
 </file>
 
-<file path=ppt/slides/slide4.xml><?xml version="1.0" encoding="utf-8"?>
+<file path=ppt/slides/slide5.xml><?xml version="1.0" encoding="utf-8"?>
 <p:sld xmlns:a="http://schemas.openxmlformats.org/drawingml/2006/main" xmlns:r="http://schemas.openxmlformats.org/officeDocument/2006/relationships" xmlns:p="http://schemas.openxmlformats.org/presentationml/2006/main">
   <p:cSld>
     <p:bg>
@@ -42214,7 +41623,7 @@
               <a:rPr lang="en-US" sz="9600" dirty="0">
                 <a:hlinkClick r:id="rId3"/>
               </a:rPr>
-              <a:t>https://replit.com/@HylandOutreach/StyleElementExample</a:t>
+              <a:t>https://replit.com/@HylandOutreach/CssFileExample</a:t>
             </a:r>
             <a:endParaRPr lang="en-US" sz="13800" dirty="0"/>
           </a:p>
@@ -42236,7 +41645,7 @@
 </p:sld>
 </file>
 
-<file path=ppt/slides/slide5.xml><?xml version="1.0" encoding="utf-8"?>
+<file path=ppt/slides/slide6.xml><?xml version="1.0" encoding="utf-8"?>
 <p:sld xmlns:a="http://schemas.openxmlformats.org/drawingml/2006/main" xmlns:r="http://schemas.openxmlformats.org/officeDocument/2006/relationships" xmlns:p="http://schemas.openxmlformats.org/presentationml/2006/main">
   <p:cSld>
     <p:spTree>
@@ -44294,7 +43703,7 @@
 </p:sld>
 </file>
 
-<file path=ppt/slides/slide6.xml><?xml version="1.0" encoding="utf-8"?>
+<file path=ppt/slides/slide7.xml><?xml version="1.0" encoding="utf-8"?>
 <p:sld xmlns:a="http://schemas.openxmlformats.org/drawingml/2006/main" xmlns:r="http://schemas.openxmlformats.org/officeDocument/2006/relationships" xmlns:p="http://schemas.openxmlformats.org/presentationml/2006/main">
   <p:cSld>
     <p:spTree>
@@ -44743,7 +44152,7 @@
 </p:sld>
 </file>
 
-<file path=ppt/slides/slide7.xml><?xml version="1.0" encoding="utf-8"?>
+<file path=ppt/slides/slide8.xml><?xml version="1.0" encoding="utf-8"?>
 <p:sld xmlns:a="http://schemas.openxmlformats.org/drawingml/2006/main" xmlns:r="http://schemas.openxmlformats.org/officeDocument/2006/relationships" xmlns:p="http://schemas.openxmlformats.org/presentationml/2006/main">
   <p:cSld>
     <p:spTree>
@@ -45281,7 +44690,7 @@
 </p:sld>
 </file>
 
-<file path=ppt/slides/slide8.xml><?xml version="1.0" encoding="utf-8"?>
+<file path=ppt/slides/slide9.xml><?xml version="1.0" encoding="utf-8"?>
 <p:sld xmlns:a="http://schemas.openxmlformats.org/drawingml/2006/main" xmlns:r="http://schemas.openxmlformats.org/officeDocument/2006/relationships" xmlns:p="http://schemas.openxmlformats.org/presentationml/2006/main">
   <p:cSld>
     <p:bg>
@@ -45354,7 +44763,7 @@
               <a:rPr lang="en-US" sz="11500" dirty="0">
                 <a:hlinkClick r:id="rId3"/>
               </a:rPr>
-              <a:t>https://replit.com/@HylandOutreach/Ruleset2</a:t>
+              <a:t>https://replit.com/@HylandOutreach/Ruleset</a:t>
             </a:r>
             <a:endParaRPr lang="en-US" sz="11500" dirty="0"/>
           </a:p>
@@ -45364,67 +44773,6 @@
     <p:extLst>
       <p:ext uri="{BB962C8B-B14F-4D97-AF65-F5344CB8AC3E}">
         <p14:creationId xmlns:p14="http://schemas.microsoft.com/office/powerpoint/2010/main" val="396988711"/>
-      </p:ext>
-    </p:extLst>
-  </p:cSld>
-  <p:clrMapOvr>
-    <a:masterClrMapping/>
-  </p:clrMapOvr>
-  <p:transition>
-    <p:fade/>
-  </p:transition>
-</p:sld>
-</file>
-
-<file path=ppt/slides/slide9.xml><?xml version="1.0" encoding="utf-8"?>
-<p:sld xmlns:a="http://schemas.openxmlformats.org/drawingml/2006/main" xmlns:r="http://schemas.openxmlformats.org/officeDocument/2006/relationships" xmlns:p="http://schemas.openxmlformats.org/presentationml/2006/main">
-  <p:cSld>
-    <p:spTree>
-      <p:nvGrpSpPr>
-        <p:cNvPr id="1" name=""/>
-        <p:cNvGrpSpPr/>
-        <p:nvPr/>
-      </p:nvGrpSpPr>
-      <p:grpSpPr>
-        <a:xfrm>
-          <a:off x="0" y="0"/>
-          <a:ext cx="0" cy="0"/>
-          <a:chOff x="0" y="0"/>
-          <a:chExt cx="0" cy="0"/>
-        </a:xfrm>
-      </p:grpSpPr>
-      <p:sp>
-        <p:nvSpPr>
-          <p:cNvPr id="2" name="Text Placeholder 1">
-            <a:extLst>
-              <a:ext uri="{FF2B5EF4-FFF2-40B4-BE49-F238E27FC236}">
-                <a16:creationId xmlns:a16="http://schemas.microsoft.com/office/drawing/2014/main" id="{85615D18-8F75-4B52-89C9-F982DAFE9325}"/>
-              </a:ext>
-            </a:extLst>
-          </p:cNvPr>
-          <p:cNvSpPr>
-            <a:spLocks noGrp="1"/>
-          </p:cNvSpPr>
-          <p:nvPr>
-            <p:ph type="body" sz="quarter" idx="10"/>
-          </p:nvPr>
-        </p:nvSpPr>
-        <p:spPr/>
-        <p:txBody>
-          <a:bodyPr/>
-          <a:lstStyle/>
-          <a:p>
-            <a:r>
-              <a:rPr lang="en-US"/>
-              <a:t>Questions?</a:t>
-            </a:r>
-          </a:p>
-        </p:txBody>
-      </p:sp>
-    </p:spTree>
-    <p:extLst>
-      <p:ext uri="{BB962C8B-B14F-4D97-AF65-F5344CB8AC3E}">
-        <p14:creationId xmlns:p14="http://schemas.microsoft.com/office/powerpoint/2010/main" val="2552111147"/>
       </p:ext>
     </p:extLst>
   </p:cSld>

</xml_diff>

<commit_message>
Update gitbook 2022-11-16 16:13:59
</commit_message>
<xml_diff>
--- a/CssIntro/HelloCss.pptx
+++ b/CssIntro/HelloCss.pptx
@@ -6,19 +6,18 @@
     <p:sldMasterId id="2147483686" r:id="rId2"/>
   </p:sldMasterIdLst>
   <p:notesMasterIdLst>
-    <p:notesMasterId r:id="rId13"/>
+    <p:notesMasterId r:id="rId12"/>
   </p:notesMasterIdLst>
   <p:sldIdLst>
     <p:sldId id="258" r:id="rId3"/>
     <p:sldId id="295" r:id="rId4"/>
     <p:sldId id="306" r:id="rId5"/>
-    <p:sldId id="311" r:id="rId6"/>
-    <p:sldId id="312" r:id="rId7"/>
-    <p:sldId id="310" r:id="rId8"/>
-    <p:sldId id="307" r:id="rId9"/>
-    <p:sldId id="315" r:id="rId10"/>
-    <p:sldId id="314" r:id="rId11"/>
-    <p:sldId id="316" r:id="rId12"/>
+    <p:sldId id="312" r:id="rId6"/>
+    <p:sldId id="310" r:id="rId7"/>
+    <p:sldId id="307" r:id="rId8"/>
+    <p:sldId id="315" r:id="rId9"/>
+    <p:sldId id="314" r:id="rId10"/>
+    <p:sldId id="316" r:id="rId11"/>
   </p:sldIdLst>
   <p:sldSz cx="12192000" cy="6858000"/>
   <p:notesSz cx="6858000" cy="9144000"/>
@@ -136,6 +135,18 @@
 </p:presentation>
 </file>
 
+<file path=ppt/commentAuthors.xml><?xml version="1.0" encoding="utf-8"?>
+<p:cmAuthorLst xmlns:a="http://schemas.openxmlformats.org/drawingml/2006/main" xmlns:r="http://schemas.openxmlformats.org/officeDocument/2006/relationships" xmlns:p="http://schemas.openxmlformats.org/presentationml/2006/main">
+  <p:cmAuthor id="1" name="Joseph Maxwell" initials="JM" lastIdx="1" clrIdx="0">
+    <p:extLst>
+      <p:ext uri="{19B8F6BF-5375-455C-9EA6-DF929625EA0E}">
+        <p15:presenceInfo xmlns:p15="http://schemas.microsoft.com/office/powerpoint/2012/main" userId="S::Joseph.Maxwell@hyland.com::81b9e37d-9426-4999-a489-1cb52182bfd4" providerId="AD"/>
+      </p:ext>
+    </p:extLst>
+  </p:cmAuthor>
+</p:cmAuthorLst>
+</file>
+
 <file path=ppt/notesMasters/notesMaster1.xml><?xml version="1.0" encoding="utf-8"?>
 <p:notesMaster xmlns:a="http://schemas.openxmlformats.org/drawingml/2006/main" xmlns:r="http://schemas.openxmlformats.org/officeDocument/2006/relationships" xmlns:p="http://schemas.openxmlformats.org/presentationml/2006/main">
   <p:cSld>
@@ -218,7 +229,7 @@
           <a:p>
             <a:fld id="{19104133-B5B0-4351-8158-4F0E5EB1E2BF}" type="datetimeFigureOut">
               <a:rPr lang="en-US" smtClean="0"/>
-              <a:t>8/25/2022</a:t>
+              <a:t>10/19/2022</a:t>
             </a:fld>
             <a:endParaRPr lang="en-US"/>
           </a:p>
@@ -640,12 +651,8 @@
           <a:p>
             <a:r>
               <a:rPr lang="en-US" dirty="0"/>
-              <a:t>Explain what CSS files are</a:t>
+              <a:t>Explain what the head and style elements are</a:t>
             </a:r>
-            <a:endParaRPr lang="en-US" baseline="0" dirty="0"/>
-          </a:p>
-          <a:p>
-            <a:endParaRPr lang="en-US" dirty="0"/>
           </a:p>
         </p:txBody>
       </p:sp>
@@ -731,17 +738,12 @@
           <a:p>
             <a:r>
               <a:rPr lang="en-US" dirty="0"/>
-              <a:t>Explain the link tag. Students should not have to worry about this for the most part – the starter code will usually start with a </a:t>
+              <a:t>Show the link tag in action.</a:t>
             </a:r>
             <a:r>
-              <a:rPr lang="en-US" b="1" dirty="0"/>
-              <a:t>link</a:t>
+              <a:rPr lang="en-US" baseline="0" dirty="0"/>
+              <a:t> Make sure to note the filename, attributes, and CSS.</a:t>
             </a:r>
-            <a:r>
-              <a:rPr lang="en-US" b="0" dirty="0"/>
-              <a:t> tag already built in. If not, they can always copy it from somewhere else. It is important for them to be aware of its existence, but they do not need to memorize how it works.</a:t>
-            </a:r>
-            <a:endParaRPr lang="en-US" dirty="0"/>
           </a:p>
         </p:txBody>
       </p:sp>
@@ -771,7 +773,7 @@
     </p:spTree>
     <p:extLst>
       <p:ext uri="{BB962C8B-B14F-4D97-AF65-F5344CB8AC3E}">
-        <p14:creationId xmlns:p14="http://schemas.microsoft.com/office/powerpoint/2010/main" val="2439832816"/>
+        <p14:creationId xmlns:p14="http://schemas.microsoft.com/office/powerpoint/2010/main" val="1081873275"/>
       </p:ext>
     </p:extLst>
   </p:cSld>
@@ -827,12 +829,13 @@
           <a:p>
             <a:r>
               <a:rPr lang="en-US" dirty="0"/>
-              <a:t>Show the link tag in action.</a:t>
+              <a:t>Go</a:t>
             </a:r>
             <a:r>
               <a:rPr lang="en-US" baseline="0" dirty="0"/>
-              <a:t> Make sure to note the filename, attributes, and CSS.</a:t>
+              <a:t> over the vocabulary around different parts of CSS. Make sure to note that each character is very important: every colon, every semi-colon, every curly bracket, dash, etc.</a:t>
             </a:r>
+            <a:endParaRPr lang="en-US" dirty="0"/>
           </a:p>
         </p:txBody>
       </p:sp>
@@ -851,18 +854,78 @@
           <a:bodyPr/>
           <a:lstStyle/>
           <a:p>
+            <a:pPr marL="0" marR="0" lvl="0" indent="0" algn="r" defTabSz="914400" rtl="0" eaLnBrk="1" fontAlgn="auto" latinLnBrk="0" hangingPunct="1">
+              <a:lnSpc>
+                <a:spcPct val="100000"/>
+              </a:lnSpc>
+              <a:spcBef>
+                <a:spcPts val="0"/>
+              </a:spcBef>
+              <a:spcAft>
+                <a:spcPts val="0"/>
+              </a:spcAft>
+              <a:buClrTx/>
+              <a:buSzTx/>
+              <a:buFontTx/>
+              <a:buNone/>
+              <a:tabLst/>
+              <a:defRPr/>
+            </a:pPr>
             <a:fld id="{DEC8F7F9-57EC-49CF-9FCD-2B781E4B449F}" type="slidenum">
-              <a:rPr lang="en-US" smtClean="0"/>
+              <a:rPr kumimoji="0" lang="en-US" sz="1200" b="0" i="0" u="none" strike="noStrike" kern="1200" cap="none" spc="0" normalizeH="0" baseline="0" noProof="0" smtClean="0">
+                <a:ln>
+                  <a:noFill/>
+                </a:ln>
+                <a:solidFill>
+                  <a:prstClr val="black"/>
+                </a:solidFill>
+                <a:effectLst/>
+                <a:uLnTx/>
+                <a:uFillTx/>
+                <a:latin typeface="Calibri" panose="020F0502020204030204"/>
+                <a:ea typeface="+mn-ea"/>
+                <a:cs typeface="+mn-cs"/>
+              </a:rPr>
+              <a:pPr marL="0" marR="0" lvl="0" indent="0" algn="r" defTabSz="914400" rtl="0" eaLnBrk="1" fontAlgn="auto" latinLnBrk="0" hangingPunct="1">
+                <a:lnSpc>
+                  <a:spcPct val="100000"/>
+                </a:lnSpc>
+                <a:spcBef>
+                  <a:spcPts val="0"/>
+                </a:spcBef>
+                <a:spcAft>
+                  <a:spcPts val="0"/>
+                </a:spcAft>
+                <a:buClrTx/>
+                <a:buSzTx/>
+                <a:buFontTx/>
+                <a:buNone/>
+                <a:tabLst/>
+                <a:defRPr/>
+              </a:pPr>
               <a:t>5</a:t>
             </a:fld>
-            <a:endParaRPr lang="en-US"/>
+            <a:endParaRPr kumimoji="0" lang="en-US" sz="1200" b="0" i="0" u="none" strike="noStrike" kern="1200" cap="none" spc="0" normalizeH="0" baseline="0" noProof="0">
+              <a:ln>
+                <a:noFill/>
+              </a:ln>
+              <a:solidFill>
+                <a:prstClr val="black"/>
+              </a:solidFill>
+              <a:effectLst/>
+              <a:uLnTx/>
+              <a:uFillTx/>
+              <a:latin typeface="Calibri" panose="020F0502020204030204"/>
+              <a:ea typeface="+mn-ea"/>
+              <a:cs typeface="+mn-cs"/>
+            </a:endParaRPr>
           </a:p>
         </p:txBody>
       </p:sp>
     </p:spTree>
     <p:extLst>
       <p:ext uri="{BB962C8B-B14F-4D97-AF65-F5344CB8AC3E}">
-        <p14:creationId xmlns:p14="http://schemas.microsoft.com/office/powerpoint/2010/main" val="1081873275"/>
+        <p14:creationId xmlns:p14="http://schemas.microsoft.com/office/powerpoint/2010/main" val="2440334685"/>
       </p:ext>
     </p:extLst>
   </p:cSld>
@@ -918,11 +981,11 @@
           <a:p>
             <a:r>
               <a:rPr lang="en-US" dirty="0"/>
-              <a:t>Go</a:t>
+              <a:t>Explain how</a:t>
             </a:r>
             <a:r>
               <a:rPr lang="en-US" baseline="0" dirty="0"/>
-              <a:t> over the vocabulary around different parts of CSS. Make sure to note that each character is very important: every colon, every semi-colon, every curly bracket, dash, etc.</a:t>
+              <a:t> CSS properties determine the actual styles that are controlled by CSS</a:t>
             </a:r>
             <a:endParaRPr lang="en-US" dirty="0"/>
           </a:p>
@@ -1014,7 +1077,7 @@
     </p:spTree>
     <p:extLst>
       <p:ext uri="{BB962C8B-B14F-4D97-AF65-F5344CB8AC3E}">
-        <p14:creationId xmlns:p14="http://schemas.microsoft.com/office/powerpoint/2010/main" val="2440334685"/>
+        <p14:creationId xmlns:p14="http://schemas.microsoft.com/office/powerpoint/2010/main" val="669666032"/>
       </p:ext>
     </p:extLst>
   </p:cSld>
@@ -1070,13 +1133,8 @@
           <a:p>
             <a:r>
               <a:rPr lang="en-US" dirty="0"/>
-              <a:t>Explain how</a:t>
+              <a:t>Go through a few of the selectors – actually just examples of the element selector. The main idea is that </a:t>
             </a:r>
-            <a:r>
-              <a:rPr lang="en-US" baseline="0" dirty="0"/>
-              <a:t> CSS properties determine the actual styles that are controlled by CSS</a:t>
-            </a:r>
-            <a:endParaRPr lang="en-US" dirty="0"/>
           </a:p>
         </p:txBody>
       </p:sp>
@@ -1166,7 +1224,7 @@
     </p:spTree>
     <p:extLst>
       <p:ext uri="{BB962C8B-B14F-4D97-AF65-F5344CB8AC3E}">
-        <p14:creationId xmlns:p14="http://schemas.microsoft.com/office/powerpoint/2010/main" val="669666032"/>
+        <p14:creationId xmlns:p14="http://schemas.microsoft.com/office/powerpoint/2010/main" val="736763130"/>
       </p:ext>
     </p:extLst>
   </p:cSld>
@@ -1222,7 +1280,19 @@
           <a:p>
             <a:r>
               <a:rPr lang="en-US" dirty="0"/>
-              <a:t>Go through a few of the selectors – actually just examples of the element selector. The main idea is that </a:t>
+              <a:t>For the Repl,</a:t>
+            </a:r>
+            <a:r>
+              <a:rPr lang="en-US" baseline="0" dirty="0"/>
+              <a:t> show the whole ruleset in action. Change around the selector, properties, values </a:t>
+            </a:r>
+            <a:r>
+              <a:rPr lang="en-US" baseline="0" dirty="0" err="1"/>
+              <a:t>etc</a:t>
+            </a:r>
+            <a:r>
+              <a:rPr lang="en-US" baseline="0" dirty="0"/>
+              <a:t> to show how it affects the page.</a:t>
             </a:r>
           </a:p>
         </p:txBody>
@@ -1292,173 +1362,6 @@
                 <a:defRPr/>
               </a:pPr>
               <a:t>8</a:t>
-            </a:fld>
-            <a:endParaRPr kumimoji="0" lang="en-US" sz="1200" b="0" i="0" u="none" strike="noStrike" kern="1200" cap="none" spc="0" normalizeH="0" baseline="0" noProof="0">
-              <a:ln>
-                <a:noFill/>
-              </a:ln>
-              <a:solidFill>
-                <a:prstClr val="black"/>
-              </a:solidFill>
-              <a:effectLst/>
-              <a:uLnTx/>
-              <a:uFillTx/>
-              <a:latin typeface="Calibri" panose="020F0502020204030204"/>
-              <a:ea typeface="+mn-ea"/>
-              <a:cs typeface="+mn-cs"/>
-            </a:endParaRPr>
-          </a:p>
-        </p:txBody>
-      </p:sp>
-    </p:spTree>
-    <p:extLst>
-      <p:ext uri="{BB962C8B-B14F-4D97-AF65-F5344CB8AC3E}">
-        <p14:creationId xmlns:p14="http://schemas.microsoft.com/office/powerpoint/2010/main" val="736763130"/>
-      </p:ext>
-    </p:extLst>
-  </p:cSld>
-  <p:clrMapOvr>
-    <a:masterClrMapping/>
-  </p:clrMapOvr>
-</p:notes>
-</file>
-
-<file path=ppt/notesSlides/notesSlide8.xml><?xml version="1.0" encoding="utf-8"?>
-<p:notes xmlns:a="http://schemas.openxmlformats.org/drawingml/2006/main" xmlns:r="http://schemas.openxmlformats.org/officeDocument/2006/relationships" xmlns:p="http://schemas.openxmlformats.org/presentationml/2006/main">
-  <p:cSld>
-    <p:spTree>
-      <p:nvGrpSpPr>
-        <p:cNvPr id="1" name=""/>
-        <p:cNvGrpSpPr/>
-        <p:nvPr/>
-      </p:nvGrpSpPr>
-      <p:grpSpPr>
-        <a:xfrm>
-          <a:off x="0" y="0"/>
-          <a:ext cx="0" cy="0"/>
-          <a:chOff x="0" y="0"/>
-          <a:chExt cx="0" cy="0"/>
-        </a:xfrm>
-      </p:grpSpPr>
-      <p:sp>
-        <p:nvSpPr>
-          <p:cNvPr id="2" name="Slide Image Placeholder 1"/>
-          <p:cNvSpPr>
-            <a:spLocks noGrp="1" noRot="1" noChangeAspect="1"/>
-          </p:cNvSpPr>
-          <p:nvPr>
-            <p:ph type="sldImg"/>
-          </p:nvPr>
-        </p:nvSpPr>
-        <p:spPr/>
-      </p:sp>
-      <p:sp>
-        <p:nvSpPr>
-          <p:cNvPr id="3" name="Notes Placeholder 2"/>
-          <p:cNvSpPr>
-            <a:spLocks noGrp="1"/>
-          </p:cNvSpPr>
-          <p:nvPr>
-            <p:ph type="body" idx="1"/>
-          </p:nvPr>
-        </p:nvSpPr>
-        <p:spPr/>
-        <p:txBody>
-          <a:bodyPr/>
-          <a:lstStyle/>
-          <a:p>
-            <a:r>
-              <a:rPr lang="en-US" dirty="0"/>
-              <a:t>For the </a:t>
-            </a:r>
-            <a:r>
-              <a:rPr lang="en-US" dirty="0" err="1"/>
-              <a:t>Repl</a:t>
-            </a:r>
-            <a:r>
-              <a:rPr lang="en-US" dirty="0"/>
-              <a:t>,</a:t>
-            </a:r>
-            <a:r>
-              <a:rPr lang="en-US" baseline="0" dirty="0"/>
-              <a:t> show the whole ruleset in action. Make sure to switch to the CSS file to see the CSS. Change around the selector, properties, values </a:t>
-            </a:r>
-            <a:r>
-              <a:rPr lang="en-US" baseline="0" dirty="0" err="1"/>
-              <a:t>etc</a:t>
-            </a:r>
-            <a:r>
-              <a:rPr lang="en-US" baseline="0" dirty="0"/>
-              <a:t> to show how it affects the page.</a:t>
-            </a:r>
-          </a:p>
-        </p:txBody>
-      </p:sp>
-      <p:sp>
-        <p:nvSpPr>
-          <p:cNvPr id="4" name="Slide Number Placeholder 3"/>
-          <p:cNvSpPr>
-            <a:spLocks noGrp="1"/>
-          </p:cNvSpPr>
-          <p:nvPr>
-            <p:ph type="sldNum" sz="quarter" idx="10"/>
-          </p:nvPr>
-        </p:nvSpPr>
-        <p:spPr/>
-        <p:txBody>
-          <a:bodyPr/>
-          <a:lstStyle/>
-          <a:p>
-            <a:pPr marL="0" marR="0" lvl="0" indent="0" algn="r" defTabSz="914400" rtl="0" eaLnBrk="1" fontAlgn="auto" latinLnBrk="0" hangingPunct="1">
-              <a:lnSpc>
-                <a:spcPct val="100000"/>
-              </a:lnSpc>
-              <a:spcBef>
-                <a:spcPts val="0"/>
-              </a:spcBef>
-              <a:spcAft>
-                <a:spcPts val="0"/>
-              </a:spcAft>
-              <a:buClrTx/>
-              <a:buSzTx/>
-              <a:buFontTx/>
-              <a:buNone/>
-              <a:tabLst/>
-              <a:defRPr/>
-            </a:pPr>
-            <a:fld id="{DEC8F7F9-57EC-49CF-9FCD-2B781E4B449F}" type="slidenum">
-              <a:rPr kumimoji="0" lang="en-US" sz="1200" b="0" i="0" u="none" strike="noStrike" kern="1200" cap="none" spc="0" normalizeH="0" baseline="0" noProof="0" smtClean="0">
-                <a:ln>
-                  <a:noFill/>
-                </a:ln>
-                <a:solidFill>
-                  <a:prstClr val="black"/>
-                </a:solidFill>
-                <a:effectLst/>
-                <a:uLnTx/>
-                <a:uFillTx/>
-                <a:latin typeface="Calibri" panose="020F0502020204030204"/>
-                <a:ea typeface="+mn-ea"/>
-                <a:cs typeface="+mn-cs"/>
-              </a:rPr>
-              <a:pPr marL="0" marR="0" lvl="0" indent="0" algn="r" defTabSz="914400" rtl="0" eaLnBrk="1" fontAlgn="auto" latinLnBrk="0" hangingPunct="1">
-                <a:lnSpc>
-                  <a:spcPct val="100000"/>
-                </a:lnSpc>
-                <a:spcBef>
-                  <a:spcPts val="0"/>
-                </a:spcBef>
-                <a:spcAft>
-                  <a:spcPts val="0"/>
-                </a:spcAft>
-                <a:buClrTx/>
-                <a:buSzTx/>
-                <a:buFontTx/>
-                <a:buNone/>
-                <a:tabLst/>
-                <a:defRPr/>
-              </a:pPr>
-              <a:t>9</a:t>
             </a:fld>
             <a:endParaRPr kumimoji="0" lang="en-US" sz="1200" b="0" i="0" u="none" strike="noStrike" kern="1200" cap="none" spc="0" normalizeH="0" baseline="0" noProof="0">
               <a:ln>
@@ -1672,7 +1575,7 @@
             <a:fld id="{1C2D31DE-C454-491C-B5C3-F097855E3DF7}" type="datetime4">
               <a:rPr lang="en-US" smtClean="0"/>
               <a:pPr/>
-              <a:t>August 25, 2022</a:t>
+              <a:t>October 19, 2022</a:t>
             </a:fld>
             <a:endParaRPr lang="en-US" dirty="0"/>
           </a:p>
@@ -5064,7 +4967,7 @@
           <a:p>
             <a:fld id="{5958763E-B898-436D-883D-03711491D54A}" type="datetimeFigureOut">
               <a:rPr lang="en-US" smtClean="0"/>
-              <a:t>8/25/2022</a:t>
+              <a:t>10/19/2022</a:t>
             </a:fld>
             <a:endParaRPr lang="en-US"/>
           </a:p>
@@ -5257,7 +5160,7 @@
           <a:p>
             <a:fld id="{5958763E-B898-436D-883D-03711491D54A}" type="datetimeFigureOut">
               <a:rPr lang="en-US" smtClean="0"/>
-              <a:t>8/25/2022</a:t>
+              <a:t>10/19/2022</a:t>
             </a:fld>
             <a:endParaRPr lang="en-US"/>
           </a:p>
@@ -5507,7 +5410,7 @@
           <a:p>
             <a:fld id="{5958763E-B898-436D-883D-03711491D54A}" type="datetimeFigureOut">
               <a:rPr lang="en-US" smtClean="0"/>
-              <a:t>8/25/2022</a:t>
+              <a:t>10/19/2022</a:t>
             </a:fld>
             <a:endParaRPr lang="en-US"/>
           </a:p>
@@ -5855,7 +5758,7 @@
           <a:p>
             <a:fld id="{5958763E-B898-436D-883D-03711491D54A}" type="datetimeFigureOut">
               <a:rPr lang="en-US" smtClean="0"/>
-              <a:t>8/25/2022</a:t>
+              <a:t>10/19/2022</a:t>
             </a:fld>
             <a:endParaRPr lang="en-US"/>
           </a:p>
@@ -6271,7 +6174,7 @@
           <a:p>
             <a:fld id="{5958763E-B898-436D-883D-03711491D54A}" type="datetimeFigureOut">
               <a:rPr lang="en-US" smtClean="0"/>
-              <a:t>8/25/2022</a:t>
+              <a:t>10/19/2022</a:t>
             </a:fld>
             <a:endParaRPr lang="en-US"/>
           </a:p>
@@ -6772,7 +6675,7 @@
           <a:p>
             <a:fld id="{5958763E-B898-436D-883D-03711491D54A}" type="datetimeFigureOut">
               <a:rPr lang="en-US" smtClean="0"/>
-              <a:t>8/25/2022</a:t>
+              <a:t>10/19/2022</a:t>
             </a:fld>
             <a:endParaRPr lang="en-US"/>
           </a:p>
@@ -7223,7 +7126,7 @@
           <a:p>
             <a:fld id="{5958763E-B898-436D-883D-03711491D54A}" type="datetimeFigureOut">
               <a:rPr lang="en-US" smtClean="0"/>
-              <a:t>8/25/2022</a:t>
+              <a:t>10/19/2022</a:t>
             </a:fld>
             <a:endParaRPr lang="en-US"/>
           </a:p>
@@ -7834,7 +7737,7 @@
           <a:p>
             <a:fld id="{5958763E-B898-436D-883D-03711491D54A}" type="datetimeFigureOut">
               <a:rPr lang="en-US" smtClean="0"/>
-              <a:t>8/25/2022</a:t>
+              <a:t>10/19/2022</a:t>
             </a:fld>
             <a:endParaRPr lang="en-US"/>
           </a:p>
@@ -8605,7 +8508,7 @@
           <a:p>
             <a:fld id="{5958763E-B898-436D-883D-03711491D54A}" type="datetimeFigureOut">
               <a:rPr lang="en-US" smtClean="0"/>
-              <a:t>8/25/2022</a:t>
+              <a:t>10/19/2022</a:t>
             </a:fld>
             <a:endParaRPr lang="en-US"/>
           </a:p>
@@ -8709,7 +8612,7 @@
           <a:p>
             <a:fld id="{5958763E-B898-436D-883D-03711491D54A}" type="datetimeFigureOut">
               <a:rPr lang="en-US" smtClean="0"/>
-              <a:t>8/25/2022</a:t>
+              <a:t>10/19/2022</a:t>
             </a:fld>
             <a:endParaRPr lang="en-US"/>
           </a:p>
@@ -9036,7 +8939,7 @@
             <a:fld id="{1C2D31DE-C454-491C-B5C3-F097855E3DF7}" type="datetime4">
               <a:rPr lang="en-US" smtClean="0"/>
               <a:pPr/>
-              <a:t>August 25, 2022</a:t>
+              <a:t>October 19, 2022</a:t>
             </a:fld>
             <a:endParaRPr lang="en-US" dirty="0"/>
           </a:p>
@@ -12188,7 +12091,7 @@
           <a:p>
             <a:fld id="{5958763E-B898-436D-883D-03711491D54A}" type="datetimeFigureOut">
               <a:rPr lang="en-US" smtClean="0"/>
-              <a:t>8/25/2022</a:t>
+              <a:t>10/19/2022</a:t>
             </a:fld>
             <a:endParaRPr lang="en-US"/>
           </a:p>
@@ -12312,7 +12215,7 @@
           <a:p>
             <a:fld id="{5958763E-B898-436D-883D-03711491D54A}" type="datetimeFigureOut">
               <a:rPr lang="en-US" smtClean="0"/>
-              <a:t>8/25/2022</a:t>
+              <a:t>10/19/2022</a:t>
             </a:fld>
             <a:endParaRPr lang="en-US"/>
           </a:p>
@@ -12436,7 +12339,7 @@
           <a:p>
             <a:fld id="{5958763E-B898-436D-883D-03711491D54A}" type="datetimeFigureOut">
               <a:rPr lang="en-US" smtClean="0"/>
-              <a:t>8/25/2022</a:t>
+              <a:t>10/19/2022</a:t>
             </a:fld>
             <a:endParaRPr lang="en-US"/>
           </a:p>
@@ -12560,7 +12463,7 @@
           <a:p>
             <a:fld id="{5958763E-B898-436D-883D-03711491D54A}" type="datetimeFigureOut">
               <a:rPr lang="en-US" smtClean="0"/>
-              <a:t>8/25/2022</a:t>
+              <a:t>10/19/2022</a:t>
             </a:fld>
             <a:endParaRPr lang="en-US"/>
           </a:p>
@@ -12684,7 +12587,7 @@
           <a:p>
             <a:fld id="{5958763E-B898-436D-883D-03711491D54A}" type="datetimeFigureOut">
               <a:rPr lang="en-US" smtClean="0"/>
-              <a:t>8/25/2022</a:t>
+              <a:t>10/19/2022</a:t>
             </a:fld>
             <a:endParaRPr lang="en-US"/>
           </a:p>
@@ -12808,7 +12711,7 @@
           <a:p>
             <a:fld id="{5958763E-B898-436D-883D-03711491D54A}" type="datetimeFigureOut">
               <a:rPr lang="en-US" smtClean="0"/>
-              <a:t>8/25/2022</a:t>
+              <a:t>10/19/2022</a:t>
             </a:fld>
             <a:endParaRPr lang="en-US"/>
           </a:p>
@@ -12932,7 +12835,7 @@
           <a:p>
             <a:fld id="{5958763E-B898-436D-883D-03711491D54A}" type="datetimeFigureOut">
               <a:rPr lang="en-US" smtClean="0"/>
-              <a:t>8/25/2022</a:t>
+              <a:t>10/19/2022</a:t>
             </a:fld>
             <a:endParaRPr lang="en-US"/>
           </a:p>
@@ -13056,7 +12959,7 @@
           <a:p>
             <a:fld id="{5958763E-B898-436D-883D-03711491D54A}" type="datetimeFigureOut">
               <a:rPr lang="en-US" smtClean="0"/>
-              <a:t>8/25/2022</a:t>
+              <a:t>10/19/2022</a:t>
             </a:fld>
             <a:endParaRPr lang="en-US"/>
           </a:p>
@@ -13189,7 +13092,7 @@
           <a:p>
             <a:fld id="{5958763E-B898-436D-883D-03711491D54A}" type="datetimeFigureOut">
               <a:rPr lang="en-US" smtClean="0"/>
-              <a:t>8/25/2022</a:t>
+              <a:t>10/19/2022</a:t>
             </a:fld>
             <a:endParaRPr lang="en-US"/>
           </a:p>
@@ -16528,7 +16431,7 @@
             <a:fld id="{1C2D31DE-C454-491C-B5C3-F097855E3DF7}" type="datetime4">
               <a:rPr lang="en-US" smtClean="0"/>
               <a:pPr/>
-              <a:t>August 25, 2022</a:t>
+              <a:t>October 19, 2022</a:t>
             </a:fld>
             <a:endParaRPr lang="en-US" dirty="0"/>
           </a:p>
@@ -28764,7 +28667,7 @@
           <a:p>
             <a:fld id="{5958763E-B898-436D-883D-03711491D54A}" type="datetimeFigureOut">
               <a:rPr lang="en-US" smtClean="0"/>
-              <a:t>8/25/2022</a:t>
+              <a:t>10/19/2022</a:t>
             </a:fld>
             <a:endParaRPr lang="en-US"/>
           </a:p>
@@ -29166,7 +29069,7 @@
           <a:p>
             <a:fld id="{5958763E-B898-436D-883D-03711491D54A}" type="datetimeFigureOut">
               <a:rPr lang="en-US" smtClean="0"/>
-              <a:t>8/25/2022</a:t>
+              <a:t>10/19/2022</a:t>
             </a:fld>
             <a:endParaRPr lang="en-US"/>
           </a:p>
@@ -29460,7 +29363,7 @@
           <a:p>
             <a:fld id="{5958763E-B898-436D-883D-03711491D54A}" type="datetimeFigureOut">
               <a:rPr lang="en-US" smtClean="0"/>
-              <a:t>8/25/2022</a:t>
+              <a:t>10/19/2022</a:t>
             </a:fld>
             <a:endParaRPr lang="en-US"/>
           </a:p>
@@ -29661,7 +29564,7 @@
           <a:p>
             <a:fld id="{5958763E-B898-436D-883D-03711491D54A}" type="datetimeFigureOut">
               <a:rPr lang="en-US" smtClean="0"/>
-              <a:t>8/25/2022</a:t>
+              <a:t>10/19/2022</a:t>
             </a:fld>
             <a:endParaRPr lang="en-US"/>
           </a:p>
@@ -29922,7 +29825,7 @@
           <a:p>
             <a:fld id="{5958763E-B898-436D-883D-03711491D54A}" type="datetimeFigureOut">
               <a:rPr lang="en-US" smtClean="0"/>
-              <a:t>8/25/2022</a:t>
+              <a:t>10/19/2022</a:t>
             </a:fld>
             <a:endParaRPr lang="en-US"/>
           </a:p>
@@ -30183,7 +30086,7 @@
           <a:p>
             <a:fld id="{61FD5E12-641C-4696-BA65-B86205845F69}" type="datetimeFigureOut">
               <a:rPr lang="en-US" smtClean="0"/>
-              <a:t>8/25/2022</a:t>
+              <a:t>10/19/2022</a:t>
             </a:fld>
             <a:endParaRPr lang="en-US"/>
           </a:p>
@@ -30353,7 +30256,7 @@
           <a:p>
             <a:fld id="{61FD5E12-641C-4696-BA65-B86205845F69}" type="datetimeFigureOut">
               <a:rPr lang="en-US" smtClean="0"/>
-              <a:t>8/25/2022</a:t>
+              <a:t>10/19/2022</a:t>
             </a:fld>
             <a:endParaRPr lang="en-US"/>
           </a:p>
@@ -30792,7 +30695,7 @@
           <a:p>
             <a:fld id="{5958763E-B898-436D-883D-03711491D54A}" type="datetimeFigureOut">
               <a:rPr lang="en-US" smtClean="0"/>
-              <a:t>8/25/2022</a:t>
+              <a:t>10/19/2022</a:t>
             </a:fld>
             <a:endParaRPr lang="en-US"/>
           </a:p>
@@ -31087,7 +30990,7 @@
           <a:p>
             <a:fld id="{61FD5E12-641C-4696-BA65-B86205845F69}" type="datetimeFigureOut">
               <a:rPr lang="en-US" smtClean="0"/>
-              <a:t>8/25/2022</a:t>
+              <a:t>10/19/2022</a:t>
             </a:fld>
             <a:endParaRPr lang="en-US"/>
           </a:p>
@@ -31319,7 +31222,7 @@
           <a:p>
             <a:fld id="{61FD5E12-641C-4696-BA65-B86205845F69}" type="datetimeFigureOut">
               <a:rPr lang="en-US" smtClean="0"/>
-              <a:t>8/25/2022</a:t>
+              <a:t>10/19/2022</a:t>
             </a:fld>
             <a:endParaRPr lang="en-US"/>
           </a:p>
@@ -31686,7 +31589,7 @@
           <a:p>
             <a:fld id="{61FD5E12-641C-4696-BA65-B86205845F69}" type="datetimeFigureOut">
               <a:rPr lang="en-US" smtClean="0"/>
-              <a:t>8/25/2022</a:t>
+              <a:t>10/19/2022</a:t>
             </a:fld>
             <a:endParaRPr lang="en-US"/>
           </a:p>
@@ -31804,7 +31707,7 @@
           <a:p>
             <a:fld id="{61FD5E12-641C-4696-BA65-B86205845F69}" type="datetimeFigureOut">
               <a:rPr lang="en-US" smtClean="0"/>
-              <a:t>8/25/2022</a:t>
+              <a:t>10/19/2022</a:t>
             </a:fld>
             <a:endParaRPr lang="en-US"/>
           </a:p>
@@ -31899,7 +31802,7 @@
           <a:p>
             <a:fld id="{61FD5E12-641C-4696-BA65-B86205845F69}" type="datetimeFigureOut">
               <a:rPr lang="en-US" smtClean="0"/>
-              <a:t>8/25/2022</a:t>
+              <a:t>10/19/2022</a:t>
             </a:fld>
             <a:endParaRPr lang="en-US"/>
           </a:p>
@@ -32176,7 +32079,7 @@
           <a:p>
             <a:fld id="{61FD5E12-641C-4696-BA65-B86205845F69}" type="datetimeFigureOut">
               <a:rPr lang="en-US" smtClean="0"/>
-              <a:t>8/25/2022</a:t>
+              <a:t>10/19/2022</a:t>
             </a:fld>
             <a:endParaRPr lang="en-US"/>
           </a:p>
@@ -32433,7 +32336,7 @@
           <a:p>
             <a:fld id="{61FD5E12-641C-4696-BA65-B86205845F69}" type="datetimeFigureOut">
               <a:rPr lang="en-US" smtClean="0"/>
-              <a:t>8/25/2022</a:t>
+              <a:t>10/19/2022</a:t>
             </a:fld>
             <a:endParaRPr lang="en-US"/>
           </a:p>
@@ -32603,7 +32506,7 @@
           <a:p>
             <a:fld id="{61FD5E12-641C-4696-BA65-B86205845F69}" type="datetimeFigureOut">
               <a:rPr lang="en-US" smtClean="0"/>
-              <a:t>8/25/2022</a:t>
+              <a:t>10/19/2022</a:t>
             </a:fld>
             <a:endParaRPr lang="en-US"/>
           </a:p>
@@ -32783,7 +32686,7 @@
           <a:p>
             <a:fld id="{61FD5E12-641C-4696-BA65-B86205845F69}" type="datetimeFigureOut">
               <a:rPr lang="en-US" smtClean="0"/>
-              <a:t>8/25/2022</a:t>
+              <a:t>10/19/2022</a:t>
             </a:fld>
             <a:endParaRPr lang="en-US"/>
           </a:p>
@@ -33429,7 +33332,7 @@
           <a:p>
             <a:fld id="{5958763E-B898-436D-883D-03711491D54A}" type="datetimeFigureOut">
               <a:rPr lang="en-US" smtClean="0"/>
-              <a:t>8/25/2022</a:t>
+              <a:t>10/19/2022</a:t>
             </a:fld>
             <a:endParaRPr lang="en-US"/>
           </a:p>
@@ -34818,7 +34721,7 @@
           <a:p>
             <a:fld id="{5958763E-B898-436D-883D-03711491D54A}" type="datetimeFigureOut">
               <a:rPr lang="en-US" smtClean="0"/>
-              <a:t>8/25/2022</a:t>
+              <a:t>10/19/2022</a:t>
             </a:fld>
             <a:endParaRPr lang="en-US"/>
           </a:p>
@@ -35019,7 +34922,7 @@
           <a:p>
             <a:fld id="{5958763E-B898-436D-883D-03711491D54A}" type="datetimeFigureOut">
               <a:rPr lang="en-US" smtClean="0"/>
-              <a:t>8/25/2022</a:t>
+              <a:t>10/19/2022</a:t>
             </a:fld>
             <a:endParaRPr lang="en-US"/>
           </a:p>
@@ -35354,7 +35257,7 @@
           <a:p>
             <a:fld id="{5958763E-B898-436D-883D-03711491D54A}" type="datetimeFigureOut">
               <a:rPr lang="en-US" smtClean="0"/>
-              <a:t>8/25/2022</a:t>
+              <a:t>10/19/2022</a:t>
             </a:fld>
             <a:endParaRPr lang="en-US"/>
           </a:p>
@@ -35584,7 +35487,7 @@
           <a:p>
             <a:fld id="{5958763E-B898-436D-883D-03711491D54A}" type="datetimeFigureOut">
               <a:rPr lang="en-US" smtClean="0"/>
-              <a:t>8/25/2022</a:t>
+              <a:t>10/19/2022</a:t>
             </a:fld>
             <a:endParaRPr lang="en-US"/>
           </a:p>
@@ -35828,7 +35731,7 @@
           <a:p>
             <a:fld id="{5958763E-B898-436D-883D-03711491D54A}" type="datetimeFigureOut">
               <a:rPr lang="en-US" smtClean="0"/>
-              <a:t>8/25/2022</a:t>
+              <a:t>10/19/2022</a:t>
             </a:fld>
             <a:endParaRPr lang="en-US"/>
           </a:p>
@@ -36469,7 +36372,7 @@
           <a:p>
             <a:fld id="{61FD5E12-641C-4696-BA65-B86205845F69}" type="datetimeFigureOut">
               <a:rPr lang="en-US" smtClean="0"/>
-              <a:t>8/25/2022</a:t>
+              <a:t>10/19/2022</a:t>
             </a:fld>
             <a:endParaRPr lang="en-US"/>
           </a:p>
@@ -39906,67 +39809,6 @@
     <p:extLst>
       <p:ext uri="{BB962C8B-B14F-4D97-AF65-F5344CB8AC3E}">
         <p14:creationId xmlns:p14="http://schemas.microsoft.com/office/powerpoint/2010/main" val="1399880830"/>
-      </p:ext>
-    </p:extLst>
-  </p:cSld>
-  <p:clrMapOvr>
-    <a:masterClrMapping/>
-  </p:clrMapOvr>
-  <p:transition>
-    <p:fade/>
-  </p:transition>
-</p:sld>
-</file>
-
-<file path=ppt/slides/slide10.xml><?xml version="1.0" encoding="utf-8"?>
-<p:sld xmlns:a="http://schemas.openxmlformats.org/drawingml/2006/main" xmlns:r="http://schemas.openxmlformats.org/officeDocument/2006/relationships" xmlns:p="http://schemas.openxmlformats.org/presentationml/2006/main">
-  <p:cSld>
-    <p:spTree>
-      <p:nvGrpSpPr>
-        <p:cNvPr id="1" name=""/>
-        <p:cNvGrpSpPr/>
-        <p:nvPr/>
-      </p:nvGrpSpPr>
-      <p:grpSpPr>
-        <a:xfrm>
-          <a:off x="0" y="0"/>
-          <a:ext cx="0" cy="0"/>
-          <a:chOff x="0" y="0"/>
-          <a:chExt cx="0" cy="0"/>
-        </a:xfrm>
-      </p:grpSpPr>
-      <p:sp>
-        <p:nvSpPr>
-          <p:cNvPr id="2" name="Text Placeholder 1">
-            <a:extLst>
-              <a:ext uri="{FF2B5EF4-FFF2-40B4-BE49-F238E27FC236}">
-                <a16:creationId xmlns:a16="http://schemas.microsoft.com/office/drawing/2014/main" id="{85615D18-8F75-4B52-89C9-F982DAFE9325}"/>
-              </a:ext>
-            </a:extLst>
-          </p:cNvPr>
-          <p:cNvSpPr>
-            <a:spLocks noGrp="1"/>
-          </p:cNvSpPr>
-          <p:nvPr>
-            <p:ph type="body" sz="quarter" idx="10"/>
-          </p:nvPr>
-        </p:nvSpPr>
-        <p:spPr/>
-        <p:txBody>
-          <a:bodyPr/>
-          <a:lstStyle/>
-          <a:p>
-            <a:r>
-              <a:rPr lang="en-US"/>
-              <a:t>Questions?</a:t>
-            </a:r>
-          </a:p>
-        </p:txBody>
-      </p:sp>
-    </p:spTree>
-    <p:extLst>
-      <p:ext uri="{BB962C8B-B14F-4D97-AF65-F5344CB8AC3E}">
-        <p14:creationId xmlns:p14="http://schemas.microsoft.com/office/powerpoint/2010/main" val="2552111147"/>
       </p:ext>
     </p:extLst>
   </p:cSld>
@@ -40596,7 +40438,39 @@
           <a:p>
             <a:r>
               <a:rPr lang="en-US" dirty="0"/>
-              <a:t>CSS Files</a:t>
+              <a:t>The </a:t>
+            </a:r>
+            <a:r>
+              <a:rPr lang="en-US" sz="4000" cap="none" dirty="0">
+                <a:solidFill>
+                  <a:schemeClr val="accent1">
+                    <a:lumMod val="40000"/>
+                    <a:lumOff val="60000"/>
+                  </a:schemeClr>
+                </a:solidFill>
+                <a:latin typeface="Consolas" panose="020B0609020204030204" pitchFamily="49" charset="0"/>
+              </a:rPr>
+              <a:t>&lt;head&gt;</a:t>
+            </a:r>
+            <a:r>
+              <a:rPr lang="en-US" sz="3600" dirty="0"/>
+              <a:t> and </a:t>
+            </a:r>
+            <a:r>
+              <a:rPr lang="en-US" sz="4000" cap="none" dirty="0">
+                <a:solidFill>
+                  <a:schemeClr val="accent1">
+                    <a:lumMod val="40000"/>
+                    <a:lumOff val="60000"/>
+                  </a:schemeClr>
+                </a:solidFill>
+                <a:latin typeface="Consolas" panose="020B0609020204030204" pitchFamily="49" charset="0"/>
+              </a:rPr>
+              <a:t>&lt;style&gt;</a:t>
+            </a:r>
+            <a:r>
+              <a:rPr lang="en-US" dirty="0"/>
+              <a:t> elements</a:t>
             </a:r>
           </a:p>
         </p:txBody>
@@ -40617,70 +40491,866 @@
             <p:ph idx="1"/>
           </p:nvPr>
         </p:nvSpPr>
-        <p:spPr/>
+        <p:spPr>
+          <a:xfrm>
+            <a:off x="381000" y="1270143"/>
+            <a:ext cx="4572000" cy="5257800"/>
+          </a:xfrm>
+          <a:solidFill>
+            <a:srgbClr val="322610"/>
+          </a:solidFill>
+        </p:spPr>
         <p:txBody>
           <a:bodyPr>
             <a:normAutofit/>
           </a:bodyPr>
           <a:lstStyle/>
           <a:p>
+            <a:pPr marL="57150" indent="0">
+              <a:buNone/>
+            </a:pPr>
             <a:r>
-              <a:rPr lang="en-US" sz="3600" dirty="0"/>
-              <a:t>CSS files are separate files that add style to HTML</a:t>
-            </a:r>
-          </a:p>
-          <a:p>
-            <a:endParaRPr lang="en-US" sz="3600" dirty="0"/>
-          </a:p>
-          <a:p>
-            <a:r>
-              <a:rPr lang="en-US" sz="3600" dirty="0"/>
-              <a:t>They have a different language</a:t>
-            </a:r>
-          </a:p>
-          <a:p>
-            <a:endParaRPr lang="en-US" sz="3600" dirty="0"/>
-          </a:p>
-          <a:p>
-            <a:r>
-              <a:rPr lang="en-US" sz="3600" dirty="0"/>
-              <a:t>They end with </a:t>
+              <a:rPr lang="en-US" sz="2400" b="0" dirty="0">
+                <a:solidFill>
+                  <a:srgbClr val="A9B665"/>
+                </a:solidFill>
+                <a:effectLst/>
+                <a:latin typeface="Consolas" panose="020B0609020204030204" pitchFamily="49" charset="0"/>
+              </a:rPr>
+              <a:t>&lt;</a:t>
             </a:r>
             <a:r>
-              <a:rPr lang="en-US" sz="3600" b="1" dirty="0"/>
-              <a:t>.</a:t>
+              <a:rPr lang="en-US" sz="2400" b="0" dirty="0">
+                <a:solidFill>
+                  <a:srgbClr val="E78A4E"/>
+                </a:solidFill>
+                <a:effectLst/>
+                <a:latin typeface="Consolas" panose="020B0609020204030204" pitchFamily="49" charset="0"/>
+              </a:rPr>
+              <a:t>html</a:t>
             </a:r>
             <a:r>
-              <a:rPr lang="en-US" sz="3600" b="1" dirty="0" err="1"/>
-              <a:t>css</a:t>
+              <a:rPr lang="en-US" sz="2400" b="0" dirty="0">
+                <a:solidFill>
+                  <a:srgbClr val="A9B665"/>
+                </a:solidFill>
+                <a:effectLst/>
+                <a:latin typeface="Consolas" panose="020B0609020204030204" pitchFamily="49" charset="0"/>
+              </a:rPr>
+              <a:t>&gt;</a:t>
             </a:r>
-            <a:endParaRPr lang="en-US" sz="3600" b="1" dirty="0"/>
-          </a:p>
-          <a:p>
-            <a:endParaRPr lang="en-US" sz="3600" dirty="0"/>
-          </a:p>
-          <a:p>
+            <a:endParaRPr lang="en-US" sz="2400" b="0" dirty="0">
+              <a:solidFill>
+                <a:srgbClr val="D4BE98"/>
+              </a:solidFill>
+              <a:effectLst/>
+              <a:latin typeface="Consolas" panose="020B0609020204030204" pitchFamily="49" charset="0"/>
+            </a:endParaRPr>
+          </a:p>
+          <a:p>
+            <a:pPr marL="57150" indent="0">
+              <a:buNone/>
+            </a:pPr>
             <a:r>
-              <a:rPr lang="en-US" sz="3600" dirty="0"/>
-              <a:t>They must be </a:t>
+              <a:rPr lang="en-US" sz="2400" b="0" dirty="0">
+                <a:solidFill>
+                  <a:srgbClr val="D4BE98"/>
+                </a:solidFill>
+                <a:effectLst/>
+                <a:latin typeface="Consolas" panose="020B0609020204030204" pitchFamily="49" charset="0"/>
+              </a:rPr>
+              <a:t>  </a:t>
             </a:r>
             <a:r>
-              <a:rPr lang="en-US" sz="3600" i="1" dirty="0"/>
-              <a:t>linked</a:t>
+              <a:rPr lang="en-US" sz="2400" b="0" dirty="0">
+                <a:solidFill>
+                  <a:srgbClr val="A9B665"/>
+                </a:solidFill>
+                <a:effectLst/>
+                <a:latin typeface="Consolas" panose="020B0609020204030204" pitchFamily="49" charset="0"/>
+              </a:rPr>
+              <a:t>&lt;</a:t>
             </a:r>
             <a:r>
-              <a:rPr lang="en-US" sz="3600" dirty="0"/>
-              <a:t> from the HTML element  </a:t>
+              <a:rPr lang="en-US" sz="2400" b="0" dirty="0">
+                <a:solidFill>
+                  <a:srgbClr val="E78A4E"/>
+                </a:solidFill>
+                <a:effectLst/>
+                <a:latin typeface="Consolas" panose="020B0609020204030204" pitchFamily="49" charset="0"/>
+              </a:rPr>
+              <a:t>head</a:t>
+            </a:r>
+            <a:r>
+              <a:rPr lang="en-US" sz="2400" b="0" dirty="0">
+                <a:solidFill>
+                  <a:srgbClr val="A9B665"/>
+                </a:solidFill>
+                <a:effectLst/>
+                <a:latin typeface="Consolas" panose="020B0609020204030204" pitchFamily="49" charset="0"/>
+              </a:rPr>
+              <a:t>&gt;</a:t>
+            </a:r>
+            <a:endParaRPr lang="en-US" sz="2400" b="0" dirty="0">
+              <a:solidFill>
+                <a:srgbClr val="D4BE98"/>
+              </a:solidFill>
+              <a:effectLst/>
+              <a:latin typeface="Consolas" panose="020B0609020204030204" pitchFamily="49" charset="0"/>
+            </a:endParaRPr>
+          </a:p>
+          <a:p>
+            <a:pPr marL="57150" indent="0">
+              <a:buNone/>
+            </a:pPr>
+            <a:r>
+              <a:rPr lang="en-US" sz="2400" b="0" dirty="0">
+                <a:solidFill>
+                  <a:srgbClr val="D4BE98"/>
+                </a:solidFill>
+                <a:effectLst/>
+                <a:latin typeface="Consolas" panose="020B0609020204030204" pitchFamily="49" charset="0"/>
+              </a:rPr>
+              <a:t>    </a:t>
+            </a:r>
+            <a:r>
+              <a:rPr lang="en-US" sz="2400" b="0" dirty="0">
+                <a:solidFill>
+                  <a:srgbClr val="A9B665"/>
+                </a:solidFill>
+                <a:effectLst/>
+                <a:latin typeface="Consolas" panose="020B0609020204030204" pitchFamily="49" charset="0"/>
+              </a:rPr>
+              <a:t>&lt;</a:t>
+            </a:r>
+            <a:r>
+              <a:rPr lang="en-US" sz="2400" b="0" dirty="0">
+                <a:solidFill>
+                  <a:srgbClr val="E78A4E"/>
+                </a:solidFill>
+                <a:effectLst/>
+                <a:latin typeface="Consolas" panose="020B0609020204030204" pitchFamily="49" charset="0"/>
+              </a:rPr>
+              <a:t>style</a:t>
+            </a:r>
+            <a:r>
+              <a:rPr lang="en-US" sz="2400" b="0" dirty="0">
+                <a:solidFill>
+                  <a:srgbClr val="A9B665"/>
+                </a:solidFill>
+                <a:effectLst/>
+                <a:latin typeface="Consolas" panose="020B0609020204030204" pitchFamily="49" charset="0"/>
+              </a:rPr>
+              <a:t>&gt;</a:t>
+            </a:r>
+            <a:endParaRPr lang="en-US" sz="2400" b="0" dirty="0">
+              <a:solidFill>
+                <a:srgbClr val="D4BE98"/>
+              </a:solidFill>
+              <a:effectLst/>
+              <a:latin typeface="Consolas" panose="020B0609020204030204" pitchFamily="49" charset="0"/>
+            </a:endParaRPr>
+          </a:p>
+          <a:p>
+            <a:pPr marL="57150" indent="0">
+              <a:buNone/>
+            </a:pPr>
+            <a:r>
+              <a:rPr lang="en-US" sz="2400" b="0" dirty="0">
+                <a:solidFill>
+                  <a:srgbClr val="D4BE98"/>
+                </a:solidFill>
+                <a:effectLst/>
+                <a:latin typeface="Consolas" panose="020B0609020204030204" pitchFamily="49" charset="0"/>
+              </a:rPr>
+              <a:t>      </a:t>
+            </a:r>
+            <a:r>
+              <a:rPr lang="en-US" sz="2400" b="0" i="1" dirty="0">
+                <a:solidFill>
+                  <a:srgbClr val="928374"/>
+                </a:solidFill>
+                <a:effectLst/>
+                <a:latin typeface="Consolas" panose="020B0609020204030204" pitchFamily="49" charset="0"/>
+              </a:rPr>
+              <a:t>/* CSS Goes Here */</a:t>
+            </a:r>
+            <a:endParaRPr lang="en-US" sz="2400" b="0" dirty="0">
+              <a:solidFill>
+                <a:srgbClr val="D4BE98"/>
+              </a:solidFill>
+              <a:effectLst/>
+              <a:latin typeface="Consolas" panose="020B0609020204030204" pitchFamily="49" charset="0"/>
+            </a:endParaRPr>
+          </a:p>
+          <a:p>
+            <a:pPr marL="57150" indent="0">
+              <a:buNone/>
+            </a:pPr>
+            <a:r>
+              <a:rPr lang="en-US" sz="2400" b="0" dirty="0">
+                <a:solidFill>
+                  <a:srgbClr val="D4BE98"/>
+                </a:solidFill>
+                <a:effectLst/>
+                <a:latin typeface="Consolas" panose="020B0609020204030204" pitchFamily="49" charset="0"/>
+              </a:rPr>
+              <a:t>    </a:t>
+            </a:r>
+            <a:r>
+              <a:rPr lang="en-US" sz="2400" b="0" dirty="0">
+                <a:solidFill>
+                  <a:srgbClr val="A9B665"/>
+                </a:solidFill>
+                <a:effectLst/>
+                <a:latin typeface="Consolas" panose="020B0609020204030204" pitchFamily="49" charset="0"/>
+              </a:rPr>
+              <a:t>&lt;/</a:t>
+            </a:r>
+            <a:r>
+              <a:rPr lang="en-US" sz="2400" b="0" dirty="0">
+                <a:solidFill>
+                  <a:srgbClr val="E78A4E"/>
+                </a:solidFill>
+                <a:effectLst/>
+                <a:latin typeface="Consolas" panose="020B0609020204030204" pitchFamily="49" charset="0"/>
+              </a:rPr>
+              <a:t>style</a:t>
+            </a:r>
+            <a:r>
+              <a:rPr lang="en-US" sz="2400" b="0" dirty="0">
+                <a:solidFill>
+                  <a:srgbClr val="A9B665"/>
+                </a:solidFill>
+                <a:effectLst/>
+                <a:latin typeface="Consolas" panose="020B0609020204030204" pitchFamily="49" charset="0"/>
+              </a:rPr>
+              <a:t>&gt;</a:t>
+            </a:r>
+            <a:endParaRPr lang="en-US" sz="2400" b="0" dirty="0">
+              <a:solidFill>
+                <a:srgbClr val="D4BE98"/>
+              </a:solidFill>
+              <a:effectLst/>
+              <a:latin typeface="Consolas" panose="020B0609020204030204" pitchFamily="49" charset="0"/>
+            </a:endParaRPr>
+          </a:p>
+          <a:p>
+            <a:pPr marL="57150" indent="0">
+              <a:buNone/>
+            </a:pPr>
+            <a:r>
+              <a:rPr lang="en-US" sz="2400" b="0" dirty="0">
+                <a:solidFill>
+                  <a:srgbClr val="D4BE98"/>
+                </a:solidFill>
+                <a:effectLst/>
+                <a:latin typeface="Consolas" panose="020B0609020204030204" pitchFamily="49" charset="0"/>
+              </a:rPr>
+              <a:t>  </a:t>
+            </a:r>
+            <a:r>
+              <a:rPr lang="en-US" sz="2400" b="0" dirty="0">
+                <a:solidFill>
+                  <a:srgbClr val="A9B665"/>
+                </a:solidFill>
+                <a:effectLst/>
+                <a:latin typeface="Consolas" panose="020B0609020204030204" pitchFamily="49" charset="0"/>
+              </a:rPr>
+              <a:t>&lt;/</a:t>
+            </a:r>
+            <a:r>
+              <a:rPr lang="en-US" sz="2400" b="0" dirty="0">
+                <a:solidFill>
+                  <a:srgbClr val="E78A4E"/>
+                </a:solidFill>
+                <a:effectLst/>
+                <a:latin typeface="Consolas" panose="020B0609020204030204" pitchFamily="49" charset="0"/>
+              </a:rPr>
+              <a:t>head</a:t>
+            </a:r>
+            <a:r>
+              <a:rPr lang="en-US" sz="2400" b="0" dirty="0">
+                <a:solidFill>
+                  <a:srgbClr val="A9B665"/>
+                </a:solidFill>
+                <a:effectLst/>
+                <a:latin typeface="Consolas" panose="020B0609020204030204" pitchFamily="49" charset="0"/>
+              </a:rPr>
+              <a:t>&gt;</a:t>
+            </a:r>
+            <a:endParaRPr lang="en-US" sz="2400" b="0" dirty="0">
+              <a:solidFill>
+                <a:srgbClr val="D4BE98"/>
+              </a:solidFill>
+              <a:effectLst/>
+              <a:latin typeface="Consolas" panose="020B0609020204030204" pitchFamily="49" charset="0"/>
+            </a:endParaRPr>
+          </a:p>
+          <a:p>
+            <a:pPr marL="57150" indent="0">
+              <a:buNone/>
+            </a:pPr>
+            <a:r>
+              <a:rPr lang="en-US" sz="2400" b="0" dirty="0">
+                <a:solidFill>
+                  <a:srgbClr val="D4BE98"/>
+                </a:solidFill>
+                <a:effectLst/>
+                <a:latin typeface="Consolas" panose="020B0609020204030204" pitchFamily="49" charset="0"/>
+              </a:rPr>
+              <a:t>  </a:t>
+            </a:r>
+            <a:r>
+              <a:rPr lang="en-US" sz="2400" b="0" dirty="0">
+                <a:solidFill>
+                  <a:srgbClr val="A9B665"/>
+                </a:solidFill>
+                <a:effectLst/>
+                <a:latin typeface="Consolas" panose="020B0609020204030204" pitchFamily="49" charset="0"/>
+              </a:rPr>
+              <a:t>&lt;</a:t>
+            </a:r>
+            <a:r>
+              <a:rPr lang="en-US" sz="2400" b="0" dirty="0">
+                <a:solidFill>
+                  <a:srgbClr val="E78A4E"/>
+                </a:solidFill>
+                <a:effectLst/>
+                <a:latin typeface="Consolas" panose="020B0609020204030204" pitchFamily="49" charset="0"/>
+              </a:rPr>
+              <a:t>body</a:t>
+            </a:r>
+            <a:r>
+              <a:rPr lang="en-US" sz="2400" b="0" dirty="0">
+                <a:solidFill>
+                  <a:srgbClr val="A9B665"/>
+                </a:solidFill>
+                <a:effectLst/>
+                <a:latin typeface="Consolas" panose="020B0609020204030204" pitchFamily="49" charset="0"/>
+              </a:rPr>
+              <a:t>&gt;</a:t>
+            </a:r>
+            <a:endParaRPr lang="en-US" sz="2400" b="0" dirty="0">
+              <a:solidFill>
+                <a:srgbClr val="D4BE98"/>
+              </a:solidFill>
+              <a:effectLst/>
+              <a:latin typeface="Consolas" panose="020B0609020204030204" pitchFamily="49" charset="0"/>
+            </a:endParaRPr>
+          </a:p>
+          <a:p>
+            <a:pPr marL="57150" indent="0">
+              <a:buNone/>
+            </a:pPr>
+            <a:r>
+              <a:rPr lang="en-US" sz="2400" b="0" dirty="0">
+                <a:solidFill>
+                  <a:srgbClr val="D4BE98"/>
+                </a:solidFill>
+                <a:effectLst/>
+                <a:latin typeface="Consolas" panose="020B0609020204030204" pitchFamily="49" charset="0"/>
+              </a:rPr>
+              <a:t>    </a:t>
+            </a:r>
+            <a:r>
+              <a:rPr lang="en-US" sz="2400" b="0" dirty="0">
+                <a:solidFill>
+                  <a:srgbClr val="A9B665"/>
+                </a:solidFill>
+                <a:effectLst/>
+                <a:latin typeface="Consolas" panose="020B0609020204030204" pitchFamily="49" charset="0"/>
+              </a:rPr>
+              <a:t>&lt;</a:t>
+            </a:r>
+            <a:r>
+              <a:rPr lang="en-US" sz="2400" b="0" dirty="0">
+                <a:solidFill>
+                  <a:srgbClr val="E78A4E"/>
+                </a:solidFill>
+                <a:effectLst/>
+                <a:latin typeface="Consolas" panose="020B0609020204030204" pitchFamily="49" charset="0"/>
+              </a:rPr>
+              <a:t>h1</a:t>
+            </a:r>
+            <a:r>
+              <a:rPr lang="en-US" sz="2400" b="0" dirty="0">
+                <a:solidFill>
+                  <a:srgbClr val="A9B665"/>
+                </a:solidFill>
+                <a:effectLst/>
+                <a:latin typeface="Consolas" panose="020B0609020204030204" pitchFamily="49" charset="0"/>
+              </a:rPr>
+              <a:t>&gt;</a:t>
+            </a:r>
+            <a:r>
+              <a:rPr lang="en-US" sz="2400" b="0" dirty="0">
+                <a:solidFill>
+                  <a:srgbClr val="D4BE98"/>
+                </a:solidFill>
+                <a:effectLst/>
+                <a:latin typeface="Consolas" panose="020B0609020204030204" pitchFamily="49" charset="0"/>
+              </a:rPr>
+              <a:t>My Site</a:t>
+            </a:r>
+            <a:r>
+              <a:rPr lang="en-US" sz="2400" b="0" dirty="0">
+                <a:solidFill>
+                  <a:srgbClr val="A9B665"/>
+                </a:solidFill>
+                <a:effectLst/>
+                <a:latin typeface="Consolas" panose="020B0609020204030204" pitchFamily="49" charset="0"/>
+              </a:rPr>
+              <a:t>&lt;/</a:t>
+            </a:r>
+            <a:r>
+              <a:rPr lang="en-US" sz="2400" b="0" dirty="0">
+                <a:solidFill>
+                  <a:srgbClr val="E78A4E"/>
+                </a:solidFill>
+                <a:effectLst/>
+                <a:latin typeface="Consolas" panose="020B0609020204030204" pitchFamily="49" charset="0"/>
+              </a:rPr>
+              <a:t>h1</a:t>
+            </a:r>
+            <a:r>
+              <a:rPr lang="en-US" sz="2400" b="0" dirty="0">
+                <a:solidFill>
+                  <a:srgbClr val="A9B665"/>
+                </a:solidFill>
+                <a:effectLst/>
+                <a:latin typeface="Consolas" panose="020B0609020204030204" pitchFamily="49" charset="0"/>
+              </a:rPr>
+              <a:t>&gt;</a:t>
+            </a:r>
+            <a:endParaRPr lang="en-US" sz="2400" b="0" dirty="0">
+              <a:solidFill>
+                <a:srgbClr val="D4BE98"/>
+              </a:solidFill>
+              <a:effectLst/>
+              <a:latin typeface="Consolas" panose="020B0609020204030204" pitchFamily="49" charset="0"/>
+            </a:endParaRPr>
+          </a:p>
+          <a:p>
+            <a:pPr marL="57150" indent="0">
+              <a:buNone/>
+            </a:pPr>
+            <a:r>
+              <a:rPr lang="en-US" sz="2400" b="0" dirty="0">
+                <a:solidFill>
+                  <a:srgbClr val="D4BE98"/>
+                </a:solidFill>
+                <a:effectLst/>
+                <a:latin typeface="Consolas" panose="020B0609020204030204" pitchFamily="49" charset="0"/>
+              </a:rPr>
+              <a:t>  </a:t>
+            </a:r>
+            <a:r>
+              <a:rPr lang="en-US" sz="2400" b="0" dirty="0">
+                <a:solidFill>
+                  <a:srgbClr val="A9B665"/>
+                </a:solidFill>
+                <a:effectLst/>
+                <a:latin typeface="Consolas" panose="020B0609020204030204" pitchFamily="49" charset="0"/>
+              </a:rPr>
+              <a:t>&lt;/</a:t>
+            </a:r>
+            <a:r>
+              <a:rPr lang="en-US" sz="2400" b="0" dirty="0">
+                <a:solidFill>
+                  <a:srgbClr val="E78A4E"/>
+                </a:solidFill>
+                <a:effectLst/>
+                <a:latin typeface="Consolas" panose="020B0609020204030204" pitchFamily="49" charset="0"/>
+              </a:rPr>
+              <a:t>body</a:t>
+            </a:r>
+            <a:r>
+              <a:rPr lang="en-US" sz="2400" b="0" dirty="0">
+                <a:solidFill>
+                  <a:srgbClr val="A9B665"/>
+                </a:solidFill>
+                <a:effectLst/>
+                <a:latin typeface="Consolas" panose="020B0609020204030204" pitchFamily="49" charset="0"/>
+              </a:rPr>
+              <a:t>&gt;</a:t>
+            </a:r>
+            <a:endParaRPr lang="en-US" sz="2400" b="0" dirty="0">
+              <a:solidFill>
+                <a:srgbClr val="D4BE98"/>
+              </a:solidFill>
+              <a:effectLst/>
+              <a:latin typeface="Consolas" panose="020B0609020204030204" pitchFamily="49" charset="0"/>
+            </a:endParaRPr>
+          </a:p>
+          <a:p>
+            <a:pPr marL="57150" indent="0">
+              <a:buNone/>
+            </a:pPr>
+            <a:r>
+              <a:rPr lang="en-US" sz="2400" b="0" dirty="0">
+                <a:solidFill>
+                  <a:srgbClr val="A9B665"/>
+                </a:solidFill>
+                <a:effectLst/>
+                <a:latin typeface="Consolas" panose="020B0609020204030204" pitchFamily="49" charset="0"/>
+              </a:rPr>
+              <a:t>&lt;/</a:t>
+            </a:r>
+            <a:r>
+              <a:rPr lang="en-US" sz="2400" b="0" dirty="0">
+                <a:solidFill>
+                  <a:srgbClr val="E78A4E"/>
+                </a:solidFill>
+                <a:effectLst/>
+                <a:latin typeface="Consolas" panose="020B0609020204030204" pitchFamily="49" charset="0"/>
+              </a:rPr>
+              <a:t>html</a:t>
+            </a:r>
+            <a:r>
+              <a:rPr lang="en-US" sz="2400" b="0" dirty="0">
+                <a:solidFill>
+                  <a:srgbClr val="A9B665"/>
+                </a:solidFill>
+                <a:effectLst/>
+                <a:latin typeface="Consolas" panose="020B0609020204030204" pitchFamily="49" charset="0"/>
+              </a:rPr>
+              <a:t>&gt;</a:t>
+            </a:r>
+            <a:endParaRPr lang="en-US" sz="2400" b="0" dirty="0">
+              <a:solidFill>
+                <a:srgbClr val="D4BE98"/>
+              </a:solidFill>
+              <a:effectLst/>
+              <a:latin typeface="Consolas" panose="020B0609020204030204" pitchFamily="49" charset="0"/>
+            </a:endParaRPr>
+          </a:p>
+        </p:txBody>
+      </p:sp>
+      <p:sp>
+        <p:nvSpPr>
+          <p:cNvPr id="5" name="Content Placeholder 2">
+            <a:extLst>
+              <a:ext uri="{FF2B5EF4-FFF2-40B4-BE49-F238E27FC236}">
+                <a16:creationId xmlns:a16="http://schemas.microsoft.com/office/drawing/2014/main" id="{0E28B48C-F781-40A9-8C61-6C54EECEAE54}"/>
+              </a:ext>
+            </a:extLst>
+          </p:cNvPr>
+          <p:cNvSpPr txBox="1">
+            <a:spLocks/>
+          </p:cNvSpPr>
+          <p:nvPr/>
+        </p:nvSpPr>
+        <p:spPr>
+          <a:xfrm>
+            <a:off x="5181599" y="4173364"/>
+            <a:ext cx="6508955" cy="2354580"/>
+          </a:xfrm>
+          <a:prstGeom prst="rect">
+            <a:avLst/>
+          </a:prstGeom>
+        </p:spPr>
+        <p:txBody>
+          <a:bodyPr vert="horz" lIns="0" tIns="0" rIns="0" bIns="0" rtlCol="0">
+            <a:normAutofit/>
+          </a:bodyPr>
+          <a:lstStyle>
+            <a:lvl1pPr marL="342900" indent="-285750" algn="l" defTabSz="914400" rtl="0" eaLnBrk="1" latinLnBrk="0" hangingPunct="1">
+              <a:lnSpc>
+                <a:spcPct val="100000"/>
+              </a:lnSpc>
+              <a:spcBef>
+                <a:spcPts val="0"/>
+              </a:spcBef>
+              <a:spcAft>
+                <a:spcPts val="1200"/>
+              </a:spcAft>
+              <a:buClr>
+                <a:schemeClr val="accent3"/>
+              </a:buClr>
+              <a:buFont typeface="Wingdings" panose="05000000000000000000" pitchFamily="2" charset="2"/>
+              <a:buChar char="§"/>
+              <a:defRPr sz="2800" kern="1200">
+                <a:solidFill>
+                  <a:schemeClr val="tx1"/>
+                </a:solidFill>
+                <a:latin typeface="+mn-lt"/>
+                <a:ea typeface="+mn-ea"/>
+                <a:cs typeface="+mn-cs"/>
+              </a:defRPr>
+            </a:lvl1pPr>
+            <a:lvl2pPr marL="685800" indent="-228600" algn="l" defTabSz="914400" rtl="0" eaLnBrk="1" latinLnBrk="0" hangingPunct="1">
+              <a:lnSpc>
+                <a:spcPct val="100000"/>
+              </a:lnSpc>
+              <a:spcBef>
+                <a:spcPts val="0"/>
+              </a:spcBef>
+              <a:spcAft>
+                <a:spcPts val="1200"/>
+              </a:spcAft>
+              <a:buClr>
+                <a:schemeClr val="accent2"/>
+              </a:buClr>
+              <a:buFont typeface="Arial" panose="020B0604020202020204" pitchFamily="34" charset="0"/>
+              <a:buChar char="•"/>
+              <a:defRPr sz="2400" kern="1200">
+                <a:solidFill>
+                  <a:schemeClr val="tx1"/>
+                </a:solidFill>
+                <a:latin typeface="+mn-lt"/>
+                <a:ea typeface="+mn-ea"/>
+                <a:cs typeface="+mn-cs"/>
+              </a:defRPr>
+            </a:lvl2pPr>
+            <a:lvl3pPr marL="1028700" indent="-228600" algn="l" defTabSz="914400" rtl="0" eaLnBrk="1" latinLnBrk="0" hangingPunct="1">
+              <a:lnSpc>
+                <a:spcPct val="100000"/>
+              </a:lnSpc>
+              <a:spcBef>
+                <a:spcPts val="0"/>
+              </a:spcBef>
+              <a:spcAft>
+                <a:spcPts val="1200"/>
+              </a:spcAft>
+              <a:buClr>
+                <a:schemeClr val="accent1"/>
+              </a:buClr>
+              <a:buFont typeface="Arial" panose="020B0604020202020204" pitchFamily="34" charset="0"/>
+              <a:buChar char="•"/>
+              <a:defRPr sz="2000" kern="1200">
+                <a:solidFill>
+                  <a:schemeClr val="tx1"/>
+                </a:solidFill>
+                <a:latin typeface="+mn-lt"/>
+                <a:ea typeface="+mn-ea"/>
+                <a:cs typeface="+mn-cs"/>
+              </a:defRPr>
+            </a:lvl3pPr>
+            <a:lvl4pPr marL="1484313" indent="-285750" algn="l" defTabSz="914400" rtl="0" eaLnBrk="1" latinLnBrk="0" hangingPunct="1">
+              <a:lnSpc>
+                <a:spcPct val="100000"/>
+              </a:lnSpc>
+              <a:spcBef>
+                <a:spcPts val="0"/>
+              </a:spcBef>
+              <a:spcAft>
+                <a:spcPts val="1200"/>
+              </a:spcAft>
+              <a:buFont typeface="Arial" panose="020B0604020202020204" pitchFamily="34" charset="0"/>
+              <a:buChar char="•"/>
+              <a:defRPr sz="1800" kern="1200">
+                <a:solidFill>
+                  <a:schemeClr val="tx1"/>
+                </a:solidFill>
+                <a:latin typeface="+mn-lt"/>
+                <a:ea typeface="+mn-ea"/>
+                <a:cs typeface="+mn-cs"/>
+              </a:defRPr>
+            </a:lvl4pPr>
+            <a:lvl5pPr marL="1889125" indent="-284163" algn="l" defTabSz="914400" rtl="0" eaLnBrk="1" latinLnBrk="0" hangingPunct="1">
+              <a:lnSpc>
+                <a:spcPct val="100000"/>
+              </a:lnSpc>
+              <a:spcBef>
+                <a:spcPts val="0"/>
+              </a:spcBef>
+              <a:spcAft>
+                <a:spcPts val="1200"/>
+              </a:spcAft>
+              <a:buFont typeface="Arial" panose="020B0604020202020204" pitchFamily="34" charset="0"/>
+              <a:buChar char="•"/>
+              <a:defRPr sz="1800" kern="1200">
+                <a:solidFill>
+                  <a:schemeClr val="tx1"/>
+                </a:solidFill>
+                <a:latin typeface="+mn-lt"/>
+                <a:ea typeface="+mn-ea"/>
+                <a:cs typeface="+mn-cs"/>
+              </a:defRPr>
+            </a:lvl5pPr>
+            <a:lvl6pPr marL="2514600" indent="-228600" algn="l" defTabSz="914400" rtl="0" eaLnBrk="1" latinLnBrk="0" hangingPunct="1">
+              <a:lnSpc>
+                <a:spcPct val="90000"/>
+              </a:lnSpc>
+              <a:spcBef>
+                <a:spcPts val="500"/>
+              </a:spcBef>
+              <a:buFont typeface="Arial" panose="020B0604020202020204" pitchFamily="34" charset="0"/>
+              <a:buChar char="•"/>
+              <a:defRPr sz="1800" kern="1200">
+                <a:solidFill>
+                  <a:schemeClr val="tx1"/>
+                </a:solidFill>
+                <a:latin typeface="+mn-lt"/>
+                <a:ea typeface="+mn-ea"/>
+                <a:cs typeface="+mn-cs"/>
+              </a:defRPr>
+            </a:lvl6pPr>
+            <a:lvl7pPr marL="2971800" indent="-228600" algn="l" defTabSz="914400" rtl="0" eaLnBrk="1" latinLnBrk="0" hangingPunct="1">
+              <a:lnSpc>
+                <a:spcPct val="90000"/>
+              </a:lnSpc>
+              <a:spcBef>
+                <a:spcPts val="500"/>
+              </a:spcBef>
+              <a:buFont typeface="Arial" panose="020B0604020202020204" pitchFamily="34" charset="0"/>
+              <a:buChar char="•"/>
+              <a:defRPr sz="1800" kern="1200">
+                <a:solidFill>
+                  <a:schemeClr val="tx1"/>
+                </a:solidFill>
+                <a:latin typeface="+mn-lt"/>
+                <a:ea typeface="+mn-ea"/>
+                <a:cs typeface="+mn-cs"/>
+              </a:defRPr>
+            </a:lvl7pPr>
+            <a:lvl8pPr marL="3429000" indent="-228600" algn="l" defTabSz="914400" rtl="0" eaLnBrk="1" latinLnBrk="0" hangingPunct="1">
+              <a:lnSpc>
+                <a:spcPct val="90000"/>
+              </a:lnSpc>
+              <a:spcBef>
+                <a:spcPts val="500"/>
+              </a:spcBef>
+              <a:buFont typeface="Arial" panose="020B0604020202020204" pitchFamily="34" charset="0"/>
+              <a:buChar char="•"/>
+              <a:defRPr sz="1800" kern="1200">
+                <a:solidFill>
+                  <a:schemeClr val="tx1"/>
+                </a:solidFill>
+                <a:latin typeface="+mn-lt"/>
+                <a:ea typeface="+mn-ea"/>
+                <a:cs typeface="+mn-cs"/>
+              </a:defRPr>
+            </a:lvl8pPr>
+            <a:lvl9pPr marL="3886200" indent="-228600" algn="l" defTabSz="914400" rtl="0" eaLnBrk="1" latinLnBrk="0" hangingPunct="1">
+              <a:lnSpc>
+                <a:spcPct val="90000"/>
+              </a:lnSpc>
+              <a:spcBef>
+                <a:spcPts val="500"/>
+              </a:spcBef>
+              <a:buFont typeface="Arial" panose="020B0604020202020204" pitchFamily="34" charset="0"/>
+              <a:buChar char="•"/>
+              <a:defRPr sz="1800" kern="1200">
+                <a:solidFill>
+                  <a:schemeClr val="tx1"/>
+                </a:solidFill>
+                <a:latin typeface="+mn-lt"/>
+                <a:ea typeface="+mn-ea"/>
+                <a:cs typeface="+mn-cs"/>
+              </a:defRPr>
+            </a:lvl9pPr>
+          </a:lstStyle>
+          <a:p>
+            <a:r>
+              <a:rPr lang="en-US" dirty="0"/>
+              <a:t>The </a:t>
+            </a:r>
+            <a:r>
+              <a:rPr lang="en-US" b="1" dirty="0">
+                <a:solidFill>
+                  <a:srgbClr val="FFB71B"/>
+                </a:solidFill>
+                <a:latin typeface="Consolas" panose="020B0609020204030204" pitchFamily="49" charset="0"/>
+              </a:rPr>
+              <a:t>&lt;head&gt;&lt;/head&gt;</a:t>
+            </a:r>
+            <a:r>
+              <a:rPr lang="en-US" dirty="0"/>
+              <a:t> element is a </a:t>
+            </a:r>
+            <a:r>
+              <a:rPr lang="en-US" i="1" dirty="0"/>
+              <a:t>child</a:t>
+            </a:r>
+            <a:r>
+              <a:rPr lang="en-US" dirty="0"/>
+              <a:t> of the </a:t>
+            </a:r>
+            <a:r>
+              <a:rPr lang="en-US" b="1" dirty="0">
+                <a:solidFill>
+                  <a:srgbClr val="FFB71B"/>
+                </a:solidFill>
+                <a:latin typeface="Consolas" panose="020B0609020204030204" pitchFamily="49" charset="0"/>
+              </a:rPr>
+              <a:t>&lt;html&gt;&lt;/html&gt;</a:t>
+            </a:r>
+            <a:r>
+              <a:rPr lang="en-US" dirty="0"/>
+              <a:t> element, and a </a:t>
+            </a:r>
+            <a:r>
+              <a:rPr lang="en-US" i="1" dirty="0"/>
+              <a:t>sibling</a:t>
+            </a:r>
+            <a:r>
+              <a:rPr lang="en-US" dirty="0"/>
+              <a:t> of the </a:t>
+            </a:r>
+            <a:r>
+              <a:rPr lang="en-US" b="1" dirty="0">
+                <a:solidFill>
+                  <a:srgbClr val="FFB71B"/>
+                </a:solidFill>
+                <a:latin typeface="Consolas" panose="020B0609020204030204" pitchFamily="49" charset="0"/>
+              </a:rPr>
+              <a:t>&lt;body&gt;&lt;/body&gt;</a:t>
+            </a:r>
+            <a:r>
+              <a:rPr lang="en-US" dirty="0"/>
+              <a:t> element</a:t>
+            </a:r>
+          </a:p>
+          <a:p>
+            <a:r>
+              <a:rPr lang="en-US" dirty="0"/>
+              <a:t>The </a:t>
+            </a:r>
+            <a:r>
+              <a:rPr lang="en-US" b="1" dirty="0">
+                <a:solidFill>
+                  <a:srgbClr val="FFB71B"/>
+                </a:solidFill>
+                <a:latin typeface="Consolas" panose="020B0609020204030204" pitchFamily="49" charset="0"/>
+              </a:rPr>
+              <a:t>&lt;style&gt;&lt;/style&gt;</a:t>
+            </a:r>
+            <a:r>
+              <a:rPr lang="en-US" dirty="0"/>
+              <a:t> element is a </a:t>
+            </a:r>
+            <a:r>
+              <a:rPr lang="en-US" i="1" dirty="0"/>
+              <a:t>child</a:t>
+            </a:r>
+            <a:r>
+              <a:rPr lang="en-US" dirty="0"/>
+              <a:t> of the </a:t>
+            </a:r>
+            <a:r>
+              <a:rPr lang="en-US" b="1" dirty="0">
+                <a:solidFill>
+                  <a:srgbClr val="FFB71B"/>
+                </a:solidFill>
+                <a:latin typeface="Consolas" panose="020B0609020204030204" pitchFamily="49" charset="0"/>
+              </a:rPr>
+              <a:t>&lt;head&gt;&lt;/head&gt;</a:t>
+            </a:r>
+            <a:r>
+              <a:rPr lang="en-US" dirty="0"/>
+              <a:t> element</a:t>
             </a:r>
           </a:p>
         </p:txBody>
       </p:sp>
       <p:pic>
         <p:nvPicPr>
-          <p:cNvPr id="1026" name="Picture 2" descr="File Manager: Download a Free Trial of WinZip">
+          <p:cNvPr id="3" name="Picture 2" descr="The saying 'Alas, poor Yorick! I knew him, Horatio' - meaning and origin.">
             <a:extLst>
               <a:ext uri="{FF2B5EF4-FFF2-40B4-BE49-F238E27FC236}">
-                <a16:creationId xmlns:a16="http://schemas.microsoft.com/office/drawing/2014/main" id="{8D89EA5D-538D-4544-BA34-92AC5BBC859E}"/>
+                <a16:creationId xmlns:a16="http://schemas.microsoft.com/office/drawing/2014/main" id="{748A4E57-B80E-4ACA-9AC7-66D578E3E66B}"/>
               </a:ext>
             </a:extLst>
           </p:cNvPr>
@@ -40697,13 +41367,60 @@
               </a:ext>
             </a:extLst>
           </a:blip>
-          <a:srcRect l="12296" r="8276"/>
+          <a:srcRect t="-1" b="33515"/>
           <a:stretch/>
         </p:blipFill>
         <p:spPr bwMode="auto">
           <a:xfrm>
-            <a:off x="7353300" y="2057400"/>
-            <a:ext cx="4229101" cy="2835983"/>
+            <a:off x="5511902" y="1374425"/>
+            <a:ext cx="2924175" cy="2387457"/>
+          </a:xfrm>
+          <a:prstGeom prst="rect">
+            <a:avLst/>
+          </a:prstGeom>
+          <a:noFill/>
+          <a:extLst>
+            <a:ext uri="{909E8E84-426E-40DD-AFC4-6F175D3DCCD1}">
+              <a14:hiddenFill xmlns:a14="http://schemas.microsoft.com/office/drawing/2010/main">
+                <a:solidFill>
+                  <a:srgbClr val="FFFFFF"/>
+                </a:solidFill>
+              </a14:hiddenFill>
+            </a:ext>
+          </a:extLst>
+        </p:spPr>
+      </p:pic>
+      <p:pic>
+        <p:nvPicPr>
+          <p:cNvPr id="1028" name="Picture 4" descr="Matryoshka - Montessori Services">
+            <a:extLst>
+              <a:ext uri="{FF2B5EF4-FFF2-40B4-BE49-F238E27FC236}">
+                <a16:creationId xmlns:a16="http://schemas.microsoft.com/office/drawing/2014/main" id="{324B8F4F-CA5A-41D3-8E74-DCFEFDB1A3CC}"/>
+              </a:ext>
+            </a:extLst>
+          </p:cNvPr>
+          <p:cNvPicPr>
+            <a:picLocks noChangeAspect="1" noChangeArrowheads="1"/>
+          </p:cNvPicPr>
+          <p:nvPr/>
+        </p:nvPicPr>
+        <p:blipFill>
+          <a:blip r:embed="rId4">
+            <a:extLst>
+              <a:ext uri="{28A0092B-C50C-407E-A947-70E740481C1C}">
+                <a14:useLocalDpi xmlns:a14="http://schemas.microsoft.com/office/drawing/2010/main" val="0"/>
+              </a:ext>
+            </a:extLst>
+          </a:blip>
+          <a:srcRect/>
+          <a:stretch>
+            <a:fillRect/>
+          </a:stretch>
+        </p:blipFill>
+        <p:spPr bwMode="auto">
+          <a:xfrm>
+            <a:off x="8724900" y="1207983"/>
+            <a:ext cx="2514600" cy="2514600"/>
           </a:xfrm>
           <a:prstGeom prst="rect">
             <a:avLst/>
@@ -40724,299 +41441,6 @@
     <p:extLst>
       <p:ext uri="{BB962C8B-B14F-4D97-AF65-F5344CB8AC3E}">
         <p14:creationId xmlns:p14="http://schemas.microsoft.com/office/powerpoint/2010/main" val="969036985"/>
-      </p:ext>
-    </p:extLst>
-  </p:cSld>
-  <p:clrMapOvr>
-    <a:masterClrMapping/>
-  </p:clrMapOvr>
-  <p:transition>
-    <p:fade/>
-  </p:transition>
-</p:sld>
-</file>
-
-<file path=ppt/slides/slide4.xml><?xml version="1.0" encoding="utf-8"?>
-<p:sld xmlns:a="http://schemas.openxmlformats.org/drawingml/2006/main" xmlns:r="http://schemas.openxmlformats.org/officeDocument/2006/relationships" xmlns:p="http://schemas.openxmlformats.org/presentationml/2006/main">
-  <p:cSld>
-    <p:spTree>
-      <p:nvGrpSpPr>
-        <p:cNvPr id="1" name=""/>
-        <p:cNvGrpSpPr/>
-        <p:nvPr/>
-      </p:nvGrpSpPr>
-      <p:grpSpPr>
-        <a:xfrm>
-          <a:off x="0" y="0"/>
-          <a:ext cx="0" cy="0"/>
-          <a:chOff x="0" y="0"/>
-          <a:chExt cx="0" cy="0"/>
-        </a:xfrm>
-      </p:grpSpPr>
-      <p:sp>
-        <p:nvSpPr>
-          <p:cNvPr id="2" name="Title 1"/>
-          <p:cNvSpPr>
-            <a:spLocks noGrp="1"/>
-          </p:cNvSpPr>
-          <p:nvPr>
-            <p:ph type="title"/>
-          </p:nvPr>
-        </p:nvSpPr>
-        <p:spPr/>
-        <p:txBody>
-          <a:bodyPr/>
-          <a:lstStyle/>
-          <a:p>
-            <a:r>
-              <a:rPr lang="en-US" dirty="0"/>
-              <a:t>the </a:t>
-            </a:r>
-            <a:r>
-              <a:rPr lang="en-US" cap="none" dirty="0">
-                <a:solidFill>
-                  <a:schemeClr val="accent1">
-                    <a:lumMod val="20000"/>
-                    <a:lumOff val="80000"/>
-                  </a:schemeClr>
-                </a:solidFill>
-                <a:latin typeface="Consolas" panose="020B0609020204030204" pitchFamily="49" charset="0"/>
-              </a:rPr>
-              <a:t>link</a:t>
-            </a:r>
-            <a:r>
-              <a:rPr lang="en-US" dirty="0"/>
-              <a:t> element</a:t>
-            </a:r>
-          </a:p>
-        </p:txBody>
-      </p:sp>
-      <p:sp>
-        <p:nvSpPr>
-          <p:cNvPr id="3" name="Content Placeholder 2"/>
-          <p:cNvSpPr>
-            <a:spLocks noGrp="1"/>
-          </p:cNvSpPr>
-          <p:nvPr>
-            <p:ph idx="1"/>
-          </p:nvPr>
-        </p:nvSpPr>
-        <p:spPr/>
-        <p:txBody>
-          <a:bodyPr>
-            <a:normAutofit/>
-          </a:bodyPr>
-          <a:lstStyle/>
-          <a:p>
-            <a:r>
-              <a:rPr lang="en-US" i="1" dirty="0"/>
-              <a:t>Different from the </a:t>
-            </a:r>
-            <a:r>
-              <a:rPr lang="en-US" b="1" i="1" dirty="0">
-                <a:solidFill>
-                  <a:schemeClr val="accent1">
-                    <a:lumMod val="50000"/>
-                  </a:schemeClr>
-                </a:solidFill>
-                <a:latin typeface="Consolas" panose="020B0609020204030204" pitchFamily="49" charset="0"/>
-              </a:rPr>
-              <a:t>&lt;a&gt;</a:t>
-            </a:r>
-            <a:r>
-              <a:rPr lang="en-US" i="1" dirty="0"/>
-              <a:t> hyperlink element</a:t>
-            </a:r>
-          </a:p>
-          <a:p>
-            <a:r>
-              <a:rPr lang="en-US" dirty="0"/>
-              <a:t>Links a variety of external files (CSS, fonts, icons)</a:t>
-            </a:r>
-          </a:p>
-          <a:p>
-            <a:r>
-              <a:rPr lang="en-US" dirty="0"/>
-              <a:t>It is a </a:t>
-            </a:r>
-            <a:r>
-              <a:rPr lang="en-US" i="1" dirty="0"/>
-              <a:t>self-closing</a:t>
-            </a:r>
-            <a:r>
-              <a:rPr lang="en-US" dirty="0"/>
-              <a:t> tag</a:t>
-            </a:r>
-          </a:p>
-          <a:p>
-            <a:r>
-              <a:rPr lang="en-US" dirty="0"/>
-              <a:t>It goes within the </a:t>
-            </a:r>
-            <a:r>
-              <a:rPr lang="en-US" sz="3200" dirty="0">
-                <a:solidFill>
-                  <a:schemeClr val="accent1">
-                    <a:lumMod val="50000"/>
-                  </a:schemeClr>
-                </a:solidFill>
-                <a:latin typeface="Consolas" panose="020B0609020204030204" pitchFamily="49" charset="0"/>
-              </a:rPr>
-              <a:t>&lt;head&gt;&lt;/head&gt;</a:t>
-            </a:r>
-            <a:r>
-              <a:rPr lang="en-US" dirty="0"/>
-              <a:t> element</a:t>
-            </a:r>
-          </a:p>
-          <a:p>
-            <a:endParaRPr lang="en-US" dirty="0"/>
-          </a:p>
-          <a:p>
-            <a:r>
-              <a:rPr lang="en-US" dirty="0"/>
-              <a:t>Important attributes:</a:t>
-            </a:r>
-          </a:p>
-          <a:p>
-            <a:pPr lvl="1"/>
-            <a:r>
-              <a:rPr lang="en-US" u="sng" dirty="0" err="1">
-                <a:solidFill>
-                  <a:schemeClr val="accent1">
-                    <a:lumMod val="50000"/>
-                  </a:schemeClr>
-                </a:solidFill>
-                <a:latin typeface="Consolas" panose="020B0609020204030204" pitchFamily="49" charset="0"/>
-              </a:rPr>
-              <a:t>href</a:t>
-            </a:r>
-            <a:r>
-              <a:rPr lang="en-US" dirty="0"/>
-              <a:t>: path to the file (either online or local)</a:t>
-            </a:r>
-          </a:p>
-          <a:p>
-            <a:pPr lvl="1"/>
-            <a:r>
-              <a:rPr lang="en-US" u="sng" dirty="0" err="1">
-                <a:solidFill>
-                  <a:schemeClr val="accent1">
-                    <a:lumMod val="50000"/>
-                  </a:schemeClr>
-                </a:solidFill>
-                <a:latin typeface="Consolas" panose="020B0609020204030204" pitchFamily="49" charset="0"/>
-              </a:rPr>
-              <a:t>rel</a:t>
-            </a:r>
-            <a:r>
-              <a:rPr lang="en-US" dirty="0"/>
-              <a:t>: determines the relationship type (e.g., “</a:t>
-            </a:r>
-            <a:r>
-              <a:rPr lang="en-US" dirty="0">
-                <a:solidFill>
-                  <a:schemeClr val="accent1">
-                    <a:lumMod val="50000"/>
-                  </a:schemeClr>
-                </a:solidFill>
-              </a:rPr>
-              <a:t>stylesheet</a:t>
-            </a:r>
-            <a:r>
-              <a:rPr lang="en-US" dirty="0"/>
-              <a:t>”)</a:t>
-            </a:r>
-          </a:p>
-          <a:p>
-            <a:pPr lvl="1"/>
-            <a:r>
-              <a:rPr lang="en-US" u="sng" dirty="0">
-                <a:solidFill>
-                  <a:schemeClr val="accent1">
-                    <a:lumMod val="50000"/>
-                  </a:schemeClr>
-                </a:solidFill>
-                <a:latin typeface="Consolas" panose="020B0609020204030204" pitchFamily="49" charset="0"/>
-              </a:rPr>
-              <a:t>type</a:t>
-            </a:r>
-            <a:r>
-              <a:rPr lang="en-US" dirty="0"/>
-              <a:t>: specifies the content type of the file (e.g., “</a:t>
-            </a:r>
-            <a:r>
-              <a:rPr lang="en-US" dirty="0">
-                <a:solidFill>
-                  <a:schemeClr val="accent1">
-                    <a:lumMod val="50000"/>
-                  </a:schemeClr>
-                </a:solidFill>
-              </a:rPr>
-              <a:t>text/</a:t>
-            </a:r>
-            <a:r>
-              <a:rPr lang="en-US" dirty="0" err="1">
-                <a:solidFill>
-                  <a:schemeClr val="accent1">
-                    <a:lumMod val="50000"/>
-                  </a:schemeClr>
-                </a:solidFill>
-              </a:rPr>
-              <a:t>css</a:t>
-            </a:r>
-            <a:r>
-              <a:rPr lang="en-US" dirty="0"/>
-              <a:t>”)</a:t>
-            </a:r>
-          </a:p>
-        </p:txBody>
-      </p:sp>
-      <p:pic>
-        <p:nvPicPr>
-          <p:cNvPr id="2050" name="Picture 2" descr="Image result for link"/>
-          <p:cNvPicPr>
-            <a:picLocks noChangeAspect="1" noChangeArrowheads="1"/>
-          </p:cNvPicPr>
-          <p:nvPr/>
-        </p:nvPicPr>
-        <p:blipFill>
-          <a:blip r:embed="rId3">
-            <a:extLst>
-              <a:ext uri="{28A0092B-C50C-407E-A947-70E740481C1C}">
-                <a14:useLocalDpi xmlns:a14="http://schemas.microsoft.com/office/drawing/2010/main" val="0"/>
-              </a:ext>
-            </a:extLst>
-          </a:blip>
-          <a:srcRect/>
-          <a:stretch>
-            <a:fillRect/>
-          </a:stretch>
-        </p:blipFill>
-        <p:spPr bwMode="auto">
-          <a:xfrm>
-            <a:off x="8603416" y="1828800"/>
-            <a:ext cx="3207584" cy="3200400"/>
-          </a:xfrm>
-          <a:prstGeom prst="rect">
-            <a:avLst/>
-          </a:prstGeom>
-          <a:noFill/>
-          <a:extLst>
-            <a:ext uri="{909E8E84-426E-40DD-AFC4-6F175D3DCCD1}">
-              <a14:hiddenFill xmlns:a14="http://schemas.microsoft.com/office/drawing/2010/main">
-                <a:solidFill>
-                  <a:srgbClr val="FFFFFF"/>
-                </a:solidFill>
-              </a14:hiddenFill>
-            </a:ext>
-          </a:extLst>
-        </p:spPr>
-      </p:pic>
-    </p:spTree>
-    <p:extLst>
-      <p:ext uri="{BB962C8B-B14F-4D97-AF65-F5344CB8AC3E}">
-        <p14:creationId xmlns:p14="http://schemas.microsoft.com/office/powerpoint/2010/main" val="2192436492"/>
       </p:ext>
     </p:extLst>
   </p:cSld>
@@ -41060,7 +41484,55 @@
                                           </p:stCondLst>
                                         </p:cTn>
                                         <p:tgtEl>
-                                          <p:spTgt spid="3">
+                                          <p:spTgt spid="6">
+                                            <p:bg/>
+                                          </p:spTgt>
+                                        </p:tgtEl>
+                                        <p:attrNameLst>
+                                          <p:attrName>style.visibility</p:attrName>
+                                        </p:attrNameLst>
+                                      </p:cBhvr>
+                                      <p:to>
+                                        <p:strVal val="visible"/>
+                                      </p:to>
+                                    </p:set>
+                                    <p:animEffect transition="in" filter="fade">
+                                      <p:cBhvr>
+                                        <p:cTn id="7" dur="500"/>
+                                        <p:tgtEl>
+                                          <p:spTgt spid="6">
+                                            <p:bg/>
+                                          </p:spTgt>
+                                        </p:tgtEl>
+                                      </p:cBhvr>
+                                    </p:animEffect>
+                                  </p:childTnLst>
+                                </p:cTn>
+                              </p:par>
+                            </p:childTnLst>
+                          </p:cTn>
+                        </p:par>
+                        <p:par>
+                          <p:cTn id="8" fill="hold">
+                            <p:stCondLst>
+                              <p:cond delay="500"/>
+                            </p:stCondLst>
+                            <p:childTnLst>
+                              <p:par>
+                                <p:cTn id="9" presetID="10" presetClass="entr" presetSubtype="0" fill="hold" grpId="0" nodeType="afterEffect">
+                                  <p:stCondLst>
+                                    <p:cond delay="0"/>
+                                  </p:stCondLst>
+                                  <p:childTnLst>
+                                    <p:set>
+                                      <p:cBhvr>
+                                        <p:cTn id="10" dur="1" fill="hold">
+                                          <p:stCondLst>
+                                            <p:cond delay="0"/>
+                                          </p:stCondLst>
+                                        </p:cTn>
+                                        <p:tgtEl>
+                                          <p:spTgt spid="6">
                                             <p:txEl>
                                               <p:pRg st="0" end="0"/>
                                             </p:txEl>
@@ -41076,9 +41548,346 @@
                                     </p:set>
                                     <p:animEffect transition="in" filter="fade">
                                       <p:cBhvr>
-                                        <p:cTn id="7" dur="500"/>
+                                        <p:cTn id="11" dur="500"/>
                                         <p:tgtEl>
-                                          <p:spTgt spid="3">
+                                          <p:spTgt spid="6">
+                                            <p:txEl>
+                                              <p:pRg st="0" end="0"/>
+                                            </p:txEl>
+                                          </p:spTgt>
+                                        </p:tgtEl>
+                                      </p:cBhvr>
+                                    </p:animEffect>
+                                  </p:childTnLst>
+                                </p:cTn>
+                              </p:par>
+                              <p:par>
+                                <p:cTn id="12" presetID="10" presetClass="entr" presetSubtype="0" fill="hold" grpId="0" nodeType="withEffect">
+                                  <p:stCondLst>
+                                    <p:cond delay="0"/>
+                                  </p:stCondLst>
+                                  <p:childTnLst>
+                                    <p:set>
+                                      <p:cBhvr>
+                                        <p:cTn id="13" dur="1" fill="hold">
+                                          <p:stCondLst>
+                                            <p:cond delay="0"/>
+                                          </p:stCondLst>
+                                        </p:cTn>
+                                        <p:tgtEl>
+                                          <p:spTgt spid="6">
+                                            <p:txEl>
+                                              <p:pRg st="9" end="9"/>
+                                            </p:txEl>
+                                          </p:spTgt>
+                                        </p:tgtEl>
+                                        <p:attrNameLst>
+                                          <p:attrName>style.visibility</p:attrName>
+                                        </p:attrNameLst>
+                                      </p:cBhvr>
+                                      <p:to>
+                                        <p:strVal val="visible"/>
+                                      </p:to>
+                                    </p:set>
+                                    <p:animEffect transition="in" filter="fade">
+                                      <p:cBhvr>
+                                        <p:cTn id="14" dur="500"/>
+                                        <p:tgtEl>
+                                          <p:spTgt spid="6">
+                                            <p:txEl>
+                                              <p:pRg st="9" end="9"/>
+                                            </p:txEl>
+                                          </p:spTgt>
+                                        </p:tgtEl>
+                                      </p:cBhvr>
+                                    </p:animEffect>
+                                  </p:childTnLst>
+                                </p:cTn>
+                              </p:par>
+                            </p:childTnLst>
+                          </p:cTn>
+                        </p:par>
+                        <p:par>
+                          <p:cTn id="15" fill="hold">
+                            <p:stCondLst>
+                              <p:cond delay="1000"/>
+                            </p:stCondLst>
+                            <p:childTnLst>
+                              <p:par>
+                                <p:cTn id="16" presetID="10" presetClass="entr" presetSubtype="0" fill="hold" grpId="0" nodeType="afterEffect">
+                                  <p:stCondLst>
+                                    <p:cond delay="0"/>
+                                  </p:stCondLst>
+                                  <p:childTnLst>
+                                    <p:set>
+                                      <p:cBhvr>
+                                        <p:cTn id="17" dur="1" fill="hold">
+                                          <p:stCondLst>
+                                            <p:cond delay="0"/>
+                                          </p:stCondLst>
+                                        </p:cTn>
+                                        <p:tgtEl>
+                                          <p:spTgt spid="6">
+                                            <p:txEl>
+                                              <p:pRg st="6" end="6"/>
+                                            </p:txEl>
+                                          </p:spTgt>
+                                        </p:tgtEl>
+                                        <p:attrNameLst>
+                                          <p:attrName>style.visibility</p:attrName>
+                                        </p:attrNameLst>
+                                      </p:cBhvr>
+                                      <p:to>
+                                        <p:strVal val="visible"/>
+                                      </p:to>
+                                    </p:set>
+                                    <p:animEffect transition="in" filter="fade">
+                                      <p:cBhvr>
+                                        <p:cTn id="18" dur="500"/>
+                                        <p:tgtEl>
+                                          <p:spTgt spid="6">
+                                            <p:txEl>
+                                              <p:pRg st="6" end="6"/>
+                                            </p:txEl>
+                                          </p:spTgt>
+                                        </p:tgtEl>
+                                      </p:cBhvr>
+                                    </p:animEffect>
+                                  </p:childTnLst>
+                                </p:cTn>
+                              </p:par>
+                              <p:par>
+                                <p:cTn id="19" presetID="10" presetClass="entr" presetSubtype="0" fill="hold" grpId="0" nodeType="withEffect">
+                                  <p:stCondLst>
+                                    <p:cond delay="0"/>
+                                  </p:stCondLst>
+                                  <p:childTnLst>
+                                    <p:set>
+                                      <p:cBhvr>
+                                        <p:cTn id="20" dur="1" fill="hold">
+                                          <p:stCondLst>
+                                            <p:cond delay="0"/>
+                                          </p:stCondLst>
+                                        </p:cTn>
+                                        <p:tgtEl>
+                                          <p:spTgt spid="6">
+                                            <p:txEl>
+                                              <p:pRg st="8" end="8"/>
+                                            </p:txEl>
+                                          </p:spTgt>
+                                        </p:tgtEl>
+                                        <p:attrNameLst>
+                                          <p:attrName>style.visibility</p:attrName>
+                                        </p:attrNameLst>
+                                      </p:cBhvr>
+                                      <p:to>
+                                        <p:strVal val="visible"/>
+                                      </p:to>
+                                    </p:set>
+                                    <p:animEffect transition="in" filter="fade">
+                                      <p:cBhvr>
+                                        <p:cTn id="21" dur="500"/>
+                                        <p:tgtEl>
+                                          <p:spTgt spid="6">
+                                            <p:txEl>
+                                              <p:pRg st="8" end="8"/>
+                                            </p:txEl>
+                                          </p:spTgt>
+                                        </p:tgtEl>
+                                      </p:cBhvr>
+                                    </p:animEffect>
+                                  </p:childTnLst>
+                                </p:cTn>
+                              </p:par>
+                            </p:childTnLst>
+                          </p:cTn>
+                        </p:par>
+                        <p:par>
+                          <p:cTn id="22" fill="hold">
+                            <p:stCondLst>
+                              <p:cond delay="1500"/>
+                            </p:stCondLst>
+                            <p:childTnLst>
+                              <p:par>
+                                <p:cTn id="23" presetID="10" presetClass="entr" presetSubtype="0" fill="hold" grpId="0" nodeType="afterEffect">
+                                  <p:stCondLst>
+                                    <p:cond delay="0"/>
+                                  </p:stCondLst>
+                                  <p:childTnLst>
+                                    <p:set>
+                                      <p:cBhvr>
+                                        <p:cTn id="24" dur="1" fill="hold">
+                                          <p:stCondLst>
+                                            <p:cond delay="0"/>
+                                          </p:stCondLst>
+                                        </p:cTn>
+                                        <p:tgtEl>
+                                          <p:spTgt spid="6">
+                                            <p:txEl>
+                                              <p:pRg st="7" end="7"/>
+                                            </p:txEl>
+                                          </p:spTgt>
+                                        </p:tgtEl>
+                                        <p:attrNameLst>
+                                          <p:attrName>style.visibility</p:attrName>
+                                        </p:attrNameLst>
+                                      </p:cBhvr>
+                                      <p:to>
+                                        <p:strVal val="visible"/>
+                                      </p:to>
+                                    </p:set>
+                                    <p:animEffect transition="in" filter="fade">
+                                      <p:cBhvr>
+                                        <p:cTn id="25" dur="500"/>
+                                        <p:tgtEl>
+                                          <p:spTgt spid="6">
+                                            <p:txEl>
+                                              <p:pRg st="7" end="7"/>
+                                            </p:txEl>
+                                          </p:spTgt>
+                                        </p:tgtEl>
+                                      </p:cBhvr>
+                                    </p:animEffect>
+                                  </p:childTnLst>
+                                </p:cTn>
+                              </p:par>
+                            </p:childTnLst>
+                          </p:cTn>
+                        </p:par>
+                      </p:childTnLst>
+                    </p:cTn>
+                  </p:par>
+                  <p:par>
+                    <p:cTn id="26" fill="hold">
+                      <p:stCondLst>
+                        <p:cond delay="indefinite"/>
+                      </p:stCondLst>
+                      <p:childTnLst>
+                        <p:par>
+                          <p:cTn id="27" fill="hold">
+                            <p:stCondLst>
+                              <p:cond delay="0"/>
+                            </p:stCondLst>
+                            <p:childTnLst>
+                              <p:par>
+                                <p:cTn id="28" presetID="10" presetClass="entr" presetSubtype="0" fill="hold" grpId="0" nodeType="clickEffect">
+                                  <p:stCondLst>
+                                    <p:cond delay="0"/>
+                                  </p:stCondLst>
+                                  <p:childTnLst>
+                                    <p:set>
+                                      <p:cBhvr>
+                                        <p:cTn id="29" dur="1" fill="hold">
+                                          <p:stCondLst>
+                                            <p:cond delay="0"/>
+                                          </p:stCondLst>
+                                        </p:cTn>
+                                        <p:tgtEl>
+                                          <p:spTgt spid="6">
+                                            <p:txEl>
+                                              <p:pRg st="1" end="1"/>
+                                            </p:txEl>
+                                          </p:spTgt>
+                                        </p:tgtEl>
+                                        <p:attrNameLst>
+                                          <p:attrName>style.visibility</p:attrName>
+                                        </p:attrNameLst>
+                                      </p:cBhvr>
+                                      <p:to>
+                                        <p:strVal val="visible"/>
+                                      </p:to>
+                                    </p:set>
+                                    <p:animEffect transition="in" filter="fade">
+                                      <p:cBhvr>
+                                        <p:cTn id="30" dur="500"/>
+                                        <p:tgtEl>
+                                          <p:spTgt spid="6">
+                                            <p:txEl>
+                                              <p:pRg st="1" end="1"/>
+                                            </p:txEl>
+                                          </p:spTgt>
+                                        </p:tgtEl>
+                                      </p:cBhvr>
+                                    </p:animEffect>
+                                  </p:childTnLst>
+                                </p:cTn>
+                              </p:par>
+                              <p:par>
+                                <p:cTn id="31" presetID="10" presetClass="entr" presetSubtype="0" fill="hold" grpId="0" nodeType="withEffect">
+                                  <p:stCondLst>
+                                    <p:cond delay="0"/>
+                                  </p:stCondLst>
+                                  <p:childTnLst>
+                                    <p:set>
+                                      <p:cBhvr>
+                                        <p:cTn id="32" dur="1" fill="hold">
+                                          <p:stCondLst>
+                                            <p:cond delay="0"/>
+                                          </p:stCondLst>
+                                        </p:cTn>
+                                        <p:tgtEl>
+                                          <p:spTgt spid="6">
+                                            <p:txEl>
+                                              <p:pRg st="5" end="5"/>
+                                            </p:txEl>
+                                          </p:spTgt>
+                                        </p:tgtEl>
+                                        <p:attrNameLst>
+                                          <p:attrName>style.visibility</p:attrName>
+                                        </p:attrNameLst>
+                                      </p:cBhvr>
+                                      <p:to>
+                                        <p:strVal val="visible"/>
+                                      </p:to>
+                                    </p:set>
+                                    <p:animEffect transition="in" filter="fade">
+                                      <p:cBhvr>
+                                        <p:cTn id="33" dur="500"/>
+                                        <p:tgtEl>
+                                          <p:spTgt spid="6">
+                                            <p:txEl>
+                                              <p:pRg st="5" end="5"/>
+                                            </p:txEl>
+                                          </p:spTgt>
+                                        </p:tgtEl>
+                                      </p:cBhvr>
+                                    </p:animEffect>
+                                  </p:childTnLst>
+                                </p:cTn>
+                              </p:par>
+                              <p:par>
+                                <p:cTn id="34" presetID="10" presetClass="entr" presetSubtype="0" fill="hold" grpId="0" nodeType="withEffect">
+                                  <p:stCondLst>
+                                    <p:cond delay="0"/>
+                                  </p:stCondLst>
+                                  <p:childTnLst>
+                                    <p:set>
+                                      <p:cBhvr>
+                                        <p:cTn id="35" dur="1" fill="hold">
+                                          <p:stCondLst>
+                                            <p:cond delay="0"/>
+                                          </p:stCondLst>
+                                        </p:cTn>
+                                        <p:tgtEl>
+                                          <p:spTgt spid="5">
+                                            <p:txEl>
+                                              <p:pRg st="0" end="0"/>
+                                            </p:txEl>
+                                          </p:spTgt>
+                                        </p:tgtEl>
+                                        <p:attrNameLst>
+                                          <p:attrName>style.visibility</p:attrName>
+                                        </p:attrNameLst>
+                                      </p:cBhvr>
+                                      <p:to>
+                                        <p:strVal val="visible"/>
+                                      </p:to>
+                                    </p:set>
+                                    <p:animEffect transition="in" filter="fade">
+                                      <p:cBhvr>
+                                        <p:cTn id="36" dur="500"/>
+                                        <p:tgtEl>
+                                          <p:spTgt spid="5">
                                             <p:txEl>
                                               <p:pRg st="0" end="0"/>
                                             </p:txEl>
@@ -41096,32 +41905,118 @@
                     </p:cTn>
                   </p:par>
                   <p:par>
-                    <p:cTn id="8" fill="hold">
+                    <p:cTn id="37" fill="hold">
                       <p:stCondLst>
                         <p:cond delay="indefinite"/>
                       </p:stCondLst>
                       <p:childTnLst>
                         <p:par>
-                          <p:cTn id="9" fill="hold">
+                          <p:cTn id="38" fill="hold">
                             <p:stCondLst>
                               <p:cond delay="0"/>
                             </p:stCondLst>
                             <p:childTnLst>
                               <p:par>
-                                <p:cTn id="10" presetID="10" presetClass="entr" presetSubtype="0" fill="hold" grpId="0" nodeType="clickEffect">
+                                <p:cTn id="39" presetID="10" presetClass="entr" presetSubtype="0" fill="hold" grpId="0" nodeType="clickEffect">
                                   <p:stCondLst>
                                     <p:cond delay="0"/>
                                   </p:stCondLst>
                                   <p:childTnLst>
                                     <p:set>
                                       <p:cBhvr>
-                                        <p:cTn id="11" dur="1" fill="hold">
+                                        <p:cTn id="40" dur="1" fill="hold">
                                           <p:stCondLst>
                                             <p:cond delay="0"/>
                                           </p:stCondLst>
                                         </p:cTn>
                                         <p:tgtEl>
-                                          <p:spTgt spid="3">
+                                          <p:spTgt spid="6">
+                                            <p:txEl>
+                                              <p:pRg st="2" end="2"/>
+                                            </p:txEl>
+                                          </p:spTgt>
+                                        </p:tgtEl>
+                                        <p:attrNameLst>
+                                          <p:attrName>style.visibility</p:attrName>
+                                        </p:attrNameLst>
+                                      </p:cBhvr>
+                                      <p:to>
+                                        <p:strVal val="visible"/>
+                                      </p:to>
+                                    </p:set>
+                                    <p:animEffect transition="in" filter="fade">
+                                      <p:cBhvr>
+                                        <p:cTn id="41" dur="500"/>
+                                        <p:tgtEl>
+                                          <p:spTgt spid="6">
+                                            <p:txEl>
+                                              <p:pRg st="2" end="2"/>
+                                            </p:txEl>
+                                          </p:spTgt>
+                                        </p:tgtEl>
+                                      </p:cBhvr>
+                                    </p:animEffect>
+                                  </p:childTnLst>
+                                </p:cTn>
+                              </p:par>
+                              <p:par>
+                                <p:cTn id="42" presetID="10" presetClass="entr" presetSubtype="0" fill="hold" grpId="0" nodeType="withEffect">
+                                  <p:stCondLst>
+                                    <p:cond delay="0"/>
+                                  </p:stCondLst>
+                                  <p:childTnLst>
+                                    <p:set>
+                                      <p:cBhvr>
+                                        <p:cTn id="43" dur="1" fill="hold">
+                                          <p:stCondLst>
+                                            <p:cond delay="0"/>
+                                          </p:stCondLst>
+                                        </p:cTn>
+                                        <p:tgtEl>
+                                          <p:spTgt spid="6">
+                                            <p:txEl>
+                                              <p:pRg st="4" end="4"/>
+                                            </p:txEl>
+                                          </p:spTgt>
+                                        </p:tgtEl>
+                                        <p:attrNameLst>
+                                          <p:attrName>style.visibility</p:attrName>
+                                        </p:attrNameLst>
+                                      </p:cBhvr>
+                                      <p:to>
+                                        <p:strVal val="visible"/>
+                                      </p:to>
+                                    </p:set>
+                                    <p:animEffect transition="in" filter="fade">
+                                      <p:cBhvr>
+                                        <p:cTn id="44" dur="500"/>
+                                        <p:tgtEl>
+                                          <p:spTgt spid="6">
+                                            <p:txEl>
+                                              <p:pRg st="4" end="4"/>
+                                            </p:txEl>
+                                          </p:spTgt>
+                                        </p:tgtEl>
+                                      </p:cBhvr>
+                                    </p:animEffect>
+                                  </p:childTnLst>
+                                </p:cTn>
+                              </p:par>
+                              <p:par>
+                                <p:cTn id="45" presetID="10" presetClass="entr" presetSubtype="0" fill="hold" grpId="0" nodeType="withEffect">
+                                  <p:stCondLst>
+                                    <p:cond delay="0"/>
+                                  </p:stCondLst>
+                                  <p:childTnLst>
+                                    <p:set>
+                                      <p:cBhvr>
+                                        <p:cTn id="46" dur="1" fill="hold">
+                                          <p:stCondLst>
+                                            <p:cond delay="0"/>
+                                          </p:stCondLst>
+                                        </p:cTn>
+                                        <p:tgtEl>
+                                          <p:spTgt spid="5">
                                             <p:txEl>
                                               <p:pRg st="1" end="1"/>
                                             </p:txEl>
@@ -41137,9 +42032,9 @@
                                     </p:set>
                                     <p:animEffect transition="in" filter="fade">
                                       <p:cBhvr>
-                                        <p:cTn id="12" dur="500"/>
+                                        <p:cTn id="47" dur="500"/>
                                         <p:tgtEl>
-                                          <p:spTgt spid="3">
+                                          <p:spTgt spid="5">
                                             <p:txEl>
                                               <p:pRg st="1" end="1"/>
                                             </p:txEl>
@@ -41157,93 +42052,32 @@
                     </p:cTn>
                   </p:par>
                   <p:par>
-                    <p:cTn id="13" fill="hold">
+                    <p:cTn id="48" fill="hold">
                       <p:stCondLst>
                         <p:cond delay="indefinite"/>
                       </p:stCondLst>
                       <p:childTnLst>
                         <p:par>
-                          <p:cTn id="14" fill="hold">
+                          <p:cTn id="49" fill="hold">
                             <p:stCondLst>
                               <p:cond delay="0"/>
                             </p:stCondLst>
                             <p:childTnLst>
                               <p:par>
-                                <p:cTn id="15" presetID="10" presetClass="entr" presetSubtype="0" fill="hold" grpId="0" nodeType="clickEffect">
+                                <p:cTn id="50" presetID="10" presetClass="entr" presetSubtype="0" fill="hold" grpId="0" nodeType="clickEffect">
                                   <p:stCondLst>
                                     <p:cond delay="0"/>
                                   </p:stCondLst>
                                   <p:childTnLst>
                                     <p:set>
                                       <p:cBhvr>
-                                        <p:cTn id="16" dur="1" fill="hold">
+                                        <p:cTn id="51" dur="1" fill="hold">
                                           <p:stCondLst>
                                             <p:cond delay="0"/>
                                           </p:stCondLst>
                                         </p:cTn>
                                         <p:tgtEl>
-                                          <p:spTgt spid="3">
-                                            <p:txEl>
-                                              <p:pRg st="2" end="2"/>
-                                            </p:txEl>
-                                          </p:spTgt>
-                                        </p:tgtEl>
-                                        <p:attrNameLst>
-                                          <p:attrName>style.visibility</p:attrName>
-                                        </p:attrNameLst>
-                                      </p:cBhvr>
-                                      <p:to>
-                                        <p:strVal val="visible"/>
-                                      </p:to>
-                                    </p:set>
-                                    <p:animEffect transition="in" filter="fade">
-                                      <p:cBhvr>
-                                        <p:cTn id="17" dur="500"/>
-                                        <p:tgtEl>
-                                          <p:spTgt spid="3">
-                                            <p:txEl>
-                                              <p:pRg st="2" end="2"/>
-                                            </p:txEl>
-                                          </p:spTgt>
-                                        </p:tgtEl>
-                                      </p:cBhvr>
-                                    </p:animEffect>
-                                  </p:childTnLst>
-                                </p:cTn>
-                              </p:par>
-                            </p:childTnLst>
-                          </p:cTn>
-                        </p:par>
-                      </p:childTnLst>
-                    </p:cTn>
-                  </p:par>
-                  <p:par>
-                    <p:cTn id="18" fill="hold">
-                      <p:stCondLst>
-                        <p:cond delay="indefinite"/>
-                      </p:stCondLst>
-                      <p:childTnLst>
-                        <p:par>
-                          <p:cTn id="19" fill="hold">
-                            <p:stCondLst>
-                              <p:cond delay="0"/>
-                            </p:stCondLst>
-                            <p:childTnLst>
-                              <p:par>
-                                <p:cTn id="20" presetID="10" presetClass="entr" presetSubtype="0" fill="hold" grpId="0" nodeType="clickEffect">
-                                  <p:stCondLst>
-                                    <p:cond delay="0"/>
-                                  </p:stCondLst>
-                                  <p:childTnLst>
-                                    <p:set>
-                                      <p:cBhvr>
-                                        <p:cTn id="21" dur="1" fill="hold">
-                                          <p:stCondLst>
-                                            <p:cond delay="0"/>
-                                          </p:stCondLst>
-                                        </p:cTn>
-                                        <p:tgtEl>
-                                          <p:spTgt spid="3">
+                                          <p:spTgt spid="6">
                                             <p:txEl>
                                               <p:pRg st="3" end="3"/>
                                             </p:txEl>
@@ -41259,255 +42093,11 @@
                                     </p:set>
                                     <p:animEffect transition="in" filter="fade">
                                       <p:cBhvr>
-                                        <p:cTn id="22" dur="500"/>
+                                        <p:cTn id="52" dur="500"/>
                                         <p:tgtEl>
-                                          <p:spTgt spid="3">
+                                          <p:spTgt spid="6">
                                             <p:txEl>
                                               <p:pRg st="3" end="3"/>
-                                            </p:txEl>
-                                          </p:spTgt>
-                                        </p:tgtEl>
-                                      </p:cBhvr>
-                                    </p:animEffect>
-                                  </p:childTnLst>
-                                </p:cTn>
-                              </p:par>
-                            </p:childTnLst>
-                          </p:cTn>
-                        </p:par>
-                      </p:childTnLst>
-                    </p:cTn>
-                  </p:par>
-                  <p:par>
-                    <p:cTn id="23" fill="hold">
-                      <p:stCondLst>
-                        <p:cond delay="indefinite"/>
-                      </p:stCondLst>
-                      <p:childTnLst>
-                        <p:par>
-                          <p:cTn id="24" fill="hold">
-                            <p:stCondLst>
-                              <p:cond delay="0"/>
-                            </p:stCondLst>
-                            <p:childTnLst>
-                              <p:par>
-                                <p:cTn id="25" presetID="10" presetClass="entr" presetSubtype="0" fill="hold" grpId="0" nodeType="clickEffect">
-                                  <p:stCondLst>
-                                    <p:cond delay="0"/>
-                                  </p:stCondLst>
-                                  <p:childTnLst>
-                                    <p:set>
-                                      <p:cBhvr>
-                                        <p:cTn id="26" dur="1" fill="hold">
-                                          <p:stCondLst>
-                                            <p:cond delay="0"/>
-                                          </p:stCondLst>
-                                        </p:cTn>
-                                        <p:tgtEl>
-                                          <p:spTgt spid="3">
-                                            <p:txEl>
-                                              <p:pRg st="5" end="5"/>
-                                            </p:txEl>
-                                          </p:spTgt>
-                                        </p:tgtEl>
-                                        <p:attrNameLst>
-                                          <p:attrName>style.visibility</p:attrName>
-                                        </p:attrNameLst>
-                                      </p:cBhvr>
-                                      <p:to>
-                                        <p:strVal val="visible"/>
-                                      </p:to>
-                                    </p:set>
-                                    <p:animEffect transition="in" filter="fade">
-                                      <p:cBhvr>
-                                        <p:cTn id="27" dur="500"/>
-                                        <p:tgtEl>
-                                          <p:spTgt spid="3">
-                                            <p:txEl>
-                                              <p:pRg st="5" end="5"/>
-                                            </p:txEl>
-                                          </p:spTgt>
-                                        </p:tgtEl>
-                                      </p:cBhvr>
-                                    </p:animEffect>
-                                  </p:childTnLst>
-                                </p:cTn>
-                              </p:par>
-                            </p:childTnLst>
-                          </p:cTn>
-                        </p:par>
-                      </p:childTnLst>
-                    </p:cTn>
-                  </p:par>
-                  <p:par>
-                    <p:cTn id="28" fill="hold">
-                      <p:stCondLst>
-                        <p:cond delay="indefinite"/>
-                      </p:stCondLst>
-                      <p:childTnLst>
-                        <p:par>
-                          <p:cTn id="29" fill="hold">
-                            <p:stCondLst>
-                              <p:cond delay="0"/>
-                            </p:stCondLst>
-                            <p:childTnLst>
-                              <p:par>
-                                <p:cTn id="30" presetID="10" presetClass="entr" presetSubtype="0" fill="hold" grpId="0" nodeType="clickEffect">
-                                  <p:stCondLst>
-                                    <p:cond delay="0"/>
-                                  </p:stCondLst>
-                                  <p:childTnLst>
-                                    <p:set>
-                                      <p:cBhvr>
-                                        <p:cTn id="31" dur="1" fill="hold">
-                                          <p:stCondLst>
-                                            <p:cond delay="0"/>
-                                          </p:stCondLst>
-                                        </p:cTn>
-                                        <p:tgtEl>
-                                          <p:spTgt spid="3">
-                                            <p:txEl>
-                                              <p:pRg st="6" end="6"/>
-                                            </p:txEl>
-                                          </p:spTgt>
-                                        </p:tgtEl>
-                                        <p:attrNameLst>
-                                          <p:attrName>style.visibility</p:attrName>
-                                        </p:attrNameLst>
-                                      </p:cBhvr>
-                                      <p:to>
-                                        <p:strVal val="visible"/>
-                                      </p:to>
-                                    </p:set>
-                                    <p:animEffect transition="in" filter="fade">
-                                      <p:cBhvr>
-                                        <p:cTn id="32" dur="500"/>
-                                        <p:tgtEl>
-                                          <p:spTgt spid="3">
-                                            <p:txEl>
-                                              <p:pRg st="6" end="6"/>
-                                            </p:txEl>
-                                          </p:spTgt>
-                                        </p:tgtEl>
-                                      </p:cBhvr>
-                                    </p:animEffect>
-                                  </p:childTnLst>
-                                </p:cTn>
-                              </p:par>
-                            </p:childTnLst>
-                          </p:cTn>
-                        </p:par>
-                      </p:childTnLst>
-                    </p:cTn>
-                  </p:par>
-                  <p:par>
-                    <p:cTn id="33" fill="hold">
-                      <p:stCondLst>
-                        <p:cond delay="indefinite"/>
-                      </p:stCondLst>
-                      <p:childTnLst>
-                        <p:par>
-                          <p:cTn id="34" fill="hold">
-                            <p:stCondLst>
-                              <p:cond delay="0"/>
-                            </p:stCondLst>
-                            <p:childTnLst>
-                              <p:par>
-                                <p:cTn id="35" presetID="10" presetClass="entr" presetSubtype="0" fill="hold" grpId="0" nodeType="clickEffect">
-                                  <p:stCondLst>
-                                    <p:cond delay="0"/>
-                                  </p:stCondLst>
-                                  <p:childTnLst>
-                                    <p:set>
-                                      <p:cBhvr>
-                                        <p:cTn id="36" dur="1" fill="hold">
-                                          <p:stCondLst>
-                                            <p:cond delay="0"/>
-                                          </p:stCondLst>
-                                        </p:cTn>
-                                        <p:tgtEl>
-                                          <p:spTgt spid="3">
-                                            <p:txEl>
-                                              <p:pRg st="7" end="7"/>
-                                            </p:txEl>
-                                          </p:spTgt>
-                                        </p:tgtEl>
-                                        <p:attrNameLst>
-                                          <p:attrName>style.visibility</p:attrName>
-                                        </p:attrNameLst>
-                                      </p:cBhvr>
-                                      <p:to>
-                                        <p:strVal val="visible"/>
-                                      </p:to>
-                                    </p:set>
-                                    <p:animEffect transition="in" filter="fade">
-                                      <p:cBhvr>
-                                        <p:cTn id="37" dur="500"/>
-                                        <p:tgtEl>
-                                          <p:spTgt spid="3">
-                                            <p:txEl>
-                                              <p:pRg st="7" end="7"/>
-                                            </p:txEl>
-                                          </p:spTgt>
-                                        </p:tgtEl>
-                                      </p:cBhvr>
-                                    </p:animEffect>
-                                  </p:childTnLst>
-                                </p:cTn>
-                              </p:par>
-                            </p:childTnLst>
-                          </p:cTn>
-                        </p:par>
-                      </p:childTnLst>
-                    </p:cTn>
-                  </p:par>
-                  <p:par>
-                    <p:cTn id="38" fill="hold">
-                      <p:stCondLst>
-                        <p:cond delay="indefinite"/>
-                      </p:stCondLst>
-                      <p:childTnLst>
-                        <p:par>
-                          <p:cTn id="39" fill="hold">
-                            <p:stCondLst>
-                              <p:cond delay="0"/>
-                            </p:stCondLst>
-                            <p:childTnLst>
-                              <p:par>
-                                <p:cTn id="40" presetID="10" presetClass="entr" presetSubtype="0" fill="hold" grpId="0" nodeType="clickEffect">
-                                  <p:stCondLst>
-                                    <p:cond delay="0"/>
-                                  </p:stCondLst>
-                                  <p:childTnLst>
-                                    <p:set>
-                                      <p:cBhvr>
-                                        <p:cTn id="41" dur="1" fill="hold">
-                                          <p:stCondLst>
-                                            <p:cond delay="0"/>
-                                          </p:stCondLst>
-                                        </p:cTn>
-                                        <p:tgtEl>
-                                          <p:spTgt spid="3">
-                                            <p:txEl>
-                                              <p:pRg st="8" end="8"/>
-                                            </p:txEl>
-                                          </p:spTgt>
-                                        </p:tgtEl>
-                                        <p:attrNameLst>
-                                          <p:attrName>style.visibility</p:attrName>
-                                        </p:attrNameLst>
-                                      </p:cBhvr>
-                                      <p:to>
-                                        <p:strVal val="visible"/>
-                                      </p:to>
-                                    </p:set>
-                                    <p:animEffect transition="in" filter="fade">
-                                      <p:cBhvr>
-                                        <p:cTn id="42" dur="500"/>
-                                        <p:tgtEl>
-                                          <p:spTgt spid="3">
-                                            <p:txEl>
-                                              <p:pRg st="8" end="8"/>
                                             </p:txEl>
                                           </p:spTgt>
                                         </p:tgtEl>
@@ -41544,13 +42134,14 @@
       </p:par>
     </p:tnLst>
     <p:bldLst>
-      <p:bldP spid="3" grpId="0" uiExpand="1" build="p"/>
+      <p:bldP spid="6" grpId="0" uiExpand="1" build="p" animBg="1"/>
+      <p:bldP spid="5" grpId="0" uiExpand="1" build="p"/>
     </p:bldLst>
   </p:timing>
 </p:sld>
 </file>
 
-<file path=ppt/slides/slide5.xml><?xml version="1.0" encoding="utf-8"?>
+<file path=ppt/slides/slide4.xml><?xml version="1.0" encoding="utf-8"?>
 <p:sld xmlns:a="http://schemas.openxmlformats.org/drawingml/2006/main" xmlns:r="http://schemas.openxmlformats.org/officeDocument/2006/relationships" xmlns:p="http://schemas.openxmlformats.org/presentationml/2006/main">
   <p:cSld>
     <p:bg>
@@ -41623,7 +42214,7 @@
               <a:rPr lang="en-US" sz="9600" dirty="0">
                 <a:hlinkClick r:id="rId3"/>
               </a:rPr>
-              <a:t>https://replit.com/@HylandOutreach/CssFileExample</a:t>
+              <a:t>https://replit.com/@HylandOutreach/StyleElementExample</a:t>
             </a:r>
             <a:endParaRPr lang="en-US" sz="13800" dirty="0"/>
           </a:p>
@@ -41645,7 +42236,7 @@
 </p:sld>
 </file>
 
-<file path=ppt/slides/slide6.xml><?xml version="1.0" encoding="utf-8"?>
+<file path=ppt/slides/slide5.xml><?xml version="1.0" encoding="utf-8"?>
 <p:sld xmlns:a="http://schemas.openxmlformats.org/drawingml/2006/main" xmlns:r="http://schemas.openxmlformats.org/officeDocument/2006/relationships" xmlns:p="http://schemas.openxmlformats.org/presentationml/2006/main">
   <p:cSld>
     <p:spTree>
@@ -43703,7 +44294,7 @@
 </p:sld>
 </file>
 
-<file path=ppt/slides/slide7.xml><?xml version="1.0" encoding="utf-8"?>
+<file path=ppt/slides/slide6.xml><?xml version="1.0" encoding="utf-8"?>
 <p:sld xmlns:a="http://schemas.openxmlformats.org/drawingml/2006/main" xmlns:r="http://schemas.openxmlformats.org/officeDocument/2006/relationships" xmlns:p="http://schemas.openxmlformats.org/presentationml/2006/main">
   <p:cSld>
     <p:spTree>
@@ -44152,7 +44743,7 @@
 </p:sld>
 </file>
 
-<file path=ppt/slides/slide8.xml><?xml version="1.0" encoding="utf-8"?>
+<file path=ppt/slides/slide7.xml><?xml version="1.0" encoding="utf-8"?>
 <p:sld xmlns:a="http://schemas.openxmlformats.org/drawingml/2006/main" xmlns:r="http://schemas.openxmlformats.org/officeDocument/2006/relationships" xmlns:p="http://schemas.openxmlformats.org/presentationml/2006/main">
   <p:cSld>
     <p:spTree>
@@ -44690,7 +45281,7 @@
 </p:sld>
 </file>
 
-<file path=ppt/slides/slide9.xml><?xml version="1.0" encoding="utf-8"?>
+<file path=ppt/slides/slide8.xml><?xml version="1.0" encoding="utf-8"?>
 <p:sld xmlns:a="http://schemas.openxmlformats.org/drawingml/2006/main" xmlns:r="http://schemas.openxmlformats.org/officeDocument/2006/relationships" xmlns:p="http://schemas.openxmlformats.org/presentationml/2006/main">
   <p:cSld>
     <p:bg>
@@ -44763,7 +45354,7 @@
               <a:rPr lang="en-US" sz="11500" dirty="0">
                 <a:hlinkClick r:id="rId3"/>
               </a:rPr>
-              <a:t>https://replit.com/@HylandOutreach/Ruleset</a:t>
+              <a:t>https://replit.com/@HylandOutreach/Ruleset2</a:t>
             </a:r>
             <a:endParaRPr lang="en-US" sz="11500" dirty="0"/>
           </a:p>
@@ -44773,6 +45364,67 @@
     <p:extLst>
       <p:ext uri="{BB962C8B-B14F-4D97-AF65-F5344CB8AC3E}">
         <p14:creationId xmlns:p14="http://schemas.microsoft.com/office/powerpoint/2010/main" val="396988711"/>
+      </p:ext>
+    </p:extLst>
+  </p:cSld>
+  <p:clrMapOvr>
+    <a:masterClrMapping/>
+  </p:clrMapOvr>
+  <p:transition>
+    <p:fade/>
+  </p:transition>
+</p:sld>
+</file>
+
+<file path=ppt/slides/slide9.xml><?xml version="1.0" encoding="utf-8"?>
+<p:sld xmlns:a="http://schemas.openxmlformats.org/drawingml/2006/main" xmlns:r="http://schemas.openxmlformats.org/officeDocument/2006/relationships" xmlns:p="http://schemas.openxmlformats.org/presentationml/2006/main">
+  <p:cSld>
+    <p:spTree>
+      <p:nvGrpSpPr>
+        <p:cNvPr id="1" name=""/>
+        <p:cNvGrpSpPr/>
+        <p:nvPr/>
+      </p:nvGrpSpPr>
+      <p:grpSpPr>
+        <a:xfrm>
+          <a:off x="0" y="0"/>
+          <a:ext cx="0" cy="0"/>
+          <a:chOff x="0" y="0"/>
+          <a:chExt cx="0" cy="0"/>
+        </a:xfrm>
+      </p:grpSpPr>
+      <p:sp>
+        <p:nvSpPr>
+          <p:cNvPr id="2" name="Text Placeholder 1">
+            <a:extLst>
+              <a:ext uri="{FF2B5EF4-FFF2-40B4-BE49-F238E27FC236}">
+                <a16:creationId xmlns:a16="http://schemas.microsoft.com/office/drawing/2014/main" id="{85615D18-8F75-4B52-89C9-F982DAFE9325}"/>
+              </a:ext>
+            </a:extLst>
+          </p:cNvPr>
+          <p:cNvSpPr>
+            <a:spLocks noGrp="1"/>
+          </p:cNvSpPr>
+          <p:nvPr>
+            <p:ph type="body" sz="quarter" idx="10"/>
+          </p:nvPr>
+        </p:nvSpPr>
+        <p:spPr/>
+        <p:txBody>
+          <a:bodyPr/>
+          <a:lstStyle/>
+          <a:p>
+            <a:r>
+              <a:rPr lang="en-US"/>
+              <a:t>Questions?</a:t>
+            </a:r>
+          </a:p>
+        </p:txBody>
+      </p:sp>
+    </p:spTree>
+    <p:extLst>
+      <p:ext uri="{BB962C8B-B14F-4D97-AF65-F5344CB8AC3E}">
+        <p14:creationId xmlns:p14="http://schemas.microsoft.com/office/powerpoint/2010/main" val="2552111147"/>
       </p:ext>
     </p:extLst>
   </p:cSld>

</xml_diff>

<commit_message>
the ide is dead - long live the ide
</commit_message>
<xml_diff>
--- a/CssIntro/HelloCss.pptx
+++ b/CssIntro/HelloCss.pptx
@@ -229,7 +229,7 @@
           <a:p>
             <a:fld id="{19104133-B5B0-4351-8158-4F0E5EB1E2BF}" type="datetimeFigureOut">
               <a:rPr lang="en-US" smtClean="0"/>
-              <a:t>10/19/2022</a:t>
+              <a:t>8/26/2024</a:t>
             </a:fld>
             <a:endParaRPr lang="en-US"/>
           </a:p>
@@ -1575,7 +1575,7 @@
             <a:fld id="{1C2D31DE-C454-491C-B5C3-F097855E3DF7}" type="datetime4">
               <a:rPr lang="en-US" smtClean="0"/>
               <a:pPr/>
-              <a:t>October 19, 2022</a:t>
+              <a:t>August 26, 2024</a:t>
             </a:fld>
             <a:endParaRPr lang="en-US" dirty="0"/>
           </a:p>
@@ -4967,7 +4967,7 @@
           <a:p>
             <a:fld id="{5958763E-B898-436D-883D-03711491D54A}" type="datetimeFigureOut">
               <a:rPr lang="en-US" smtClean="0"/>
-              <a:t>10/19/2022</a:t>
+              <a:t>8/26/2024</a:t>
             </a:fld>
             <a:endParaRPr lang="en-US"/>
           </a:p>
@@ -5160,7 +5160,7 @@
           <a:p>
             <a:fld id="{5958763E-B898-436D-883D-03711491D54A}" type="datetimeFigureOut">
               <a:rPr lang="en-US" smtClean="0"/>
-              <a:t>10/19/2022</a:t>
+              <a:t>8/26/2024</a:t>
             </a:fld>
             <a:endParaRPr lang="en-US"/>
           </a:p>
@@ -5410,7 +5410,7 @@
           <a:p>
             <a:fld id="{5958763E-B898-436D-883D-03711491D54A}" type="datetimeFigureOut">
               <a:rPr lang="en-US" smtClean="0"/>
-              <a:t>10/19/2022</a:t>
+              <a:t>8/26/2024</a:t>
             </a:fld>
             <a:endParaRPr lang="en-US"/>
           </a:p>
@@ -5758,7 +5758,7 @@
           <a:p>
             <a:fld id="{5958763E-B898-436D-883D-03711491D54A}" type="datetimeFigureOut">
               <a:rPr lang="en-US" smtClean="0"/>
-              <a:t>10/19/2022</a:t>
+              <a:t>8/26/2024</a:t>
             </a:fld>
             <a:endParaRPr lang="en-US"/>
           </a:p>
@@ -6174,7 +6174,7 @@
           <a:p>
             <a:fld id="{5958763E-B898-436D-883D-03711491D54A}" type="datetimeFigureOut">
               <a:rPr lang="en-US" smtClean="0"/>
-              <a:t>10/19/2022</a:t>
+              <a:t>8/26/2024</a:t>
             </a:fld>
             <a:endParaRPr lang="en-US"/>
           </a:p>
@@ -6675,7 +6675,7 @@
           <a:p>
             <a:fld id="{5958763E-B898-436D-883D-03711491D54A}" type="datetimeFigureOut">
               <a:rPr lang="en-US" smtClean="0"/>
-              <a:t>10/19/2022</a:t>
+              <a:t>8/26/2024</a:t>
             </a:fld>
             <a:endParaRPr lang="en-US"/>
           </a:p>
@@ -7126,7 +7126,7 @@
           <a:p>
             <a:fld id="{5958763E-B898-436D-883D-03711491D54A}" type="datetimeFigureOut">
               <a:rPr lang="en-US" smtClean="0"/>
-              <a:t>10/19/2022</a:t>
+              <a:t>8/26/2024</a:t>
             </a:fld>
             <a:endParaRPr lang="en-US"/>
           </a:p>
@@ -7737,7 +7737,7 @@
           <a:p>
             <a:fld id="{5958763E-B898-436D-883D-03711491D54A}" type="datetimeFigureOut">
               <a:rPr lang="en-US" smtClean="0"/>
-              <a:t>10/19/2022</a:t>
+              <a:t>8/26/2024</a:t>
             </a:fld>
             <a:endParaRPr lang="en-US"/>
           </a:p>
@@ -8508,7 +8508,7 @@
           <a:p>
             <a:fld id="{5958763E-B898-436D-883D-03711491D54A}" type="datetimeFigureOut">
               <a:rPr lang="en-US" smtClean="0"/>
-              <a:t>10/19/2022</a:t>
+              <a:t>8/26/2024</a:t>
             </a:fld>
             <a:endParaRPr lang="en-US"/>
           </a:p>
@@ -8612,7 +8612,7 @@
           <a:p>
             <a:fld id="{5958763E-B898-436D-883D-03711491D54A}" type="datetimeFigureOut">
               <a:rPr lang="en-US" smtClean="0"/>
-              <a:t>10/19/2022</a:t>
+              <a:t>8/26/2024</a:t>
             </a:fld>
             <a:endParaRPr lang="en-US"/>
           </a:p>
@@ -8939,7 +8939,7 @@
             <a:fld id="{1C2D31DE-C454-491C-B5C3-F097855E3DF7}" type="datetime4">
               <a:rPr lang="en-US" smtClean="0"/>
               <a:pPr/>
-              <a:t>October 19, 2022</a:t>
+              <a:t>August 26, 2024</a:t>
             </a:fld>
             <a:endParaRPr lang="en-US" dirty="0"/>
           </a:p>
@@ -12091,7 +12091,7 @@
           <a:p>
             <a:fld id="{5958763E-B898-436D-883D-03711491D54A}" type="datetimeFigureOut">
               <a:rPr lang="en-US" smtClean="0"/>
-              <a:t>10/19/2022</a:t>
+              <a:t>8/26/2024</a:t>
             </a:fld>
             <a:endParaRPr lang="en-US"/>
           </a:p>
@@ -12215,7 +12215,7 @@
           <a:p>
             <a:fld id="{5958763E-B898-436D-883D-03711491D54A}" type="datetimeFigureOut">
               <a:rPr lang="en-US" smtClean="0"/>
-              <a:t>10/19/2022</a:t>
+              <a:t>8/26/2024</a:t>
             </a:fld>
             <a:endParaRPr lang="en-US"/>
           </a:p>
@@ -12339,7 +12339,7 @@
           <a:p>
             <a:fld id="{5958763E-B898-436D-883D-03711491D54A}" type="datetimeFigureOut">
               <a:rPr lang="en-US" smtClean="0"/>
-              <a:t>10/19/2022</a:t>
+              <a:t>8/26/2024</a:t>
             </a:fld>
             <a:endParaRPr lang="en-US"/>
           </a:p>
@@ -12463,7 +12463,7 @@
           <a:p>
             <a:fld id="{5958763E-B898-436D-883D-03711491D54A}" type="datetimeFigureOut">
               <a:rPr lang="en-US" smtClean="0"/>
-              <a:t>10/19/2022</a:t>
+              <a:t>8/26/2024</a:t>
             </a:fld>
             <a:endParaRPr lang="en-US"/>
           </a:p>
@@ -12587,7 +12587,7 @@
           <a:p>
             <a:fld id="{5958763E-B898-436D-883D-03711491D54A}" type="datetimeFigureOut">
               <a:rPr lang="en-US" smtClean="0"/>
-              <a:t>10/19/2022</a:t>
+              <a:t>8/26/2024</a:t>
             </a:fld>
             <a:endParaRPr lang="en-US"/>
           </a:p>
@@ -12711,7 +12711,7 @@
           <a:p>
             <a:fld id="{5958763E-B898-436D-883D-03711491D54A}" type="datetimeFigureOut">
               <a:rPr lang="en-US" smtClean="0"/>
-              <a:t>10/19/2022</a:t>
+              <a:t>8/26/2024</a:t>
             </a:fld>
             <a:endParaRPr lang="en-US"/>
           </a:p>
@@ -12835,7 +12835,7 @@
           <a:p>
             <a:fld id="{5958763E-B898-436D-883D-03711491D54A}" type="datetimeFigureOut">
               <a:rPr lang="en-US" smtClean="0"/>
-              <a:t>10/19/2022</a:t>
+              <a:t>8/26/2024</a:t>
             </a:fld>
             <a:endParaRPr lang="en-US"/>
           </a:p>
@@ -12959,7 +12959,7 @@
           <a:p>
             <a:fld id="{5958763E-B898-436D-883D-03711491D54A}" type="datetimeFigureOut">
               <a:rPr lang="en-US" smtClean="0"/>
-              <a:t>10/19/2022</a:t>
+              <a:t>8/26/2024</a:t>
             </a:fld>
             <a:endParaRPr lang="en-US"/>
           </a:p>
@@ -13092,7 +13092,7 @@
           <a:p>
             <a:fld id="{5958763E-B898-436D-883D-03711491D54A}" type="datetimeFigureOut">
               <a:rPr lang="en-US" smtClean="0"/>
-              <a:t>10/19/2022</a:t>
+              <a:t>8/26/2024</a:t>
             </a:fld>
             <a:endParaRPr lang="en-US"/>
           </a:p>
@@ -16431,7 +16431,7 @@
             <a:fld id="{1C2D31DE-C454-491C-B5C3-F097855E3DF7}" type="datetime4">
               <a:rPr lang="en-US" smtClean="0"/>
               <a:pPr/>
-              <a:t>October 19, 2022</a:t>
+              <a:t>August 26, 2024</a:t>
             </a:fld>
             <a:endParaRPr lang="en-US" dirty="0"/>
           </a:p>
@@ -28667,7 +28667,7 @@
           <a:p>
             <a:fld id="{5958763E-B898-436D-883D-03711491D54A}" type="datetimeFigureOut">
               <a:rPr lang="en-US" smtClean="0"/>
-              <a:t>10/19/2022</a:t>
+              <a:t>8/26/2024</a:t>
             </a:fld>
             <a:endParaRPr lang="en-US"/>
           </a:p>
@@ -29069,7 +29069,7 @@
           <a:p>
             <a:fld id="{5958763E-B898-436D-883D-03711491D54A}" type="datetimeFigureOut">
               <a:rPr lang="en-US" smtClean="0"/>
-              <a:t>10/19/2022</a:t>
+              <a:t>8/26/2024</a:t>
             </a:fld>
             <a:endParaRPr lang="en-US"/>
           </a:p>
@@ -29363,7 +29363,7 @@
           <a:p>
             <a:fld id="{5958763E-B898-436D-883D-03711491D54A}" type="datetimeFigureOut">
               <a:rPr lang="en-US" smtClean="0"/>
-              <a:t>10/19/2022</a:t>
+              <a:t>8/26/2024</a:t>
             </a:fld>
             <a:endParaRPr lang="en-US"/>
           </a:p>
@@ -29564,7 +29564,7 @@
           <a:p>
             <a:fld id="{5958763E-B898-436D-883D-03711491D54A}" type="datetimeFigureOut">
               <a:rPr lang="en-US" smtClean="0"/>
-              <a:t>10/19/2022</a:t>
+              <a:t>8/26/2024</a:t>
             </a:fld>
             <a:endParaRPr lang="en-US"/>
           </a:p>
@@ -29825,7 +29825,7 @@
           <a:p>
             <a:fld id="{5958763E-B898-436D-883D-03711491D54A}" type="datetimeFigureOut">
               <a:rPr lang="en-US" smtClean="0"/>
-              <a:t>10/19/2022</a:t>
+              <a:t>8/26/2024</a:t>
             </a:fld>
             <a:endParaRPr lang="en-US"/>
           </a:p>
@@ -30086,7 +30086,7 @@
           <a:p>
             <a:fld id="{61FD5E12-641C-4696-BA65-B86205845F69}" type="datetimeFigureOut">
               <a:rPr lang="en-US" smtClean="0"/>
-              <a:t>10/19/2022</a:t>
+              <a:t>8/26/2024</a:t>
             </a:fld>
             <a:endParaRPr lang="en-US"/>
           </a:p>
@@ -30256,7 +30256,7 @@
           <a:p>
             <a:fld id="{61FD5E12-641C-4696-BA65-B86205845F69}" type="datetimeFigureOut">
               <a:rPr lang="en-US" smtClean="0"/>
-              <a:t>10/19/2022</a:t>
+              <a:t>8/26/2024</a:t>
             </a:fld>
             <a:endParaRPr lang="en-US"/>
           </a:p>
@@ -30695,7 +30695,7 @@
           <a:p>
             <a:fld id="{5958763E-B898-436D-883D-03711491D54A}" type="datetimeFigureOut">
               <a:rPr lang="en-US" smtClean="0"/>
-              <a:t>10/19/2022</a:t>
+              <a:t>8/26/2024</a:t>
             </a:fld>
             <a:endParaRPr lang="en-US"/>
           </a:p>
@@ -30990,7 +30990,7 @@
           <a:p>
             <a:fld id="{61FD5E12-641C-4696-BA65-B86205845F69}" type="datetimeFigureOut">
               <a:rPr lang="en-US" smtClean="0"/>
-              <a:t>10/19/2022</a:t>
+              <a:t>8/26/2024</a:t>
             </a:fld>
             <a:endParaRPr lang="en-US"/>
           </a:p>
@@ -31222,7 +31222,7 @@
           <a:p>
             <a:fld id="{61FD5E12-641C-4696-BA65-B86205845F69}" type="datetimeFigureOut">
               <a:rPr lang="en-US" smtClean="0"/>
-              <a:t>10/19/2022</a:t>
+              <a:t>8/26/2024</a:t>
             </a:fld>
             <a:endParaRPr lang="en-US"/>
           </a:p>
@@ -31589,7 +31589,7 @@
           <a:p>
             <a:fld id="{61FD5E12-641C-4696-BA65-B86205845F69}" type="datetimeFigureOut">
               <a:rPr lang="en-US" smtClean="0"/>
-              <a:t>10/19/2022</a:t>
+              <a:t>8/26/2024</a:t>
             </a:fld>
             <a:endParaRPr lang="en-US"/>
           </a:p>
@@ -31707,7 +31707,7 @@
           <a:p>
             <a:fld id="{61FD5E12-641C-4696-BA65-B86205845F69}" type="datetimeFigureOut">
               <a:rPr lang="en-US" smtClean="0"/>
-              <a:t>10/19/2022</a:t>
+              <a:t>8/26/2024</a:t>
             </a:fld>
             <a:endParaRPr lang="en-US"/>
           </a:p>
@@ -31802,7 +31802,7 @@
           <a:p>
             <a:fld id="{61FD5E12-641C-4696-BA65-B86205845F69}" type="datetimeFigureOut">
               <a:rPr lang="en-US" smtClean="0"/>
-              <a:t>10/19/2022</a:t>
+              <a:t>8/26/2024</a:t>
             </a:fld>
             <a:endParaRPr lang="en-US"/>
           </a:p>
@@ -32079,7 +32079,7 @@
           <a:p>
             <a:fld id="{61FD5E12-641C-4696-BA65-B86205845F69}" type="datetimeFigureOut">
               <a:rPr lang="en-US" smtClean="0"/>
-              <a:t>10/19/2022</a:t>
+              <a:t>8/26/2024</a:t>
             </a:fld>
             <a:endParaRPr lang="en-US"/>
           </a:p>
@@ -32336,7 +32336,7 @@
           <a:p>
             <a:fld id="{61FD5E12-641C-4696-BA65-B86205845F69}" type="datetimeFigureOut">
               <a:rPr lang="en-US" smtClean="0"/>
-              <a:t>10/19/2022</a:t>
+              <a:t>8/26/2024</a:t>
             </a:fld>
             <a:endParaRPr lang="en-US"/>
           </a:p>
@@ -32506,7 +32506,7 @@
           <a:p>
             <a:fld id="{61FD5E12-641C-4696-BA65-B86205845F69}" type="datetimeFigureOut">
               <a:rPr lang="en-US" smtClean="0"/>
-              <a:t>10/19/2022</a:t>
+              <a:t>8/26/2024</a:t>
             </a:fld>
             <a:endParaRPr lang="en-US"/>
           </a:p>
@@ -32686,7 +32686,7 @@
           <a:p>
             <a:fld id="{61FD5E12-641C-4696-BA65-B86205845F69}" type="datetimeFigureOut">
               <a:rPr lang="en-US" smtClean="0"/>
-              <a:t>10/19/2022</a:t>
+              <a:t>8/26/2024</a:t>
             </a:fld>
             <a:endParaRPr lang="en-US"/>
           </a:p>
@@ -33332,7 +33332,7 @@
           <a:p>
             <a:fld id="{5958763E-B898-436D-883D-03711491D54A}" type="datetimeFigureOut">
               <a:rPr lang="en-US" smtClean="0"/>
-              <a:t>10/19/2022</a:t>
+              <a:t>8/26/2024</a:t>
             </a:fld>
             <a:endParaRPr lang="en-US"/>
           </a:p>
@@ -34721,7 +34721,7 @@
           <a:p>
             <a:fld id="{5958763E-B898-436D-883D-03711491D54A}" type="datetimeFigureOut">
               <a:rPr lang="en-US" smtClean="0"/>
-              <a:t>10/19/2022</a:t>
+              <a:t>8/26/2024</a:t>
             </a:fld>
             <a:endParaRPr lang="en-US"/>
           </a:p>
@@ -34922,7 +34922,7 @@
           <a:p>
             <a:fld id="{5958763E-B898-436D-883D-03711491D54A}" type="datetimeFigureOut">
               <a:rPr lang="en-US" smtClean="0"/>
-              <a:t>10/19/2022</a:t>
+              <a:t>8/26/2024</a:t>
             </a:fld>
             <a:endParaRPr lang="en-US"/>
           </a:p>
@@ -35257,7 +35257,7 @@
           <a:p>
             <a:fld id="{5958763E-B898-436D-883D-03711491D54A}" type="datetimeFigureOut">
               <a:rPr lang="en-US" smtClean="0"/>
-              <a:t>10/19/2022</a:t>
+              <a:t>8/26/2024</a:t>
             </a:fld>
             <a:endParaRPr lang="en-US"/>
           </a:p>
@@ -35487,7 +35487,7 @@
           <a:p>
             <a:fld id="{5958763E-B898-436D-883D-03711491D54A}" type="datetimeFigureOut">
               <a:rPr lang="en-US" smtClean="0"/>
-              <a:t>10/19/2022</a:t>
+              <a:t>8/26/2024</a:t>
             </a:fld>
             <a:endParaRPr lang="en-US"/>
           </a:p>
@@ -35731,7 +35731,7 @@
           <a:p>
             <a:fld id="{5958763E-B898-436D-883D-03711491D54A}" type="datetimeFigureOut">
               <a:rPr lang="en-US" smtClean="0"/>
-              <a:t>10/19/2022</a:t>
+              <a:t>8/26/2024</a:t>
             </a:fld>
             <a:endParaRPr lang="en-US"/>
           </a:p>
@@ -36372,7 +36372,7 @@
           <a:p>
             <a:fld id="{61FD5E12-641C-4696-BA65-B86205845F69}" type="datetimeFigureOut">
               <a:rPr lang="en-US" smtClean="0"/>
-              <a:t>10/19/2022</a:t>
+              <a:t>8/26/2024</a:t>
             </a:fld>
             <a:endParaRPr lang="en-US"/>
           </a:p>
@@ -42185,7 +42185,7 @@
           <a:p>
             <a:r>
               <a:rPr lang="en-US" dirty="0"/>
-              <a:t>CSS FILE example</a:t>
+              <a:t>Style Element example</a:t>
             </a:r>
           </a:p>
         </p:txBody>
@@ -42214,7 +42214,7 @@
               <a:rPr lang="en-US" sz="9600" dirty="0">
                 <a:hlinkClick r:id="rId3"/>
               </a:rPr>
-              <a:t>https://replit.com/@HylandOutreach/StyleElementExample</a:t>
+              <a:t>https://jsfiddle.net/ob6jp4fz/</a:t>
             </a:r>
             <a:endParaRPr lang="en-US" sz="13800" dirty="0"/>
           </a:p>
@@ -45354,7 +45354,13 @@
               <a:rPr lang="en-US" sz="11500" dirty="0">
                 <a:hlinkClick r:id="rId3"/>
               </a:rPr>
-              <a:t>https://replit.com/@HylandOutreach/Ruleset2</a:t>
+              <a:t>https://jsfiddle.net/</a:t>
+            </a:r>
+            <a:r>
+              <a:rPr lang="en-US" sz="11500">
+                <a:hlinkClick r:id="rId3"/>
+              </a:rPr>
+              <a:t>mnv79x5w/</a:t>
             </a:r>
             <a:endParaRPr lang="en-US" sz="11500" dirty="0"/>
           </a:p>

</xml_diff>

<commit_message>
Update gitbook 2024-08-26 15:21:48
</commit_message>
<xml_diff>
--- a/CssIntro/HelloCss.pptx
+++ b/CssIntro/HelloCss.pptx
@@ -229,7 +229,7 @@
           <a:p>
             <a:fld id="{19104133-B5B0-4351-8158-4F0E5EB1E2BF}" type="datetimeFigureOut">
               <a:rPr lang="en-US" smtClean="0"/>
-              <a:t>10/19/2022</a:t>
+              <a:t>8/26/2024</a:t>
             </a:fld>
             <a:endParaRPr lang="en-US"/>
           </a:p>
@@ -1575,7 +1575,7 @@
             <a:fld id="{1C2D31DE-C454-491C-B5C3-F097855E3DF7}" type="datetime4">
               <a:rPr lang="en-US" smtClean="0"/>
               <a:pPr/>
-              <a:t>October 19, 2022</a:t>
+              <a:t>August 26, 2024</a:t>
             </a:fld>
             <a:endParaRPr lang="en-US" dirty="0"/>
           </a:p>
@@ -4967,7 +4967,7 @@
           <a:p>
             <a:fld id="{5958763E-B898-436D-883D-03711491D54A}" type="datetimeFigureOut">
               <a:rPr lang="en-US" smtClean="0"/>
-              <a:t>10/19/2022</a:t>
+              <a:t>8/26/2024</a:t>
             </a:fld>
             <a:endParaRPr lang="en-US"/>
           </a:p>
@@ -5160,7 +5160,7 @@
           <a:p>
             <a:fld id="{5958763E-B898-436D-883D-03711491D54A}" type="datetimeFigureOut">
               <a:rPr lang="en-US" smtClean="0"/>
-              <a:t>10/19/2022</a:t>
+              <a:t>8/26/2024</a:t>
             </a:fld>
             <a:endParaRPr lang="en-US"/>
           </a:p>
@@ -5410,7 +5410,7 @@
           <a:p>
             <a:fld id="{5958763E-B898-436D-883D-03711491D54A}" type="datetimeFigureOut">
               <a:rPr lang="en-US" smtClean="0"/>
-              <a:t>10/19/2022</a:t>
+              <a:t>8/26/2024</a:t>
             </a:fld>
             <a:endParaRPr lang="en-US"/>
           </a:p>
@@ -5758,7 +5758,7 @@
           <a:p>
             <a:fld id="{5958763E-B898-436D-883D-03711491D54A}" type="datetimeFigureOut">
               <a:rPr lang="en-US" smtClean="0"/>
-              <a:t>10/19/2022</a:t>
+              <a:t>8/26/2024</a:t>
             </a:fld>
             <a:endParaRPr lang="en-US"/>
           </a:p>
@@ -6174,7 +6174,7 @@
           <a:p>
             <a:fld id="{5958763E-B898-436D-883D-03711491D54A}" type="datetimeFigureOut">
               <a:rPr lang="en-US" smtClean="0"/>
-              <a:t>10/19/2022</a:t>
+              <a:t>8/26/2024</a:t>
             </a:fld>
             <a:endParaRPr lang="en-US"/>
           </a:p>
@@ -6675,7 +6675,7 @@
           <a:p>
             <a:fld id="{5958763E-B898-436D-883D-03711491D54A}" type="datetimeFigureOut">
               <a:rPr lang="en-US" smtClean="0"/>
-              <a:t>10/19/2022</a:t>
+              <a:t>8/26/2024</a:t>
             </a:fld>
             <a:endParaRPr lang="en-US"/>
           </a:p>
@@ -7126,7 +7126,7 @@
           <a:p>
             <a:fld id="{5958763E-B898-436D-883D-03711491D54A}" type="datetimeFigureOut">
               <a:rPr lang="en-US" smtClean="0"/>
-              <a:t>10/19/2022</a:t>
+              <a:t>8/26/2024</a:t>
             </a:fld>
             <a:endParaRPr lang="en-US"/>
           </a:p>
@@ -7737,7 +7737,7 @@
           <a:p>
             <a:fld id="{5958763E-B898-436D-883D-03711491D54A}" type="datetimeFigureOut">
               <a:rPr lang="en-US" smtClean="0"/>
-              <a:t>10/19/2022</a:t>
+              <a:t>8/26/2024</a:t>
             </a:fld>
             <a:endParaRPr lang="en-US"/>
           </a:p>
@@ -8508,7 +8508,7 @@
           <a:p>
             <a:fld id="{5958763E-B898-436D-883D-03711491D54A}" type="datetimeFigureOut">
               <a:rPr lang="en-US" smtClean="0"/>
-              <a:t>10/19/2022</a:t>
+              <a:t>8/26/2024</a:t>
             </a:fld>
             <a:endParaRPr lang="en-US"/>
           </a:p>
@@ -8612,7 +8612,7 @@
           <a:p>
             <a:fld id="{5958763E-B898-436D-883D-03711491D54A}" type="datetimeFigureOut">
               <a:rPr lang="en-US" smtClean="0"/>
-              <a:t>10/19/2022</a:t>
+              <a:t>8/26/2024</a:t>
             </a:fld>
             <a:endParaRPr lang="en-US"/>
           </a:p>
@@ -8939,7 +8939,7 @@
             <a:fld id="{1C2D31DE-C454-491C-B5C3-F097855E3DF7}" type="datetime4">
               <a:rPr lang="en-US" smtClean="0"/>
               <a:pPr/>
-              <a:t>October 19, 2022</a:t>
+              <a:t>August 26, 2024</a:t>
             </a:fld>
             <a:endParaRPr lang="en-US" dirty="0"/>
           </a:p>
@@ -12091,7 +12091,7 @@
           <a:p>
             <a:fld id="{5958763E-B898-436D-883D-03711491D54A}" type="datetimeFigureOut">
               <a:rPr lang="en-US" smtClean="0"/>
-              <a:t>10/19/2022</a:t>
+              <a:t>8/26/2024</a:t>
             </a:fld>
             <a:endParaRPr lang="en-US"/>
           </a:p>
@@ -12215,7 +12215,7 @@
           <a:p>
             <a:fld id="{5958763E-B898-436D-883D-03711491D54A}" type="datetimeFigureOut">
               <a:rPr lang="en-US" smtClean="0"/>
-              <a:t>10/19/2022</a:t>
+              <a:t>8/26/2024</a:t>
             </a:fld>
             <a:endParaRPr lang="en-US"/>
           </a:p>
@@ -12339,7 +12339,7 @@
           <a:p>
             <a:fld id="{5958763E-B898-436D-883D-03711491D54A}" type="datetimeFigureOut">
               <a:rPr lang="en-US" smtClean="0"/>
-              <a:t>10/19/2022</a:t>
+              <a:t>8/26/2024</a:t>
             </a:fld>
             <a:endParaRPr lang="en-US"/>
           </a:p>
@@ -12463,7 +12463,7 @@
           <a:p>
             <a:fld id="{5958763E-B898-436D-883D-03711491D54A}" type="datetimeFigureOut">
               <a:rPr lang="en-US" smtClean="0"/>
-              <a:t>10/19/2022</a:t>
+              <a:t>8/26/2024</a:t>
             </a:fld>
             <a:endParaRPr lang="en-US"/>
           </a:p>
@@ -12587,7 +12587,7 @@
           <a:p>
             <a:fld id="{5958763E-B898-436D-883D-03711491D54A}" type="datetimeFigureOut">
               <a:rPr lang="en-US" smtClean="0"/>
-              <a:t>10/19/2022</a:t>
+              <a:t>8/26/2024</a:t>
             </a:fld>
             <a:endParaRPr lang="en-US"/>
           </a:p>
@@ -12711,7 +12711,7 @@
           <a:p>
             <a:fld id="{5958763E-B898-436D-883D-03711491D54A}" type="datetimeFigureOut">
               <a:rPr lang="en-US" smtClean="0"/>
-              <a:t>10/19/2022</a:t>
+              <a:t>8/26/2024</a:t>
             </a:fld>
             <a:endParaRPr lang="en-US"/>
           </a:p>
@@ -12835,7 +12835,7 @@
           <a:p>
             <a:fld id="{5958763E-B898-436D-883D-03711491D54A}" type="datetimeFigureOut">
               <a:rPr lang="en-US" smtClean="0"/>
-              <a:t>10/19/2022</a:t>
+              <a:t>8/26/2024</a:t>
             </a:fld>
             <a:endParaRPr lang="en-US"/>
           </a:p>
@@ -12959,7 +12959,7 @@
           <a:p>
             <a:fld id="{5958763E-B898-436D-883D-03711491D54A}" type="datetimeFigureOut">
               <a:rPr lang="en-US" smtClean="0"/>
-              <a:t>10/19/2022</a:t>
+              <a:t>8/26/2024</a:t>
             </a:fld>
             <a:endParaRPr lang="en-US"/>
           </a:p>
@@ -13092,7 +13092,7 @@
           <a:p>
             <a:fld id="{5958763E-B898-436D-883D-03711491D54A}" type="datetimeFigureOut">
               <a:rPr lang="en-US" smtClean="0"/>
-              <a:t>10/19/2022</a:t>
+              <a:t>8/26/2024</a:t>
             </a:fld>
             <a:endParaRPr lang="en-US"/>
           </a:p>
@@ -16431,7 +16431,7 @@
             <a:fld id="{1C2D31DE-C454-491C-B5C3-F097855E3DF7}" type="datetime4">
               <a:rPr lang="en-US" smtClean="0"/>
               <a:pPr/>
-              <a:t>October 19, 2022</a:t>
+              <a:t>August 26, 2024</a:t>
             </a:fld>
             <a:endParaRPr lang="en-US" dirty="0"/>
           </a:p>
@@ -28667,7 +28667,7 @@
           <a:p>
             <a:fld id="{5958763E-B898-436D-883D-03711491D54A}" type="datetimeFigureOut">
               <a:rPr lang="en-US" smtClean="0"/>
-              <a:t>10/19/2022</a:t>
+              <a:t>8/26/2024</a:t>
             </a:fld>
             <a:endParaRPr lang="en-US"/>
           </a:p>
@@ -29069,7 +29069,7 @@
           <a:p>
             <a:fld id="{5958763E-B898-436D-883D-03711491D54A}" type="datetimeFigureOut">
               <a:rPr lang="en-US" smtClean="0"/>
-              <a:t>10/19/2022</a:t>
+              <a:t>8/26/2024</a:t>
             </a:fld>
             <a:endParaRPr lang="en-US"/>
           </a:p>
@@ -29363,7 +29363,7 @@
           <a:p>
             <a:fld id="{5958763E-B898-436D-883D-03711491D54A}" type="datetimeFigureOut">
               <a:rPr lang="en-US" smtClean="0"/>
-              <a:t>10/19/2022</a:t>
+              <a:t>8/26/2024</a:t>
             </a:fld>
             <a:endParaRPr lang="en-US"/>
           </a:p>
@@ -29564,7 +29564,7 @@
           <a:p>
             <a:fld id="{5958763E-B898-436D-883D-03711491D54A}" type="datetimeFigureOut">
               <a:rPr lang="en-US" smtClean="0"/>
-              <a:t>10/19/2022</a:t>
+              <a:t>8/26/2024</a:t>
             </a:fld>
             <a:endParaRPr lang="en-US"/>
           </a:p>
@@ -29825,7 +29825,7 @@
           <a:p>
             <a:fld id="{5958763E-B898-436D-883D-03711491D54A}" type="datetimeFigureOut">
               <a:rPr lang="en-US" smtClean="0"/>
-              <a:t>10/19/2022</a:t>
+              <a:t>8/26/2024</a:t>
             </a:fld>
             <a:endParaRPr lang="en-US"/>
           </a:p>
@@ -30086,7 +30086,7 @@
           <a:p>
             <a:fld id="{61FD5E12-641C-4696-BA65-B86205845F69}" type="datetimeFigureOut">
               <a:rPr lang="en-US" smtClean="0"/>
-              <a:t>10/19/2022</a:t>
+              <a:t>8/26/2024</a:t>
             </a:fld>
             <a:endParaRPr lang="en-US"/>
           </a:p>
@@ -30256,7 +30256,7 @@
           <a:p>
             <a:fld id="{61FD5E12-641C-4696-BA65-B86205845F69}" type="datetimeFigureOut">
               <a:rPr lang="en-US" smtClean="0"/>
-              <a:t>10/19/2022</a:t>
+              <a:t>8/26/2024</a:t>
             </a:fld>
             <a:endParaRPr lang="en-US"/>
           </a:p>
@@ -30695,7 +30695,7 @@
           <a:p>
             <a:fld id="{5958763E-B898-436D-883D-03711491D54A}" type="datetimeFigureOut">
               <a:rPr lang="en-US" smtClean="0"/>
-              <a:t>10/19/2022</a:t>
+              <a:t>8/26/2024</a:t>
             </a:fld>
             <a:endParaRPr lang="en-US"/>
           </a:p>
@@ -30990,7 +30990,7 @@
           <a:p>
             <a:fld id="{61FD5E12-641C-4696-BA65-B86205845F69}" type="datetimeFigureOut">
               <a:rPr lang="en-US" smtClean="0"/>
-              <a:t>10/19/2022</a:t>
+              <a:t>8/26/2024</a:t>
             </a:fld>
             <a:endParaRPr lang="en-US"/>
           </a:p>
@@ -31222,7 +31222,7 @@
           <a:p>
             <a:fld id="{61FD5E12-641C-4696-BA65-B86205845F69}" type="datetimeFigureOut">
               <a:rPr lang="en-US" smtClean="0"/>
-              <a:t>10/19/2022</a:t>
+              <a:t>8/26/2024</a:t>
             </a:fld>
             <a:endParaRPr lang="en-US"/>
           </a:p>
@@ -31589,7 +31589,7 @@
           <a:p>
             <a:fld id="{61FD5E12-641C-4696-BA65-B86205845F69}" type="datetimeFigureOut">
               <a:rPr lang="en-US" smtClean="0"/>
-              <a:t>10/19/2022</a:t>
+              <a:t>8/26/2024</a:t>
             </a:fld>
             <a:endParaRPr lang="en-US"/>
           </a:p>
@@ -31707,7 +31707,7 @@
           <a:p>
             <a:fld id="{61FD5E12-641C-4696-BA65-B86205845F69}" type="datetimeFigureOut">
               <a:rPr lang="en-US" smtClean="0"/>
-              <a:t>10/19/2022</a:t>
+              <a:t>8/26/2024</a:t>
             </a:fld>
             <a:endParaRPr lang="en-US"/>
           </a:p>
@@ -31802,7 +31802,7 @@
           <a:p>
             <a:fld id="{61FD5E12-641C-4696-BA65-B86205845F69}" type="datetimeFigureOut">
               <a:rPr lang="en-US" smtClean="0"/>
-              <a:t>10/19/2022</a:t>
+              <a:t>8/26/2024</a:t>
             </a:fld>
             <a:endParaRPr lang="en-US"/>
           </a:p>
@@ -32079,7 +32079,7 @@
           <a:p>
             <a:fld id="{61FD5E12-641C-4696-BA65-B86205845F69}" type="datetimeFigureOut">
               <a:rPr lang="en-US" smtClean="0"/>
-              <a:t>10/19/2022</a:t>
+              <a:t>8/26/2024</a:t>
             </a:fld>
             <a:endParaRPr lang="en-US"/>
           </a:p>
@@ -32336,7 +32336,7 @@
           <a:p>
             <a:fld id="{61FD5E12-641C-4696-BA65-B86205845F69}" type="datetimeFigureOut">
               <a:rPr lang="en-US" smtClean="0"/>
-              <a:t>10/19/2022</a:t>
+              <a:t>8/26/2024</a:t>
             </a:fld>
             <a:endParaRPr lang="en-US"/>
           </a:p>
@@ -32506,7 +32506,7 @@
           <a:p>
             <a:fld id="{61FD5E12-641C-4696-BA65-B86205845F69}" type="datetimeFigureOut">
               <a:rPr lang="en-US" smtClean="0"/>
-              <a:t>10/19/2022</a:t>
+              <a:t>8/26/2024</a:t>
             </a:fld>
             <a:endParaRPr lang="en-US"/>
           </a:p>
@@ -32686,7 +32686,7 @@
           <a:p>
             <a:fld id="{61FD5E12-641C-4696-BA65-B86205845F69}" type="datetimeFigureOut">
               <a:rPr lang="en-US" smtClean="0"/>
-              <a:t>10/19/2022</a:t>
+              <a:t>8/26/2024</a:t>
             </a:fld>
             <a:endParaRPr lang="en-US"/>
           </a:p>
@@ -33332,7 +33332,7 @@
           <a:p>
             <a:fld id="{5958763E-B898-436D-883D-03711491D54A}" type="datetimeFigureOut">
               <a:rPr lang="en-US" smtClean="0"/>
-              <a:t>10/19/2022</a:t>
+              <a:t>8/26/2024</a:t>
             </a:fld>
             <a:endParaRPr lang="en-US"/>
           </a:p>
@@ -34721,7 +34721,7 @@
           <a:p>
             <a:fld id="{5958763E-B898-436D-883D-03711491D54A}" type="datetimeFigureOut">
               <a:rPr lang="en-US" smtClean="0"/>
-              <a:t>10/19/2022</a:t>
+              <a:t>8/26/2024</a:t>
             </a:fld>
             <a:endParaRPr lang="en-US"/>
           </a:p>
@@ -34922,7 +34922,7 @@
           <a:p>
             <a:fld id="{5958763E-B898-436D-883D-03711491D54A}" type="datetimeFigureOut">
               <a:rPr lang="en-US" smtClean="0"/>
-              <a:t>10/19/2022</a:t>
+              <a:t>8/26/2024</a:t>
             </a:fld>
             <a:endParaRPr lang="en-US"/>
           </a:p>
@@ -35257,7 +35257,7 @@
           <a:p>
             <a:fld id="{5958763E-B898-436D-883D-03711491D54A}" type="datetimeFigureOut">
               <a:rPr lang="en-US" smtClean="0"/>
-              <a:t>10/19/2022</a:t>
+              <a:t>8/26/2024</a:t>
             </a:fld>
             <a:endParaRPr lang="en-US"/>
           </a:p>
@@ -35487,7 +35487,7 @@
           <a:p>
             <a:fld id="{5958763E-B898-436D-883D-03711491D54A}" type="datetimeFigureOut">
               <a:rPr lang="en-US" smtClean="0"/>
-              <a:t>10/19/2022</a:t>
+              <a:t>8/26/2024</a:t>
             </a:fld>
             <a:endParaRPr lang="en-US"/>
           </a:p>
@@ -35731,7 +35731,7 @@
           <a:p>
             <a:fld id="{5958763E-B898-436D-883D-03711491D54A}" type="datetimeFigureOut">
               <a:rPr lang="en-US" smtClean="0"/>
-              <a:t>10/19/2022</a:t>
+              <a:t>8/26/2024</a:t>
             </a:fld>
             <a:endParaRPr lang="en-US"/>
           </a:p>
@@ -36372,7 +36372,7 @@
           <a:p>
             <a:fld id="{61FD5E12-641C-4696-BA65-B86205845F69}" type="datetimeFigureOut">
               <a:rPr lang="en-US" smtClean="0"/>
-              <a:t>10/19/2022</a:t>
+              <a:t>8/26/2024</a:t>
             </a:fld>
             <a:endParaRPr lang="en-US"/>
           </a:p>
@@ -42185,7 +42185,7 @@
           <a:p>
             <a:r>
               <a:rPr lang="en-US" dirty="0"/>
-              <a:t>CSS FILE example</a:t>
+              <a:t>Style Element example</a:t>
             </a:r>
           </a:p>
         </p:txBody>
@@ -42214,7 +42214,7 @@
               <a:rPr lang="en-US" sz="9600" dirty="0">
                 <a:hlinkClick r:id="rId3"/>
               </a:rPr>
-              <a:t>https://replit.com/@HylandOutreach/StyleElementExample</a:t>
+              <a:t>https://jsfiddle.net/ob6jp4fz/</a:t>
             </a:r>
             <a:endParaRPr lang="en-US" sz="13800" dirty="0"/>
           </a:p>
@@ -45354,7 +45354,13 @@
               <a:rPr lang="en-US" sz="11500" dirty="0">
                 <a:hlinkClick r:id="rId3"/>
               </a:rPr>
-              <a:t>https://replit.com/@HylandOutreach/Ruleset2</a:t>
+              <a:t>https://jsfiddle.net/</a:t>
+            </a:r>
+            <a:r>
+              <a:rPr lang="en-US" sz="11500">
+                <a:hlinkClick r:id="rId3"/>
+              </a:rPr>
+              <a:t>mnv79x5w/</a:t>
             </a:r>
             <a:endParaRPr lang="en-US" sz="11500" dirty="0"/>
           </a:p>

</xml_diff>